<commit_message>
update replit link week2 lecture
</commit_message>
<xml_diff>
--- a/Week02/BasicHtmlElements.pptx
+++ b/Week02/BasicHtmlElements.pptx
@@ -213,7 +213,7 @@
           <a:p>
             <a:fld id="{19104133-B5B0-4351-8158-4F0E5EB1E2BF}" type="datetimeFigureOut">
               <a:rPr lang="en-US" smtClean="0"/>
-              <a:t>3/19/2020</a:t>
+              <a:t>3/8/2022</a:t>
             </a:fld>
             <a:endParaRPr lang="en-US"/>
           </a:p>
@@ -277,38 +277,37 @@
           <a:p>
             <a:pPr lvl="0"/>
             <a:r>
-              <a:rPr lang="en-US" smtClean="0"/>
+              <a:rPr lang="en-US"/>
               <a:t>Edit Master text styles</a:t>
             </a:r>
           </a:p>
           <a:p>
             <a:pPr lvl="1"/>
             <a:r>
-              <a:rPr lang="en-US" smtClean="0"/>
+              <a:rPr lang="en-US"/>
               <a:t>Second level</a:t>
             </a:r>
           </a:p>
           <a:p>
             <a:pPr lvl="2"/>
             <a:r>
-              <a:rPr lang="en-US" smtClean="0"/>
+              <a:rPr lang="en-US"/>
               <a:t>Third level</a:t>
             </a:r>
           </a:p>
           <a:p>
             <a:pPr lvl="3"/>
             <a:r>
-              <a:rPr lang="en-US" smtClean="0"/>
+              <a:rPr lang="en-US"/>
               <a:t>Fourth level</a:t>
             </a:r>
           </a:p>
           <a:p>
             <a:pPr lvl="4"/>
             <a:r>
-              <a:rPr lang="en-US" smtClean="0"/>
+              <a:rPr lang="en-US"/>
               <a:t>Fifth level</a:t>
             </a:r>
-            <a:endParaRPr lang="en-US"/>
           </a:p>
         </p:txBody>
       </p:sp>
@@ -526,19 +525,19 @@
           <a:lstStyle/>
           <a:p>
             <a:r>
-              <a:rPr lang="en-US" dirty="0" smtClean="0"/>
+              <a:rPr lang="en-US" dirty="0"/>
               <a:t>Introduce some basic HTML elements</a:t>
             </a:r>
             <a:r>
-              <a:rPr lang="en-US" baseline="0" dirty="0" smtClean="0"/>
+              <a:rPr lang="en-US" baseline="0" dirty="0"/>
               <a:t>. There is a </a:t>
             </a:r>
             <a:r>
-              <a:rPr lang="en-US" baseline="0" dirty="0" err="1" smtClean="0"/>
+              <a:rPr lang="en-US" baseline="0" dirty="0" err="1"/>
               <a:t>CodePen</a:t>
             </a:r>
             <a:r>
-              <a:rPr lang="en-US" baseline="0" dirty="0" smtClean="0"/>
+              <a:rPr lang="en-US" baseline="0" dirty="0"/>
               <a:t> link at the end to show all of the elements in action.</a:t>
             </a:r>
             <a:endParaRPr lang="en-US" dirty="0"/>
@@ -643,10 +642,12 @@
               <a:defRPr/>
             </a:pPr>
             <a:r>
-              <a:rPr lang="en-US" dirty="0" smtClean="0">
-                <a:hlinkClick r:id="rId3"/>
-              </a:rPr>
-              <a:t>https://repl.it/repls/StudiousSlategrayBinarytree</a:t>
+              <a:rPr lang="en-US" dirty="0"/>
+              <a:t>https://replit.com/@HylandOutreach</a:t>
+            </a:r>
+            <a:r>
+              <a:rPr lang="en-US"/>
+              <a:t>/BasicElementsExample</a:t>
             </a:r>
             <a:endParaRPr lang="en-US" dirty="0"/>
           </a:p>
@@ -828,15 +829,7 @@
           <a:p>
             <a:r>
               <a:rPr lang="en-US" dirty="0"/>
-              <a:t>Click to edit Master </a:t>
-            </a:r>
-            <a:r>
-              <a:rPr lang="en-US" dirty="0" smtClean="0"/>
-              <a:t>subtitle </a:t>
-            </a:r>
-            <a:r>
-              <a:rPr lang="en-US" dirty="0"/>
-              <a:t>style</a:t>
+              <a:t>Click to edit Master subtitle style</a:t>
             </a:r>
           </a:p>
         </p:txBody>
@@ -878,7 +871,7 @@
             <a:fld id="{1C2D31DE-C454-491C-B5C3-F097855E3DF7}" type="datetime4">
               <a:rPr lang="en-US" smtClean="0"/>
               <a:pPr/>
-              <a:t>March 19, 2020</a:t>
+              <a:t>March 8, 2022</a:t>
             </a:fld>
             <a:endParaRPr lang="en-US" dirty="0"/>
           </a:p>
@@ -3952,17 +3945,16 @@
           <a:p>
             <a:pPr lvl="0"/>
             <a:r>
-              <a:rPr lang="en-US" dirty="0" smtClean="0"/>
+              <a:rPr lang="en-US" dirty="0"/>
               <a:t>Presenter Name</a:t>
             </a:r>
             <a:br>
-              <a:rPr lang="en-US" dirty="0" smtClean="0"/>
+              <a:rPr lang="en-US" dirty="0"/>
             </a:br>
             <a:r>
-              <a:rPr lang="en-US" dirty="0" smtClean="0"/>
+              <a:rPr lang="en-US" dirty="0"/>
               <a:t>Presenter Title</a:t>
             </a:r>
-            <a:endParaRPr lang="en-US" dirty="0"/>
           </a:p>
         </p:txBody>
       </p:sp>
@@ -3979,13 +3971,6 @@
   <p:transition>
     <p:fade/>
   </p:transition>
-  <p:timing>
-    <p:tnLst>
-      <p:par>
-        <p:cTn id="1" dur="indefinite" restart="never" nodeType="tmRoot"/>
-      </p:par>
-    </p:tnLst>
-  </p:timing>
   <p:hf sldNum="0" hdr="0" ftr="0"/>
 </p:sldLayout>
 </file>
@@ -4278,7 +4263,7 @@
           <a:p>
             <a:fld id="{5958763E-B898-436D-883D-03711491D54A}" type="datetimeFigureOut">
               <a:rPr lang="en-US" smtClean="0"/>
-              <a:t>3/19/2020</a:t>
+              <a:t>3/8/2022</a:t>
             </a:fld>
             <a:endParaRPr lang="en-US"/>
           </a:p>
@@ -4351,13 +4336,6 @@
   <p:transition>
     <p:fade/>
   </p:transition>
-  <p:timing>
-    <p:tnLst>
-      <p:par>
-        <p:cTn id="1" dur="indefinite" restart="never" nodeType="tmRoot"/>
-      </p:par>
-    </p:tnLst>
-  </p:timing>
 </p:sldLayout>
 </file>
 
@@ -4406,10 +4384,9 @@
           </a:lstStyle>
           <a:p>
             <a:r>
-              <a:rPr lang="en-US" dirty="0" smtClean="0"/>
+              <a:rPr lang="en-US" dirty="0"/>
               <a:t>Click icon to add picture</a:t>
             </a:r>
-            <a:endParaRPr lang="en-US" dirty="0"/>
           </a:p>
         </p:txBody>
       </p:sp>
@@ -4479,7 +4456,7 @@
           <a:p>
             <a:fld id="{5958763E-B898-436D-883D-03711491D54A}" type="datetimeFigureOut">
               <a:rPr lang="en-US" smtClean="0"/>
-              <a:t>3/19/2020</a:t>
+              <a:t>3/8/2022</a:t>
             </a:fld>
             <a:endParaRPr lang="en-US"/>
           </a:p>
@@ -4552,13 +4529,6 @@
   <p:transition>
     <p:fade/>
   </p:transition>
-  <p:timing>
-    <p:tnLst>
-      <p:par>
-        <p:cTn id="1" dur="indefinite" restart="never" nodeType="tmRoot"/>
-      </p:par>
-    </p:tnLst>
-  </p:timing>
 </p:sldLayout>
 </file>
 
@@ -4736,7 +4706,7 @@
           <a:p>
             <a:fld id="{5958763E-B898-436D-883D-03711491D54A}" type="datetimeFigureOut">
               <a:rPr lang="en-US" smtClean="0"/>
-              <a:t>3/19/2020</a:t>
+              <a:t>3/8/2022</a:t>
             </a:fld>
             <a:endParaRPr lang="en-US"/>
           </a:p>
@@ -4809,13 +4779,6 @@
   <p:transition>
     <p:fade/>
   </p:transition>
-  <p:timing>
-    <p:tnLst>
-      <p:par>
-        <p:cTn id="1" dur="indefinite" restart="never" nodeType="tmRoot"/>
-      </p:par>
-    </p:tnLst>
-  </p:timing>
 </p:sldLayout>
 </file>
 
@@ -5091,7 +5054,7 @@
           <a:p>
             <a:fld id="{5958763E-B898-436D-883D-03711491D54A}" type="datetimeFigureOut">
               <a:rPr lang="en-US" smtClean="0"/>
-              <a:t>3/19/2020</a:t>
+              <a:t>3/8/2022</a:t>
             </a:fld>
             <a:endParaRPr lang="en-US"/>
           </a:p>
@@ -5152,13 +5115,6 @@
   <p:transition>
     <p:fade/>
   </p:transition>
-  <p:timing>
-    <p:tnLst>
-      <p:par>
-        <p:cTn id="1" dur="indefinite" restart="never" nodeType="tmRoot"/>
-      </p:par>
-    </p:tnLst>
-  </p:timing>
 </p:sldLayout>
 </file>
 
@@ -5514,7 +5470,7 @@
           <a:p>
             <a:fld id="{5958763E-B898-436D-883D-03711491D54A}" type="datetimeFigureOut">
               <a:rPr lang="en-US" smtClean="0"/>
-              <a:t>3/19/2020</a:t>
+              <a:t>3/8/2022</a:t>
             </a:fld>
             <a:endParaRPr lang="en-US"/>
           </a:p>
@@ -5575,13 +5531,6 @@
   <p:transition>
     <p:fade/>
   </p:transition>
-  <p:timing>
-    <p:tnLst>
-      <p:par>
-        <p:cTn id="1" dur="indefinite" restart="never" nodeType="tmRoot"/>
-      </p:par>
-    </p:tnLst>
-  </p:timing>
 </p:sldLayout>
 </file>
 
@@ -6022,7 +5971,7 @@
           <a:p>
             <a:fld id="{5958763E-B898-436D-883D-03711491D54A}" type="datetimeFigureOut">
               <a:rPr lang="en-US" smtClean="0"/>
-              <a:t>3/19/2020</a:t>
+              <a:t>3/8/2022</a:t>
             </a:fld>
             <a:endParaRPr lang="en-US"/>
           </a:p>
@@ -6083,13 +6032,6 @@
   <p:transition>
     <p:fade/>
   </p:transition>
-  <p:timing>
-    <p:tnLst>
-      <p:par>
-        <p:cTn id="1" dur="indefinite" restart="never" nodeType="tmRoot"/>
-      </p:par>
-    </p:tnLst>
-  </p:timing>
 </p:sldLayout>
 </file>
 
@@ -6480,7 +6422,7 @@
           <a:p>
             <a:fld id="{5958763E-B898-436D-883D-03711491D54A}" type="datetimeFigureOut">
               <a:rPr lang="en-US" smtClean="0"/>
-              <a:t>3/19/2020</a:t>
+              <a:t>3/8/2022</a:t>
             </a:fld>
             <a:endParaRPr lang="en-US"/>
           </a:p>
@@ -6541,13 +6483,6 @@
   <p:transition>
     <p:fade/>
   </p:transition>
-  <p:timing>
-    <p:tnLst>
-      <p:par>
-        <p:cTn id="1" dur="indefinite" restart="never" nodeType="tmRoot"/>
-      </p:par>
-    </p:tnLst>
-  </p:timing>
 </p:sldLayout>
 </file>
 
@@ -7098,7 +7033,7 @@
           <a:p>
             <a:fld id="{5958763E-B898-436D-883D-03711491D54A}" type="datetimeFigureOut">
               <a:rPr lang="en-US" smtClean="0"/>
-              <a:t>3/19/2020</a:t>
+              <a:t>3/8/2022</a:t>
             </a:fld>
             <a:endParaRPr lang="en-US"/>
           </a:p>
@@ -7159,13 +7094,6 @@
   <p:transition>
     <p:fade/>
   </p:transition>
-  <p:timing>
-    <p:tnLst>
-      <p:par>
-        <p:cTn id="1" dur="indefinite" restart="never" nodeType="tmRoot"/>
-      </p:par>
-    </p:tnLst>
-  </p:timing>
 </p:sldLayout>
 </file>
 
@@ -7876,7 +7804,7 @@
           <a:p>
             <a:fld id="{5958763E-B898-436D-883D-03711491D54A}" type="datetimeFigureOut">
               <a:rPr lang="en-US" smtClean="0"/>
-              <a:t>3/19/2020</a:t>
+              <a:t>3/8/2022</a:t>
             </a:fld>
             <a:endParaRPr lang="en-US"/>
           </a:p>
@@ -7937,13 +7865,6 @@
   <p:transition>
     <p:fade/>
   </p:transition>
-  <p:timing>
-    <p:tnLst>
-      <p:par>
-        <p:cTn id="1" dur="indefinite" restart="never" nodeType="tmRoot"/>
-      </p:par>
-    </p:tnLst>
-  </p:timing>
 </p:sldLayout>
 </file>
 
@@ -7987,7 +7908,7 @@
           <a:p>
             <a:fld id="{5958763E-B898-436D-883D-03711491D54A}" type="datetimeFigureOut">
               <a:rPr lang="en-US" smtClean="0"/>
-              <a:t>3/19/2020</a:t>
+              <a:t>3/8/2022</a:t>
             </a:fld>
             <a:endParaRPr lang="en-US"/>
           </a:p>
@@ -8060,13 +7981,6 @@
   <p:transition>
     <p:fade/>
   </p:transition>
-  <p:timing>
-    <p:tnLst>
-      <p:par>
-        <p:cTn id="1" dur="indefinite" restart="never" nodeType="tmRoot"/>
-      </p:par>
-    </p:tnLst>
-  </p:timing>
 </p:sldLayout>
 </file>
 
@@ -8146,7 +8060,7 @@
                 <a:spcPct val="0"/>
               </a:spcAft>
             </a:pPr>
-            <a:endParaRPr lang="en-US" sz="2400" dirty="0" err="1" smtClean="0">
+            <a:endParaRPr lang="en-US" sz="2400" dirty="0" err="1">
               <a:gradFill>
                 <a:gsLst>
                   <a:gs pos="0">
@@ -8279,15 +8193,7 @@
           <a:p>
             <a:r>
               <a:rPr lang="en-US" dirty="0"/>
-              <a:t>Click to edit Master </a:t>
-            </a:r>
-            <a:r>
-              <a:rPr lang="en-US" dirty="0" smtClean="0"/>
-              <a:t>subtitle </a:t>
-            </a:r>
-            <a:r>
-              <a:rPr lang="en-US" dirty="0"/>
-              <a:t>style</a:t>
+              <a:t>Click to edit Master subtitle style</a:t>
             </a:r>
           </a:p>
         </p:txBody>
@@ -8329,7 +8235,7 @@
             <a:fld id="{1C2D31DE-C454-491C-B5C3-F097855E3DF7}" type="datetime4">
               <a:rPr lang="en-US" smtClean="0"/>
               <a:pPr/>
-              <a:t>March 19, 2020</a:t>
+              <a:t>March 8, 2022</a:t>
             </a:fld>
             <a:endParaRPr lang="en-US" dirty="0"/>
           </a:p>
@@ -11403,17 +11309,16 @@
           <a:p>
             <a:pPr lvl="0"/>
             <a:r>
-              <a:rPr lang="en-US" dirty="0" smtClean="0"/>
+              <a:rPr lang="en-US" dirty="0"/>
               <a:t>Presenter Name</a:t>
             </a:r>
             <a:br>
-              <a:rPr lang="en-US" dirty="0" smtClean="0"/>
+              <a:rPr lang="en-US" dirty="0"/>
             </a:br>
             <a:r>
-              <a:rPr lang="en-US" dirty="0" smtClean="0"/>
+              <a:rPr lang="en-US" dirty="0"/>
               <a:t>Presenter Title</a:t>
             </a:r>
-            <a:endParaRPr lang="en-US" dirty="0"/>
           </a:p>
         </p:txBody>
       </p:sp>
@@ -11430,13 +11335,6 @@
   <p:transition>
     <p:fade/>
   </p:transition>
-  <p:timing>
-    <p:tnLst>
-      <p:par>
-        <p:cTn id="1" dur="indefinite" restart="never" nodeType="tmRoot"/>
-      </p:par>
-    </p:tnLst>
-  </p:timing>
   <p:hf sldNum="0" hdr="0" ftr="0"/>
 </p:sldLayout>
 </file>
@@ -11489,7 +11387,7 @@
           <a:p>
             <a:fld id="{5958763E-B898-436D-883D-03711491D54A}" type="datetimeFigureOut">
               <a:rPr lang="en-US" smtClean="0"/>
-              <a:t>3/19/2020</a:t>
+              <a:t>3/8/2022</a:t>
             </a:fld>
             <a:endParaRPr lang="en-US"/>
           </a:p>
@@ -11562,13 +11460,6 @@
   <p:transition>
     <p:fade/>
   </p:transition>
-  <p:timing>
-    <p:tnLst>
-      <p:par>
-        <p:cTn id="1" dur="indefinite" restart="never" nodeType="tmRoot"/>
-      </p:par>
-    </p:tnLst>
-  </p:timing>
 </p:sldLayout>
 </file>
 
@@ -11620,7 +11511,7 @@
           <a:p>
             <a:fld id="{5958763E-B898-436D-883D-03711491D54A}" type="datetimeFigureOut">
               <a:rPr lang="en-US" smtClean="0"/>
-              <a:t>3/19/2020</a:t>
+              <a:t>3/8/2022</a:t>
             </a:fld>
             <a:endParaRPr lang="en-US"/>
           </a:p>
@@ -11693,13 +11584,6 @@
   <p:transition>
     <p:fade/>
   </p:transition>
-  <p:timing>
-    <p:tnLst>
-      <p:par>
-        <p:cTn id="1" dur="indefinite" restart="never" nodeType="tmRoot"/>
-      </p:par>
-    </p:tnLst>
-  </p:timing>
 </p:sldLayout>
 </file>
 
@@ -11751,7 +11635,7 @@
           <a:p>
             <a:fld id="{5958763E-B898-436D-883D-03711491D54A}" type="datetimeFigureOut">
               <a:rPr lang="en-US" smtClean="0"/>
-              <a:t>3/19/2020</a:t>
+              <a:t>3/8/2022</a:t>
             </a:fld>
             <a:endParaRPr lang="en-US"/>
           </a:p>
@@ -11824,13 +11708,6 @@
   <p:transition>
     <p:fade/>
   </p:transition>
-  <p:timing>
-    <p:tnLst>
-      <p:par>
-        <p:cTn id="1" dur="indefinite" restart="never" nodeType="tmRoot"/>
-      </p:par>
-    </p:tnLst>
-  </p:timing>
 </p:sldLayout>
 </file>
 
@@ -11882,7 +11759,7 @@
           <a:p>
             <a:fld id="{5958763E-B898-436D-883D-03711491D54A}" type="datetimeFigureOut">
               <a:rPr lang="en-US" smtClean="0"/>
-              <a:t>3/19/2020</a:t>
+              <a:t>3/8/2022</a:t>
             </a:fld>
             <a:endParaRPr lang="en-US"/>
           </a:p>
@@ -11955,13 +11832,6 @@
   <p:transition>
     <p:fade/>
   </p:transition>
-  <p:timing>
-    <p:tnLst>
-      <p:par>
-        <p:cTn id="1" dur="indefinite" restart="never" nodeType="tmRoot"/>
-      </p:par>
-    </p:tnLst>
-  </p:timing>
 </p:sldLayout>
 </file>
 
@@ -12013,7 +11883,7 @@
           <a:p>
             <a:fld id="{5958763E-B898-436D-883D-03711491D54A}" type="datetimeFigureOut">
               <a:rPr lang="en-US" smtClean="0"/>
-              <a:t>3/19/2020</a:t>
+              <a:t>3/8/2022</a:t>
             </a:fld>
             <a:endParaRPr lang="en-US"/>
           </a:p>
@@ -12086,13 +11956,6 @@
   <p:transition>
     <p:fade/>
   </p:transition>
-  <p:timing>
-    <p:tnLst>
-      <p:par>
-        <p:cTn id="1" dur="indefinite" restart="never" nodeType="tmRoot"/>
-      </p:par>
-    </p:tnLst>
-  </p:timing>
 </p:sldLayout>
 </file>
 
@@ -12144,7 +12007,7 @@
           <a:p>
             <a:fld id="{5958763E-B898-436D-883D-03711491D54A}" type="datetimeFigureOut">
               <a:rPr lang="en-US" smtClean="0"/>
-              <a:t>3/19/2020</a:t>
+              <a:t>3/8/2022</a:t>
             </a:fld>
             <a:endParaRPr lang="en-US"/>
           </a:p>
@@ -12217,13 +12080,6 @@
   <p:transition>
     <p:fade/>
   </p:transition>
-  <p:timing>
-    <p:tnLst>
-      <p:par>
-        <p:cTn id="1" dur="indefinite" restart="never" nodeType="tmRoot"/>
-      </p:par>
-    </p:tnLst>
-  </p:timing>
 </p:sldLayout>
 </file>
 
@@ -12275,7 +12131,7 @@
           <a:p>
             <a:fld id="{5958763E-B898-436D-883D-03711491D54A}" type="datetimeFigureOut">
               <a:rPr lang="en-US" smtClean="0"/>
-              <a:t>3/19/2020</a:t>
+              <a:t>3/8/2022</a:t>
             </a:fld>
             <a:endParaRPr lang="en-US"/>
           </a:p>
@@ -12348,13 +12204,6 @@
   <p:transition>
     <p:fade/>
   </p:transition>
-  <p:timing>
-    <p:tnLst>
-      <p:par>
-        <p:cTn id="1" dur="indefinite" restart="never" nodeType="tmRoot"/>
-      </p:par>
-    </p:tnLst>
-  </p:timing>
 </p:sldLayout>
 </file>
 
@@ -12406,7 +12255,7 @@
           <a:p>
             <a:fld id="{5958763E-B898-436D-883D-03711491D54A}" type="datetimeFigureOut">
               <a:rPr lang="en-US" smtClean="0"/>
-              <a:t>3/19/2020</a:t>
+              <a:t>3/8/2022</a:t>
             </a:fld>
             <a:endParaRPr lang="en-US"/>
           </a:p>
@@ -12479,13 +12328,6 @@
   <p:transition>
     <p:fade/>
   </p:transition>
-  <p:timing>
-    <p:tnLst>
-      <p:par>
-        <p:cTn id="1" dur="indefinite" restart="never" nodeType="tmRoot"/>
-      </p:par>
-    </p:tnLst>
-  </p:timing>
 </p:sldLayout>
 </file>
 
@@ -12546,7 +12388,7 @@
           <a:p>
             <a:fld id="{5958763E-B898-436D-883D-03711491D54A}" type="datetimeFigureOut">
               <a:rPr lang="en-US" smtClean="0"/>
-              <a:t>3/19/2020</a:t>
+              <a:t>3/8/2022</a:t>
             </a:fld>
             <a:endParaRPr lang="en-US"/>
           </a:p>
@@ -12619,13 +12461,6 @@
   <p:transition>
     <p:fade/>
   </p:transition>
-  <p:timing>
-    <p:tnLst>
-      <p:par>
-        <p:cTn id="1" dur="indefinite" restart="never" nodeType="tmRoot"/>
-      </p:par>
-    </p:tnLst>
-  </p:timing>
 </p:sldLayout>
 </file>
 
@@ -15627,13 +15462,6 @@
   <p:transition>
     <p:fade/>
   </p:transition>
-  <p:timing>
-    <p:tnLst>
-      <p:par>
-        <p:cTn id="1" dur="indefinite" restart="never" nodeType="tmRoot"/>
-      </p:par>
-    </p:tnLst>
-  </p:timing>
 </p:sldLayout>
 </file>
 
@@ -15721,7 +15549,7 @@
                 <a:spcPct val="0"/>
               </a:spcAft>
             </a:pPr>
-            <a:endParaRPr lang="en-US" sz="2400" dirty="0" err="1" smtClean="0">
+            <a:endParaRPr lang="en-US" sz="2400" dirty="0" err="1">
               <a:gradFill>
                 <a:gsLst>
                   <a:gs pos="0">
@@ -15857,15 +15685,7 @@
           <a:p>
             <a:r>
               <a:rPr lang="en-US" dirty="0"/>
-              <a:t>Click to edit Master </a:t>
-            </a:r>
-            <a:r>
-              <a:rPr lang="en-US" dirty="0" smtClean="0"/>
-              <a:t>subtitle </a:t>
-            </a:r>
-            <a:r>
-              <a:rPr lang="en-US" dirty="0"/>
-              <a:t>style</a:t>
+              <a:t>Click to edit Master subtitle style</a:t>
             </a:r>
           </a:p>
         </p:txBody>
@@ -15907,7 +15727,7 @@
             <a:fld id="{1C2D31DE-C454-491C-B5C3-F097855E3DF7}" type="datetime4">
               <a:rPr lang="en-US" smtClean="0"/>
               <a:pPr/>
-              <a:t>March 19, 2020</a:t>
+              <a:t>March 8, 2022</a:t>
             </a:fld>
             <a:endParaRPr lang="en-US" dirty="0"/>
           </a:p>
@@ -18989,17 +18809,16 @@
           <a:p>
             <a:pPr lvl="0"/>
             <a:r>
-              <a:rPr lang="en-US" dirty="0" smtClean="0"/>
+              <a:rPr lang="en-US" dirty="0"/>
               <a:t>Presenter Name</a:t>
             </a:r>
             <a:br>
-              <a:rPr lang="en-US" dirty="0" smtClean="0"/>
+              <a:rPr lang="en-US" dirty="0"/>
             </a:br>
             <a:r>
-              <a:rPr lang="en-US" dirty="0" smtClean="0"/>
+              <a:rPr lang="en-US" dirty="0"/>
               <a:t>Presenter Title</a:t>
             </a:r>
-            <a:endParaRPr lang="en-US" dirty="0"/>
           </a:p>
         </p:txBody>
       </p:sp>
@@ -19016,13 +18835,6 @@
   <p:transition>
     <p:fade/>
   </p:transition>
-  <p:timing>
-    <p:tnLst>
-      <p:par>
-        <p:cTn id="1" dur="indefinite" restart="never" nodeType="tmRoot"/>
-      </p:par>
-    </p:tnLst>
-  </p:timing>
   <p:hf sldNum="0" hdr="0" ftr="0"/>
 </p:sldLayout>
 </file>
@@ -26532,10 +26344,9 @@
           <a:p>
             <a:pPr lvl="0"/>
             <a:r>
-              <a:rPr lang="en-US" dirty="0" smtClean="0"/>
+              <a:rPr lang="en-US" dirty="0"/>
               <a:t>&lt;Call to action&gt;</a:t>
             </a:r>
-            <a:endParaRPr lang="en-US" dirty="0"/>
           </a:p>
         </p:txBody>
       </p:sp>
@@ -28152,7 +27963,7 @@
           <a:p>
             <a:fld id="{5958763E-B898-436D-883D-03711491D54A}" type="datetimeFigureOut">
               <a:rPr lang="en-US" smtClean="0"/>
-              <a:t>3/19/2020</a:t>
+              <a:t>3/8/2022</a:t>
             </a:fld>
             <a:endParaRPr lang="en-US"/>
           </a:p>
@@ -28279,7 +28090,7 @@
                 <a:spcPct val="0"/>
               </a:spcAft>
             </a:pPr>
-            <a:endParaRPr lang="en-US" sz="2400" dirty="0" err="1" smtClean="0">
+            <a:endParaRPr lang="en-US" sz="2400" dirty="0" err="1">
               <a:gradFill>
                 <a:gsLst>
                   <a:gs pos="0">
@@ -28310,13 +28121,6 @@
   <p:transition>
     <p:fade/>
   </p:transition>
-  <p:timing>
-    <p:tnLst>
-      <p:par>
-        <p:cTn id="1" dur="indefinite" restart="never" nodeType="tmRoot"/>
-      </p:par>
-    </p:tnLst>
-  </p:timing>
 </p:sldLayout>
 </file>
 
@@ -28561,7 +28365,7 @@
           <a:p>
             <a:fld id="{5958763E-B898-436D-883D-03711491D54A}" type="datetimeFigureOut">
               <a:rPr lang="en-US" smtClean="0"/>
-              <a:t>3/19/2020</a:t>
+              <a:t>3/8/2022</a:t>
             </a:fld>
             <a:endParaRPr lang="en-US"/>
           </a:p>
@@ -28634,13 +28438,6 @@
   <p:transition>
     <p:fade/>
   </p:transition>
-  <p:timing>
-    <p:tnLst>
-      <p:par>
-        <p:cTn id="1" dur="indefinite" restart="never" nodeType="tmRoot"/>
-      </p:par>
-    </p:tnLst>
-  </p:timing>
 </p:sldLayout>
 </file>
 
@@ -28862,7 +28659,7 @@
           <a:p>
             <a:fld id="{5958763E-B898-436D-883D-03711491D54A}" type="datetimeFigureOut">
               <a:rPr lang="en-US" smtClean="0"/>
-              <a:t>3/19/2020</a:t>
+              <a:t>3/8/2022</a:t>
             </a:fld>
             <a:endParaRPr lang="en-US"/>
           </a:p>
@@ -28935,13 +28732,6 @@
   <p:transition>
     <p:fade/>
   </p:transition>
-  <p:timing>
-    <p:tnLst>
-      <p:par>
-        <p:cTn id="1" dur="indefinite" restart="never" nodeType="tmRoot"/>
-      </p:par>
-    </p:tnLst>
-  </p:timing>
 </p:sldLayout>
 </file>
 
@@ -29070,7 +28860,7 @@
           <a:p>
             <a:fld id="{5958763E-B898-436D-883D-03711491D54A}" type="datetimeFigureOut">
               <a:rPr lang="en-US" smtClean="0"/>
-              <a:t>3/19/2020</a:t>
+              <a:t>3/8/2022</a:t>
             </a:fld>
             <a:endParaRPr lang="en-US"/>
           </a:p>
@@ -29193,13 +28983,6 @@
   <p:transition>
     <p:fade/>
   </p:transition>
-  <p:timing>
-    <p:tnLst>
-      <p:par>
-        <p:cTn id="1" dur="indefinite" restart="never" nodeType="tmRoot"/>
-      </p:par>
-    </p:tnLst>
-  </p:timing>
 </p:sldLayout>
 </file>
 
@@ -29338,7 +29121,7 @@
           <a:p>
             <a:fld id="{5958763E-B898-436D-883D-03711491D54A}" type="datetimeFigureOut">
               <a:rPr lang="en-US" smtClean="0"/>
-              <a:t>3/19/2020</a:t>
+              <a:t>3/8/2022</a:t>
             </a:fld>
             <a:endParaRPr lang="en-US"/>
           </a:p>
@@ -29465,13 +29248,6 @@
   <p:transition>
     <p:fade/>
   </p:transition>
-  <p:timing>
-    <p:tnLst>
-      <p:par>
-        <p:cTn id="1" dur="indefinite" restart="never" nodeType="tmRoot"/>
-      </p:par>
-    </p:tnLst>
-  </p:timing>
 </p:sldLayout>
 </file>
 
@@ -29633,7 +29409,7 @@
                 <a:spcPct val="0"/>
               </a:spcAft>
             </a:pPr>
-            <a:endParaRPr lang="en-US" sz="2400" dirty="0" err="1" smtClean="0">
+            <a:endParaRPr lang="en-US" sz="2400" dirty="0" err="1">
               <a:gradFill>
                 <a:gsLst>
                   <a:gs pos="0">
@@ -29684,10 +29460,9 @@
           </a:lstStyle>
           <a:p>
             <a:r>
-              <a:rPr lang="en-US" dirty="0" smtClean="0"/>
+              <a:rPr lang="en-US" dirty="0"/>
               <a:t>Type “Agenda”</a:t>
             </a:r>
-            <a:endParaRPr lang="en-US" dirty="0"/>
           </a:p>
         </p:txBody>
       </p:sp>
@@ -29811,24 +29586,23 @@
           <a:p>
             <a:pPr lvl="0"/>
             <a:r>
-              <a:rPr lang="en-US" dirty="0" smtClean="0"/>
+              <a:rPr lang="en-US" dirty="0"/>
               <a:t>Item 1</a:t>
             </a:r>
           </a:p>
           <a:p>
             <a:pPr lvl="0"/>
             <a:r>
-              <a:rPr lang="en-US" dirty="0" smtClean="0"/>
+              <a:rPr lang="en-US" dirty="0"/>
               <a:t>Item 2</a:t>
             </a:r>
           </a:p>
           <a:p>
             <a:pPr lvl="0"/>
             <a:r>
-              <a:rPr lang="en-US" dirty="0" smtClean="0"/>
+              <a:rPr lang="en-US" dirty="0"/>
               <a:t>Item 3</a:t>
             </a:r>
-            <a:endParaRPr lang="en-US" dirty="0"/>
           </a:p>
         </p:txBody>
       </p:sp>
@@ -29855,7 +29629,7 @@
           <a:p>
             <a:fld id="{5958763E-B898-436D-883D-03711491D54A}" type="datetimeFigureOut">
               <a:rPr lang="en-US" smtClean="0"/>
-              <a:t>3/19/2020</a:t>
+              <a:t>3/8/2022</a:t>
             </a:fld>
             <a:endParaRPr lang="en-US"/>
           </a:p>
@@ -29962,13 +29736,6 @@
   <p:transition>
     <p:fade/>
   </p:transition>
-  <p:timing>
-    <p:tnLst>
-      <p:par>
-        <p:cTn id="1" dur="indefinite" restart="never" nodeType="tmRoot"/>
-      </p:par>
-    </p:tnLst>
-  </p:timing>
 </p:sldLayout>
 </file>
 
@@ -30130,7 +29897,7 @@
                 <a:spcPct val="0"/>
               </a:spcAft>
             </a:pPr>
-            <a:endParaRPr lang="en-US" sz="2400" dirty="0" err="1" smtClean="0">
+            <a:endParaRPr lang="en-US" sz="2400" dirty="0" err="1">
               <a:gradFill>
                 <a:gsLst>
                   <a:gs pos="0">
@@ -30183,10 +29950,9 @@
           </a:lstStyle>
           <a:p>
             <a:r>
-              <a:rPr lang="en-US" dirty="0" smtClean="0"/>
+              <a:rPr lang="en-US" dirty="0"/>
               <a:t>Notable Quote</a:t>
             </a:r>
-            <a:endParaRPr lang="en-US" dirty="0"/>
           </a:p>
         </p:txBody>
       </p:sp>
@@ -30313,10 +30079,9 @@
           <a:p>
             <a:pPr lvl="0"/>
             <a:r>
-              <a:rPr lang="en-US" dirty="0" smtClean="0"/>
+              <a:rPr lang="en-US" dirty="0"/>
               <a:t>– Attribution</a:t>
             </a:r>
-            <a:endParaRPr lang="en-US" dirty="0"/>
           </a:p>
         </p:txBody>
       </p:sp>
@@ -30343,7 +30108,7 @@
           <a:p>
             <a:fld id="{5958763E-B898-436D-883D-03711491D54A}" type="datetimeFigureOut">
               <a:rPr lang="en-US" smtClean="0"/>
-              <a:t>3/19/2020</a:t>
+              <a:t>3/8/2022</a:t>
             </a:fld>
             <a:endParaRPr lang="en-US"/>
           </a:p>
@@ -31091,13 +30856,6 @@
   <p:transition>
     <p:fade/>
   </p:transition>
-  <p:timing>
-    <p:tnLst>
-      <p:par>
-        <p:cTn id="1" dur="indefinite" restart="never" nodeType="tmRoot"/>
-      </p:par>
-    </p:tnLst>
-  </p:timing>
 </p:sldLayout>
 </file>
 
@@ -31169,7 +30927,7 @@
           <a:p>
             <a:fld id="{5958763E-B898-436D-883D-03711491D54A}" type="datetimeFigureOut">
               <a:rPr lang="en-US" smtClean="0"/>
-              <a:t>3/19/2020</a:t>
+              <a:t>3/8/2022</a:t>
             </a:fld>
             <a:endParaRPr lang="en-US"/>
           </a:p>
@@ -31242,13 +31000,6 @@
   <p:transition>
     <p:fade/>
   </p:transition>
-  <p:timing>
-    <p:tnLst>
-      <p:par>
-        <p:cTn id="1" dur="indefinite" restart="never" nodeType="tmRoot"/>
-      </p:par>
-    </p:tnLst>
-  </p:timing>
 </p:sldLayout>
 </file>
 
@@ -31377,7 +31128,7 @@
           <a:p>
             <a:fld id="{5958763E-B898-436D-883D-03711491D54A}" type="datetimeFigureOut">
               <a:rPr lang="en-US" smtClean="0"/>
-              <a:t>3/19/2020</a:t>
+              <a:t>3/8/2022</a:t>
             </a:fld>
             <a:endParaRPr lang="en-US"/>
           </a:p>
@@ -31500,13 +31251,6 @@
   <p:transition>
     <p:fade/>
   </p:transition>
-  <p:timing>
-    <p:tnLst>
-      <p:par>
-        <p:cTn id="1" dur="indefinite" restart="never" nodeType="tmRoot"/>
-      </p:par>
-    </p:tnLst>
-  </p:timing>
 </p:sldLayout>
 </file>
 
@@ -31719,7 +31463,7 @@
           <a:p>
             <a:fld id="{5958763E-B898-436D-883D-03711491D54A}" type="datetimeFigureOut">
               <a:rPr lang="en-US" smtClean="0"/>
-              <a:t>3/19/2020</a:t>
+              <a:t>3/8/2022</a:t>
             </a:fld>
             <a:endParaRPr lang="en-US"/>
           </a:p>
@@ -31792,13 +31536,6 @@
   <p:transition>
     <p:fade/>
   </p:transition>
-  <p:timing>
-    <p:tnLst>
-      <p:par>
-        <p:cTn id="1" dur="indefinite" restart="never" nodeType="tmRoot"/>
-      </p:par>
-    </p:tnLst>
-  </p:timing>
 </p:sldLayout>
 </file>
 
@@ -31956,7 +31693,7 @@
           <a:p>
             <a:fld id="{5958763E-B898-436D-883D-03711491D54A}" type="datetimeFigureOut">
               <a:rPr lang="en-US" smtClean="0"/>
-              <a:t>3/19/2020</a:t>
+              <a:t>3/8/2022</a:t>
             </a:fld>
             <a:endParaRPr lang="en-US"/>
           </a:p>
@@ -32029,13 +31766,6 @@
   <p:transition>
     <p:fade/>
   </p:transition>
-  <p:timing>
-    <p:tnLst>
-      <p:par>
-        <p:cTn id="1" dur="indefinite" restart="never" nodeType="tmRoot"/>
-      </p:par>
-    </p:tnLst>
-  </p:timing>
 </p:sldLayout>
 </file>
 
@@ -32207,7 +31937,7 @@
           <a:p>
             <a:fld id="{5958763E-B898-436D-883D-03711491D54A}" type="datetimeFigureOut">
               <a:rPr lang="en-US" smtClean="0"/>
-              <a:t>3/19/2020</a:t>
+              <a:t>3/8/2022</a:t>
             </a:fld>
             <a:endParaRPr lang="en-US"/>
           </a:p>
@@ -32353,13 +32083,6 @@
   <p:transition>
     <p:fade/>
   </p:transition>
-  <p:timing>
-    <p:tnLst>
-      <p:par>
-        <p:cTn id="1" dur="indefinite" restart="never" nodeType="tmRoot"/>
-      </p:par>
-    </p:tnLst>
-  </p:timing>
   <p:txStyles>
     <p:titleStyle>
       <a:lvl1pPr algn="l" defTabSz="914400" rtl="0" eaLnBrk="1" latinLnBrk="0" hangingPunct="1">
@@ -32664,7 +32387,7 @@
       </a:lvl9pPr>
     </p:otherStyle>
   </p:txStyles>
-  <p:extLst mod="1">
+  <p:extLst>
     <p:ext uri="{27BBF7A9-308A-43DC-89C8-2F10F3537804}">
       <p15:sldGuideLst xmlns:p15="http://schemas.microsoft.com/office/powerpoint/2012/main">
         <p15:guide id="1" orient="horz" pos="2160" userDrawn="1">
@@ -32743,10 +32466,9 @@
           <a:lstStyle/>
           <a:p>
             <a:r>
-              <a:rPr lang="en-US" sz="6600" dirty="0" smtClean="0"/>
+              <a:rPr lang="en-US" sz="6600" dirty="0"/>
               <a:t>Basic HTML Elements</a:t>
             </a:r>
-            <a:endParaRPr lang="en-US" sz="6600" dirty="0"/>
           </a:p>
         </p:txBody>
       </p:sp>
@@ -32771,10 +32493,9 @@
           <a:lstStyle/>
           <a:p>
             <a:r>
-              <a:rPr lang="en-US" dirty="0" smtClean="0"/>
+              <a:rPr lang="en-US" dirty="0"/>
               <a:t>Hy-Tech Club: Web 101</a:t>
             </a:r>
-            <a:endParaRPr lang="en-US" dirty="0"/>
           </a:p>
         </p:txBody>
       </p:sp>
@@ -35759,13 +35480,6 @@
   <p:transition>
     <p:fade/>
   </p:transition>
-  <p:timing>
-    <p:tnLst>
-      <p:par>
-        <p:cTn id="1" dur="indefinite" restart="never" nodeType="tmRoot"/>
-      </p:par>
-    </p:tnLst>
-  </p:timing>
 </p:sld>
 </file>
 
@@ -35812,14 +35526,9 @@
           <a:lstStyle/>
           <a:p>
             <a:r>
-              <a:rPr lang="en-US" dirty="0" smtClean="0"/>
-              <a:t>Header </a:t>
+              <a:rPr lang="en-US" dirty="0"/>
+              <a:t>Header Elements</a:t>
             </a:r>
-            <a:r>
-              <a:rPr lang="en-US" dirty="0" smtClean="0"/>
-              <a:t>Elements</a:t>
-            </a:r>
-            <a:endParaRPr lang="en-US" dirty="0"/>
           </a:p>
         </p:txBody>
       </p:sp>
@@ -35845,7 +35554,7 @@
           </a:bodyPr>
           <a:lstStyle/>
           <a:p>
-            <a:endParaRPr lang="en-US" dirty="0" smtClean="0">
+            <a:endParaRPr lang="en-US" dirty="0">
               <a:solidFill>
                 <a:schemeClr val="bg1"/>
               </a:solidFill>
@@ -35853,22 +35562,17 @@
           </a:p>
           <a:p>
             <a:r>
-              <a:rPr lang="en-US" dirty="0" smtClean="0">
+              <a:rPr lang="en-US" dirty="0">
                 <a:solidFill>
                   <a:schemeClr val="bg1"/>
                 </a:solidFill>
               </a:rPr>
               <a:t>Used for page headings or titles</a:t>
             </a:r>
-            <a:endParaRPr lang="en-US" dirty="0" smtClean="0">
-              <a:solidFill>
-                <a:schemeClr val="bg1"/>
-              </a:solidFill>
-            </a:endParaRPr>
           </a:p>
           <a:p>
             <a:r>
-              <a:rPr lang="en-US" dirty="0" smtClean="0">
+              <a:rPr lang="en-US" dirty="0">
                 <a:solidFill>
                   <a:schemeClr val="bg1"/>
                 </a:solidFill>
@@ -35876,7 +35580,7 @@
               <a:t>There are six header elements – </a:t>
             </a:r>
             <a:r>
-              <a:rPr lang="en-US" b="1" dirty="0" smtClean="0">
+              <a:rPr lang="en-US" b="1" dirty="0">
                 <a:solidFill>
                   <a:schemeClr val="accent1">
                     <a:lumMod val="60000"/>
@@ -35893,18 +35597,10 @@
                   <a:schemeClr val="bg1"/>
                 </a:solidFill>
               </a:rPr>
-              <a:t> </a:t>
+              <a:t> through </a:t>
             </a:r>
             <a:r>
-              <a:rPr lang="en-US" dirty="0" smtClean="0">
-                <a:solidFill>
-                  <a:schemeClr val="bg1"/>
-                </a:solidFill>
-              </a:rPr>
-              <a:t>through </a:t>
-            </a:r>
-            <a:r>
-              <a:rPr lang="en-US" b="1" dirty="0" smtClean="0">
+              <a:rPr lang="en-US" b="1" dirty="0">
                 <a:solidFill>
                   <a:schemeClr val="accent1">
                     <a:lumMod val="60000"/>
@@ -35950,7 +35646,7 @@
               <a:t>&lt;</a:t>
             </a:r>
             <a:r>
-              <a:rPr lang="en-US" sz="4800" dirty="0" smtClean="0">
+              <a:rPr lang="en-US" sz="4800" dirty="0">
                 <a:solidFill>
                   <a:srgbClr val="569CD6"/>
                 </a:solidFill>
@@ -35959,7 +35655,7 @@
               <a:t>h1</a:t>
             </a:r>
             <a:r>
-              <a:rPr lang="en-US" sz="4800" dirty="0" smtClean="0">
+              <a:rPr lang="en-US" sz="4800" dirty="0">
                 <a:solidFill>
                   <a:srgbClr val="808080"/>
                 </a:solidFill>
@@ -35968,7 +35664,7 @@
               <a:t>&gt;</a:t>
             </a:r>
             <a:r>
-              <a:rPr lang="en-US" sz="4800" dirty="0" smtClean="0">
+              <a:rPr lang="en-US" sz="4800" dirty="0">
                 <a:solidFill>
                   <a:schemeClr val="bg1"/>
                 </a:solidFill>
@@ -35977,7 +35673,7 @@
               <a:t>This is the biggest</a:t>
             </a:r>
             <a:r>
-              <a:rPr lang="en-US" sz="4800" dirty="0" smtClean="0">
+              <a:rPr lang="en-US" sz="4800" dirty="0">
                 <a:solidFill>
                   <a:srgbClr val="808080"/>
                 </a:solidFill>
@@ -35986,7 +35682,7 @@
               <a:t>&lt;/</a:t>
             </a:r>
             <a:r>
-              <a:rPr lang="en-US" sz="4800" dirty="0" smtClean="0">
+              <a:rPr lang="en-US" sz="4800" dirty="0">
                 <a:solidFill>
                   <a:srgbClr val="569CD6"/>
                 </a:solidFill>
@@ -35995,7 +35691,7 @@
               <a:t>h1</a:t>
             </a:r>
             <a:r>
-              <a:rPr lang="en-US" sz="4800" dirty="0" smtClean="0">
+              <a:rPr lang="en-US" sz="4800" dirty="0">
                 <a:solidFill>
                   <a:srgbClr val="808080"/>
                 </a:solidFill>
@@ -36015,7 +35711,7 @@
               <a:t>&lt;</a:t>
             </a:r>
             <a:r>
-              <a:rPr lang="en-US" sz="4800" dirty="0" smtClean="0">
+              <a:rPr lang="en-US" sz="4800" dirty="0">
                 <a:solidFill>
                   <a:srgbClr val="569CD6"/>
                 </a:solidFill>
@@ -36024,7 +35720,7 @@
               <a:t>h6</a:t>
             </a:r>
             <a:r>
-              <a:rPr lang="en-US" sz="4800" dirty="0" smtClean="0">
+              <a:rPr lang="en-US" sz="4800" dirty="0">
                 <a:solidFill>
                   <a:srgbClr val="808080"/>
                 </a:solidFill>
@@ -36033,7 +35729,7 @@
               <a:t>&gt;</a:t>
             </a:r>
             <a:r>
-              <a:rPr lang="en-US" sz="4800" dirty="0" smtClean="0">
+              <a:rPr lang="en-US" sz="4800" dirty="0">
                 <a:solidFill>
                   <a:schemeClr val="bg1"/>
                 </a:solidFill>
@@ -36042,7 +35738,7 @@
               <a:t>This is the smallest</a:t>
             </a:r>
             <a:r>
-              <a:rPr lang="en-US" sz="4800" dirty="0" smtClean="0">
+              <a:rPr lang="en-US" sz="4800" dirty="0">
                 <a:solidFill>
                   <a:srgbClr val="808080"/>
                 </a:solidFill>
@@ -36051,7 +35747,7 @@
               <a:t>&lt;/</a:t>
             </a:r>
             <a:r>
-              <a:rPr lang="en-US" sz="4800" dirty="0" smtClean="0">
+              <a:rPr lang="en-US" sz="4800" dirty="0">
                 <a:solidFill>
                   <a:srgbClr val="569CD6"/>
                 </a:solidFill>
@@ -36060,7 +35756,7 @@
               <a:t>h6</a:t>
             </a:r>
             <a:r>
-              <a:rPr lang="en-US" sz="4800" dirty="0" smtClean="0">
+              <a:rPr lang="en-US" sz="4800" dirty="0">
                 <a:solidFill>
                   <a:srgbClr val="808080"/>
                 </a:solidFill>
@@ -36084,7 +35780,7 @@
                 <a:spcPts val="600"/>
               </a:spcAft>
             </a:pPr>
-            <a:endParaRPr lang="en-US" sz="2400" dirty="0" err="1" smtClean="0">
+            <a:endParaRPr lang="en-US" sz="2400" dirty="0" err="1">
               <a:gradFill>
                 <a:gsLst>
                   <a:gs pos="2917">
@@ -36245,11 +35941,11 @@
           <a:lstStyle/>
           <a:p>
             <a:r>
-              <a:rPr lang="en-US" dirty="0" smtClean="0"/>
+              <a:rPr lang="en-US" dirty="0"/>
               <a:t>The </a:t>
             </a:r>
             <a:r>
-              <a:rPr lang="en-US" sz="4000" cap="none" dirty="0" smtClean="0">
+              <a:rPr lang="en-US" sz="4000" cap="none" dirty="0">
                 <a:solidFill>
                   <a:schemeClr val="accent1">
                     <a:lumMod val="20000"/>
@@ -36261,10 +35957,9 @@
               <a:t>p</a:t>
             </a:r>
             <a:r>
-              <a:rPr lang="en-US" dirty="0" smtClean="0"/>
+              <a:rPr lang="en-US" dirty="0"/>
               <a:t> (Paragraph) Element</a:t>
             </a:r>
-            <a:endParaRPr lang="en-US" dirty="0"/>
           </a:p>
         </p:txBody>
       </p:sp>
@@ -36283,7 +35978,7 @@
           <a:bodyPr/>
           <a:lstStyle/>
           <a:p>
-            <a:endParaRPr lang="en-US" dirty="0" smtClean="0">
+            <a:endParaRPr lang="en-US" dirty="0">
               <a:solidFill>
                 <a:schemeClr val="bg1"/>
               </a:solidFill>
@@ -36291,26 +35986,18 @@
           </a:p>
           <a:p>
             <a:r>
-              <a:rPr lang="en-US" dirty="0" smtClean="0">
+              <a:rPr lang="en-US" dirty="0">
                 <a:solidFill>
                   <a:schemeClr val="bg1"/>
                 </a:solidFill>
               </a:rPr>
-              <a:t>Displays </a:t>
-            </a:r>
-            <a:r>
-              <a:rPr lang="en-US" dirty="0" smtClean="0">
-                <a:solidFill>
-                  <a:schemeClr val="bg1"/>
-                </a:solidFill>
-              </a:rPr>
-              <a:t>common text on the page </a:t>
+              <a:t>Displays common text on the page </a:t>
             </a:r>
           </a:p>
           <a:p>
             <a:pPr lvl="1"/>
             <a:r>
-              <a:rPr lang="en-US" dirty="0" smtClean="0">
+              <a:rPr lang="en-US" dirty="0">
                 <a:solidFill>
                   <a:schemeClr val="bg1"/>
                 </a:solidFill>
@@ -36320,7 +36007,7 @@
           </a:p>
           <a:p>
             <a:r>
-              <a:rPr lang="en-US" dirty="0" smtClean="0">
+              <a:rPr lang="en-US" dirty="0">
                 <a:solidFill>
                   <a:schemeClr val="bg1"/>
                 </a:solidFill>
@@ -36328,7 +36015,7 @@
               <a:t>Each </a:t>
             </a:r>
             <a:r>
-              <a:rPr lang="en-US" b="1" dirty="0" smtClean="0">
+              <a:rPr lang="en-US" b="1" dirty="0">
                 <a:solidFill>
                   <a:schemeClr val="accent1">
                     <a:lumMod val="60000"/>
@@ -36340,7 +36027,7 @@
               <a:t>&lt;p&gt;&lt;/p&gt;</a:t>
             </a:r>
             <a:r>
-              <a:rPr lang="en-US" dirty="0" smtClean="0">
+              <a:rPr lang="en-US" dirty="0">
                 <a:solidFill>
                   <a:schemeClr val="bg1"/>
                 </a:solidFill>
@@ -36382,7 +36069,7 @@
           <a:lstStyle/>
           <a:p>
             <a:r>
-              <a:rPr lang="en-US" sz="4400" dirty="0" smtClean="0">
+              <a:rPr lang="en-US" sz="4400" dirty="0">
                 <a:solidFill>
                   <a:srgbClr val="808080"/>
                 </a:solidFill>
@@ -36391,7 +36078,7 @@
               <a:t>&lt;</a:t>
             </a:r>
             <a:r>
-              <a:rPr lang="en-US" sz="4400" dirty="0" smtClean="0">
+              <a:rPr lang="en-US" sz="4400" dirty="0">
                 <a:solidFill>
                   <a:srgbClr val="569CD6"/>
                 </a:solidFill>
@@ -36400,7 +36087,7 @@
               <a:t>p</a:t>
             </a:r>
             <a:r>
-              <a:rPr lang="en-US" sz="4400" dirty="0" smtClean="0">
+              <a:rPr lang="en-US" sz="4400" dirty="0">
                 <a:solidFill>
                   <a:srgbClr val="808080"/>
                 </a:solidFill>
@@ -36409,7 +36096,7 @@
               <a:t>&gt;</a:t>
             </a:r>
             <a:r>
-              <a:rPr lang="en-US" sz="4400" dirty="0" smtClean="0">
+              <a:rPr lang="en-US" sz="4400" dirty="0">
                 <a:solidFill>
                   <a:schemeClr val="bg1"/>
                 </a:solidFill>
@@ -36418,7 +36105,7 @@
               <a:t>This will appear normal</a:t>
             </a:r>
             <a:r>
-              <a:rPr lang="en-US" sz="4400" dirty="0" smtClean="0">
+              <a:rPr lang="en-US" sz="4400" dirty="0">
                 <a:solidFill>
                   <a:srgbClr val="808080"/>
                 </a:solidFill>
@@ -36427,7 +36114,7 @@
               <a:t>&lt;/</a:t>
             </a:r>
             <a:r>
-              <a:rPr lang="en-US" sz="4400" dirty="0" smtClean="0">
+              <a:rPr lang="en-US" sz="4400" dirty="0">
                 <a:solidFill>
                   <a:srgbClr val="569CD6"/>
                 </a:solidFill>
@@ -36436,7 +36123,7 @@
               <a:t>p</a:t>
             </a:r>
             <a:r>
-              <a:rPr lang="en-US" sz="4400" dirty="0" smtClean="0">
+              <a:rPr lang="en-US" sz="4400" dirty="0">
                 <a:solidFill>
                   <a:srgbClr val="808080"/>
                 </a:solidFill>
@@ -36444,7 +36131,7 @@
               </a:rPr>
               <a:t>&gt;</a:t>
             </a:r>
-            <a:endParaRPr lang="en-US" sz="2400" dirty="0" smtClean="0">
+            <a:endParaRPr lang="en-US" sz="2400" dirty="0">
               <a:gradFill>
                 <a:gsLst>
                   <a:gs pos="2917">
@@ -36605,7 +36292,7 @@
           <a:lstStyle/>
           <a:p>
             <a:r>
-              <a:rPr lang="en-US" dirty="0" smtClean="0"/>
+              <a:rPr lang="en-US" dirty="0"/>
               <a:t>The </a:t>
             </a:r>
             <a:r>
@@ -36621,14 +36308,9 @@
               <a:t>a</a:t>
             </a:r>
             <a:r>
-              <a:rPr lang="en-US" dirty="0" smtClean="0"/>
-              <a:t> (anchor) </a:t>
+              <a:rPr lang="en-US" dirty="0"/>
+              <a:t> (anchor) Element</a:t>
             </a:r>
-            <a:r>
-              <a:rPr lang="en-US" dirty="0" smtClean="0"/>
-              <a:t>Element</a:t>
-            </a:r>
-            <a:endParaRPr lang="en-US" dirty="0"/>
           </a:p>
         </p:txBody>
       </p:sp>
@@ -36647,7 +36329,7 @@
           <a:bodyPr/>
           <a:lstStyle/>
           <a:p>
-            <a:endParaRPr lang="en-US" dirty="0" smtClean="0">
+            <a:endParaRPr lang="en-US" dirty="0">
               <a:solidFill>
                 <a:schemeClr val="bg1"/>
               </a:solidFill>
@@ -36655,22 +36337,17 @@
           </a:p>
           <a:p>
             <a:r>
-              <a:rPr lang="en-US" dirty="0" smtClean="0">
+              <a:rPr lang="en-US" dirty="0">
                 <a:solidFill>
                   <a:schemeClr val="bg1"/>
                 </a:solidFill>
               </a:rPr>
               <a:t>Used to create a link to another page</a:t>
             </a:r>
-            <a:endParaRPr lang="en-US" dirty="0" smtClean="0">
-              <a:solidFill>
-                <a:schemeClr val="bg1"/>
-              </a:solidFill>
-            </a:endParaRPr>
           </a:p>
           <a:p>
             <a:r>
-              <a:rPr lang="en-US" dirty="0" smtClean="0">
+              <a:rPr lang="en-US" dirty="0">
                 <a:solidFill>
                   <a:schemeClr val="bg1"/>
                 </a:solidFill>
@@ -36678,7 +36355,7 @@
               <a:t>Set the </a:t>
             </a:r>
             <a:r>
-              <a:rPr lang="en-US" b="1" dirty="0" err="1" smtClean="0">
+              <a:rPr lang="en-US" b="1" dirty="0" err="1">
                 <a:solidFill>
                   <a:schemeClr val="accent1">
                     <a:lumMod val="60000"/>
@@ -36690,7 +36367,7 @@
               <a:t>href</a:t>
             </a:r>
             <a:r>
-              <a:rPr lang="en-US" dirty="0" smtClean="0">
+              <a:rPr lang="en-US" dirty="0">
                 <a:solidFill>
                   <a:schemeClr val="bg1"/>
                 </a:solidFill>
@@ -36700,18 +36377,13 @@
           </a:p>
           <a:p>
             <a:r>
-              <a:rPr lang="en-US" dirty="0" smtClean="0">
+              <a:rPr lang="en-US" dirty="0">
                 <a:solidFill>
                   <a:schemeClr val="bg1"/>
                 </a:solidFill>
               </a:rPr>
               <a:t>The text of the link goes in between the opening and closing tag</a:t>
             </a:r>
-            <a:endParaRPr lang="en-US" dirty="0" smtClean="0">
-              <a:solidFill>
-                <a:schemeClr val="bg1"/>
-              </a:solidFill>
-            </a:endParaRPr>
           </a:p>
         </p:txBody>
       </p:sp>
@@ -36789,19 +36461,10 @@
                 </a:solidFill>
                 <a:latin typeface="Consolas" panose="020B0609020204030204" pitchFamily="49" charset="0"/>
               </a:rPr>
-              <a:t>"https</a:t>
+              <a:t>"https://google.com"</a:t>
             </a:r>
             <a:r>
-              <a:rPr lang="en-US" sz="4000" dirty="0" smtClean="0">
-                <a:solidFill>
-                  <a:srgbClr val="CE9178"/>
-                </a:solidFill>
-                <a:latin typeface="Consolas" panose="020B0609020204030204" pitchFamily="49" charset="0"/>
-              </a:rPr>
-              <a:t>://google.com"</a:t>
-            </a:r>
-            <a:r>
-              <a:rPr lang="en-US" sz="4000" dirty="0" smtClean="0">
+              <a:rPr lang="en-US" sz="4000" dirty="0">
                 <a:solidFill>
                   <a:srgbClr val="808080"/>
                 </a:solidFill>
@@ -36810,7 +36473,7 @@
               <a:t>&gt;</a:t>
             </a:r>
             <a:r>
-              <a:rPr lang="en-US" sz="4000" dirty="0" smtClean="0">
+              <a:rPr lang="en-US" sz="4000" dirty="0">
                 <a:solidFill>
                   <a:schemeClr val="bg1"/>
                 </a:solidFill>
@@ -36819,7 +36482,7 @@
               <a:t>Google</a:t>
             </a:r>
             <a:r>
-              <a:rPr lang="en-US" sz="4000" dirty="0" smtClean="0">
+              <a:rPr lang="en-US" sz="4000" dirty="0">
                 <a:solidFill>
                   <a:srgbClr val="808080"/>
                 </a:solidFill>
@@ -37000,11 +36663,11 @@
           <a:lstStyle/>
           <a:p>
             <a:r>
-              <a:rPr lang="en-US" dirty="0" smtClean="0"/>
+              <a:rPr lang="en-US" dirty="0"/>
               <a:t>The </a:t>
             </a:r>
             <a:r>
-              <a:rPr lang="en-US" sz="4000" cap="none" dirty="0" err="1" smtClean="0">
+              <a:rPr lang="en-US" sz="4000" cap="none" dirty="0" err="1">
                 <a:solidFill>
                   <a:schemeClr val="accent1">
                     <a:lumMod val="20000"/>
@@ -37016,14 +36679,9 @@
               <a:t>img</a:t>
             </a:r>
             <a:r>
-              <a:rPr lang="en-US" dirty="0" smtClean="0"/>
-              <a:t> </a:t>
+              <a:rPr lang="en-US" dirty="0"/>
+              <a:t> Element</a:t>
             </a:r>
-            <a:r>
-              <a:rPr lang="en-US" dirty="0" smtClean="0"/>
-              <a:t>Element</a:t>
-            </a:r>
-            <a:endParaRPr lang="en-US" dirty="0"/>
           </a:p>
         </p:txBody>
       </p:sp>
@@ -37047,7 +36705,7 @@
           <a:bodyPr/>
           <a:lstStyle/>
           <a:p>
-            <a:endParaRPr lang="en-US" dirty="0" smtClean="0">
+            <a:endParaRPr lang="en-US" dirty="0">
               <a:solidFill>
                 <a:schemeClr val="bg1"/>
               </a:solidFill>
@@ -37055,22 +36713,17 @@
           </a:p>
           <a:p>
             <a:r>
-              <a:rPr lang="en-US" dirty="0" smtClean="0">
+              <a:rPr lang="en-US" dirty="0">
                 <a:solidFill>
                   <a:schemeClr val="bg1"/>
                 </a:solidFill>
               </a:rPr>
               <a:t>Used to display an image</a:t>
             </a:r>
-            <a:endParaRPr lang="en-US" dirty="0" smtClean="0">
-              <a:solidFill>
-                <a:schemeClr val="bg1"/>
-              </a:solidFill>
-            </a:endParaRPr>
           </a:p>
           <a:p>
             <a:r>
-              <a:rPr lang="en-US" dirty="0" smtClean="0">
+              <a:rPr lang="en-US" dirty="0">
                 <a:solidFill>
                   <a:schemeClr val="bg1"/>
                 </a:solidFill>
@@ -37078,7 +36731,7 @@
               <a:t>Set the </a:t>
             </a:r>
             <a:r>
-              <a:rPr lang="en-US" b="1" dirty="0" err="1" smtClean="0">
+              <a:rPr lang="en-US" b="1" dirty="0" err="1">
                 <a:solidFill>
                   <a:schemeClr val="accent1">
                     <a:lumMod val="60000"/>
@@ -37090,7 +36743,7 @@
               <a:t>src</a:t>
             </a:r>
             <a:r>
-              <a:rPr lang="en-US" dirty="0" smtClean="0">
+              <a:rPr lang="en-US" dirty="0">
                 <a:solidFill>
                   <a:schemeClr val="bg1"/>
                 </a:solidFill>
@@ -37100,7 +36753,7 @@
           </a:p>
           <a:p>
             <a:r>
-              <a:rPr lang="en-US" dirty="0" smtClean="0">
+              <a:rPr lang="en-US" dirty="0">
                 <a:solidFill>
                   <a:schemeClr val="bg1"/>
                 </a:solidFill>
@@ -37108,18 +36761,13 @@
               <a:t>This element has no closing tag – it is </a:t>
             </a:r>
             <a:r>
-              <a:rPr lang="en-US" b="1" i="1" dirty="0" smtClean="0">
+              <a:rPr lang="en-US" b="1" i="1" dirty="0">
                 <a:solidFill>
                   <a:schemeClr val="bg1"/>
                 </a:solidFill>
               </a:rPr>
               <a:t>self-closing</a:t>
             </a:r>
-            <a:endParaRPr lang="en-US" b="1" i="1" dirty="0" smtClean="0">
-              <a:solidFill>
-                <a:schemeClr val="bg1"/>
-              </a:solidFill>
-            </a:endParaRPr>
           </a:p>
         </p:txBody>
       </p:sp>
@@ -37362,10 +37010,9 @@
           <a:lstStyle/>
           <a:p>
             <a:r>
-              <a:rPr lang="en-US" dirty="0" smtClean="0"/>
+              <a:rPr lang="en-US" dirty="0"/>
               <a:t>Example</a:t>
             </a:r>
-            <a:endParaRPr lang="en-US" dirty="0"/>
           </a:p>
         </p:txBody>
       </p:sp>
@@ -37393,7 +37040,7 @@
               <a:rPr lang="en-US" sz="9600" dirty="0">
                 <a:hlinkClick r:id="rId3"/>
               </a:rPr>
-              <a:t>https://repl.it/repls/StudiousSlategrayBinarytree</a:t>
+              <a:t>https://replit.com/@HylandOutreach/BasicElementsExample</a:t>
             </a:r>
             <a:endParaRPr lang="en-US" sz="9600" dirty="0"/>
           </a:p>
@@ -37412,13 +37059,6 @@
   <p:transition>
     <p:fade/>
   </p:transition>
-  <p:timing>
-    <p:tnLst>
-      <p:par>
-        <p:cTn id="1" dur="indefinite" restart="never" nodeType="tmRoot"/>
-      </p:par>
-    </p:tnLst>
-  </p:timing>
 </p:sld>
 </file>
 

</xml_diff>

<commit_message>
Update gitbook 2022-03-08 22:08:21
</commit_message>
<xml_diff>
--- a/Week02/BasicHtmlElements.pptx
+++ b/Week02/BasicHtmlElements.pptx
@@ -213,7 +213,7 @@
           <a:p>
             <a:fld id="{19104133-B5B0-4351-8158-4F0E5EB1E2BF}" type="datetimeFigureOut">
               <a:rPr lang="en-US" smtClean="0"/>
-              <a:t>3/19/2020</a:t>
+              <a:t>3/8/2022</a:t>
             </a:fld>
             <a:endParaRPr lang="en-US"/>
           </a:p>
@@ -277,38 +277,37 @@
           <a:p>
             <a:pPr lvl="0"/>
             <a:r>
-              <a:rPr lang="en-US" smtClean="0"/>
+              <a:rPr lang="en-US"/>
               <a:t>Edit Master text styles</a:t>
             </a:r>
           </a:p>
           <a:p>
             <a:pPr lvl="1"/>
             <a:r>
-              <a:rPr lang="en-US" smtClean="0"/>
+              <a:rPr lang="en-US"/>
               <a:t>Second level</a:t>
             </a:r>
           </a:p>
           <a:p>
             <a:pPr lvl="2"/>
             <a:r>
-              <a:rPr lang="en-US" smtClean="0"/>
+              <a:rPr lang="en-US"/>
               <a:t>Third level</a:t>
             </a:r>
           </a:p>
           <a:p>
             <a:pPr lvl="3"/>
             <a:r>
-              <a:rPr lang="en-US" smtClean="0"/>
+              <a:rPr lang="en-US"/>
               <a:t>Fourth level</a:t>
             </a:r>
           </a:p>
           <a:p>
             <a:pPr lvl="4"/>
             <a:r>
-              <a:rPr lang="en-US" smtClean="0"/>
+              <a:rPr lang="en-US"/>
               <a:t>Fifth level</a:t>
             </a:r>
-            <a:endParaRPr lang="en-US"/>
           </a:p>
         </p:txBody>
       </p:sp>
@@ -526,19 +525,19 @@
           <a:lstStyle/>
           <a:p>
             <a:r>
-              <a:rPr lang="en-US" dirty="0" smtClean="0"/>
+              <a:rPr lang="en-US" dirty="0"/>
               <a:t>Introduce some basic HTML elements</a:t>
             </a:r>
             <a:r>
-              <a:rPr lang="en-US" baseline="0" dirty="0" smtClean="0"/>
+              <a:rPr lang="en-US" baseline="0" dirty="0"/>
               <a:t>. There is a </a:t>
             </a:r>
             <a:r>
-              <a:rPr lang="en-US" baseline="0" dirty="0" err="1" smtClean="0"/>
+              <a:rPr lang="en-US" baseline="0" dirty="0" err="1"/>
               <a:t>CodePen</a:t>
             </a:r>
             <a:r>
-              <a:rPr lang="en-US" baseline="0" dirty="0" smtClean="0"/>
+              <a:rPr lang="en-US" baseline="0" dirty="0"/>
               <a:t> link at the end to show all of the elements in action.</a:t>
             </a:r>
             <a:endParaRPr lang="en-US" dirty="0"/>
@@ -643,10 +642,12 @@
               <a:defRPr/>
             </a:pPr>
             <a:r>
-              <a:rPr lang="en-US" dirty="0" smtClean="0">
-                <a:hlinkClick r:id="rId3"/>
-              </a:rPr>
-              <a:t>https://repl.it/repls/StudiousSlategrayBinarytree</a:t>
+              <a:rPr lang="en-US" dirty="0"/>
+              <a:t>https://replit.com/@HylandOutreach</a:t>
+            </a:r>
+            <a:r>
+              <a:rPr lang="en-US"/>
+              <a:t>/BasicElementsExample</a:t>
             </a:r>
             <a:endParaRPr lang="en-US" dirty="0"/>
           </a:p>
@@ -828,15 +829,7 @@
           <a:p>
             <a:r>
               <a:rPr lang="en-US" dirty="0"/>
-              <a:t>Click to edit Master </a:t>
-            </a:r>
-            <a:r>
-              <a:rPr lang="en-US" dirty="0" smtClean="0"/>
-              <a:t>subtitle </a:t>
-            </a:r>
-            <a:r>
-              <a:rPr lang="en-US" dirty="0"/>
-              <a:t>style</a:t>
+              <a:t>Click to edit Master subtitle style</a:t>
             </a:r>
           </a:p>
         </p:txBody>
@@ -878,7 +871,7 @@
             <a:fld id="{1C2D31DE-C454-491C-B5C3-F097855E3DF7}" type="datetime4">
               <a:rPr lang="en-US" smtClean="0"/>
               <a:pPr/>
-              <a:t>March 19, 2020</a:t>
+              <a:t>March 8, 2022</a:t>
             </a:fld>
             <a:endParaRPr lang="en-US" dirty="0"/>
           </a:p>
@@ -3952,17 +3945,16 @@
           <a:p>
             <a:pPr lvl="0"/>
             <a:r>
-              <a:rPr lang="en-US" dirty="0" smtClean="0"/>
+              <a:rPr lang="en-US" dirty="0"/>
               <a:t>Presenter Name</a:t>
             </a:r>
             <a:br>
-              <a:rPr lang="en-US" dirty="0" smtClean="0"/>
+              <a:rPr lang="en-US" dirty="0"/>
             </a:br>
             <a:r>
-              <a:rPr lang="en-US" dirty="0" smtClean="0"/>
+              <a:rPr lang="en-US" dirty="0"/>
               <a:t>Presenter Title</a:t>
             </a:r>
-            <a:endParaRPr lang="en-US" dirty="0"/>
           </a:p>
         </p:txBody>
       </p:sp>
@@ -3979,13 +3971,6 @@
   <p:transition>
     <p:fade/>
   </p:transition>
-  <p:timing>
-    <p:tnLst>
-      <p:par>
-        <p:cTn id="1" dur="indefinite" restart="never" nodeType="tmRoot"/>
-      </p:par>
-    </p:tnLst>
-  </p:timing>
   <p:hf sldNum="0" hdr="0" ftr="0"/>
 </p:sldLayout>
 </file>
@@ -4278,7 +4263,7 @@
           <a:p>
             <a:fld id="{5958763E-B898-436D-883D-03711491D54A}" type="datetimeFigureOut">
               <a:rPr lang="en-US" smtClean="0"/>
-              <a:t>3/19/2020</a:t>
+              <a:t>3/8/2022</a:t>
             </a:fld>
             <a:endParaRPr lang="en-US"/>
           </a:p>
@@ -4351,13 +4336,6 @@
   <p:transition>
     <p:fade/>
   </p:transition>
-  <p:timing>
-    <p:tnLst>
-      <p:par>
-        <p:cTn id="1" dur="indefinite" restart="never" nodeType="tmRoot"/>
-      </p:par>
-    </p:tnLst>
-  </p:timing>
 </p:sldLayout>
 </file>
 
@@ -4406,10 +4384,9 @@
           </a:lstStyle>
           <a:p>
             <a:r>
-              <a:rPr lang="en-US" dirty="0" smtClean="0"/>
+              <a:rPr lang="en-US" dirty="0"/>
               <a:t>Click icon to add picture</a:t>
             </a:r>
-            <a:endParaRPr lang="en-US" dirty="0"/>
           </a:p>
         </p:txBody>
       </p:sp>
@@ -4479,7 +4456,7 @@
           <a:p>
             <a:fld id="{5958763E-B898-436D-883D-03711491D54A}" type="datetimeFigureOut">
               <a:rPr lang="en-US" smtClean="0"/>
-              <a:t>3/19/2020</a:t>
+              <a:t>3/8/2022</a:t>
             </a:fld>
             <a:endParaRPr lang="en-US"/>
           </a:p>
@@ -4552,13 +4529,6 @@
   <p:transition>
     <p:fade/>
   </p:transition>
-  <p:timing>
-    <p:tnLst>
-      <p:par>
-        <p:cTn id="1" dur="indefinite" restart="never" nodeType="tmRoot"/>
-      </p:par>
-    </p:tnLst>
-  </p:timing>
 </p:sldLayout>
 </file>
 
@@ -4736,7 +4706,7 @@
           <a:p>
             <a:fld id="{5958763E-B898-436D-883D-03711491D54A}" type="datetimeFigureOut">
               <a:rPr lang="en-US" smtClean="0"/>
-              <a:t>3/19/2020</a:t>
+              <a:t>3/8/2022</a:t>
             </a:fld>
             <a:endParaRPr lang="en-US"/>
           </a:p>
@@ -4809,13 +4779,6 @@
   <p:transition>
     <p:fade/>
   </p:transition>
-  <p:timing>
-    <p:tnLst>
-      <p:par>
-        <p:cTn id="1" dur="indefinite" restart="never" nodeType="tmRoot"/>
-      </p:par>
-    </p:tnLst>
-  </p:timing>
 </p:sldLayout>
 </file>
 
@@ -5091,7 +5054,7 @@
           <a:p>
             <a:fld id="{5958763E-B898-436D-883D-03711491D54A}" type="datetimeFigureOut">
               <a:rPr lang="en-US" smtClean="0"/>
-              <a:t>3/19/2020</a:t>
+              <a:t>3/8/2022</a:t>
             </a:fld>
             <a:endParaRPr lang="en-US"/>
           </a:p>
@@ -5152,13 +5115,6 @@
   <p:transition>
     <p:fade/>
   </p:transition>
-  <p:timing>
-    <p:tnLst>
-      <p:par>
-        <p:cTn id="1" dur="indefinite" restart="never" nodeType="tmRoot"/>
-      </p:par>
-    </p:tnLst>
-  </p:timing>
 </p:sldLayout>
 </file>
 
@@ -5514,7 +5470,7 @@
           <a:p>
             <a:fld id="{5958763E-B898-436D-883D-03711491D54A}" type="datetimeFigureOut">
               <a:rPr lang="en-US" smtClean="0"/>
-              <a:t>3/19/2020</a:t>
+              <a:t>3/8/2022</a:t>
             </a:fld>
             <a:endParaRPr lang="en-US"/>
           </a:p>
@@ -5575,13 +5531,6 @@
   <p:transition>
     <p:fade/>
   </p:transition>
-  <p:timing>
-    <p:tnLst>
-      <p:par>
-        <p:cTn id="1" dur="indefinite" restart="never" nodeType="tmRoot"/>
-      </p:par>
-    </p:tnLst>
-  </p:timing>
 </p:sldLayout>
 </file>
 
@@ -6022,7 +5971,7 @@
           <a:p>
             <a:fld id="{5958763E-B898-436D-883D-03711491D54A}" type="datetimeFigureOut">
               <a:rPr lang="en-US" smtClean="0"/>
-              <a:t>3/19/2020</a:t>
+              <a:t>3/8/2022</a:t>
             </a:fld>
             <a:endParaRPr lang="en-US"/>
           </a:p>
@@ -6083,13 +6032,6 @@
   <p:transition>
     <p:fade/>
   </p:transition>
-  <p:timing>
-    <p:tnLst>
-      <p:par>
-        <p:cTn id="1" dur="indefinite" restart="never" nodeType="tmRoot"/>
-      </p:par>
-    </p:tnLst>
-  </p:timing>
 </p:sldLayout>
 </file>
 
@@ -6480,7 +6422,7 @@
           <a:p>
             <a:fld id="{5958763E-B898-436D-883D-03711491D54A}" type="datetimeFigureOut">
               <a:rPr lang="en-US" smtClean="0"/>
-              <a:t>3/19/2020</a:t>
+              <a:t>3/8/2022</a:t>
             </a:fld>
             <a:endParaRPr lang="en-US"/>
           </a:p>
@@ -6541,13 +6483,6 @@
   <p:transition>
     <p:fade/>
   </p:transition>
-  <p:timing>
-    <p:tnLst>
-      <p:par>
-        <p:cTn id="1" dur="indefinite" restart="never" nodeType="tmRoot"/>
-      </p:par>
-    </p:tnLst>
-  </p:timing>
 </p:sldLayout>
 </file>
 
@@ -7098,7 +7033,7 @@
           <a:p>
             <a:fld id="{5958763E-B898-436D-883D-03711491D54A}" type="datetimeFigureOut">
               <a:rPr lang="en-US" smtClean="0"/>
-              <a:t>3/19/2020</a:t>
+              <a:t>3/8/2022</a:t>
             </a:fld>
             <a:endParaRPr lang="en-US"/>
           </a:p>
@@ -7159,13 +7094,6 @@
   <p:transition>
     <p:fade/>
   </p:transition>
-  <p:timing>
-    <p:tnLst>
-      <p:par>
-        <p:cTn id="1" dur="indefinite" restart="never" nodeType="tmRoot"/>
-      </p:par>
-    </p:tnLst>
-  </p:timing>
 </p:sldLayout>
 </file>
 
@@ -7876,7 +7804,7 @@
           <a:p>
             <a:fld id="{5958763E-B898-436D-883D-03711491D54A}" type="datetimeFigureOut">
               <a:rPr lang="en-US" smtClean="0"/>
-              <a:t>3/19/2020</a:t>
+              <a:t>3/8/2022</a:t>
             </a:fld>
             <a:endParaRPr lang="en-US"/>
           </a:p>
@@ -7937,13 +7865,6 @@
   <p:transition>
     <p:fade/>
   </p:transition>
-  <p:timing>
-    <p:tnLst>
-      <p:par>
-        <p:cTn id="1" dur="indefinite" restart="never" nodeType="tmRoot"/>
-      </p:par>
-    </p:tnLst>
-  </p:timing>
 </p:sldLayout>
 </file>
 
@@ -7987,7 +7908,7 @@
           <a:p>
             <a:fld id="{5958763E-B898-436D-883D-03711491D54A}" type="datetimeFigureOut">
               <a:rPr lang="en-US" smtClean="0"/>
-              <a:t>3/19/2020</a:t>
+              <a:t>3/8/2022</a:t>
             </a:fld>
             <a:endParaRPr lang="en-US"/>
           </a:p>
@@ -8060,13 +7981,6 @@
   <p:transition>
     <p:fade/>
   </p:transition>
-  <p:timing>
-    <p:tnLst>
-      <p:par>
-        <p:cTn id="1" dur="indefinite" restart="never" nodeType="tmRoot"/>
-      </p:par>
-    </p:tnLst>
-  </p:timing>
 </p:sldLayout>
 </file>
 
@@ -8146,7 +8060,7 @@
                 <a:spcPct val="0"/>
               </a:spcAft>
             </a:pPr>
-            <a:endParaRPr lang="en-US" sz="2400" dirty="0" err="1" smtClean="0">
+            <a:endParaRPr lang="en-US" sz="2400" dirty="0" err="1">
               <a:gradFill>
                 <a:gsLst>
                   <a:gs pos="0">
@@ -8279,15 +8193,7 @@
           <a:p>
             <a:r>
               <a:rPr lang="en-US" dirty="0"/>
-              <a:t>Click to edit Master </a:t>
-            </a:r>
-            <a:r>
-              <a:rPr lang="en-US" dirty="0" smtClean="0"/>
-              <a:t>subtitle </a:t>
-            </a:r>
-            <a:r>
-              <a:rPr lang="en-US" dirty="0"/>
-              <a:t>style</a:t>
+              <a:t>Click to edit Master subtitle style</a:t>
             </a:r>
           </a:p>
         </p:txBody>
@@ -8329,7 +8235,7 @@
             <a:fld id="{1C2D31DE-C454-491C-B5C3-F097855E3DF7}" type="datetime4">
               <a:rPr lang="en-US" smtClean="0"/>
               <a:pPr/>
-              <a:t>March 19, 2020</a:t>
+              <a:t>March 8, 2022</a:t>
             </a:fld>
             <a:endParaRPr lang="en-US" dirty="0"/>
           </a:p>
@@ -11403,17 +11309,16 @@
           <a:p>
             <a:pPr lvl="0"/>
             <a:r>
-              <a:rPr lang="en-US" dirty="0" smtClean="0"/>
+              <a:rPr lang="en-US" dirty="0"/>
               <a:t>Presenter Name</a:t>
             </a:r>
             <a:br>
-              <a:rPr lang="en-US" dirty="0" smtClean="0"/>
+              <a:rPr lang="en-US" dirty="0"/>
             </a:br>
             <a:r>
-              <a:rPr lang="en-US" dirty="0" smtClean="0"/>
+              <a:rPr lang="en-US" dirty="0"/>
               <a:t>Presenter Title</a:t>
             </a:r>
-            <a:endParaRPr lang="en-US" dirty="0"/>
           </a:p>
         </p:txBody>
       </p:sp>
@@ -11430,13 +11335,6 @@
   <p:transition>
     <p:fade/>
   </p:transition>
-  <p:timing>
-    <p:tnLst>
-      <p:par>
-        <p:cTn id="1" dur="indefinite" restart="never" nodeType="tmRoot"/>
-      </p:par>
-    </p:tnLst>
-  </p:timing>
   <p:hf sldNum="0" hdr="0" ftr="0"/>
 </p:sldLayout>
 </file>
@@ -11489,7 +11387,7 @@
           <a:p>
             <a:fld id="{5958763E-B898-436D-883D-03711491D54A}" type="datetimeFigureOut">
               <a:rPr lang="en-US" smtClean="0"/>
-              <a:t>3/19/2020</a:t>
+              <a:t>3/8/2022</a:t>
             </a:fld>
             <a:endParaRPr lang="en-US"/>
           </a:p>
@@ -11562,13 +11460,6 @@
   <p:transition>
     <p:fade/>
   </p:transition>
-  <p:timing>
-    <p:tnLst>
-      <p:par>
-        <p:cTn id="1" dur="indefinite" restart="never" nodeType="tmRoot"/>
-      </p:par>
-    </p:tnLst>
-  </p:timing>
 </p:sldLayout>
 </file>
 
@@ -11620,7 +11511,7 @@
           <a:p>
             <a:fld id="{5958763E-B898-436D-883D-03711491D54A}" type="datetimeFigureOut">
               <a:rPr lang="en-US" smtClean="0"/>
-              <a:t>3/19/2020</a:t>
+              <a:t>3/8/2022</a:t>
             </a:fld>
             <a:endParaRPr lang="en-US"/>
           </a:p>
@@ -11693,13 +11584,6 @@
   <p:transition>
     <p:fade/>
   </p:transition>
-  <p:timing>
-    <p:tnLst>
-      <p:par>
-        <p:cTn id="1" dur="indefinite" restart="never" nodeType="tmRoot"/>
-      </p:par>
-    </p:tnLst>
-  </p:timing>
 </p:sldLayout>
 </file>
 
@@ -11751,7 +11635,7 @@
           <a:p>
             <a:fld id="{5958763E-B898-436D-883D-03711491D54A}" type="datetimeFigureOut">
               <a:rPr lang="en-US" smtClean="0"/>
-              <a:t>3/19/2020</a:t>
+              <a:t>3/8/2022</a:t>
             </a:fld>
             <a:endParaRPr lang="en-US"/>
           </a:p>
@@ -11824,13 +11708,6 @@
   <p:transition>
     <p:fade/>
   </p:transition>
-  <p:timing>
-    <p:tnLst>
-      <p:par>
-        <p:cTn id="1" dur="indefinite" restart="never" nodeType="tmRoot"/>
-      </p:par>
-    </p:tnLst>
-  </p:timing>
 </p:sldLayout>
 </file>
 
@@ -11882,7 +11759,7 @@
           <a:p>
             <a:fld id="{5958763E-B898-436D-883D-03711491D54A}" type="datetimeFigureOut">
               <a:rPr lang="en-US" smtClean="0"/>
-              <a:t>3/19/2020</a:t>
+              <a:t>3/8/2022</a:t>
             </a:fld>
             <a:endParaRPr lang="en-US"/>
           </a:p>
@@ -11955,13 +11832,6 @@
   <p:transition>
     <p:fade/>
   </p:transition>
-  <p:timing>
-    <p:tnLst>
-      <p:par>
-        <p:cTn id="1" dur="indefinite" restart="never" nodeType="tmRoot"/>
-      </p:par>
-    </p:tnLst>
-  </p:timing>
 </p:sldLayout>
 </file>
 
@@ -12013,7 +11883,7 @@
           <a:p>
             <a:fld id="{5958763E-B898-436D-883D-03711491D54A}" type="datetimeFigureOut">
               <a:rPr lang="en-US" smtClean="0"/>
-              <a:t>3/19/2020</a:t>
+              <a:t>3/8/2022</a:t>
             </a:fld>
             <a:endParaRPr lang="en-US"/>
           </a:p>
@@ -12086,13 +11956,6 @@
   <p:transition>
     <p:fade/>
   </p:transition>
-  <p:timing>
-    <p:tnLst>
-      <p:par>
-        <p:cTn id="1" dur="indefinite" restart="never" nodeType="tmRoot"/>
-      </p:par>
-    </p:tnLst>
-  </p:timing>
 </p:sldLayout>
 </file>
 
@@ -12144,7 +12007,7 @@
           <a:p>
             <a:fld id="{5958763E-B898-436D-883D-03711491D54A}" type="datetimeFigureOut">
               <a:rPr lang="en-US" smtClean="0"/>
-              <a:t>3/19/2020</a:t>
+              <a:t>3/8/2022</a:t>
             </a:fld>
             <a:endParaRPr lang="en-US"/>
           </a:p>
@@ -12217,13 +12080,6 @@
   <p:transition>
     <p:fade/>
   </p:transition>
-  <p:timing>
-    <p:tnLst>
-      <p:par>
-        <p:cTn id="1" dur="indefinite" restart="never" nodeType="tmRoot"/>
-      </p:par>
-    </p:tnLst>
-  </p:timing>
 </p:sldLayout>
 </file>
 
@@ -12275,7 +12131,7 @@
           <a:p>
             <a:fld id="{5958763E-B898-436D-883D-03711491D54A}" type="datetimeFigureOut">
               <a:rPr lang="en-US" smtClean="0"/>
-              <a:t>3/19/2020</a:t>
+              <a:t>3/8/2022</a:t>
             </a:fld>
             <a:endParaRPr lang="en-US"/>
           </a:p>
@@ -12348,13 +12204,6 @@
   <p:transition>
     <p:fade/>
   </p:transition>
-  <p:timing>
-    <p:tnLst>
-      <p:par>
-        <p:cTn id="1" dur="indefinite" restart="never" nodeType="tmRoot"/>
-      </p:par>
-    </p:tnLst>
-  </p:timing>
 </p:sldLayout>
 </file>
 
@@ -12406,7 +12255,7 @@
           <a:p>
             <a:fld id="{5958763E-B898-436D-883D-03711491D54A}" type="datetimeFigureOut">
               <a:rPr lang="en-US" smtClean="0"/>
-              <a:t>3/19/2020</a:t>
+              <a:t>3/8/2022</a:t>
             </a:fld>
             <a:endParaRPr lang="en-US"/>
           </a:p>
@@ -12479,13 +12328,6 @@
   <p:transition>
     <p:fade/>
   </p:transition>
-  <p:timing>
-    <p:tnLst>
-      <p:par>
-        <p:cTn id="1" dur="indefinite" restart="never" nodeType="tmRoot"/>
-      </p:par>
-    </p:tnLst>
-  </p:timing>
 </p:sldLayout>
 </file>
 
@@ -12546,7 +12388,7 @@
           <a:p>
             <a:fld id="{5958763E-B898-436D-883D-03711491D54A}" type="datetimeFigureOut">
               <a:rPr lang="en-US" smtClean="0"/>
-              <a:t>3/19/2020</a:t>
+              <a:t>3/8/2022</a:t>
             </a:fld>
             <a:endParaRPr lang="en-US"/>
           </a:p>
@@ -12619,13 +12461,6 @@
   <p:transition>
     <p:fade/>
   </p:transition>
-  <p:timing>
-    <p:tnLst>
-      <p:par>
-        <p:cTn id="1" dur="indefinite" restart="never" nodeType="tmRoot"/>
-      </p:par>
-    </p:tnLst>
-  </p:timing>
 </p:sldLayout>
 </file>
 
@@ -15627,13 +15462,6 @@
   <p:transition>
     <p:fade/>
   </p:transition>
-  <p:timing>
-    <p:tnLst>
-      <p:par>
-        <p:cTn id="1" dur="indefinite" restart="never" nodeType="tmRoot"/>
-      </p:par>
-    </p:tnLst>
-  </p:timing>
 </p:sldLayout>
 </file>
 
@@ -15721,7 +15549,7 @@
                 <a:spcPct val="0"/>
               </a:spcAft>
             </a:pPr>
-            <a:endParaRPr lang="en-US" sz="2400" dirty="0" err="1" smtClean="0">
+            <a:endParaRPr lang="en-US" sz="2400" dirty="0" err="1">
               <a:gradFill>
                 <a:gsLst>
                   <a:gs pos="0">
@@ -15857,15 +15685,7 @@
           <a:p>
             <a:r>
               <a:rPr lang="en-US" dirty="0"/>
-              <a:t>Click to edit Master </a:t>
-            </a:r>
-            <a:r>
-              <a:rPr lang="en-US" dirty="0" smtClean="0"/>
-              <a:t>subtitle </a:t>
-            </a:r>
-            <a:r>
-              <a:rPr lang="en-US" dirty="0"/>
-              <a:t>style</a:t>
+              <a:t>Click to edit Master subtitle style</a:t>
             </a:r>
           </a:p>
         </p:txBody>
@@ -15907,7 +15727,7 @@
             <a:fld id="{1C2D31DE-C454-491C-B5C3-F097855E3DF7}" type="datetime4">
               <a:rPr lang="en-US" smtClean="0"/>
               <a:pPr/>
-              <a:t>March 19, 2020</a:t>
+              <a:t>March 8, 2022</a:t>
             </a:fld>
             <a:endParaRPr lang="en-US" dirty="0"/>
           </a:p>
@@ -18989,17 +18809,16 @@
           <a:p>
             <a:pPr lvl="0"/>
             <a:r>
-              <a:rPr lang="en-US" dirty="0" smtClean="0"/>
+              <a:rPr lang="en-US" dirty="0"/>
               <a:t>Presenter Name</a:t>
             </a:r>
             <a:br>
-              <a:rPr lang="en-US" dirty="0" smtClean="0"/>
+              <a:rPr lang="en-US" dirty="0"/>
             </a:br>
             <a:r>
-              <a:rPr lang="en-US" dirty="0" smtClean="0"/>
+              <a:rPr lang="en-US" dirty="0"/>
               <a:t>Presenter Title</a:t>
             </a:r>
-            <a:endParaRPr lang="en-US" dirty="0"/>
           </a:p>
         </p:txBody>
       </p:sp>
@@ -19016,13 +18835,6 @@
   <p:transition>
     <p:fade/>
   </p:transition>
-  <p:timing>
-    <p:tnLst>
-      <p:par>
-        <p:cTn id="1" dur="indefinite" restart="never" nodeType="tmRoot"/>
-      </p:par>
-    </p:tnLst>
-  </p:timing>
   <p:hf sldNum="0" hdr="0" ftr="0"/>
 </p:sldLayout>
 </file>
@@ -26532,10 +26344,9 @@
           <a:p>
             <a:pPr lvl="0"/>
             <a:r>
-              <a:rPr lang="en-US" dirty="0" smtClean="0"/>
+              <a:rPr lang="en-US" dirty="0"/>
               <a:t>&lt;Call to action&gt;</a:t>
             </a:r>
-            <a:endParaRPr lang="en-US" dirty="0"/>
           </a:p>
         </p:txBody>
       </p:sp>
@@ -28152,7 +27963,7 @@
           <a:p>
             <a:fld id="{5958763E-B898-436D-883D-03711491D54A}" type="datetimeFigureOut">
               <a:rPr lang="en-US" smtClean="0"/>
-              <a:t>3/19/2020</a:t>
+              <a:t>3/8/2022</a:t>
             </a:fld>
             <a:endParaRPr lang="en-US"/>
           </a:p>
@@ -28279,7 +28090,7 @@
                 <a:spcPct val="0"/>
               </a:spcAft>
             </a:pPr>
-            <a:endParaRPr lang="en-US" sz="2400" dirty="0" err="1" smtClean="0">
+            <a:endParaRPr lang="en-US" sz="2400" dirty="0" err="1">
               <a:gradFill>
                 <a:gsLst>
                   <a:gs pos="0">
@@ -28310,13 +28121,6 @@
   <p:transition>
     <p:fade/>
   </p:transition>
-  <p:timing>
-    <p:tnLst>
-      <p:par>
-        <p:cTn id="1" dur="indefinite" restart="never" nodeType="tmRoot"/>
-      </p:par>
-    </p:tnLst>
-  </p:timing>
 </p:sldLayout>
 </file>
 
@@ -28561,7 +28365,7 @@
           <a:p>
             <a:fld id="{5958763E-B898-436D-883D-03711491D54A}" type="datetimeFigureOut">
               <a:rPr lang="en-US" smtClean="0"/>
-              <a:t>3/19/2020</a:t>
+              <a:t>3/8/2022</a:t>
             </a:fld>
             <a:endParaRPr lang="en-US"/>
           </a:p>
@@ -28634,13 +28438,6 @@
   <p:transition>
     <p:fade/>
   </p:transition>
-  <p:timing>
-    <p:tnLst>
-      <p:par>
-        <p:cTn id="1" dur="indefinite" restart="never" nodeType="tmRoot"/>
-      </p:par>
-    </p:tnLst>
-  </p:timing>
 </p:sldLayout>
 </file>
 
@@ -28862,7 +28659,7 @@
           <a:p>
             <a:fld id="{5958763E-B898-436D-883D-03711491D54A}" type="datetimeFigureOut">
               <a:rPr lang="en-US" smtClean="0"/>
-              <a:t>3/19/2020</a:t>
+              <a:t>3/8/2022</a:t>
             </a:fld>
             <a:endParaRPr lang="en-US"/>
           </a:p>
@@ -28935,13 +28732,6 @@
   <p:transition>
     <p:fade/>
   </p:transition>
-  <p:timing>
-    <p:tnLst>
-      <p:par>
-        <p:cTn id="1" dur="indefinite" restart="never" nodeType="tmRoot"/>
-      </p:par>
-    </p:tnLst>
-  </p:timing>
 </p:sldLayout>
 </file>
 
@@ -29070,7 +28860,7 @@
           <a:p>
             <a:fld id="{5958763E-B898-436D-883D-03711491D54A}" type="datetimeFigureOut">
               <a:rPr lang="en-US" smtClean="0"/>
-              <a:t>3/19/2020</a:t>
+              <a:t>3/8/2022</a:t>
             </a:fld>
             <a:endParaRPr lang="en-US"/>
           </a:p>
@@ -29193,13 +28983,6 @@
   <p:transition>
     <p:fade/>
   </p:transition>
-  <p:timing>
-    <p:tnLst>
-      <p:par>
-        <p:cTn id="1" dur="indefinite" restart="never" nodeType="tmRoot"/>
-      </p:par>
-    </p:tnLst>
-  </p:timing>
 </p:sldLayout>
 </file>
 
@@ -29338,7 +29121,7 @@
           <a:p>
             <a:fld id="{5958763E-B898-436D-883D-03711491D54A}" type="datetimeFigureOut">
               <a:rPr lang="en-US" smtClean="0"/>
-              <a:t>3/19/2020</a:t>
+              <a:t>3/8/2022</a:t>
             </a:fld>
             <a:endParaRPr lang="en-US"/>
           </a:p>
@@ -29465,13 +29248,6 @@
   <p:transition>
     <p:fade/>
   </p:transition>
-  <p:timing>
-    <p:tnLst>
-      <p:par>
-        <p:cTn id="1" dur="indefinite" restart="never" nodeType="tmRoot"/>
-      </p:par>
-    </p:tnLst>
-  </p:timing>
 </p:sldLayout>
 </file>
 
@@ -29633,7 +29409,7 @@
                 <a:spcPct val="0"/>
               </a:spcAft>
             </a:pPr>
-            <a:endParaRPr lang="en-US" sz="2400" dirty="0" err="1" smtClean="0">
+            <a:endParaRPr lang="en-US" sz="2400" dirty="0" err="1">
               <a:gradFill>
                 <a:gsLst>
                   <a:gs pos="0">
@@ -29684,10 +29460,9 @@
           </a:lstStyle>
           <a:p>
             <a:r>
-              <a:rPr lang="en-US" dirty="0" smtClean="0"/>
+              <a:rPr lang="en-US" dirty="0"/>
               <a:t>Type “Agenda”</a:t>
             </a:r>
-            <a:endParaRPr lang="en-US" dirty="0"/>
           </a:p>
         </p:txBody>
       </p:sp>
@@ -29811,24 +29586,23 @@
           <a:p>
             <a:pPr lvl="0"/>
             <a:r>
-              <a:rPr lang="en-US" dirty="0" smtClean="0"/>
+              <a:rPr lang="en-US" dirty="0"/>
               <a:t>Item 1</a:t>
             </a:r>
           </a:p>
           <a:p>
             <a:pPr lvl="0"/>
             <a:r>
-              <a:rPr lang="en-US" dirty="0" smtClean="0"/>
+              <a:rPr lang="en-US" dirty="0"/>
               <a:t>Item 2</a:t>
             </a:r>
           </a:p>
           <a:p>
             <a:pPr lvl="0"/>
             <a:r>
-              <a:rPr lang="en-US" dirty="0" smtClean="0"/>
+              <a:rPr lang="en-US" dirty="0"/>
               <a:t>Item 3</a:t>
             </a:r>
-            <a:endParaRPr lang="en-US" dirty="0"/>
           </a:p>
         </p:txBody>
       </p:sp>
@@ -29855,7 +29629,7 @@
           <a:p>
             <a:fld id="{5958763E-B898-436D-883D-03711491D54A}" type="datetimeFigureOut">
               <a:rPr lang="en-US" smtClean="0"/>
-              <a:t>3/19/2020</a:t>
+              <a:t>3/8/2022</a:t>
             </a:fld>
             <a:endParaRPr lang="en-US"/>
           </a:p>
@@ -29962,13 +29736,6 @@
   <p:transition>
     <p:fade/>
   </p:transition>
-  <p:timing>
-    <p:tnLst>
-      <p:par>
-        <p:cTn id="1" dur="indefinite" restart="never" nodeType="tmRoot"/>
-      </p:par>
-    </p:tnLst>
-  </p:timing>
 </p:sldLayout>
 </file>
 
@@ -30130,7 +29897,7 @@
                 <a:spcPct val="0"/>
               </a:spcAft>
             </a:pPr>
-            <a:endParaRPr lang="en-US" sz="2400" dirty="0" err="1" smtClean="0">
+            <a:endParaRPr lang="en-US" sz="2400" dirty="0" err="1">
               <a:gradFill>
                 <a:gsLst>
                   <a:gs pos="0">
@@ -30183,10 +29950,9 @@
           </a:lstStyle>
           <a:p>
             <a:r>
-              <a:rPr lang="en-US" dirty="0" smtClean="0"/>
+              <a:rPr lang="en-US" dirty="0"/>
               <a:t>Notable Quote</a:t>
             </a:r>
-            <a:endParaRPr lang="en-US" dirty="0"/>
           </a:p>
         </p:txBody>
       </p:sp>
@@ -30313,10 +30079,9 @@
           <a:p>
             <a:pPr lvl="0"/>
             <a:r>
-              <a:rPr lang="en-US" dirty="0" smtClean="0"/>
+              <a:rPr lang="en-US" dirty="0"/>
               <a:t>– Attribution</a:t>
             </a:r>
-            <a:endParaRPr lang="en-US" dirty="0"/>
           </a:p>
         </p:txBody>
       </p:sp>
@@ -30343,7 +30108,7 @@
           <a:p>
             <a:fld id="{5958763E-B898-436D-883D-03711491D54A}" type="datetimeFigureOut">
               <a:rPr lang="en-US" smtClean="0"/>
-              <a:t>3/19/2020</a:t>
+              <a:t>3/8/2022</a:t>
             </a:fld>
             <a:endParaRPr lang="en-US"/>
           </a:p>
@@ -31091,13 +30856,6 @@
   <p:transition>
     <p:fade/>
   </p:transition>
-  <p:timing>
-    <p:tnLst>
-      <p:par>
-        <p:cTn id="1" dur="indefinite" restart="never" nodeType="tmRoot"/>
-      </p:par>
-    </p:tnLst>
-  </p:timing>
 </p:sldLayout>
 </file>
 
@@ -31169,7 +30927,7 @@
           <a:p>
             <a:fld id="{5958763E-B898-436D-883D-03711491D54A}" type="datetimeFigureOut">
               <a:rPr lang="en-US" smtClean="0"/>
-              <a:t>3/19/2020</a:t>
+              <a:t>3/8/2022</a:t>
             </a:fld>
             <a:endParaRPr lang="en-US"/>
           </a:p>
@@ -31242,13 +31000,6 @@
   <p:transition>
     <p:fade/>
   </p:transition>
-  <p:timing>
-    <p:tnLst>
-      <p:par>
-        <p:cTn id="1" dur="indefinite" restart="never" nodeType="tmRoot"/>
-      </p:par>
-    </p:tnLst>
-  </p:timing>
 </p:sldLayout>
 </file>
 
@@ -31377,7 +31128,7 @@
           <a:p>
             <a:fld id="{5958763E-B898-436D-883D-03711491D54A}" type="datetimeFigureOut">
               <a:rPr lang="en-US" smtClean="0"/>
-              <a:t>3/19/2020</a:t>
+              <a:t>3/8/2022</a:t>
             </a:fld>
             <a:endParaRPr lang="en-US"/>
           </a:p>
@@ -31500,13 +31251,6 @@
   <p:transition>
     <p:fade/>
   </p:transition>
-  <p:timing>
-    <p:tnLst>
-      <p:par>
-        <p:cTn id="1" dur="indefinite" restart="never" nodeType="tmRoot"/>
-      </p:par>
-    </p:tnLst>
-  </p:timing>
 </p:sldLayout>
 </file>
 
@@ -31719,7 +31463,7 @@
           <a:p>
             <a:fld id="{5958763E-B898-436D-883D-03711491D54A}" type="datetimeFigureOut">
               <a:rPr lang="en-US" smtClean="0"/>
-              <a:t>3/19/2020</a:t>
+              <a:t>3/8/2022</a:t>
             </a:fld>
             <a:endParaRPr lang="en-US"/>
           </a:p>
@@ -31792,13 +31536,6 @@
   <p:transition>
     <p:fade/>
   </p:transition>
-  <p:timing>
-    <p:tnLst>
-      <p:par>
-        <p:cTn id="1" dur="indefinite" restart="never" nodeType="tmRoot"/>
-      </p:par>
-    </p:tnLst>
-  </p:timing>
 </p:sldLayout>
 </file>
 
@@ -31956,7 +31693,7 @@
           <a:p>
             <a:fld id="{5958763E-B898-436D-883D-03711491D54A}" type="datetimeFigureOut">
               <a:rPr lang="en-US" smtClean="0"/>
-              <a:t>3/19/2020</a:t>
+              <a:t>3/8/2022</a:t>
             </a:fld>
             <a:endParaRPr lang="en-US"/>
           </a:p>
@@ -32029,13 +31766,6 @@
   <p:transition>
     <p:fade/>
   </p:transition>
-  <p:timing>
-    <p:tnLst>
-      <p:par>
-        <p:cTn id="1" dur="indefinite" restart="never" nodeType="tmRoot"/>
-      </p:par>
-    </p:tnLst>
-  </p:timing>
 </p:sldLayout>
 </file>
 
@@ -32207,7 +31937,7 @@
           <a:p>
             <a:fld id="{5958763E-B898-436D-883D-03711491D54A}" type="datetimeFigureOut">
               <a:rPr lang="en-US" smtClean="0"/>
-              <a:t>3/19/2020</a:t>
+              <a:t>3/8/2022</a:t>
             </a:fld>
             <a:endParaRPr lang="en-US"/>
           </a:p>
@@ -32353,13 +32083,6 @@
   <p:transition>
     <p:fade/>
   </p:transition>
-  <p:timing>
-    <p:tnLst>
-      <p:par>
-        <p:cTn id="1" dur="indefinite" restart="never" nodeType="tmRoot"/>
-      </p:par>
-    </p:tnLst>
-  </p:timing>
   <p:txStyles>
     <p:titleStyle>
       <a:lvl1pPr algn="l" defTabSz="914400" rtl="0" eaLnBrk="1" latinLnBrk="0" hangingPunct="1">
@@ -32664,7 +32387,7 @@
       </a:lvl9pPr>
     </p:otherStyle>
   </p:txStyles>
-  <p:extLst mod="1">
+  <p:extLst>
     <p:ext uri="{27BBF7A9-308A-43DC-89C8-2F10F3537804}">
       <p15:sldGuideLst xmlns:p15="http://schemas.microsoft.com/office/powerpoint/2012/main">
         <p15:guide id="1" orient="horz" pos="2160" userDrawn="1">
@@ -32743,10 +32466,9 @@
           <a:lstStyle/>
           <a:p>
             <a:r>
-              <a:rPr lang="en-US" sz="6600" dirty="0" smtClean="0"/>
+              <a:rPr lang="en-US" sz="6600" dirty="0"/>
               <a:t>Basic HTML Elements</a:t>
             </a:r>
-            <a:endParaRPr lang="en-US" sz="6600" dirty="0"/>
           </a:p>
         </p:txBody>
       </p:sp>
@@ -32771,10 +32493,9 @@
           <a:lstStyle/>
           <a:p>
             <a:r>
-              <a:rPr lang="en-US" dirty="0" smtClean="0"/>
+              <a:rPr lang="en-US" dirty="0"/>
               <a:t>Hy-Tech Club: Web 101</a:t>
             </a:r>
-            <a:endParaRPr lang="en-US" dirty="0"/>
           </a:p>
         </p:txBody>
       </p:sp>
@@ -35759,13 +35480,6 @@
   <p:transition>
     <p:fade/>
   </p:transition>
-  <p:timing>
-    <p:tnLst>
-      <p:par>
-        <p:cTn id="1" dur="indefinite" restart="never" nodeType="tmRoot"/>
-      </p:par>
-    </p:tnLst>
-  </p:timing>
 </p:sld>
 </file>
 
@@ -35812,14 +35526,9 @@
           <a:lstStyle/>
           <a:p>
             <a:r>
-              <a:rPr lang="en-US" dirty="0" smtClean="0"/>
-              <a:t>Header </a:t>
+              <a:rPr lang="en-US" dirty="0"/>
+              <a:t>Header Elements</a:t>
             </a:r>
-            <a:r>
-              <a:rPr lang="en-US" dirty="0" smtClean="0"/>
-              <a:t>Elements</a:t>
-            </a:r>
-            <a:endParaRPr lang="en-US" dirty="0"/>
           </a:p>
         </p:txBody>
       </p:sp>
@@ -35845,7 +35554,7 @@
           </a:bodyPr>
           <a:lstStyle/>
           <a:p>
-            <a:endParaRPr lang="en-US" dirty="0" smtClean="0">
+            <a:endParaRPr lang="en-US" dirty="0">
               <a:solidFill>
                 <a:schemeClr val="bg1"/>
               </a:solidFill>
@@ -35853,22 +35562,17 @@
           </a:p>
           <a:p>
             <a:r>
-              <a:rPr lang="en-US" dirty="0" smtClean="0">
+              <a:rPr lang="en-US" dirty="0">
                 <a:solidFill>
                   <a:schemeClr val="bg1"/>
                 </a:solidFill>
               </a:rPr>
               <a:t>Used for page headings or titles</a:t>
             </a:r>
-            <a:endParaRPr lang="en-US" dirty="0" smtClean="0">
-              <a:solidFill>
-                <a:schemeClr val="bg1"/>
-              </a:solidFill>
-            </a:endParaRPr>
           </a:p>
           <a:p>
             <a:r>
-              <a:rPr lang="en-US" dirty="0" smtClean="0">
+              <a:rPr lang="en-US" dirty="0">
                 <a:solidFill>
                   <a:schemeClr val="bg1"/>
                 </a:solidFill>
@@ -35876,7 +35580,7 @@
               <a:t>There are six header elements – </a:t>
             </a:r>
             <a:r>
-              <a:rPr lang="en-US" b="1" dirty="0" smtClean="0">
+              <a:rPr lang="en-US" b="1" dirty="0">
                 <a:solidFill>
                   <a:schemeClr val="accent1">
                     <a:lumMod val="60000"/>
@@ -35893,18 +35597,10 @@
                   <a:schemeClr val="bg1"/>
                 </a:solidFill>
               </a:rPr>
-              <a:t> </a:t>
+              <a:t> through </a:t>
             </a:r>
             <a:r>
-              <a:rPr lang="en-US" dirty="0" smtClean="0">
-                <a:solidFill>
-                  <a:schemeClr val="bg1"/>
-                </a:solidFill>
-              </a:rPr>
-              <a:t>through </a:t>
-            </a:r>
-            <a:r>
-              <a:rPr lang="en-US" b="1" dirty="0" smtClean="0">
+              <a:rPr lang="en-US" b="1" dirty="0">
                 <a:solidFill>
                   <a:schemeClr val="accent1">
                     <a:lumMod val="60000"/>
@@ -35950,7 +35646,7 @@
               <a:t>&lt;</a:t>
             </a:r>
             <a:r>
-              <a:rPr lang="en-US" sz="4800" dirty="0" smtClean="0">
+              <a:rPr lang="en-US" sz="4800" dirty="0">
                 <a:solidFill>
                   <a:srgbClr val="569CD6"/>
                 </a:solidFill>
@@ -35959,7 +35655,7 @@
               <a:t>h1</a:t>
             </a:r>
             <a:r>
-              <a:rPr lang="en-US" sz="4800" dirty="0" smtClean="0">
+              <a:rPr lang="en-US" sz="4800" dirty="0">
                 <a:solidFill>
                   <a:srgbClr val="808080"/>
                 </a:solidFill>
@@ -35968,7 +35664,7 @@
               <a:t>&gt;</a:t>
             </a:r>
             <a:r>
-              <a:rPr lang="en-US" sz="4800" dirty="0" smtClean="0">
+              <a:rPr lang="en-US" sz="4800" dirty="0">
                 <a:solidFill>
                   <a:schemeClr val="bg1"/>
                 </a:solidFill>
@@ -35977,7 +35673,7 @@
               <a:t>This is the biggest</a:t>
             </a:r>
             <a:r>
-              <a:rPr lang="en-US" sz="4800" dirty="0" smtClean="0">
+              <a:rPr lang="en-US" sz="4800" dirty="0">
                 <a:solidFill>
                   <a:srgbClr val="808080"/>
                 </a:solidFill>
@@ -35986,7 +35682,7 @@
               <a:t>&lt;/</a:t>
             </a:r>
             <a:r>
-              <a:rPr lang="en-US" sz="4800" dirty="0" smtClean="0">
+              <a:rPr lang="en-US" sz="4800" dirty="0">
                 <a:solidFill>
                   <a:srgbClr val="569CD6"/>
                 </a:solidFill>
@@ -35995,7 +35691,7 @@
               <a:t>h1</a:t>
             </a:r>
             <a:r>
-              <a:rPr lang="en-US" sz="4800" dirty="0" smtClean="0">
+              <a:rPr lang="en-US" sz="4800" dirty="0">
                 <a:solidFill>
                   <a:srgbClr val="808080"/>
                 </a:solidFill>
@@ -36015,7 +35711,7 @@
               <a:t>&lt;</a:t>
             </a:r>
             <a:r>
-              <a:rPr lang="en-US" sz="4800" dirty="0" smtClean="0">
+              <a:rPr lang="en-US" sz="4800" dirty="0">
                 <a:solidFill>
                   <a:srgbClr val="569CD6"/>
                 </a:solidFill>
@@ -36024,7 +35720,7 @@
               <a:t>h6</a:t>
             </a:r>
             <a:r>
-              <a:rPr lang="en-US" sz="4800" dirty="0" smtClean="0">
+              <a:rPr lang="en-US" sz="4800" dirty="0">
                 <a:solidFill>
                   <a:srgbClr val="808080"/>
                 </a:solidFill>
@@ -36033,7 +35729,7 @@
               <a:t>&gt;</a:t>
             </a:r>
             <a:r>
-              <a:rPr lang="en-US" sz="4800" dirty="0" smtClean="0">
+              <a:rPr lang="en-US" sz="4800" dirty="0">
                 <a:solidFill>
                   <a:schemeClr val="bg1"/>
                 </a:solidFill>
@@ -36042,7 +35738,7 @@
               <a:t>This is the smallest</a:t>
             </a:r>
             <a:r>
-              <a:rPr lang="en-US" sz="4800" dirty="0" smtClean="0">
+              <a:rPr lang="en-US" sz="4800" dirty="0">
                 <a:solidFill>
                   <a:srgbClr val="808080"/>
                 </a:solidFill>
@@ -36051,7 +35747,7 @@
               <a:t>&lt;/</a:t>
             </a:r>
             <a:r>
-              <a:rPr lang="en-US" sz="4800" dirty="0" smtClean="0">
+              <a:rPr lang="en-US" sz="4800" dirty="0">
                 <a:solidFill>
                   <a:srgbClr val="569CD6"/>
                 </a:solidFill>
@@ -36060,7 +35756,7 @@
               <a:t>h6</a:t>
             </a:r>
             <a:r>
-              <a:rPr lang="en-US" sz="4800" dirty="0" smtClean="0">
+              <a:rPr lang="en-US" sz="4800" dirty="0">
                 <a:solidFill>
                   <a:srgbClr val="808080"/>
                 </a:solidFill>
@@ -36084,7 +35780,7 @@
                 <a:spcPts val="600"/>
               </a:spcAft>
             </a:pPr>
-            <a:endParaRPr lang="en-US" sz="2400" dirty="0" err="1" smtClean="0">
+            <a:endParaRPr lang="en-US" sz="2400" dirty="0" err="1">
               <a:gradFill>
                 <a:gsLst>
                   <a:gs pos="2917">
@@ -36245,11 +35941,11 @@
           <a:lstStyle/>
           <a:p>
             <a:r>
-              <a:rPr lang="en-US" dirty="0" smtClean="0"/>
+              <a:rPr lang="en-US" dirty="0"/>
               <a:t>The </a:t>
             </a:r>
             <a:r>
-              <a:rPr lang="en-US" sz="4000" cap="none" dirty="0" smtClean="0">
+              <a:rPr lang="en-US" sz="4000" cap="none" dirty="0">
                 <a:solidFill>
                   <a:schemeClr val="accent1">
                     <a:lumMod val="20000"/>
@@ -36261,10 +35957,9 @@
               <a:t>p</a:t>
             </a:r>
             <a:r>
-              <a:rPr lang="en-US" dirty="0" smtClean="0"/>
+              <a:rPr lang="en-US" dirty="0"/>
               <a:t> (Paragraph) Element</a:t>
             </a:r>
-            <a:endParaRPr lang="en-US" dirty="0"/>
           </a:p>
         </p:txBody>
       </p:sp>
@@ -36283,7 +35978,7 @@
           <a:bodyPr/>
           <a:lstStyle/>
           <a:p>
-            <a:endParaRPr lang="en-US" dirty="0" smtClean="0">
+            <a:endParaRPr lang="en-US" dirty="0">
               <a:solidFill>
                 <a:schemeClr val="bg1"/>
               </a:solidFill>
@@ -36291,26 +35986,18 @@
           </a:p>
           <a:p>
             <a:r>
-              <a:rPr lang="en-US" dirty="0" smtClean="0">
+              <a:rPr lang="en-US" dirty="0">
                 <a:solidFill>
                   <a:schemeClr val="bg1"/>
                 </a:solidFill>
               </a:rPr>
-              <a:t>Displays </a:t>
-            </a:r>
-            <a:r>
-              <a:rPr lang="en-US" dirty="0" smtClean="0">
-                <a:solidFill>
-                  <a:schemeClr val="bg1"/>
-                </a:solidFill>
-              </a:rPr>
-              <a:t>common text on the page </a:t>
+              <a:t>Displays common text on the page </a:t>
             </a:r>
           </a:p>
           <a:p>
             <a:pPr lvl="1"/>
             <a:r>
-              <a:rPr lang="en-US" dirty="0" smtClean="0">
+              <a:rPr lang="en-US" dirty="0">
                 <a:solidFill>
                   <a:schemeClr val="bg1"/>
                 </a:solidFill>
@@ -36320,7 +36007,7 @@
           </a:p>
           <a:p>
             <a:r>
-              <a:rPr lang="en-US" dirty="0" smtClean="0">
+              <a:rPr lang="en-US" dirty="0">
                 <a:solidFill>
                   <a:schemeClr val="bg1"/>
                 </a:solidFill>
@@ -36328,7 +36015,7 @@
               <a:t>Each </a:t>
             </a:r>
             <a:r>
-              <a:rPr lang="en-US" b="1" dirty="0" smtClean="0">
+              <a:rPr lang="en-US" b="1" dirty="0">
                 <a:solidFill>
                   <a:schemeClr val="accent1">
                     <a:lumMod val="60000"/>
@@ -36340,7 +36027,7 @@
               <a:t>&lt;p&gt;&lt;/p&gt;</a:t>
             </a:r>
             <a:r>
-              <a:rPr lang="en-US" dirty="0" smtClean="0">
+              <a:rPr lang="en-US" dirty="0">
                 <a:solidFill>
                   <a:schemeClr val="bg1"/>
                 </a:solidFill>
@@ -36382,7 +36069,7 @@
           <a:lstStyle/>
           <a:p>
             <a:r>
-              <a:rPr lang="en-US" sz="4400" dirty="0" smtClean="0">
+              <a:rPr lang="en-US" sz="4400" dirty="0">
                 <a:solidFill>
                   <a:srgbClr val="808080"/>
                 </a:solidFill>
@@ -36391,7 +36078,7 @@
               <a:t>&lt;</a:t>
             </a:r>
             <a:r>
-              <a:rPr lang="en-US" sz="4400" dirty="0" smtClean="0">
+              <a:rPr lang="en-US" sz="4400" dirty="0">
                 <a:solidFill>
                   <a:srgbClr val="569CD6"/>
                 </a:solidFill>
@@ -36400,7 +36087,7 @@
               <a:t>p</a:t>
             </a:r>
             <a:r>
-              <a:rPr lang="en-US" sz="4400" dirty="0" smtClean="0">
+              <a:rPr lang="en-US" sz="4400" dirty="0">
                 <a:solidFill>
                   <a:srgbClr val="808080"/>
                 </a:solidFill>
@@ -36409,7 +36096,7 @@
               <a:t>&gt;</a:t>
             </a:r>
             <a:r>
-              <a:rPr lang="en-US" sz="4400" dirty="0" smtClean="0">
+              <a:rPr lang="en-US" sz="4400" dirty="0">
                 <a:solidFill>
                   <a:schemeClr val="bg1"/>
                 </a:solidFill>
@@ -36418,7 +36105,7 @@
               <a:t>This will appear normal</a:t>
             </a:r>
             <a:r>
-              <a:rPr lang="en-US" sz="4400" dirty="0" smtClean="0">
+              <a:rPr lang="en-US" sz="4400" dirty="0">
                 <a:solidFill>
                   <a:srgbClr val="808080"/>
                 </a:solidFill>
@@ -36427,7 +36114,7 @@
               <a:t>&lt;/</a:t>
             </a:r>
             <a:r>
-              <a:rPr lang="en-US" sz="4400" dirty="0" smtClean="0">
+              <a:rPr lang="en-US" sz="4400" dirty="0">
                 <a:solidFill>
                   <a:srgbClr val="569CD6"/>
                 </a:solidFill>
@@ -36436,7 +36123,7 @@
               <a:t>p</a:t>
             </a:r>
             <a:r>
-              <a:rPr lang="en-US" sz="4400" dirty="0" smtClean="0">
+              <a:rPr lang="en-US" sz="4400" dirty="0">
                 <a:solidFill>
                   <a:srgbClr val="808080"/>
                 </a:solidFill>
@@ -36444,7 +36131,7 @@
               </a:rPr>
               <a:t>&gt;</a:t>
             </a:r>
-            <a:endParaRPr lang="en-US" sz="2400" dirty="0" smtClean="0">
+            <a:endParaRPr lang="en-US" sz="2400" dirty="0">
               <a:gradFill>
                 <a:gsLst>
                   <a:gs pos="2917">
@@ -36605,7 +36292,7 @@
           <a:lstStyle/>
           <a:p>
             <a:r>
-              <a:rPr lang="en-US" dirty="0" smtClean="0"/>
+              <a:rPr lang="en-US" dirty="0"/>
               <a:t>The </a:t>
             </a:r>
             <a:r>
@@ -36621,14 +36308,9 @@
               <a:t>a</a:t>
             </a:r>
             <a:r>
-              <a:rPr lang="en-US" dirty="0" smtClean="0"/>
-              <a:t> (anchor) </a:t>
+              <a:rPr lang="en-US" dirty="0"/>
+              <a:t> (anchor) Element</a:t>
             </a:r>
-            <a:r>
-              <a:rPr lang="en-US" dirty="0" smtClean="0"/>
-              <a:t>Element</a:t>
-            </a:r>
-            <a:endParaRPr lang="en-US" dirty="0"/>
           </a:p>
         </p:txBody>
       </p:sp>
@@ -36647,7 +36329,7 @@
           <a:bodyPr/>
           <a:lstStyle/>
           <a:p>
-            <a:endParaRPr lang="en-US" dirty="0" smtClean="0">
+            <a:endParaRPr lang="en-US" dirty="0">
               <a:solidFill>
                 <a:schemeClr val="bg1"/>
               </a:solidFill>
@@ -36655,22 +36337,17 @@
           </a:p>
           <a:p>
             <a:r>
-              <a:rPr lang="en-US" dirty="0" smtClean="0">
+              <a:rPr lang="en-US" dirty="0">
                 <a:solidFill>
                   <a:schemeClr val="bg1"/>
                 </a:solidFill>
               </a:rPr>
               <a:t>Used to create a link to another page</a:t>
             </a:r>
-            <a:endParaRPr lang="en-US" dirty="0" smtClean="0">
-              <a:solidFill>
-                <a:schemeClr val="bg1"/>
-              </a:solidFill>
-            </a:endParaRPr>
           </a:p>
           <a:p>
             <a:r>
-              <a:rPr lang="en-US" dirty="0" smtClean="0">
+              <a:rPr lang="en-US" dirty="0">
                 <a:solidFill>
                   <a:schemeClr val="bg1"/>
                 </a:solidFill>
@@ -36678,7 +36355,7 @@
               <a:t>Set the </a:t>
             </a:r>
             <a:r>
-              <a:rPr lang="en-US" b="1" dirty="0" err="1" smtClean="0">
+              <a:rPr lang="en-US" b="1" dirty="0" err="1">
                 <a:solidFill>
                   <a:schemeClr val="accent1">
                     <a:lumMod val="60000"/>
@@ -36690,7 +36367,7 @@
               <a:t>href</a:t>
             </a:r>
             <a:r>
-              <a:rPr lang="en-US" dirty="0" smtClean="0">
+              <a:rPr lang="en-US" dirty="0">
                 <a:solidFill>
                   <a:schemeClr val="bg1"/>
                 </a:solidFill>
@@ -36700,18 +36377,13 @@
           </a:p>
           <a:p>
             <a:r>
-              <a:rPr lang="en-US" dirty="0" smtClean="0">
+              <a:rPr lang="en-US" dirty="0">
                 <a:solidFill>
                   <a:schemeClr val="bg1"/>
                 </a:solidFill>
               </a:rPr>
               <a:t>The text of the link goes in between the opening and closing tag</a:t>
             </a:r>
-            <a:endParaRPr lang="en-US" dirty="0" smtClean="0">
-              <a:solidFill>
-                <a:schemeClr val="bg1"/>
-              </a:solidFill>
-            </a:endParaRPr>
           </a:p>
         </p:txBody>
       </p:sp>
@@ -36789,19 +36461,10 @@
                 </a:solidFill>
                 <a:latin typeface="Consolas" panose="020B0609020204030204" pitchFamily="49" charset="0"/>
               </a:rPr>
-              <a:t>"https</a:t>
+              <a:t>"https://google.com"</a:t>
             </a:r>
             <a:r>
-              <a:rPr lang="en-US" sz="4000" dirty="0" smtClean="0">
-                <a:solidFill>
-                  <a:srgbClr val="CE9178"/>
-                </a:solidFill>
-                <a:latin typeface="Consolas" panose="020B0609020204030204" pitchFamily="49" charset="0"/>
-              </a:rPr>
-              <a:t>://google.com"</a:t>
-            </a:r>
-            <a:r>
-              <a:rPr lang="en-US" sz="4000" dirty="0" smtClean="0">
+              <a:rPr lang="en-US" sz="4000" dirty="0">
                 <a:solidFill>
                   <a:srgbClr val="808080"/>
                 </a:solidFill>
@@ -36810,7 +36473,7 @@
               <a:t>&gt;</a:t>
             </a:r>
             <a:r>
-              <a:rPr lang="en-US" sz="4000" dirty="0" smtClean="0">
+              <a:rPr lang="en-US" sz="4000" dirty="0">
                 <a:solidFill>
                   <a:schemeClr val="bg1"/>
                 </a:solidFill>
@@ -36819,7 +36482,7 @@
               <a:t>Google</a:t>
             </a:r>
             <a:r>
-              <a:rPr lang="en-US" sz="4000" dirty="0" smtClean="0">
+              <a:rPr lang="en-US" sz="4000" dirty="0">
                 <a:solidFill>
                   <a:srgbClr val="808080"/>
                 </a:solidFill>
@@ -37000,11 +36663,11 @@
           <a:lstStyle/>
           <a:p>
             <a:r>
-              <a:rPr lang="en-US" dirty="0" smtClean="0"/>
+              <a:rPr lang="en-US" dirty="0"/>
               <a:t>The </a:t>
             </a:r>
             <a:r>
-              <a:rPr lang="en-US" sz="4000" cap="none" dirty="0" err="1" smtClean="0">
+              <a:rPr lang="en-US" sz="4000" cap="none" dirty="0" err="1">
                 <a:solidFill>
                   <a:schemeClr val="accent1">
                     <a:lumMod val="20000"/>
@@ -37016,14 +36679,9 @@
               <a:t>img</a:t>
             </a:r>
             <a:r>
-              <a:rPr lang="en-US" dirty="0" smtClean="0"/>
-              <a:t> </a:t>
+              <a:rPr lang="en-US" dirty="0"/>
+              <a:t> Element</a:t>
             </a:r>
-            <a:r>
-              <a:rPr lang="en-US" dirty="0" smtClean="0"/>
-              <a:t>Element</a:t>
-            </a:r>
-            <a:endParaRPr lang="en-US" dirty="0"/>
           </a:p>
         </p:txBody>
       </p:sp>
@@ -37047,7 +36705,7 @@
           <a:bodyPr/>
           <a:lstStyle/>
           <a:p>
-            <a:endParaRPr lang="en-US" dirty="0" smtClean="0">
+            <a:endParaRPr lang="en-US" dirty="0">
               <a:solidFill>
                 <a:schemeClr val="bg1"/>
               </a:solidFill>
@@ -37055,22 +36713,17 @@
           </a:p>
           <a:p>
             <a:r>
-              <a:rPr lang="en-US" dirty="0" smtClean="0">
+              <a:rPr lang="en-US" dirty="0">
                 <a:solidFill>
                   <a:schemeClr val="bg1"/>
                 </a:solidFill>
               </a:rPr>
               <a:t>Used to display an image</a:t>
             </a:r>
-            <a:endParaRPr lang="en-US" dirty="0" smtClean="0">
-              <a:solidFill>
-                <a:schemeClr val="bg1"/>
-              </a:solidFill>
-            </a:endParaRPr>
           </a:p>
           <a:p>
             <a:r>
-              <a:rPr lang="en-US" dirty="0" smtClean="0">
+              <a:rPr lang="en-US" dirty="0">
                 <a:solidFill>
                   <a:schemeClr val="bg1"/>
                 </a:solidFill>
@@ -37078,7 +36731,7 @@
               <a:t>Set the </a:t>
             </a:r>
             <a:r>
-              <a:rPr lang="en-US" b="1" dirty="0" err="1" smtClean="0">
+              <a:rPr lang="en-US" b="1" dirty="0" err="1">
                 <a:solidFill>
                   <a:schemeClr val="accent1">
                     <a:lumMod val="60000"/>
@@ -37090,7 +36743,7 @@
               <a:t>src</a:t>
             </a:r>
             <a:r>
-              <a:rPr lang="en-US" dirty="0" smtClean="0">
+              <a:rPr lang="en-US" dirty="0">
                 <a:solidFill>
                   <a:schemeClr val="bg1"/>
                 </a:solidFill>
@@ -37100,7 +36753,7 @@
           </a:p>
           <a:p>
             <a:r>
-              <a:rPr lang="en-US" dirty="0" smtClean="0">
+              <a:rPr lang="en-US" dirty="0">
                 <a:solidFill>
                   <a:schemeClr val="bg1"/>
                 </a:solidFill>
@@ -37108,18 +36761,13 @@
               <a:t>This element has no closing tag – it is </a:t>
             </a:r>
             <a:r>
-              <a:rPr lang="en-US" b="1" i="1" dirty="0" smtClean="0">
+              <a:rPr lang="en-US" b="1" i="1" dirty="0">
                 <a:solidFill>
                   <a:schemeClr val="bg1"/>
                 </a:solidFill>
               </a:rPr>
               <a:t>self-closing</a:t>
             </a:r>
-            <a:endParaRPr lang="en-US" b="1" i="1" dirty="0" smtClean="0">
-              <a:solidFill>
-                <a:schemeClr val="bg1"/>
-              </a:solidFill>
-            </a:endParaRPr>
           </a:p>
         </p:txBody>
       </p:sp>
@@ -37362,10 +37010,9 @@
           <a:lstStyle/>
           <a:p>
             <a:r>
-              <a:rPr lang="en-US" dirty="0" smtClean="0"/>
+              <a:rPr lang="en-US" dirty="0"/>
               <a:t>Example</a:t>
             </a:r>
-            <a:endParaRPr lang="en-US" dirty="0"/>
           </a:p>
         </p:txBody>
       </p:sp>
@@ -37393,7 +37040,7 @@
               <a:rPr lang="en-US" sz="9600" dirty="0">
                 <a:hlinkClick r:id="rId3"/>
               </a:rPr>
-              <a:t>https://repl.it/repls/StudiousSlategrayBinarytree</a:t>
+              <a:t>https://replit.com/@HylandOutreach/BasicElementsExample</a:t>
             </a:r>
             <a:endParaRPr lang="en-US" sz="9600" dirty="0"/>
           </a:p>
@@ -37412,13 +37059,6 @@
   <p:transition>
     <p:fade/>
   </p:transition>
-  <p:timing>
-    <p:tnLst>
-      <p:par>
-        <p:cTn id="1" dur="indefinite" restart="never" nodeType="tmRoot"/>
-      </p:par>
-    </p:tnLst>
-  </p:timing>
 </p:sld>
 </file>
 

</xml_diff>

<commit_message>
changed replit links to glitch
</commit_message>
<xml_diff>
--- a/Week02/BasicHtmlElements.pptx
+++ b/Week02/BasicHtmlElements.pptx
@@ -902,32 +902,38 @@
           <a:bodyPr/>
           <a:lstStyle/>
           <a:p>
-            <a:pPr marL="0" marR="0" lvl="0" indent="0" algn="l" defTabSz="914400" rtl="0" eaLnBrk="1" fontAlgn="auto" latinLnBrk="0" hangingPunct="1">
-              <a:lnSpc>
-                <a:spcPct val="100000"/>
-              </a:lnSpc>
-              <a:spcBef>
-                <a:spcPts val="0"/>
-              </a:spcBef>
-              <a:spcAft>
-                <a:spcPts val="0"/>
-              </a:spcAft>
-              <a:buClrTx/>
-              <a:buSzTx/>
-              <a:buFontTx/>
-              <a:buNone/>
-              <a:tabLst/>
-              <a:defRPr/>
+            <a:pPr marL="42863" indent="0" algn="ctr">
+              <a:buNone/>
             </a:pPr>
             <a:r>
-              <a:rPr lang="en-US" dirty="0"/>
-              <a:t>https://replit.com/@HylandOutreach</a:t>
+              <a:rPr lang="en-US" sz="1100" b="1" dirty="0">
+                <a:solidFill>
+                  <a:schemeClr val="tx1"/>
+                </a:solidFill>
+                <a:highlight>
+                  <a:srgbClr val="C0C0C0"/>
+                </a:highlight>
+                <a:hlinkClick r:id="rId3">
+                  <a:extLst>
+                    <a:ext uri="{A12FA001-AC4F-418D-AE19-62706E023703}">
+                      <ahyp:hlinkClr xmlns:ahyp="http://schemas.microsoft.com/office/drawing/2018/hyperlinkcolor" val="tx"/>
+                    </a:ext>
+                  </a:extLst>
+                </a:hlinkClick>
+              </a:rPr>
+              <a:t>https://glitch.com/edit/#!/basicelementsexample</a:t>
             </a:r>
             <a:r>
-              <a:rPr lang="en-US"/>
-              <a:t>/BasicElementsExample</a:t>
+              <a:rPr lang="en-US" sz="1100" b="1" dirty="0">
+                <a:solidFill>
+                  <a:schemeClr val="tx1"/>
+                </a:solidFill>
+                <a:highlight>
+                  <a:srgbClr val="C0C0C0"/>
+                </a:highlight>
+              </a:rPr>
+              <a:t> </a:t>
             </a:r>
-            <a:endParaRPr lang="en-US" dirty="0"/>
           </a:p>
         </p:txBody>
       </p:sp>
@@ -4581,7 +4587,7 @@
           <a:p>
             <a:fld id="{5958763E-B898-436D-883D-03711491D54A}" type="datetimeFigureOut">
               <a:rPr lang="en-US" smtClean="0"/>
-              <a:t>2/8/2023</a:t>
+              <a:t>6/25/2024</a:t>
             </a:fld>
             <a:endParaRPr lang="en-US"/>
           </a:p>
@@ -8063,8 +8069,11 @@
             <a:r>
               <a:rPr lang="en-US" sz="2000" b="1" dirty="0">
                 <a:solidFill>
-                  <a:schemeClr val="bg1"/>
-                </a:solidFill>
+                  <a:schemeClr val="tx1"/>
+                </a:solidFill>
+                <a:highlight>
+                  <a:srgbClr val="C0C0C0"/>
+                </a:highlight>
                 <a:hlinkClick r:id="rId3">
                   <a:extLst>
                     <a:ext uri="{A12FA001-AC4F-418D-AE19-62706E023703}">
@@ -8073,13 +8082,19 @@
                   </a:extLst>
                 </a:hlinkClick>
               </a:rPr>
-              <a:t>https://replit.com/@HylandOutreach/BasicElementsExample</a:t>
+              <a:t>https://glitch.com/edit/#!/basicelementsexample</a:t>
             </a:r>
-            <a:endParaRPr lang="en-US" sz="2000" b="1" dirty="0">
-              <a:solidFill>
-                <a:schemeClr val="bg1"/>
-              </a:solidFill>
-            </a:endParaRPr>
+            <a:r>
+              <a:rPr lang="en-US" sz="2000" b="1" dirty="0">
+                <a:solidFill>
+                  <a:schemeClr val="tx1"/>
+                </a:solidFill>
+                <a:highlight>
+                  <a:srgbClr val="C0C0C0"/>
+                </a:highlight>
+              </a:rPr>
+              <a:t> </a:t>
+            </a:r>
           </a:p>
         </p:txBody>
       </p:sp>

</xml_diff>

<commit_message>
first round of changes I implemented
</commit_message>
<xml_diff>
--- a/Week02/BasicHtmlElements.pptx
+++ b/Week02/BasicHtmlElements.pptx
@@ -4587,7 +4587,7 @@
           <a:p>
             <a:fld id="{5958763E-B898-436D-883D-03711491D54A}" type="datetimeFigureOut">
               <a:rPr lang="en-US" smtClean="0"/>
-              <a:t>6/25/2024</a:t>
+              <a:t>6/26/2024</a:t>
             </a:fld>
             <a:endParaRPr lang="en-US"/>
           </a:p>
@@ -8082,7 +8082,7 @@
                   </a:extLst>
                 </a:hlinkClick>
               </a:rPr>
-              <a:t>https://glitch.com/edit/#!/basicelementsexample</a:t>
+              <a:t>https://glitch.com/edit/#!/remix/basicelementsexample</a:t>
             </a:r>
             <a:r>
               <a:rPr lang="en-US" sz="2000" b="1" dirty="0">

</xml_diff>

<commit_message>
Update gitbook 2024-06-27 13:03:57
</commit_message>
<xml_diff>
--- a/Week02/BasicHtmlElements.pptx
+++ b/Week02/BasicHtmlElements.pptx
@@ -902,32 +902,38 @@
           <a:bodyPr/>
           <a:lstStyle/>
           <a:p>
-            <a:pPr marL="0" marR="0" lvl="0" indent="0" algn="l" defTabSz="914400" rtl="0" eaLnBrk="1" fontAlgn="auto" latinLnBrk="0" hangingPunct="1">
-              <a:lnSpc>
-                <a:spcPct val="100000"/>
-              </a:lnSpc>
-              <a:spcBef>
-                <a:spcPts val="0"/>
-              </a:spcBef>
-              <a:spcAft>
-                <a:spcPts val="0"/>
-              </a:spcAft>
-              <a:buClrTx/>
-              <a:buSzTx/>
-              <a:buFontTx/>
-              <a:buNone/>
-              <a:tabLst/>
-              <a:defRPr/>
+            <a:pPr marL="42863" indent="0" algn="ctr">
+              <a:buNone/>
             </a:pPr>
             <a:r>
-              <a:rPr lang="en-US" dirty="0"/>
-              <a:t>https://replit.com/@HylandOutreach</a:t>
+              <a:rPr lang="en-US" sz="1100" b="1" dirty="0">
+                <a:solidFill>
+                  <a:schemeClr val="tx1"/>
+                </a:solidFill>
+                <a:highlight>
+                  <a:srgbClr val="C0C0C0"/>
+                </a:highlight>
+                <a:hlinkClick r:id="rId3">
+                  <a:extLst>
+                    <a:ext uri="{A12FA001-AC4F-418D-AE19-62706E023703}">
+                      <ahyp:hlinkClr xmlns:ahyp="http://schemas.microsoft.com/office/drawing/2018/hyperlinkcolor" val="tx"/>
+                    </a:ext>
+                  </a:extLst>
+                </a:hlinkClick>
+              </a:rPr>
+              <a:t>https://glitch.com/edit/#!/basicelementsexample</a:t>
             </a:r>
             <a:r>
-              <a:rPr lang="en-US"/>
-              <a:t>/BasicElementsExample</a:t>
+              <a:rPr lang="en-US" sz="1100" b="1" dirty="0">
+                <a:solidFill>
+                  <a:schemeClr val="tx1"/>
+                </a:solidFill>
+                <a:highlight>
+                  <a:srgbClr val="C0C0C0"/>
+                </a:highlight>
+              </a:rPr>
+              <a:t> </a:t>
             </a:r>
-            <a:endParaRPr lang="en-US" dirty="0"/>
           </a:p>
         </p:txBody>
       </p:sp>
@@ -4581,7 +4587,7 @@
           <a:p>
             <a:fld id="{5958763E-B898-436D-883D-03711491D54A}" type="datetimeFigureOut">
               <a:rPr lang="en-US" smtClean="0"/>
-              <a:t>2/8/2023</a:t>
+              <a:t>6/26/2024</a:t>
             </a:fld>
             <a:endParaRPr lang="en-US"/>
           </a:p>
@@ -8063,8 +8069,11 @@
             <a:r>
               <a:rPr lang="en-US" sz="2000" b="1" dirty="0">
                 <a:solidFill>
-                  <a:schemeClr val="bg1"/>
-                </a:solidFill>
+                  <a:schemeClr val="tx1"/>
+                </a:solidFill>
+                <a:highlight>
+                  <a:srgbClr val="C0C0C0"/>
+                </a:highlight>
                 <a:hlinkClick r:id="rId3">
                   <a:extLst>
                     <a:ext uri="{A12FA001-AC4F-418D-AE19-62706E023703}">
@@ -8073,13 +8082,19 @@
                   </a:extLst>
                 </a:hlinkClick>
               </a:rPr>
-              <a:t>https://replit.com/@HylandOutreach/BasicElementsExample</a:t>
+              <a:t>https://glitch.com/edit/#!/remix/basicelementsexample</a:t>
             </a:r>
-            <a:endParaRPr lang="en-US" sz="2000" b="1" dirty="0">
-              <a:solidFill>
-                <a:schemeClr val="bg1"/>
-              </a:solidFill>
-            </a:endParaRPr>
+            <a:r>
+              <a:rPr lang="en-US" sz="2000" b="1" dirty="0">
+                <a:solidFill>
+                  <a:schemeClr val="tx1"/>
+                </a:solidFill>
+                <a:highlight>
+                  <a:srgbClr val="C0C0C0"/>
+                </a:highlight>
+              </a:rPr>
+              <a:t> </a:t>
+            </a:r>
           </a:p>
         </p:txBody>
       </p:sp>

</xml_diff>

<commit_message>
reapply some glitch changes
</commit_message>
<xml_diff>
--- a/Week02/BasicHtmlElements.pptx
+++ b/Week02/BasicHtmlElements.pptx
@@ -902,32 +902,38 @@
           <a:bodyPr/>
           <a:lstStyle/>
           <a:p>
-            <a:pPr marL="0" marR="0" lvl="0" indent="0" algn="l" defTabSz="914400" rtl="0" eaLnBrk="1" fontAlgn="auto" latinLnBrk="0" hangingPunct="1">
-              <a:lnSpc>
-                <a:spcPct val="100000"/>
-              </a:lnSpc>
-              <a:spcBef>
-                <a:spcPts val="0"/>
-              </a:spcBef>
-              <a:spcAft>
-                <a:spcPts val="0"/>
-              </a:spcAft>
-              <a:buClrTx/>
-              <a:buSzTx/>
-              <a:buFontTx/>
-              <a:buNone/>
-              <a:tabLst/>
-              <a:defRPr/>
+            <a:pPr marL="42863" indent="0" algn="ctr">
+              <a:buNone/>
             </a:pPr>
             <a:r>
-              <a:rPr lang="en-US" dirty="0"/>
-              <a:t>https://replit.com/@HylandOutreach</a:t>
+              <a:rPr lang="en-US" sz="1100" b="1" dirty="0">
+                <a:solidFill>
+                  <a:schemeClr val="tx1"/>
+                </a:solidFill>
+                <a:highlight>
+                  <a:srgbClr val="C0C0C0"/>
+                </a:highlight>
+                <a:hlinkClick r:id="rId3">
+                  <a:extLst>
+                    <a:ext uri="{A12FA001-AC4F-418D-AE19-62706E023703}">
+                      <ahyp:hlinkClr xmlns:ahyp="http://schemas.microsoft.com/office/drawing/2018/hyperlinkcolor" val="tx"/>
+                    </a:ext>
+                  </a:extLst>
+                </a:hlinkClick>
+              </a:rPr>
+              <a:t>https://glitch.com/edit/#!/basicelementsexample</a:t>
             </a:r>
             <a:r>
-              <a:rPr lang="en-US"/>
-              <a:t>/BasicElementsExample</a:t>
+              <a:rPr lang="en-US" sz="1100" b="1" dirty="0">
+                <a:solidFill>
+                  <a:schemeClr val="tx1"/>
+                </a:solidFill>
+                <a:highlight>
+                  <a:srgbClr val="C0C0C0"/>
+                </a:highlight>
+              </a:rPr>
+              <a:t> </a:t>
             </a:r>
-            <a:endParaRPr lang="en-US" dirty="0"/>
           </a:p>
         </p:txBody>
       </p:sp>
@@ -4581,7 +4587,7 @@
           <a:p>
             <a:fld id="{5958763E-B898-436D-883D-03711491D54A}" type="datetimeFigureOut">
               <a:rPr lang="en-US" smtClean="0"/>
-              <a:t>2/8/2023</a:t>
+              <a:t>6/26/2024</a:t>
             </a:fld>
             <a:endParaRPr lang="en-US"/>
           </a:p>
@@ -8063,8 +8069,11 @@
             <a:r>
               <a:rPr lang="en-US" sz="2000" b="1" dirty="0">
                 <a:solidFill>
-                  <a:schemeClr val="bg1"/>
-                </a:solidFill>
+                  <a:schemeClr val="tx1"/>
+                </a:solidFill>
+                <a:highlight>
+                  <a:srgbClr val="C0C0C0"/>
+                </a:highlight>
                 <a:hlinkClick r:id="rId3">
                   <a:extLst>
                     <a:ext uri="{A12FA001-AC4F-418D-AE19-62706E023703}">
@@ -8073,13 +8082,19 @@
                   </a:extLst>
                 </a:hlinkClick>
               </a:rPr>
-              <a:t>https://replit.com/@HylandOutreach/BasicElementsExample</a:t>
+              <a:t>https://glitch.com/edit/#!/remix/basicelementsexample</a:t>
             </a:r>
-            <a:endParaRPr lang="en-US" sz="2000" b="1" dirty="0">
-              <a:solidFill>
-                <a:schemeClr val="bg1"/>
-              </a:solidFill>
-            </a:endParaRPr>
+            <a:r>
+              <a:rPr lang="en-US" sz="2000" b="1" dirty="0">
+                <a:solidFill>
+                  <a:schemeClr val="tx1"/>
+                </a:solidFill>
+                <a:highlight>
+                  <a:srgbClr val="C0C0C0"/>
+                </a:highlight>
+              </a:rPr>
+              <a:t> </a:t>
+            </a:r>
           </a:p>
         </p:txBody>
       </p:sp>

</xml_diff>

<commit_message>
Update gitbook 2024-07-03 13:28:00
</commit_message>
<xml_diff>
--- a/Week02/BasicHtmlElements.pptx
+++ b/Week02/BasicHtmlElements.pptx
@@ -902,38 +902,32 @@
           <a:bodyPr/>
           <a:lstStyle/>
           <a:p>
-            <a:pPr marL="42863" indent="0" algn="ctr">
-              <a:buNone/>
+            <a:pPr marL="0" marR="0" lvl="0" indent="0" algn="l" defTabSz="914400" rtl="0" eaLnBrk="1" fontAlgn="auto" latinLnBrk="0" hangingPunct="1">
+              <a:lnSpc>
+                <a:spcPct val="100000"/>
+              </a:lnSpc>
+              <a:spcBef>
+                <a:spcPts val="0"/>
+              </a:spcBef>
+              <a:spcAft>
+                <a:spcPts val="0"/>
+              </a:spcAft>
+              <a:buClrTx/>
+              <a:buSzTx/>
+              <a:buFontTx/>
+              <a:buNone/>
+              <a:tabLst/>
+              <a:defRPr/>
             </a:pPr>
             <a:r>
-              <a:rPr lang="en-US" sz="1100" b="1" dirty="0">
-                <a:solidFill>
-                  <a:schemeClr val="tx1"/>
-                </a:solidFill>
-                <a:highlight>
-                  <a:srgbClr val="C0C0C0"/>
-                </a:highlight>
-                <a:hlinkClick r:id="rId3">
-                  <a:extLst>
-                    <a:ext uri="{A12FA001-AC4F-418D-AE19-62706E023703}">
-                      <ahyp:hlinkClr xmlns:ahyp="http://schemas.microsoft.com/office/drawing/2018/hyperlinkcolor" val="tx"/>
-                    </a:ext>
-                  </a:extLst>
-                </a:hlinkClick>
-              </a:rPr>
-              <a:t>https://glitch.com/edit/#!/basicelementsexample</a:t>
+              <a:rPr lang="en-US" dirty="0"/>
+              <a:t>https://replit.com/@HylandOutreach</a:t>
             </a:r>
             <a:r>
-              <a:rPr lang="en-US" sz="1100" b="1" dirty="0">
-                <a:solidFill>
-                  <a:schemeClr val="tx1"/>
-                </a:solidFill>
-                <a:highlight>
-                  <a:srgbClr val="C0C0C0"/>
-                </a:highlight>
-              </a:rPr>
-              <a:t> </a:t>
+              <a:rPr lang="en-US"/>
+              <a:t>/BasicElementsExample</a:t>
             </a:r>
+            <a:endParaRPr lang="en-US" dirty="0"/>
           </a:p>
         </p:txBody>
       </p:sp>
@@ -4587,7 +4581,7 @@
           <a:p>
             <a:fld id="{5958763E-B898-436D-883D-03711491D54A}" type="datetimeFigureOut">
               <a:rPr lang="en-US" smtClean="0"/>
-              <a:t>6/26/2024</a:t>
+              <a:t>2/8/2023</a:t>
             </a:fld>
             <a:endParaRPr lang="en-US"/>
           </a:p>
@@ -8069,11 +8063,8 @@
             <a:r>
               <a:rPr lang="en-US" sz="2000" b="1" dirty="0">
                 <a:solidFill>
-                  <a:schemeClr val="tx1"/>
-                </a:solidFill>
-                <a:highlight>
-                  <a:srgbClr val="C0C0C0"/>
-                </a:highlight>
+                  <a:schemeClr val="bg1"/>
+                </a:solidFill>
                 <a:hlinkClick r:id="rId3">
                   <a:extLst>
                     <a:ext uri="{A12FA001-AC4F-418D-AE19-62706E023703}">
@@ -8082,19 +8073,13 @@
                   </a:extLst>
                 </a:hlinkClick>
               </a:rPr>
-              <a:t>https://glitch.com/edit/#!/remix/basicelementsexample</a:t>
+              <a:t>https://replit.com/@HylandOutreach/BasicElementsExample</a:t>
             </a:r>
-            <a:r>
-              <a:rPr lang="en-US" sz="2000" b="1" dirty="0">
-                <a:solidFill>
-                  <a:schemeClr val="tx1"/>
-                </a:solidFill>
-                <a:highlight>
-                  <a:srgbClr val="C0C0C0"/>
-                </a:highlight>
-              </a:rPr>
-              <a:t> </a:t>
-            </a:r>
+            <a:endParaRPr lang="en-US" sz="2000" b="1" dirty="0">
+              <a:solidFill>
+                <a:schemeClr val="bg1"/>
+              </a:solidFill>
+            </a:endParaRPr>
           </a:p>
         </p:txBody>
       </p:sp>

</xml_diff>

<commit_message>
Revert "reapply some glitch changes"
This reverts commit a577be4958e749d99782d1e59f86bcd1357cf29e.
</commit_message>
<xml_diff>
--- a/Week02/BasicHtmlElements.pptx
+++ b/Week02/BasicHtmlElements.pptx
@@ -902,38 +902,32 @@
           <a:bodyPr/>
           <a:lstStyle/>
           <a:p>
-            <a:pPr marL="42863" indent="0" algn="ctr">
-              <a:buNone/>
+            <a:pPr marL="0" marR="0" lvl="0" indent="0" algn="l" defTabSz="914400" rtl="0" eaLnBrk="1" fontAlgn="auto" latinLnBrk="0" hangingPunct="1">
+              <a:lnSpc>
+                <a:spcPct val="100000"/>
+              </a:lnSpc>
+              <a:spcBef>
+                <a:spcPts val="0"/>
+              </a:spcBef>
+              <a:spcAft>
+                <a:spcPts val="0"/>
+              </a:spcAft>
+              <a:buClrTx/>
+              <a:buSzTx/>
+              <a:buFontTx/>
+              <a:buNone/>
+              <a:tabLst/>
+              <a:defRPr/>
             </a:pPr>
             <a:r>
-              <a:rPr lang="en-US" sz="1100" b="1" dirty="0">
-                <a:solidFill>
-                  <a:schemeClr val="tx1"/>
-                </a:solidFill>
-                <a:highlight>
-                  <a:srgbClr val="C0C0C0"/>
-                </a:highlight>
-                <a:hlinkClick r:id="rId3">
-                  <a:extLst>
-                    <a:ext uri="{A12FA001-AC4F-418D-AE19-62706E023703}">
-                      <ahyp:hlinkClr xmlns:ahyp="http://schemas.microsoft.com/office/drawing/2018/hyperlinkcolor" val="tx"/>
-                    </a:ext>
-                  </a:extLst>
-                </a:hlinkClick>
-              </a:rPr>
-              <a:t>https://glitch.com/edit/#!/basicelementsexample</a:t>
+              <a:rPr lang="en-US" dirty="0"/>
+              <a:t>https://replit.com/@HylandOutreach</a:t>
             </a:r>
             <a:r>
-              <a:rPr lang="en-US" sz="1100" b="1" dirty="0">
-                <a:solidFill>
-                  <a:schemeClr val="tx1"/>
-                </a:solidFill>
-                <a:highlight>
-                  <a:srgbClr val="C0C0C0"/>
-                </a:highlight>
-              </a:rPr>
-              <a:t> </a:t>
+              <a:rPr lang="en-US"/>
+              <a:t>/BasicElementsExample</a:t>
             </a:r>
+            <a:endParaRPr lang="en-US" dirty="0"/>
           </a:p>
         </p:txBody>
       </p:sp>
@@ -4587,7 +4581,7 @@
           <a:p>
             <a:fld id="{5958763E-B898-436D-883D-03711491D54A}" type="datetimeFigureOut">
               <a:rPr lang="en-US" smtClean="0"/>
-              <a:t>6/26/2024</a:t>
+              <a:t>2/8/2023</a:t>
             </a:fld>
             <a:endParaRPr lang="en-US"/>
           </a:p>
@@ -8069,11 +8063,8 @@
             <a:r>
               <a:rPr lang="en-US" sz="2000" b="1" dirty="0">
                 <a:solidFill>
-                  <a:schemeClr val="tx1"/>
-                </a:solidFill>
-                <a:highlight>
-                  <a:srgbClr val="C0C0C0"/>
-                </a:highlight>
+                  <a:schemeClr val="bg1"/>
+                </a:solidFill>
                 <a:hlinkClick r:id="rId3">
                   <a:extLst>
                     <a:ext uri="{A12FA001-AC4F-418D-AE19-62706E023703}">
@@ -8082,19 +8073,13 @@
                   </a:extLst>
                 </a:hlinkClick>
               </a:rPr>
-              <a:t>https://glitch.com/edit/#!/remix/basicelementsexample</a:t>
+              <a:t>https://replit.com/@HylandOutreach/BasicElementsExample</a:t>
             </a:r>
-            <a:r>
-              <a:rPr lang="en-US" sz="2000" b="1" dirty="0">
-                <a:solidFill>
-                  <a:schemeClr val="tx1"/>
-                </a:solidFill>
-                <a:highlight>
-                  <a:srgbClr val="C0C0C0"/>
-                </a:highlight>
-              </a:rPr>
-              <a:t> </a:t>
-            </a:r>
+            <a:endParaRPr lang="en-US" sz="2000" b="1" dirty="0">
+              <a:solidFill>
+                <a:schemeClr val="bg1"/>
+              </a:solidFill>
+            </a:endParaRPr>
           </a:p>
         </p:txBody>
       </p:sp>

</xml_diff>

<commit_message>
Added details to PPTs
</commit_message>
<xml_diff>
--- a/Week02/BasicHtmlElements.pptx
+++ b/Week02/BasicHtmlElements.pptx
@@ -5,35 +5,39 @@
     <p:sldMasterId id="2147483676" r:id="rId1"/>
   </p:sldMasterIdLst>
   <p:notesMasterIdLst>
-    <p:notesMasterId r:id="rId9"/>
+    <p:notesMasterId r:id="rId13"/>
   </p:notesMasterIdLst>
   <p:sldIdLst>
     <p:sldId id="256" r:id="rId2"/>
     <p:sldId id="319" r:id="rId3"/>
-    <p:sldId id="320" r:id="rId4"/>
-    <p:sldId id="305" r:id="rId5"/>
-    <p:sldId id="321" r:id="rId6"/>
-    <p:sldId id="322" r:id="rId7"/>
-    <p:sldId id="279" r:id="rId8"/>
+    <p:sldId id="323" r:id="rId4"/>
+    <p:sldId id="320" r:id="rId5"/>
+    <p:sldId id="324" r:id="rId6"/>
+    <p:sldId id="305" r:id="rId7"/>
+    <p:sldId id="325" r:id="rId8"/>
+    <p:sldId id="321" r:id="rId9"/>
+    <p:sldId id="326" r:id="rId10"/>
+    <p:sldId id="322" r:id="rId11"/>
+    <p:sldId id="279" r:id="rId12"/>
   </p:sldIdLst>
   <p:sldSz cx="9144000" cy="5143500" type="screen16x9"/>
   <p:notesSz cx="6858000" cy="9144000"/>
   <p:embeddedFontLst>
     <p:embeddedFont>
       <p:font typeface="Consolas" panose="020B0609020204030204" pitchFamily="49" charset="0"/>
-      <p:regular r:id="rId10"/>
-      <p:bold r:id="rId11"/>
-      <p:italic r:id="rId12"/>
-      <p:boldItalic r:id="rId13"/>
+      <p:regular r:id="rId14"/>
+      <p:bold r:id="rId15"/>
+      <p:italic r:id="rId16"/>
+      <p:boldItalic r:id="rId17"/>
     </p:embeddedFont>
     <p:embeddedFont>
       <p:font typeface="Krona One" panose="020B0604020202020204" charset="0"/>
-      <p:regular r:id="rId14"/>
+      <p:regular r:id="rId18"/>
     </p:embeddedFont>
     <p:embeddedFont>
       <p:font typeface="Miriam Libre" panose="00000500000000000000" pitchFamily="2" charset="-79"/>
-      <p:regular r:id="rId15"/>
-      <p:bold r:id="rId16"/>
+      <p:regular r:id="rId19"/>
+      <p:bold r:id="rId20"/>
     </p:embeddedFont>
   </p:embeddedFontLst>
   <p:defaultTextStyle>
@@ -948,7 +952,7 @@
           <a:p>
             <a:fld id="{DEC8F7F9-57EC-49CF-9FCD-2B781E4B449F}" type="slidenum">
               <a:rPr lang="en-US" smtClean="0"/>
-              <a:t>6</a:t>
+              <a:t>10</a:t>
             </a:fld>
             <a:endParaRPr lang="en-US"/>
           </a:p>
@@ -4581,7 +4585,7 @@
           <a:p>
             <a:fld id="{5958763E-B898-436D-883D-03711491D54A}" type="datetimeFigureOut">
               <a:rPr lang="en-US" smtClean="0"/>
-              <a:t>2/8/2023</a:t>
+              <a:t>7/3/2024</a:t>
             </a:fld>
             <a:endParaRPr lang="en-US"/>
           </a:p>
@@ -6302,6 +6306,562 @@
               <a:buNone/>
             </a:pPr>
             <a:endParaRPr/>
+          </a:p>
+        </p:txBody>
+      </p:sp>
+    </p:spTree>
+  </p:cSld>
+  <p:clrMapOvr>
+    <a:masterClrMapping/>
+  </p:clrMapOvr>
+</p:sld>
+</file>
+
+<file path=ppt/slides/slide10.xml><?xml version="1.0" encoding="utf-8"?>
+<p:sld xmlns:a="http://schemas.openxmlformats.org/drawingml/2006/main" xmlns:r="http://schemas.openxmlformats.org/officeDocument/2006/relationships" xmlns:p="http://schemas.openxmlformats.org/presentationml/2006/main">
+  <p:cSld>
+    <p:spTree>
+      <p:nvGrpSpPr>
+        <p:cNvPr id="1" name=""/>
+        <p:cNvGrpSpPr/>
+        <p:nvPr/>
+      </p:nvGrpSpPr>
+      <p:grpSpPr>
+        <a:xfrm>
+          <a:off x="0" y="0"/>
+          <a:ext cx="0" cy="0"/>
+          <a:chOff x="0" y="0"/>
+          <a:chExt cx="0" cy="0"/>
+        </a:xfrm>
+      </p:grpSpPr>
+      <p:sp>
+        <p:nvSpPr>
+          <p:cNvPr id="2" name="Title 1"/>
+          <p:cNvSpPr>
+            <a:spLocks noGrp="1"/>
+          </p:cNvSpPr>
+          <p:nvPr>
+            <p:ph type="title"/>
+          </p:nvPr>
+        </p:nvSpPr>
+        <p:spPr/>
+        <p:txBody>
+          <a:bodyPr anchor="ctr"/>
+          <a:lstStyle/>
+          <a:p>
+            <a:r>
+              <a:rPr lang="en-US" dirty="0">
+                <a:solidFill>
+                  <a:schemeClr val="tx1"/>
+                </a:solidFill>
+              </a:rPr>
+              <a:t>Example</a:t>
+            </a:r>
+          </a:p>
+        </p:txBody>
+      </p:sp>
+      <p:sp>
+        <p:nvSpPr>
+          <p:cNvPr id="3" name="Content Placeholder 2"/>
+          <p:cNvSpPr>
+            <a:spLocks noGrp="1"/>
+          </p:cNvSpPr>
+          <p:nvPr>
+            <p:ph idx="1"/>
+          </p:nvPr>
+        </p:nvSpPr>
+        <p:spPr>
+          <a:xfrm>
+            <a:off x="0" y="1152475"/>
+            <a:ext cx="9144000" cy="3416400"/>
+          </a:xfrm>
+        </p:spPr>
+        <p:txBody>
+          <a:bodyPr anchor="ctr">
+            <a:noAutofit/>
+          </a:bodyPr>
+          <a:lstStyle/>
+          <a:p>
+            <a:pPr marL="42863" indent="0" algn="ctr">
+              <a:buNone/>
+            </a:pPr>
+            <a:r>
+              <a:rPr lang="en-US" sz="2000" b="1" dirty="0">
+                <a:solidFill>
+                  <a:schemeClr val="bg1"/>
+                </a:solidFill>
+                <a:hlinkClick r:id="rId3">
+                  <a:extLst>
+                    <a:ext uri="{A12FA001-AC4F-418D-AE19-62706E023703}">
+                      <ahyp:hlinkClr xmlns:ahyp="http://schemas.microsoft.com/office/drawing/2018/hyperlinkcolor" val="tx"/>
+                    </a:ext>
+                  </a:extLst>
+                </a:hlinkClick>
+              </a:rPr>
+              <a:t>https://replit.com/@HylandOutreach/BasicElementsExample</a:t>
+            </a:r>
+            <a:endParaRPr lang="en-US" sz="2000" b="1" dirty="0">
+              <a:solidFill>
+                <a:schemeClr val="bg1"/>
+              </a:solidFill>
+            </a:endParaRPr>
+          </a:p>
+        </p:txBody>
+      </p:sp>
+    </p:spTree>
+    <p:extLst>
+      <p:ext uri="{BB962C8B-B14F-4D97-AF65-F5344CB8AC3E}">
+        <p14:creationId xmlns:p14="http://schemas.microsoft.com/office/powerpoint/2010/main" val="153810681"/>
+      </p:ext>
+    </p:extLst>
+  </p:cSld>
+  <p:clrMapOvr>
+    <a:masterClrMapping/>
+  </p:clrMapOvr>
+  <p:transition>
+    <p:fade/>
+  </p:transition>
+</p:sld>
+</file>
+
+<file path=ppt/slides/slide11.xml><?xml version="1.0" encoding="utf-8"?>
+<p:sld xmlns:a="http://schemas.openxmlformats.org/drawingml/2006/main" xmlns:r="http://schemas.openxmlformats.org/officeDocument/2006/relationships" xmlns:p="http://schemas.openxmlformats.org/presentationml/2006/main">
+  <p:cSld>
+    <p:spTree>
+      <p:nvGrpSpPr>
+        <p:cNvPr id="1" name="Shape 1502"/>
+        <p:cNvGrpSpPr/>
+        <p:nvPr/>
+      </p:nvGrpSpPr>
+      <p:grpSpPr>
+        <a:xfrm>
+          <a:off x="0" y="0"/>
+          <a:ext cx="0" cy="0"/>
+          <a:chOff x="0" y="0"/>
+          <a:chExt cx="0" cy="0"/>
+        </a:xfrm>
+      </p:grpSpPr>
+      <p:sp>
+        <p:nvSpPr>
+          <p:cNvPr id="1503" name="Google Shape;1503;p54"/>
+          <p:cNvSpPr txBox="1">
+            <a:spLocks noGrp="1"/>
+          </p:cNvSpPr>
+          <p:nvPr>
+            <p:ph type="subTitle" idx="1"/>
+          </p:nvPr>
+        </p:nvSpPr>
+        <p:spPr>
+          <a:xfrm>
+            <a:off x="720000" y="1824225"/>
+            <a:ext cx="5650200" cy="378300"/>
+          </a:xfrm>
+          <a:prstGeom prst="rect">
+            <a:avLst/>
+          </a:prstGeom>
+        </p:spPr>
+        <p:txBody>
+          <a:bodyPr spcFirstLastPara="1" wrap="square" lIns="91425" tIns="91425" rIns="91425" bIns="91425" anchor="t" anchorCtr="0">
+            <a:noAutofit/>
+          </a:bodyPr>
+          <a:lstStyle/>
+          <a:p>
+            <a:pPr marL="0" lvl="0" indent="0" algn="l" rtl="0">
+              <a:spcBef>
+                <a:spcPts val="0"/>
+              </a:spcBef>
+              <a:spcAft>
+                <a:spcPts val="0"/>
+              </a:spcAft>
+              <a:buNone/>
+            </a:pPr>
+            <a:r>
+              <a:rPr lang="en" dirty="0"/>
+              <a:t>DO YOU HAVE ANY QUESTIONS?</a:t>
+            </a:r>
+            <a:endParaRPr dirty="0"/>
+          </a:p>
+        </p:txBody>
+      </p:sp>
+      <p:sp>
+        <p:nvSpPr>
+          <p:cNvPr id="1504" name="Google Shape;1504;p54"/>
+          <p:cNvSpPr txBox="1">
+            <a:spLocks noGrp="1"/>
+          </p:cNvSpPr>
+          <p:nvPr>
+            <p:ph type="ctrTitle"/>
+          </p:nvPr>
+        </p:nvSpPr>
+        <p:spPr>
+          <a:xfrm>
+            <a:off x="720000" y="1049325"/>
+            <a:ext cx="5650200" cy="774900"/>
+          </a:xfrm>
+          <a:prstGeom prst="rect">
+            <a:avLst/>
+          </a:prstGeom>
+        </p:spPr>
+        <p:txBody>
+          <a:bodyPr spcFirstLastPara="1" wrap="square" lIns="91425" tIns="91425" rIns="91425" bIns="91425" anchor="t" anchorCtr="0">
+            <a:noAutofit/>
+          </a:bodyPr>
+          <a:lstStyle/>
+          <a:p>
+            <a:pPr marL="0" lvl="0" indent="0" algn="l" rtl="0">
+              <a:spcBef>
+                <a:spcPts val="0"/>
+              </a:spcBef>
+              <a:spcAft>
+                <a:spcPts val="0"/>
+              </a:spcAft>
+              <a:buNone/>
+            </a:pPr>
+            <a:r>
+              <a:rPr lang="en"/>
+              <a:t>THANKS!</a:t>
+            </a:r>
+            <a:endParaRPr/>
+          </a:p>
+        </p:txBody>
+      </p:sp>
+      <p:sp>
+        <p:nvSpPr>
+          <p:cNvPr id="1542" name="Google Shape;1542;p54"/>
+          <p:cNvSpPr/>
+          <p:nvPr/>
+        </p:nvSpPr>
+        <p:spPr>
+          <a:xfrm>
+            <a:off x="570050" y="3746300"/>
+            <a:ext cx="939600" cy="939600"/>
+          </a:xfrm>
+          <a:prstGeom prst="snip1Rect">
+            <a:avLst>
+              <a:gd name="adj" fmla="val 11329"/>
+            </a:avLst>
+          </a:prstGeom>
+          <a:solidFill>
+            <a:schemeClr val="lt1"/>
+          </a:solidFill>
+          <a:ln w="28575" cap="flat" cmpd="sng">
+            <a:solidFill>
+              <a:schemeClr val="dk1"/>
+            </a:solidFill>
+            <a:prstDash val="solid"/>
+            <a:round/>
+            <a:headEnd type="none" w="sm" len="sm"/>
+            <a:tailEnd type="none" w="sm" len="sm"/>
+          </a:ln>
+        </p:spPr>
+        <p:txBody>
+          <a:bodyPr spcFirstLastPara="1" wrap="square" lIns="91425" tIns="91425" rIns="91425" bIns="91425" anchor="ctr" anchorCtr="0">
+            <a:noAutofit/>
+          </a:bodyPr>
+          <a:lstStyle/>
+          <a:p>
+            <a:pPr marL="0" lvl="0" indent="0" algn="l" rtl="0">
+              <a:spcBef>
+                <a:spcPts val="0"/>
+              </a:spcBef>
+              <a:spcAft>
+                <a:spcPts val="0"/>
+              </a:spcAft>
+              <a:buNone/>
+            </a:pPr>
+            <a:endParaRPr/>
+          </a:p>
+        </p:txBody>
+      </p:sp>
+      <p:sp>
+        <p:nvSpPr>
+          <p:cNvPr id="1543" name="Google Shape;1543;p54"/>
+          <p:cNvSpPr/>
+          <p:nvPr/>
+        </p:nvSpPr>
+        <p:spPr>
+          <a:xfrm>
+            <a:off x="490150" y="3665400"/>
+            <a:ext cx="939600" cy="939600"/>
+          </a:xfrm>
+          <a:prstGeom prst="snip1Rect">
+            <a:avLst>
+              <a:gd name="adj" fmla="val 11329"/>
+            </a:avLst>
+          </a:prstGeom>
+          <a:solidFill>
+            <a:schemeClr val="accent1"/>
+          </a:solidFill>
+          <a:ln w="28575" cap="flat" cmpd="sng">
+            <a:solidFill>
+              <a:schemeClr val="dk1"/>
+            </a:solidFill>
+            <a:prstDash val="solid"/>
+            <a:round/>
+            <a:headEnd type="none" w="sm" len="sm"/>
+            <a:tailEnd type="none" w="sm" len="sm"/>
+          </a:ln>
+        </p:spPr>
+        <p:txBody>
+          <a:bodyPr spcFirstLastPara="1" wrap="square" lIns="91425" tIns="91425" rIns="91425" bIns="91425" anchor="ctr" anchorCtr="0">
+            <a:noAutofit/>
+          </a:bodyPr>
+          <a:lstStyle/>
+          <a:p>
+            <a:pPr marL="0" lvl="0" indent="0" algn="l" rtl="0">
+              <a:spcBef>
+                <a:spcPts val="0"/>
+              </a:spcBef>
+              <a:spcAft>
+                <a:spcPts val="0"/>
+              </a:spcAft>
+              <a:buNone/>
+            </a:pPr>
+            <a:endParaRPr/>
+          </a:p>
+        </p:txBody>
+      </p:sp>
+      <p:sp>
+        <p:nvSpPr>
+          <p:cNvPr id="1544" name="Google Shape;1544;p54"/>
+          <p:cNvSpPr/>
+          <p:nvPr/>
+        </p:nvSpPr>
+        <p:spPr>
+          <a:xfrm>
+            <a:off x="1708675" y="3746300"/>
+            <a:ext cx="939600" cy="939600"/>
+          </a:xfrm>
+          <a:prstGeom prst="snip1Rect">
+            <a:avLst>
+              <a:gd name="adj" fmla="val 11329"/>
+            </a:avLst>
+          </a:prstGeom>
+          <a:solidFill>
+            <a:schemeClr val="lt1"/>
+          </a:solidFill>
+          <a:ln w="28575" cap="flat" cmpd="sng">
+            <a:solidFill>
+              <a:schemeClr val="dk1"/>
+            </a:solidFill>
+            <a:prstDash val="solid"/>
+            <a:round/>
+            <a:headEnd type="none" w="sm" len="sm"/>
+            <a:tailEnd type="none" w="sm" len="sm"/>
+          </a:ln>
+        </p:spPr>
+        <p:txBody>
+          <a:bodyPr spcFirstLastPara="1" wrap="square" lIns="91425" tIns="91425" rIns="91425" bIns="91425" anchor="ctr" anchorCtr="0">
+            <a:noAutofit/>
+          </a:bodyPr>
+          <a:lstStyle/>
+          <a:p>
+            <a:pPr marL="0" lvl="0" indent="0" algn="l" rtl="0">
+              <a:spcBef>
+                <a:spcPts val="0"/>
+              </a:spcBef>
+              <a:spcAft>
+                <a:spcPts val="0"/>
+              </a:spcAft>
+              <a:buNone/>
+            </a:pPr>
+            <a:endParaRPr/>
+          </a:p>
+        </p:txBody>
+      </p:sp>
+      <p:sp>
+        <p:nvSpPr>
+          <p:cNvPr id="1545" name="Google Shape;1545;p54"/>
+          <p:cNvSpPr/>
+          <p:nvPr/>
+        </p:nvSpPr>
+        <p:spPr>
+          <a:xfrm>
+            <a:off x="1628775" y="3665400"/>
+            <a:ext cx="939600" cy="939600"/>
+          </a:xfrm>
+          <a:prstGeom prst="snip1Rect">
+            <a:avLst>
+              <a:gd name="adj" fmla="val 11329"/>
+            </a:avLst>
+          </a:prstGeom>
+          <a:solidFill>
+            <a:schemeClr val="accent2"/>
+          </a:solidFill>
+          <a:ln w="28575" cap="flat" cmpd="sng">
+            <a:solidFill>
+              <a:schemeClr val="dk1"/>
+            </a:solidFill>
+            <a:prstDash val="solid"/>
+            <a:round/>
+            <a:headEnd type="none" w="sm" len="sm"/>
+            <a:tailEnd type="none" w="sm" len="sm"/>
+          </a:ln>
+        </p:spPr>
+        <p:txBody>
+          <a:bodyPr spcFirstLastPara="1" wrap="square" lIns="91425" tIns="91425" rIns="91425" bIns="91425" anchor="ctr" anchorCtr="0">
+            <a:noAutofit/>
+          </a:bodyPr>
+          <a:lstStyle/>
+          <a:p>
+            <a:pPr marL="0" lvl="0" indent="0" algn="l" rtl="0">
+              <a:spcBef>
+                <a:spcPts val="0"/>
+              </a:spcBef>
+              <a:spcAft>
+                <a:spcPts val="0"/>
+              </a:spcAft>
+              <a:buNone/>
+            </a:pPr>
+            <a:endParaRPr/>
+          </a:p>
+        </p:txBody>
+      </p:sp>
+      <p:sp>
+        <p:nvSpPr>
+          <p:cNvPr id="1546" name="Google Shape;1546;p54"/>
+          <p:cNvSpPr/>
+          <p:nvPr/>
+        </p:nvSpPr>
+        <p:spPr>
+          <a:xfrm>
+            <a:off x="2847300" y="3746300"/>
+            <a:ext cx="939600" cy="939600"/>
+          </a:xfrm>
+          <a:prstGeom prst="snip1Rect">
+            <a:avLst>
+              <a:gd name="adj" fmla="val 11329"/>
+            </a:avLst>
+          </a:prstGeom>
+          <a:solidFill>
+            <a:schemeClr val="lt1"/>
+          </a:solidFill>
+          <a:ln w="28575" cap="flat" cmpd="sng">
+            <a:solidFill>
+              <a:schemeClr val="dk1"/>
+            </a:solidFill>
+            <a:prstDash val="solid"/>
+            <a:round/>
+            <a:headEnd type="none" w="sm" len="sm"/>
+            <a:tailEnd type="none" w="sm" len="sm"/>
+          </a:ln>
+        </p:spPr>
+        <p:txBody>
+          <a:bodyPr spcFirstLastPara="1" wrap="square" lIns="91425" tIns="91425" rIns="91425" bIns="91425" anchor="ctr" anchorCtr="0">
+            <a:noAutofit/>
+          </a:bodyPr>
+          <a:lstStyle/>
+          <a:p>
+            <a:pPr marL="0" lvl="0" indent="0" algn="l" rtl="0">
+              <a:spcBef>
+                <a:spcPts val="0"/>
+              </a:spcBef>
+              <a:spcAft>
+                <a:spcPts val="0"/>
+              </a:spcAft>
+              <a:buNone/>
+            </a:pPr>
+            <a:endParaRPr/>
+          </a:p>
+        </p:txBody>
+      </p:sp>
+      <p:sp>
+        <p:nvSpPr>
+          <p:cNvPr id="1547" name="Google Shape;1547;p54"/>
+          <p:cNvSpPr/>
+          <p:nvPr/>
+        </p:nvSpPr>
+        <p:spPr>
+          <a:xfrm>
+            <a:off x="2767400" y="3665400"/>
+            <a:ext cx="939600" cy="939600"/>
+          </a:xfrm>
+          <a:prstGeom prst="snip1Rect">
+            <a:avLst>
+              <a:gd name="adj" fmla="val 11329"/>
+            </a:avLst>
+          </a:prstGeom>
+          <a:solidFill>
+            <a:schemeClr val="lt2"/>
+          </a:solidFill>
+          <a:ln w="28575" cap="flat" cmpd="sng">
+            <a:solidFill>
+              <a:schemeClr val="dk1"/>
+            </a:solidFill>
+            <a:prstDash val="solid"/>
+            <a:round/>
+            <a:headEnd type="none" w="sm" len="sm"/>
+            <a:tailEnd type="none" w="sm" len="sm"/>
+          </a:ln>
+        </p:spPr>
+        <p:txBody>
+          <a:bodyPr spcFirstLastPara="1" wrap="square" lIns="91425" tIns="91425" rIns="91425" bIns="91425" anchor="ctr" anchorCtr="0">
+            <a:noAutofit/>
+          </a:bodyPr>
+          <a:lstStyle/>
+          <a:p>
+            <a:pPr marL="0" lvl="0" indent="0" algn="l" rtl="0">
+              <a:spcBef>
+                <a:spcPts val="0"/>
+              </a:spcBef>
+              <a:spcAft>
+                <a:spcPts val="0"/>
+              </a:spcAft>
+              <a:buNone/>
+            </a:pPr>
+            <a:endParaRPr/>
+          </a:p>
+        </p:txBody>
+      </p:sp>
+      <p:sp>
+        <p:nvSpPr>
+          <p:cNvPr id="4" name="Rectangle 3">
+            <a:extLst>
+              <a:ext uri="{FF2B5EF4-FFF2-40B4-BE49-F238E27FC236}">
+                <a16:creationId xmlns:a16="http://schemas.microsoft.com/office/drawing/2014/main" id="{9694C185-2733-82A6-CD26-B6BB946D14B6}"/>
+              </a:ext>
+            </a:extLst>
+          </p:cNvPr>
+          <p:cNvSpPr/>
+          <p:nvPr/>
+        </p:nvSpPr>
+        <p:spPr>
+          <a:xfrm>
+            <a:off x="4211782" y="3837709"/>
+            <a:ext cx="4253345" cy="477982"/>
+          </a:xfrm>
+          <a:prstGeom prst="rect">
+            <a:avLst/>
+          </a:prstGeom>
+          <a:solidFill>
+            <a:schemeClr val="bg1"/>
+          </a:solidFill>
+          <a:ln>
+            <a:noFill/>
+          </a:ln>
+        </p:spPr>
+        <p:style>
+          <a:lnRef idx="2">
+            <a:schemeClr val="accent1">
+              <a:shade val="50000"/>
+            </a:schemeClr>
+          </a:lnRef>
+          <a:fillRef idx="1">
+            <a:schemeClr val="accent1"/>
+          </a:fillRef>
+          <a:effectRef idx="0">
+            <a:schemeClr val="accent1"/>
+          </a:effectRef>
+          <a:fontRef idx="minor">
+            <a:schemeClr val="lt1"/>
+          </a:fontRef>
+        </p:style>
+        <p:txBody>
+          <a:bodyPr rtlCol="0" anchor="ctr"/>
+          <a:lstStyle/>
+          <a:p>
+            <a:pPr algn="ctr"/>
+            <a:endParaRPr lang="en-US"/>
           </a:p>
         </p:txBody>
       </p:sp>
@@ -6801,7 +7361,7 @@
           <p:cNvPr id="5" name="Rectangle 4">
             <a:extLst>
               <a:ext uri="{FF2B5EF4-FFF2-40B4-BE49-F238E27FC236}">
-                <a16:creationId xmlns:a16="http://schemas.microsoft.com/office/drawing/2014/main" id="{2CE3FFA3-15BD-3901-E2F8-25B2099C9B53}"/>
+                <a16:creationId xmlns:a16="http://schemas.microsoft.com/office/drawing/2014/main" id="{557E17FD-13CD-DF44-26D9-56818BDD0162}"/>
               </a:ext>
             </a:extLst>
           </p:cNvPr>
@@ -6871,211 +7431,45 @@
                   <a:schemeClr val="tx1"/>
                 </a:solidFill>
               </a:rPr>
-              <a:t>The Paragraph Element</a:t>
+              <a:t>Header Elements</a:t>
             </a:r>
           </a:p>
         </p:txBody>
       </p:sp>
-      <p:sp>
-        <p:nvSpPr>
-          <p:cNvPr id="3" name="Content Placeholder 2"/>
-          <p:cNvSpPr>
-            <a:spLocks noGrp="1"/>
-          </p:cNvSpPr>
-          <p:nvPr>
-            <p:ph idx="1"/>
-          </p:nvPr>
-        </p:nvSpPr>
-        <p:spPr>
-          <a:xfrm>
-            <a:off x="719999" y="1136072"/>
-            <a:ext cx="7704000" cy="1269757"/>
-          </a:xfrm>
-        </p:spPr>
-        <p:txBody>
-          <a:bodyPr/>
-          <a:lstStyle/>
-          <a:p>
-            <a:pPr>
-              <a:buClr>
-                <a:schemeClr val="bg1"/>
-              </a:buClr>
-            </a:pPr>
-            <a:r>
-              <a:rPr lang="en-US" sz="2000" dirty="0">
-                <a:solidFill>
-                  <a:schemeClr val="bg1"/>
-                </a:solidFill>
-              </a:rPr>
-              <a:t>Displays common text on the page</a:t>
-            </a:r>
-          </a:p>
-          <a:p>
-            <a:pPr lvl="1">
-              <a:buClr>
-                <a:schemeClr val="bg1"/>
-              </a:buClr>
-            </a:pPr>
-            <a:r>
-              <a:rPr lang="en-US" sz="2000" dirty="0">
-                <a:solidFill>
-                  <a:schemeClr val="bg1"/>
-                </a:solidFill>
-              </a:rPr>
-              <a:t>The content does not have to be multiple sentences</a:t>
-            </a:r>
-          </a:p>
-          <a:p>
-            <a:pPr>
-              <a:buClr>
-                <a:schemeClr val="bg1"/>
-              </a:buClr>
-            </a:pPr>
-            <a:r>
-              <a:rPr lang="en-US" sz="2000" dirty="0">
-                <a:solidFill>
-                  <a:schemeClr val="bg1"/>
-                </a:solidFill>
-              </a:rPr>
-              <a:t>Each </a:t>
-            </a:r>
-            <a:r>
-              <a:rPr lang="en-US" sz="2000" b="1" dirty="0">
-                <a:solidFill>
-                  <a:schemeClr val="accent1">
-                    <a:lumMod val="60000"/>
-                    <a:lumOff val="40000"/>
-                  </a:schemeClr>
-                </a:solidFill>
-                <a:latin typeface="Consolas" panose="020B0609020204030204" pitchFamily="49" charset="0"/>
-              </a:rPr>
-              <a:t>&lt;p&gt;&lt;/p&gt;</a:t>
-            </a:r>
-            <a:r>
-              <a:rPr lang="en-US" sz="2000" dirty="0">
-                <a:solidFill>
-                  <a:schemeClr val="bg1"/>
-                </a:solidFill>
-              </a:rPr>
-              <a:t> creates a new line under it</a:t>
-            </a:r>
-            <a:endParaRPr lang="en-US" sz="2000" b="1" dirty="0">
-              <a:solidFill>
-                <a:schemeClr val="accent1">
-                  <a:lumMod val="60000"/>
-                  <a:lumOff val="40000"/>
-                </a:schemeClr>
-              </a:solidFill>
-              <a:latin typeface="Consolas" panose="020B0609020204030204" pitchFamily="49" charset="0"/>
-            </a:endParaRPr>
-          </a:p>
-        </p:txBody>
-      </p:sp>
-      <p:sp>
-        <p:nvSpPr>
-          <p:cNvPr id="4" name="TextBox 3"/>
-          <p:cNvSpPr txBox="1"/>
+      <p:pic>
+        <p:nvPicPr>
+          <p:cNvPr id="9" name="Picture 8">
+            <a:extLst>
+              <a:ext uri="{FF2B5EF4-FFF2-40B4-BE49-F238E27FC236}">
+                <a16:creationId xmlns:a16="http://schemas.microsoft.com/office/drawing/2014/main" id="{D8504C91-F92E-0E55-B0E8-347207752FBC}"/>
+              </a:ext>
+            </a:extLst>
+          </p:cNvPr>
+          <p:cNvPicPr>
+            <a:picLocks noChangeAspect="1"/>
+          </p:cNvPicPr>
           <p:nvPr/>
-        </p:nvSpPr>
-        <p:spPr>
-          <a:xfrm>
-            <a:off x="634383" y="2975264"/>
-            <a:ext cx="7875233" cy="775597"/>
+        </p:nvPicPr>
+        <p:blipFill>
+          <a:blip r:embed="rId2"/>
+          <a:stretch>
+            <a:fillRect/>
+          </a:stretch>
+        </p:blipFill>
+        <p:spPr>
+          <a:xfrm>
+            <a:off x="502840" y="1436603"/>
+            <a:ext cx="8138319" cy="2270293"/>
           </a:xfrm>
           <a:prstGeom prst="rect">
             <a:avLst/>
           </a:prstGeom>
-          <a:noFill/>
-        </p:spPr>
-        <p:txBody>
-          <a:bodyPr wrap="none" lIns="137160" tIns="109728" rIns="137160" bIns="109728" rtlCol="0">
-            <a:spAutoFit/>
-          </a:bodyPr>
-          <a:lstStyle/>
-          <a:p>
-            <a:r>
-              <a:rPr lang="en-US" sz="3600" b="1" dirty="0">
-                <a:solidFill>
-                  <a:srgbClr val="808080"/>
-                </a:solidFill>
-                <a:latin typeface="Consolas" panose="020B0609020204030204" pitchFamily="49" charset="0"/>
-              </a:rPr>
-              <a:t>&lt;</a:t>
-            </a:r>
-            <a:r>
-              <a:rPr lang="en-US" sz="3600" b="1" dirty="0">
-                <a:solidFill>
-                  <a:srgbClr val="569CD6"/>
-                </a:solidFill>
-                <a:latin typeface="Consolas" panose="020B0609020204030204" pitchFamily="49" charset="0"/>
-              </a:rPr>
-              <a:t>p</a:t>
-            </a:r>
-            <a:r>
-              <a:rPr lang="en-US" sz="3600" b="1" dirty="0">
-                <a:solidFill>
-                  <a:srgbClr val="808080"/>
-                </a:solidFill>
-                <a:latin typeface="Consolas" panose="020B0609020204030204" pitchFamily="49" charset="0"/>
-              </a:rPr>
-              <a:t>&gt;</a:t>
-            </a:r>
-            <a:r>
-              <a:rPr lang="en-US" sz="3600" b="1" dirty="0">
-                <a:solidFill>
-                  <a:schemeClr val="bg1"/>
-                </a:solidFill>
-                <a:latin typeface="Consolas" panose="020B0609020204030204" pitchFamily="49" charset="0"/>
-              </a:rPr>
-              <a:t>This will appear normal</a:t>
-            </a:r>
-            <a:r>
-              <a:rPr lang="en-US" sz="3600" b="1" dirty="0">
-                <a:solidFill>
-                  <a:srgbClr val="808080"/>
-                </a:solidFill>
-                <a:latin typeface="Consolas" panose="020B0609020204030204" pitchFamily="49" charset="0"/>
-              </a:rPr>
-              <a:t>&lt;/</a:t>
-            </a:r>
-            <a:r>
-              <a:rPr lang="en-US" sz="3600" b="1" dirty="0">
-                <a:solidFill>
-                  <a:srgbClr val="569CD6"/>
-                </a:solidFill>
-                <a:latin typeface="Consolas" panose="020B0609020204030204" pitchFamily="49" charset="0"/>
-              </a:rPr>
-              <a:t>p</a:t>
-            </a:r>
-            <a:r>
-              <a:rPr lang="en-US" sz="3600" b="1" dirty="0">
-                <a:solidFill>
-                  <a:srgbClr val="808080"/>
-                </a:solidFill>
-                <a:latin typeface="Consolas" panose="020B0609020204030204" pitchFamily="49" charset="0"/>
-              </a:rPr>
-              <a:t>&gt;</a:t>
-            </a:r>
-            <a:endParaRPr lang="en-US" sz="2000" b="1" dirty="0">
-              <a:gradFill>
-                <a:gsLst>
-                  <a:gs pos="2917">
-                    <a:schemeClr val="tx1"/>
-                  </a:gs>
-                  <a:gs pos="30000">
-                    <a:schemeClr val="tx1"/>
-                  </a:gs>
-                </a:gsLst>
-                <a:lin ang="5400000" scaled="0"/>
-              </a:gradFill>
-            </a:endParaRPr>
-          </a:p>
-        </p:txBody>
-      </p:sp>
+        </p:spPr>
+      </p:pic>
     </p:spTree>
     <p:extLst>
       <p:ext uri="{BB962C8B-B14F-4D97-AF65-F5344CB8AC3E}">
-        <p14:creationId xmlns:p14="http://schemas.microsoft.com/office/powerpoint/2010/main" val="3519910749"/>
+        <p14:creationId xmlns:p14="http://schemas.microsoft.com/office/powerpoint/2010/main" val="1182814773"/>
       </p:ext>
     </p:extLst>
   </p:cSld>
@@ -7085,92 +7479,6 @@
   <p:transition>
     <p:fade/>
   </p:transition>
-  <p:timing>
-    <p:tnLst>
-      <p:par>
-        <p:cTn id="1" dur="indefinite" restart="never" nodeType="tmRoot">
-          <p:childTnLst>
-            <p:seq concurrent="1" nextAc="seek">
-              <p:cTn id="2" dur="indefinite" nodeType="mainSeq">
-                <p:childTnLst>
-                  <p:par>
-                    <p:cTn id="3" fill="hold">
-                      <p:stCondLst>
-                        <p:cond delay="indefinite"/>
-                      </p:stCondLst>
-                      <p:childTnLst>
-                        <p:par>
-                          <p:cTn id="4" fill="hold">
-                            <p:stCondLst>
-                              <p:cond delay="0"/>
-                            </p:stCondLst>
-                            <p:childTnLst>
-                              <p:par>
-                                <p:cTn id="5" presetID="10" presetClass="entr" presetSubtype="0" fill="hold" grpId="0" nodeType="clickEffect">
-                                  <p:stCondLst>
-                                    <p:cond delay="0"/>
-                                  </p:stCondLst>
-                                  <p:childTnLst>
-                                    <p:set>
-                                      <p:cBhvr>
-                                        <p:cTn id="6" dur="1" fill="hold">
-                                          <p:stCondLst>
-                                            <p:cond delay="0"/>
-                                          </p:stCondLst>
-                                        </p:cTn>
-                                        <p:tgtEl>
-                                          <p:spTgt spid="4"/>
-                                        </p:tgtEl>
-                                        <p:attrNameLst>
-                                          <p:attrName>style.visibility</p:attrName>
-                                        </p:attrNameLst>
-                                      </p:cBhvr>
-                                      <p:to>
-                                        <p:strVal val="visible"/>
-                                      </p:to>
-                                    </p:set>
-                                    <p:animEffect transition="in" filter="fade">
-                                      <p:cBhvr>
-                                        <p:cTn id="7" dur="500"/>
-                                        <p:tgtEl>
-                                          <p:spTgt spid="4"/>
-                                        </p:tgtEl>
-                                      </p:cBhvr>
-                                    </p:animEffect>
-                                  </p:childTnLst>
-                                </p:cTn>
-                              </p:par>
-                            </p:childTnLst>
-                          </p:cTn>
-                        </p:par>
-                      </p:childTnLst>
-                    </p:cTn>
-                  </p:par>
-                </p:childTnLst>
-              </p:cTn>
-              <p:prevCondLst>
-                <p:cond evt="onPrev" delay="0">
-                  <p:tgtEl>
-                    <p:sldTgt/>
-                  </p:tgtEl>
-                </p:cond>
-              </p:prevCondLst>
-              <p:nextCondLst>
-                <p:cond evt="onNext" delay="0">
-                  <p:tgtEl>
-                    <p:sldTgt/>
-                  </p:tgtEl>
-                </p:cond>
-              </p:nextCondLst>
-            </p:seq>
-          </p:childTnLst>
-        </p:cTn>
-      </p:par>
-    </p:tnLst>
-    <p:bldLst>
-      <p:bldP spid="4" grpId="0"/>
-    </p:bldLst>
-  </p:timing>
 </p:sld>
 </file>
 
@@ -7196,7 +7504,7 @@
           <p:cNvPr id="5" name="Rectangle 4">
             <a:extLst>
               <a:ext uri="{FF2B5EF4-FFF2-40B4-BE49-F238E27FC236}">
-                <a16:creationId xmlns:a16="http://schemas.microsoft.com/office/drawing/2014/main" id="{FCE8C6AD-BD43-04CA-D8C8-389B386D3285}"/>
+                <a16:creationId xmlns:a16="http://schemas.microsoft.com/office/drawing/2014/main" id="{2CE3FFA3-15BD-3901-E2F8-25B2099C9B53}"/>
               </a:ext>
             </a:extLst>
           </p:cNvPr>
@@ -7266,7 +7574,7 @@
                   <a:schemeClr val="tx1"/>
                 </a:solidFill>
               </a:rPr>
-              <a:t>The Hyperlink Element</a:t>
+              <a:t>The Paragraph Element</a:t>
             </a:r>
           </a:p>
         </p:txBody>
@@ -7283,8 +7591,8 @@
         </p:nvSpPr>
         <p:spPr>
           <a:xfrm>
-            <a:off x="285751" y="1152475"/>
-            <a:ext cx="8572500" cy="1549161"/>
+            <a:off x="719999" y="1136072"/>
+            <a:ext cx="7704000" cy="1269757"/>
           </a:xfrm>
         </p:spPr>
         <p:txBody>
@@ -7302,7 +7610,22 @@
                   <a:schemeClr val="bg1"/>
                 </a:solidFill>
               </a:rPr>
-              <a:t>Used to create a link to another page</a:t>
+              <a:t>Displays common text on the page</a:t>
+            </a:r>
+          </a:p>
+          <a:p>
+            <a:pPr lvl="1">
+              <a:buClr>
+                <a:schemeClr val="bg1"/>
+              </a:buClr>
+            </a:pPr>
+            <a:r>
+              <a:rPr lang="en-US" sz="2000" dirty="0">
+                <a:solidFill>
+                  <a:schemeClr val="bg1"/>
+                </a:solidFill>
+              </a:rPr>
+              <a:t>The content does not have to be multiple sentences</a:t>
             </a:r>
           </a:p>
           <a:p>
@@ -7317,10 +7640,10 @@
                   <a:schemeClr val="bg1"/>
                 </a:solidFill>
               </a:rPr>
-              <a:t>Set the </a:t>
+              <a:t>Each </a:t>
             </a:r>
             <a:r>
-              <a:rPr lang="en-US" sz="2000" b="1" dirty="0" err="1">
+              <a:rPr lang="en-US" sz="2000" b="1" dirty="0">
                 <a:solidFill>
                   <a:schemeClr val="accent1">
                     <a:lumMod val="60000"/>
@@ -7329,7 +7652,7 @@
                 </a:solidFill>
                 <a:latin typeface="Consolas" panose="020B0609020204030204" pitchFamily="49" charset="0"/>
               </a:rPr>
-              <a:t>href</a:t>
+              <a:t>&lt;p&gt;&lt;/p&gt;</a:t>
             </a:r>
             <a:r>
               <a:rPr lang="en-US" sz="2000" dirty="0">
@@ -7337,23 +7660,17 @@
                   <a:schemeClr val="bg1"/>
                 </a:solidFill>
               </a:rPr>
-              <a:t> to a URL</a:t>
+              <a:t> creates a new line under it</a:t>
             </a:r>
-          </a:p>
-          <a:p>
-            <a:pPr>
-              <a:buClr>
-                <a:schemeClr val="bg1"/>
-              </a:buClr>
-            </a:pPr>
-            <a:r>
-              <a:rPr lang="en-US" sz="2000" dirty="0">
-                <a:solidFill>
-                  <a:schemeClr val="bg1"/>
-                </a:solidFill>
-              </a:rPr>
-              <a:t>The text of the link goes in between the opening and closing tag</a:t>
-            </a:r>
+            <a:endParaRPr lang="en-US" sz="2000" b="1" dirty="0">
+              <a:solidFill>
+                <a:schemeClr val="accent1">
+                  <a:lumMod val="60000"/>
+                  <a:lumOff val="40000"/>
+                </a:schemeClr>
+              </a:solidFill>
+              <a:latin typeface="Consolas" panose="020B0609020204030204" pitchFamily="49" charset="0"/>
+            </a:endParaRPr>
           </a:p>
         </p:txBody>
       </p:sp>
@@ -7365,8 +7682,8 @@
         </p:nvSpPr>
         <p:spPr>
           <a:xfrm>
-            <a:off x="279298" y="3257550"/>
-            <a:ext cx="8529258" cy="683264"/>
+            <a:off x="634383" y="2975264"/>
+            <a:ext cx="7875233" cy="775597"/>
           </a:xfrm>
           <a:prstGeom prst="rect">
             <a:avLst/>
@@ -7380,7 +7697,7 @@
           <a:lstStyle/>
           <a:p>
             <a:r>
-              <a:rPr lang="en-US" sz="3000" b="1" dirty="0">
+              <a:rPr lang="en-US" sz="3600" b="1" dirty="0">
                 <a:solidFill>
                   <a:srgbClr val="808080"/>
                 </a:solidFill>
@@ -7389,52 +7706,16 @@
               <a:t>&lt;</a:t>
             </a:r>
             <a:r>
-              <a:rPr lang="en-US" sz="3000" b="1" dirty="0">
+              <a:rPr lang="en-US" sz="3600" b="1" dirty="0">
                 <a:solidFill>
                   <a:srgbClr val="569CD6"/>
                 </a:solidFill>
                 <a:latin typeface="Consolas" panose="020B0609020204030204" pitchFamily="49" charset="0"/>
               </a:rPr>
-              <a:t>a</a:t>
+              <a:t>p</a:t>
             </a:r>
             <a:r>
-              <a:rPr lang="en-US" sz="3000" b="1" dirty="0">
-                <a:solidFill>
-                  <a:srgbClr val="D4D4D4"/>
-                </a:solidFill>
-                <a:latin typeface="Consolas" panose="020B0609020204030204" pitchFamily="49" charset="0"/>
-              </a:rPr>
-              <a:t> </a:t>
-            </a:r>
-            <a:r>
-              <a:rPr lang="en-US" sz="3000" b="1" dirty="0" err="1">
-                <a:solidFill>
-                  <a:srgbClr val="9CDCFE"/>
-                </a:solidFill>
-                <a:latin typeface="Consolas" panose="020B0609020204030204" pitchFamily="49" charset="0"/>
-              </a:rPr>
-              <a:t>href</a:t>
-            </a:r>
-            <a:r>
-              <a:rPr lang="en-US" sz="3000" b="1" dirty="0">
-                <a:solidFill>
-                  <a:srgbClr val="D4D4D4"/>
-                </a:solidFill>
-                <a:latin typeface="Consolas" panose="020B0609020204030204" pitchFamily="49" charset="0"/>
-              </a:rPr>
-              <a:t>=</a:t>
-            </a:r>
-            <a:r>
-              <a:rPr lang="en-US" sz="3000" b="1" dirty="0">
-                <a:solidFill>
-                  <a:srgbClr val="CE9178"/>
-                </a:solidFill>
-                <a:latin typeface="Consolas" panose="020B0609020204030204" pitchFamily="49" charset="0"/>
-              </a:rPr>
-              <a:t>"https://google.com"</a:t>
-            </a:r>
-            <a:r>
-              <a:rPr lang="en-US" sz="3000" b="1" dirty="0">
+              <a:rPr lang="en-US" sz="3600" b="1" dirty="0">
                 <a:solidFill>
                   <a:srgbClr val="808080"/>
                 </a:solidFill>
@@ -7443,16 +7724,16 @@
               <a:t>&gt;</a:t>
             </a:r>
             <a:r>
-              <a:rPr lang="en-US" sz="3000" b="1" dirty="0">
+              <a:rPr lang="en-US" sz="3600" b="1" dirty="0">
                 <a:solidFill>
                   <a:schemeClr val="bg1"/>
                 </a:solidFill>
                 <a:latin typeface="Consolas" panose="020B0609020204030204" pitchFamily="49" charset="0"/>
               </a:rPr>
-              <a:t>Google</a:t>
+              <a:t>This will appear normal</a:t>
             </a:r>
             <a:r>
-              <a:rPr lang="en-US" sz="3000" b="1" dirty="0">
+              <a:rPr lang="en-US" sz="3600" b="1" dirty="0">
                 <a:solidFill>
                   <a:srgbClr val="808080"/>
                 </a:solidFill>
@@ -7461,16 +7742,16 @@
               <a:t>&lt;/</a:t>
             </a:r>
             <a:r>
-              <a:rPr lang="en-US" sz="3000" b="1" dirty="0">
+              <a:rPr lang="en-US" sz="3600" b="1" dirty="0">
                 <a:solidFill>
                   <a:srgbClr val="569CD6"/>
                 </a:solidFill>
                 <a:latin typeface="Consolas" panose="020B0609020204030204" pitchFamily="49" charset="0"/>
               </a:rPr>
-              <a:t>a</a:t>
+              <a:t>p</a:t>
             </a:r>
             <a:r>
-              <a:rPr lang="en-US" sz="3000" b="1" dirty="0">
+              <a:rPr lang="en-US" sz="3600" b="1" dirty="0">
                 <a:solidFill>
                   <a:srgbClr val="808080"/>
                 </a:solidFill>
@@ -7478,11 +7759,18 @@
               </a:rPr>
               <a:t>&gt;</a:t>
             </a:r>
-            <a:endParaRPr lang="en-US" sz="3000" b="1" dirty="0">
-              <a:solidFill>
-                <a:srgbClr val="D4D4D4"/>
-              </a:solidFill>
-              <a:latin typeface="Consolas" panose="020B0609020204030204" pitchFamily="49" charset="0"/>
+            <a:endParaRPr lang="en-US" sz="2000" b="1" dirty="0">
+              <a:gradFill>
+                <a:gsLst>
+                  <a:gs pos="2917">
+                    <a:schemeClr val="tx1"/>
+                  </a:gs>
+                  <a:gs pos="30000">
+                    <a:schemeClr val="tx1"/>
+                  </a:gs>
+                </a:gsLst>
+                <a:lin ang="5400000" scaled="0"/>
+              </a:gradFill>
             </a:endParaRPr>
           </a:p>
         </p:txBody>
@@ -7490,7 +7778,7 @@
     </p:spTree>
     <p:extLst>
       <p:ext uri="{BB962C8B-B14F-4D97-AF65-F5344CB8AC3E}">
-        <p14:creationId xmlns:p14="http://schemas.microsoft.com/office/powerpoint/2010/main" val="1987866754"/>
+        <p14:creationId xmlns:p14="http://schemas.microsoft.com/office/powerpoint/2010/main" val="3519910749"/>
       </p:ext>
     </p:extLst>
   </p:cSld>
@@ -7611,6 +7899,732 @@
           <p:cNvPr id="5" name="Rectangle 4">
             <a:extLst>
               <a:ext uri="{FF2B5EF4-FFF2-40B4-BE49-F238E27FC236}">
+                <a16:creationId xmlns:a16="http://schemas.microsoft.com/office/drawing/2014/main" id="{2CE3FFA3-15BD-3901-E2F8-25B2099C9B53}"/>
+              </a:ext>
+            </a:extLst>
+          </p:cNvPr>
+          <p:cNvSpPr/>
+          <p:nvPr/>
+        </p:nvSpPr>
+        <p:spPr>
+          <a:xfrm>
+            <a:off x="285749" y="822960"/>
+            <a:ext cx="8572500" cy="3839095"/>
+          </a:xfrm>
+          <a:prstGeom prst="rect">
+            <a:avLst/>
+          </a:prstGeom>
+          <a:solidFill>
+            <a:schemeClr val="tx1"/>
+          </a:solidFill>
+          <a:ln>
+            <a:solidFill>
+              <a:schemeClr val="tx2"/>
+            </a:solidFill>
+          </a:ln>
+        </p:spPr>
+        <p:style>
+          <a:lnRef idx="2">
+            <a:schemeClr val="accent1">
+              <a:shade val="50000"/>
+            </a:schemeClr>
+          </a:lnRef>
+          <a:fillRef idx="1">
+            <a:schemeClr val="accent1"/>
+          </a:fillRef>
+          <a:effectRef idx="0">
+            <a:schemeClr val="accent1"/>
+          </a:effectRef>
+          <a:fontRef idx="minor">
+            <a:schemeClr val="lt1"/>
+          </a:fontRef>
+        </p:style>
+        <p:txBody>
+          <a:bodyPr rtlCol="0" anchor="ctr"/>
+          <a:lstStyle/>
+          <a:p>
+            <a:pPr algn="ctr"/>
+            <a:endParaRPr lang="en-US"/>
+          </a:p>
+        </p:txBody>
+      </p:sp>
+      <p:sp>
+        <p:nvSpPr>
+          <p:cNvPr id="2" name="Title 1"/>
+          <p:cNvSpPr>
+            <a:spLocks noGrp="1"/>
+          </p:cNvSpPr>
+          <p:nvPr>
+            <p:ph type="title"/>
+          </p:nvPr>
+        </p:nvSpPr>
+        <p:spPr/>
+        <p:txBody>
+          <a:bodyPr anchor="ctr"/>
+          <a:lstStyle/>
+          <a:p>
+            <a:r>
+              <a:rPr lang="en-US" dirty="0">
+                <a:solidFill>
+                  <a:schemeClr val="tx1"/>
+                </a:solidFill>
+              </a:rPr>
+              <a:t>The Paragraph Element</a:t>
+            </a:r>
+          </a:p>
+        </p:txBody>
+      </p:sp>
+      <p:pic>
+        <p:nvPicPr>
+          <p:cNvPr id="7" name="Picture 6">
+            <a:extLst>
+              <a:ext uri="{FF2B5EF4-FFF2-40B4-BE49-F238E27FC236}">
+                <a16:creationId xmlns:a16="http://schemas.microsoft.com/office/drawing/2014/main" id="{84530F80-71B3-5938-01B5-81717C8F0BD8}"/>
+              </a:ext>
+            </a:extLst>
+          </p:cNvPr>
+          <p:cNvPicPr>
+            <a:picLocks noChangeAspect="1"/>
+          </p:cNvPicPr>
+          <p:nvPr/>
+        </p:nvPicPr>
+        <p:blipFill>
+          <a:blip r:embed="rId2"/>
+          <a:stretch>
+            <a:fillRect/>
+          </a:stretch>
+        </p:blipFill>
+        <p:spPr>
+          <a:xfrm>
+            <a:off x="393510" y="1699649"/>
+            <a:ext cx="8356978" cy="1486824"/>
+          </a:xfrm>
+          <a:prstGeom prst="rect">
+            <a:avLst/>
+          </a:prstGeom>
+        </p:spPr>
+      </p:pic>
+    </p:spTree>
+    <p:extLst>
+      <p:ext uri="{BB962C8B-B14F-4D97-AF65-F5344CB8AC3E}">
+        <p14:creationId xmlns:p14="http://schemas.microsoft.com/office/powerpoint/2010/main" val="567858339"/>
+      </p:ext>
+    </p:extLst>
+  </p:cSld>
+  <p:clrMapOvr>
+    <a:masterClrMapping/>
+  </p:clrMapOvr>
+  <p:transition>
+    <p:fade/>
+  </p:transition>
+</p:sld>
+</file>
+
+<file path=ppt/slides/slide6.xml><?xml version="1.0" encoding="utf-8"?>
+<p:sld xmlns:a="http://schemas.openxmlformats.org/drawingml/2006/main" xmlns:r="http://schemas.openxmlformats.org/officeDocument/2006/relationships" xmlns:p="http://schemas.openxmlformats.org/presentationml/2006/main">
+  <p:cSld>
+    <p:spTree>
+      <p:nvGrpSpPr>
+        <p:cNvPr id="1" name=""/>
+        <p:cNvGrpSpPr/>
+        <p:nvPr/>
+      </p:nvGrpSpPr>
+      <p:grpSpPr>
+        <a:xfrm>
+          <a:off x="0" y="0"/>
+          <a:ext cx="0" cy="0"/>
+          <a:chOff x="0" y="0"/>
+          <a:chExt cx="0" cy="0"/>
+        </a:xfrm>
+      </p:grpSpPr>
+      <p:sp>
+        <p:nvSpPr>
+          <p:cNvPr id="5" name="Rectangle 4">
+            <a:extLst>
+              <a:ext uri="{FF2B5EF4-FFF2-40B4-BE49-F238E27FC236}">
+                <a16:creationId xmlns:a16="http://schemas.microsoft.com/office/drawing/2014/main" id="{FCE8C6AD-BD43-04CA-D8C8-389B386D3285}"/>
+              </a:ext>
+            </a:extLst>
+          </p:cNvPr>
+          <p:cNvSpPr/>
+          <p:nvPr/>
+        </p:nvSpPr>
+        <p:spPr>
+          <a:xfrm>
+            <a:off x="285750" y="822960"/>
+            <a:ext cx="8572500" cy="3839095"/>
+          </a:xfrm>
+          <a:prstGeom prst="rect">
+            <a:avLst/>
+          </a:prstGeom>
+          <a:solidFill>
+            <a:schemeClr val="tx1"/>
+          </a:solidFill>
+          <a:ln>
+            <a:solidFill>
+              <a:schemeClr val="tx2"/>
+            </a:solidFill>
+          </a:ln>
+        </p:spPr>
+        <p:style>
+          <a:lnRef idx="2">
+            <a:schemeClr val="accent1">
+              <a:shade val="50000"/>
+            </a:schemeClr>
+          </a:lnRef>
+          <a:fillRef idx="1">
+            <a:schemeClr val="accent1"/>
+          </a:fillRef>
+          <a:effectRef idx="0">
+            <a:schemeClr val="accent1"/>
+          </a:effectRef>
+          <a:fontRef idx="minor">
+            <a:schemeClr val="lt1"/>
+          </a:fontRef>
+        </p:style>
+        <p:txBody>
+          <a:bodyPr rtlCol="0" anchor="ctr"/>
+          <a:lstStyle/>
+          <a:p>
+            <a:pPr algn="ctr"/>
+            <a:endParaRPr lang="en-US"/>
+          </a:p>
+        </p:txBody>
+      </p:sp>
+      <p:sp>
+        <p:nvSpPr>
+          <p:cNvPr id="2" name="Title 1"/>
+          <p:cNvSpPr>
+            <a:spLocks noGrp="1"/>
+          </p:cNvSpPr>
+          <p:nvPr>
+            <p:ph type="title"/>
+          </p:nvPr>
+        </p:nvSpPr>
+        <p:spPr/>
+        <p:txBody>
+          <a:bodyPr anchor="ctr"/>
+          <a:lstStyle/>
+          <a:p>
+            <a:r>
+              <a:rPr lang="en-US" dirty="0">
+                <a:solidFill>
+                  <a:schemeClr val="tx1"/>
+                </a:solidFill>
+              </a:rPr>
+              <a:t>The Hyperlink Element</a:t>
+            </a:r>
+          </a:p>
+        </p:txBody>
+      </p:sp>
+      <p:sp>
+        <p:nvSpPr>
+          <p:cNvPr id="3" name="Content Placeholder 2"/>
+          <p:cNvSpPr>
+            <a:spLocks noGrp="1"/>
+          </p:cNvSpPr>
+          <p:nvPr>
+            <p:ph idx="1"/>
+          </p:nvPr>
+        </p:nvSpPr>
+        <p:spPr>
+          <a:xfrm>
+            <a:off x="285751" y="1152475"/>
+            <a:ext cx="8572500" cy="1549161"/>
+          </a:xfrm>
+        </p:spPr>
+        <p:txBody>
+          <a:bodyPr/>
+          <a:lstStyle/>
+          <a:p>
+            <a:pPr>
+              <a:buClr>
+                <a:schemeClr val="bg1"/>
+              </a:buClr>
+            </a:pPr>
+            <a:r>
+              <a:rPr lang="en-US" sz="2000" dirty="0">
+                <a:solidFill>
+                  <a:schemeClr val="bg1"/>
+                </a:solidFill>
+              </a:rPr>
+              <a:t>Used to create a link to another page</a:t>
+            </a:r>
+          </a:p>
+          <a:p>
+            <a:pPr>
+              <a:buClr>
+                <a:schemeClr val="bg1"/>
+              </a:buClr>
+            </a:pPr>
+            <a:r>
+              <a:rPr lang="en-US" sz="2000" dirty="0">
+                <a:solidFill>
+                  <a:schemeClr val="bg1"/>
+                </a:solidFill>
+              </a:rPr>
+              <a:t>Set the </a:t>
+            </a:r>
+            <a:r>
+              <a:rPr lang="en-US" sz="2000" b="1" dirty="0" err="1">
+                <a:solidFill>
+                  <a:schemeClr val="accent1">
+                    <a:lumMod val="60000"/>
+                    <a:lumOff val="40000"/>
+                  </a:schemeClr>
+                </a:solidFill>
+                <a:latin typeface="Consolas" panose="020B0609020204030204" pitchFamily="49" charset="0"/>
+              </a:rPr>
+              <a:t>href</a:t>
+            </a:r>
+            <a:r>
+              <a:rPr lang="en-US" sz="2000" dirty="0">
+                <a:solidFill>
+                  <a:schemeClr val="bg1"/>
+                </a:solidFill>
+              </a:rPr>
+              <a:t> to a URL</a:t>
+            </a:r>
+          </a:p>
+          <a:p>
+            <a:pPr>
+              <a:buClr>
+                <a:schemeClr val="bg1"/>
+              </a:buClr>
+            </a:pPr>
+            <a:r>
+              <a:rPr lang="en-US" sz="2000" dirty="0">
+                <a:solidFill>
+                  <a:schemeClr val="bg1"/>
+                </a:solidFill>
+              </a:rPr>
+              <a:t>The text of the link goes in between the opening and closing tag</a:t>
+            </a:r>
+          </a:p>
+        </p:txBody>
+      </p:sp>
+      <p:sp>
+        <p:nvSpPr>
+          <p:cNvPr id="4" name="TextBox 3"/>
+          <p:cNvSpPr txBox="1"/>
+          <p:nvPr/>
+        </p:nvSpPr>
+        <p:spPr>
+          <a:xfrm>
+            <a:off x="279298" y="3257550"/>
+            <a:ext cx="8529258" cy="683264"/>
+          </a:xfrm>
+          <a:prstGeom prst="rect">
+            <a:avLst/>
+          </a:prstGeom>
+          <a:noFill/>
+        </p:spPr>
+        <p:txBody>
+          <a:bodyPr wrap="none" lIns="137160" tIns="109728" rIns="137160" bIns="109728" rtlCol="0">
+            <a:spAutoFit/>
+          </a:bodyPr>
+          <a:lstStyle/>
+          <a:p>
+            <a:r>
+              <a:rPr lang="en-US" sz="3000" b="1" dirty="0">
+                <a:solidFill>
+                  <a:srgbClr val="808080"/>
+                </a:solidFill>
+                <a:latin typeface="Consolas" panose="020B0609020204030204" pitchFamily="49" charset="0"/>
+              </a:rPr>
+              <a:t>&lt;</a:t>
+            </a:r>
+            <a:r>
+              <a:rPr lang="en-US" sz="3000" b="1" dirty="0">
+                <a:solidFill>
+                  <a:srgbClr val="569CD6"/>
+                </a:solidFill>
+                <a:latin typeface="Consolas" panose="020B0609020204030204" pitchFamily="49" charset="0"/>
+              </a:rPr>
+              <a:t>a</a:t>
+            </a:r>
+            <a:r>
+              <a:rPr lang="en-US" sz="3000" b="1" dirty="0">
+                <a:solidFill>
+                  <a:srgbClr val="D4D4D4"/>
+                </a:solidFill>
+                <a:latin typeface="Consolas" panose="020B0609020204030204" pitchFamily="49" charset="0"/>
+              </a:rPr>
+              <a:t> </a:t>
+            </a:r>
+            <a:r>
+              <a:rPr lang="en-US" sz="3000" b="1" dirty="0" err="1">
+                <a:solidFill>
+                  <a:srgbClr val="9CDCFE"/>
+                </a:solidFill>
+                <a:latin typeface="Consolas" panose="020B0609020204030204" pitchFamily="49" charset="0"/>
+              </a:rPr>
+              <a:t>href</a:t>
+            </a:r>
+            <a:r>
+              <a:rPr lang="en-US" sz="3000" b="1" dirty="0">
+                <a:solidFill>
+                  <a:srgbClr val="D4D4D4"/>
+                </a:solidFill>
+                <a:latin typeface="Consolas" panose="020B0609020204030204" pitchFamily="49" charset="0"/>
+              </a:rPr>
+              <a:t>=</a:t>
+            </a:r>
+            <a:r>
+              <a:rPr lang="en-US" sz="3000" b="1" dirty="0">
+                <a:solidFill>
+                  <a:srgbClr val="CE9178"/>
+                </a:solidFill>
+                <a:latin typeface="Consolas" panose="020B0609020204030204" pitchFamily="49" charset="0"/>
+              </a:rPr>
+              <a:t>"https://google.com"</a:t>
+            </a:r>
+            <a:r>
+              <a:rPr lang="en-US" sz="3000" b="1" dirty="0">
+                <a:solidFill>
+                  <a:srgbClr val="808080"/>
+                </a:solidFill>
+                <a:latin typeface="Consolas" panose="020B0609020204030204" pitchFamily="49" charset="0"/>
+              </a:rPr>
+              <a:t>&gt;</a:t>
+            </a:r>
+            <a:r>
+              <a:rPr lang="en-US" sz="3000" b="1" dirty="0">
+                <a:solidFill>
+                  <a:schemeClr val="bg1"/>
+                </a:solidFill>
+                <a:latin typeface="Consolas" panose="020B0609020204030204" pitchFamily="49" charset="0"/>
+              </a:rPr>
+              <a:t>Google</a:t>
+            </a:r>
+            <a:r>
+              <a:rPr lang="en-US" sz="3000" b="1" dirty="0">
+                <a:solidFill>
+                  <a:srgbClr val="808080"/>
+                </a:solidFill>
+                <a:latin typeface="Consolas" panose="020B0609020204030204" pitchFamily="49" charset="0"/>
+              </a:rPr>
+              <a:t>&lt;/</a:t>
+            </a:r>
+            <a:r>
+              <a:rPr lang="en-US" sz="3000" b="1" dirty="0">
+                <a:solidFill>
+                  <a:srgbClr val="569CD6"/>
+                </a:solidFill>
+                <a:latin typeface="Consolas" panose="020B0609020204030204" pitchFamily="49" charset="0"/>
+              </a:rPr>
+              <a:t>a</a:t>
+            </a:r>
+            <a:r>
+              <a:rPr lang="en-US" sz="3000" b="1" dirty="0">
+                <a:solidFill>
+                  <a:srgbClr val="808080"/>
+                </a:solidFill>
+                <a:latin typeface="Consolas" panose="020B0609020204030204" pitchFamily="49" charset="0"/>
+              </a:rPr>
+              <a:t>&gt;</a:t>
+            </a:r>
+            <a:endParaRPr lang="en-US" sz="3000" b="1" dirty="0">
+              <a:solidFill>
+                <a:srgbClr val="D4D4D4"/>
+              </a:solidFill>
+              <a:latin typeface="Consolas" panose="020B0609020204030204" pitchFamily="49" charset="0"/>
+            </a:endParaRPr>
+          </a:p>
+        </p:txBody>
+      </p:sp>
+    </p:spTree>
+    <p:extLst>
+      <p:ext uri="{BB962C8B-B14F-4D97-AF65-F5344CB8AC3E}">
+        <p14:creationId xmlns:p14="http://schemas.microsoft.com/office/powerpoint/2010/main" val="1987866754"/>
+      </p:ext>
+    </p:extLst>
+  </p:cSld>
+  <p:clrMapOvr>
+    <a:masterClrMapping/>
+  </p:clrMapOvr>
+  <p:transition>
+    <p:fade/>
+  </p:transition>
+  <p:timing>
+    <p:tnLst>
+      <p:par>
+        <p:cTn id="1" dur="indefinite" restart="never" nodeType="tmRoot">
+          <p:childTnLst>
+            <p:seq concurrent="1" nextAc="seek">
+              <p:cTn id="2" dur="indefinite" nodeType="mainSeq">
+                <p:childTnLst>
+                  <p:par>
+                    <p:cTn id="3" fill="hold">
+                      <p:stCondLst>
+                        <p:cond delay="indefinite"/>
+                      </p:stCondLst>
+                      <p:childTnLst>
+                        <p:par>
+                          <p:cTn id="4" fill="hold">
+                            <p:stCondLst>
+                              <p:cond delay="0"/>
+                            </p:stCondLst>
+                            <p:childTnLst>
+                              <p:par>
+                                <p:cTn id="5" presetID="10" presetClass="entr" presetSubtype="0" fill="hold" grpId="0" nodeType="clickEffect">
+                                  <p:stCondLst>
+                                    <p:cond delay="0"/>
+                                  </p:stCondLst>
+                                  <p:childTnLst>
+                                    <p:set>
+                                      <p:cBhvr>
+                                        <p:cTn id="6" dur="1" fill="hold">
+                                          <p:stCondLst>
+                                            <p:cond delay="0"/>
+                                          </p:stCondLst>
+                                        </p:cTn>
+                                        <p:tgtEl>
+                                          <p:spTgt spid="4"/>
+                                        </p:tgtEl>
+                                        <p:attrNameLst>
+                                          <p:attrName>style.visibility</p:attrName>
+                                        </p:attrNameLst>
+                                      </p:cBhvr>
+                                      <p:to>
+                                        <p:strVal val="visible"/>
+                                      </p:to>
+                                    </p:set>
+                                    <p:animEffect transition="in" filter="fade">
+                                      <p:cBhvr>
+                                        <p:cTn id="7" dur="500"/>
+                                        <p:tgtEl>
+                                          <p:spTgt spid="4"/>
+                                        </p:tgtEl>
+                                      </p:cBhvr>
+                                    </p:animEffect>
+                                  </p:childTnLst>
+                                </p:cTn>
+                              </p:par>
+                            </p:childTnLst>
+                          </p:cTn>
+                        </p:par>
+                      </p:childTnLst>
+                    </p:cTn>
+                  </p:par>
+                </p:childTnLst>
+              </p:cTn>
+              <p:prevCondLst>
+                <p:cond evt="onPrev" delay="0">
+                  <p:tgtEl>
+                    <p:sldTgt/>
+                  </p:tgtEl>
+                </p:cond>
+              </p:prevCondLst>
+              <p:nextCondLst>
+                <p:cond evt="onNext" delay="0">
+                  <p:tgtEl>
+                    <p:sldTgt/>
+                  </p:tgtEl>
+                </p:cond>
+              </p:nextCondLst>
+            </p:seq>
+          </p:childTnLst>
+        </p:cTn>
+      </p:par>
+    </p:tnLst>
+    <p:bldLst>
+      <p:bldP spid="4" grpId="0"/>
+    </p:bldLst>
+  </p:timing>
+</p:sld>
+</file>
+
+<file path=ppt/slides/slide7.xml><?xml version="1.0" encoding="utf-8"?>
+<p:sld xmlns:a="http://schemas.openxmlformats.org/drawingml/2006/main" xmlns:r="http://schemas.openxmlformats.org/officeDocument/2006/relationships" xmlns:p="http://schemas.openxmlformats.org/presentationml/2006/main">
+  <p:cSld>
+    <p:spTree>
+      <p:nvGrpSpPr>
+        <p:cNvPr id="1" name=""/>
+        <p:cNvGrpSpPr/>
+        <p:nvPr/>
+      </p:nvGrpSpPr>
+      <p:grpSpPr>
+        <a:xfrm>
+          <a:off x="0" y="0"/>
+          <a:ext cx="0" cy="0"/>
+          <a:chOff x="0" y="0"/>
+          <a:chExt cx="0" cy="0"/>
+        </a:xfrm>
+      </p:grpSpPr>
+      <p:sp>
+        <p:nvSpPr>
+          <p:cNvPr id="5" name="Rectangle 4">
+            <a:extLst>
+              <a:ext uri="{FF2B5EF4-FFF2-40B4-BE49-F238E27FC236}">
+                <a16:creationId xmlns:a16="http://schemas.microsoft.com/office/drawing/2014/main" id="{FCE8C6AD-BD43-04CA-D8C8-389B386D3285}"/>
+              </a:ext>
+            </a:extLst>
+          </p:cNvPr>
+          <p:cNvSpPr/>
+          <p:nvPr/>
+        </p:nvSpPr>
+        <p:spPr>
+          <a:xfrm>
+            <a:off x="292202" y="1014162"/>
+            <a:ext cx="8572500" cy="3839095"/>
+          </a:xfrm>
+          <a:prstGeom prst="rect">
+            <a:avLst/>
+          </a:prstGeom>
+          <a:solidFill>
+            <a:schemeClr val="tx1"/>
+          </a:solidFill>
+          <a:ln>
+            <a:solidFill>
+              <a:schemeClr val="tx2"/>
+            </a:solidFill>
+          </a:ln>
+        </p:spPr>
+        <p:style>
+          <a:lnRef idx="2">
+            <a:schemeClr val="accent1">
+              <a:shade val="50000"/>
+            </a:schemeClr>
+          </a:lnRef>
+          <a:fillRef idx="1">
+            <a:schemeClr val="accent1"/>
+          </a:fillRef>
+          <a:effectRef idx="0">
+            <a:schemeClr val="accent1"/>
+          </a:effectRef>
+          <a:fontRef idx="minor">
+            <a:schemeClr val="lt1"/>
+          </a:fontRef>
+        </p:style>
+        <p:txBody>
+          <a:bodyPr rtlCol="0" anchor="ctr"/>
+          <a:lstStyle/>
+          <a:p>
+            <a:pPr algn="ctr"/>
+            <a:endParaRPr lang="en-US"/>
+          </a:p>
+        </p:txBody>
+      </p:sp>
+      <p:sp>
+        <p:nvSpPr>
+          <p:cNvPr id="2" name="Title 1"/>
+          <p:cNvSpPr>
+            <a:spLocks noGrp="1"/>
+          </p:cNvSpPr>
+          <p:nvPr>
+            <p:ph type="title"/>
+          </p:nvPr>
+        </p:nvSpPr>
+        <p:spPr/>
+        <p:txBody>
+          <a:bodyPr anchor="ctr"/>
+          <a:lstStyle/>
+          <a:p>
+            <a:r>
+              <a:rPr lang="en-US" dirty="0">
+                <a:solidFill>
+                  <a:schemeClr val="tx1"/>
+                </a:solidFill>
+              </a:rPr>
+              <a:t>The Hyperlink Element</a:t>
+            </a:r>
+          </a:p>
+        </p:txBody>
+      </p:sp>
+      <p:sp>
+        <p:nvSpPr>
+          <p:cNvPr id="7" name="Content Placeholder 6">
+            <a:extLst>
+              <a:ext uri="{FF2B5EF4-FFF2-40B4-BE49-F238E27FC236}">
+                <a16:creationId xmlns:a16="http://schemas.microsoft.com/office/drawing/2014/main" id="{8F4C29BE-4D75-9678-9CDA-8B6D23599744}"/>
+              </a:ext>
+            </a:extLst>
+          </p:cNvPr>
+          <p:cNvSpPr>
+            <a:spLocks noGrp="1"/>
+          </p:cNvSpPr>
+          <p:nvPr>
+            <p:ph idx="1"/>
+          </p:nvPr>
+        </p:nvSpPr>
+        <p:spPr/>
+        <p:txBody>
+          <a:bodyPr/>
+          <a:lstStyle/>
+          <a:p>
+            <a:endParaRPr lang="en-US" dirty="0"/>
+          </a:p>
+        </p:txBody>
+      </p:sp>
+      <p:pic>
+        <p:nvPicPr>
+          <p:cNvPr id="9" name="Picture 8">
+            <a:extLst>
+              <a:ext uri="{FF2B5EF4-FFF2-40B4-BE49-F238E27FC236}">
+                <a16:creationId xmlns:a16="http://schemas.microsoft.com/office/drawing/2014/main" id="{258365D0-7274-9339-3C8E-0C360410D160}"/>
+              </a:ext>
+            </a:extLst>
+          </p:cNvPr>
+          <p:cNvPicPr>
+            <a:picLocks noChangeAspect="1"/>
+          </p:cNvPicPr>
+          <p:nvPr/>
+        </p:nvPicPr>
+        <p:blipFill>
+          <a:blip r:embed="rId2"/>
+          <a:stretch>
+            <a:fillRect/>
+          </a:stretch>
+        </p:blipFill>
+        <p:spPr>
+          <a:xfrm>
+            <a:off x="450778" y="2023033"/>
+            <a:ext cx="8062022" cy="1411729"/>
+          </a:xfrm>
+          <a:prstGeom prst="rect">
+            <a:avLst/>
+          </a:prstGeom>
+        </p:spPr>
+      </p:pic>
+    </p:spTree>
+    <p:extLst>
+      <p:ext uri="{BB962C8B-B14F-4D97-AF65-F5344CB8AC3E}">
+        <p14:creationId xmlns:p14="http://schemas.microsoft.com/office/powerpoint/2010/main" val="1712241861"/>
+      </p:ext>
+    </p:extLst>
+  </p:cSld>
+  <p:clrMapOvr>
+    <a:masterClrMapping/>
+  </p:clrMapOvr>
+  <p:transition>
+    <p:fade/>
+  </p:transition>
+</p:sld>
+</file>
+
+<file path=ppt/slides/slide8.xml><?xml version="1.0" encoding="utf-8"?>
+<p:sld xmlns:a="http://schemas.openxmlformats.org/drawingml/2006/main" xmlns:r="http://schemas.openxmlformats.org/officeDocument/2006/relationships" xmlns:p="http://schemas.openxmlformats.org/presentationml/2006/main">
+  <p:cSld>
+    <p:spTree>
+      <p:nvGrpSpPr>
+        <p:cNvPr id="1" name=""/>
+        <p:cNvGrpSpPr/>
+        <p:nvPr/>
+      </p:nvGrpSpPr>
+      <p:grpSpPr>
+        <a:xfrm>
+          <a:off x="0" y="0"/>
+          <a:ext cx="0" cy="0"/>
+          <a:chOff x="0" y="0"/>
+          <a:chExt cx="0" cy="0"/>
+        </a:xfrm>
+      </p:grpSpPr>
+      <p:sp>
+        <p:nvSpPr>
+          <p:cNvPr id="5" name="Rectangle 4">
+            <a:extLst>
+              <a:ext uri="{FF2B5EF4-FFF2-40B4-BE49-F238E27FC236}">
                 <a16:creationId xmlns:a16="http://schemas.microsoft.com/office/drawing/2014/main" id="{02DE89CA-A60D-1CBA-419F-E45ECDC38EAE}"/>
               </a:ext>
             </a:extLst>
@@ -7992,7 +9006,7 @@
 </p:sld>
 </file>
 
-<file path=ppt/slides/slide6.xml><?xml version="1.0" encoding="utf-8"?>
+<file path=ppt/slides/slide9.xml><?xml version="1.0" encoding="utf-8"?>
 <p:sld xmlns:a="http://schemas.openxmlformats.org/drawingml/2006/main" xmlns:r="http://schemas.openxmlformats.org/officeDocument/2006/relationships" xmlns:p="http://schemas.openxmlformats.org/presentationml/2006/main">
   <p:cSld>
     <p:spTree>
@@ -8011,7 +9025,13 @@
       </p:grpSpPr>
       <p:sp>
         <p:nvSpPr>
-          <p:cNvPr id="2" name="Title 1"/>
+          <p:cNvPr id="2" name="Title 1">
+            <a:extLst>
+              <a:ext uri="{FF2B5EF4-FFF2-40B4-BE49-F238E27FC236}">
+                <a16:creationId xmlns:a16="http://schemas.microsoft.com/office/drawing/2014/main" id="{084F45A1-788D-79E8-5CFC-B30C74075F16}"/>
+              </a:ext>
+            </a:extLst>
+          </p:cNvPr>
           <p:cNvSpPr>
             <a:spLocks noGrp="1"/>
           </p:cNvSpPr>
@@ -8021,7 +9041,7 @@
         </p:nvSpPr>
         <p:spPr/>
         <p:txBody>
-          <a:bodyPr anchor="ctr"/>
+          <a:bodyPr/>
           <a:lstStyle/>
           <a:p>
             <a:r>
@@ -8030,14 +9050,21 @@
                   <a:schemeClr val="tx1"/>
                 </a:solidFill>
               </a:rPr>
-              <a:t>Example</a:t>
+              <a:t>The Image Element</a:t>
             </a:r>
-          </a:p>
-        </p:txBody>
-      </p:sp>
-      <p:sp>
-        <p:nvSpPr>
-          <p:cNvPr id="3" name="Content Placeholder 2"/>
+            <a:endParaRPr lang="en-US" dirty="0"/>
+          </a:p>
+        </p:txBody>
+      </p:sp>
+      <p:sp>
+        <p:nvSpPr>
+          <p:cNvPr id="3" name="Content Placeholder 2">
+            <a:extLst>
+              <a:ext uri="{FF2B5EF4-FFF2-40B4-BE49-F238E27FC236}">
+                <a16:creationId xmlns:a16="http://schemas.microsoft.com/office/drawing/2014/main" id="{F120EFF6-C771-F22E-7094-EE536E73E827}"/>
+              </a:ext>
+            </a:extLst>
+          </p:cNvPr>
           <p:cNvSpPr>
             <a:spLocks noGrp="1"/>
           </p:cNvSpPr>
@@ -8045,48 +9072,49 @@
             <p:ph idx="1"/>
           </p:nvPr>
         </p:nvSpPr>
-        <p:spPr>
-          <a:xfrm>
-            <a:off x="0" y="1152475"/>
-            <a:ext cx="9144000" cy="3416400"/>
-          </a:xfrm>
-        </p:spPr>
-        <p:txBody>
-          <a:bodyPr anchor="ctr">
-            <a:noAutofit/>
-          </a:bodyPr>
-          <a:lstStyle/>
-          <a:p>
-            <a:pPr marL="42863" indent="0" algn="ctr">
-              <a:buNone/>
-            </a:pPr>
-            <a:r>
-              <a:rPr lang="en-US" sz="2000" b="1" dirty="0">
-                <a:solidFill>
-                  <a:schemeClr val="bg1"/>
-                </a:solidFill>
-                <a:hlinkClick r:id="rId3">
-                  <a:extLst>
-                    <a:ext uri="{A12FA001-AC4F-418D-AE19-62706E023703}">
-                      <ahyp:hlinkClr xmlns:ahyp="http://schemas.microsoft.com/office/drawing/2018/hyperlinkcolor" val="tx"/>
-                    </a:ext>
-                  </a:extLst>
-                </a:hlinkClick>
-              </a:rPr>
-              <a:t>https://replit.com/@HylandOutreach/BasicElementsExample</a:t>
-            </a:r>
-            <a:endParaRPr lang="en-US" sz="2000" b="1" dirty="0">
-              <a:solidFill>
-                <a:schemeClr val="bg1"/>
-              </a:solidFill>
-            </a:endParaRPr>
-          </a:p>
-        </p:txBody>
-      </p:sp>
+        <p:spPr/>
+        <p:txBody>
+          <a:bodyPr/>
+          <a:lstStyle/>
+          <a:p>
+            <a:endParaRPr lang="en-US"/>
+          </a:p>
+        </p:txBody>
+      </p:sp>
+      <p:pic>
+        <p:nvPicPr>
+          <p:cNvPr id="5" name="Picture 4">
+            <a:extLst>
+              <a:ext uri="{FF2B5EF4-FFF2-40B4-BE49-F238E27FC236}">
+                <a16:creationId xmlns:a16="http://schemas.microsoft.com/office/drawing/2014/main" id="{D979CF40-F384-27DD-1F49-CE5A4300E2B7}"/>
+              </a:ext>
+            </a:extLst>
+          </p:cNvPr>
+          <p:cNvPicPr>
+            <a:picLocks noChangeAspect="1"/>
+          </p:cNvPicPr>
+          <p:nvPr/>
+        </p:nvPicPr>
+        <p:blipFill>
+          <a:blip r:embed="rId2"/>
+          <a:stretch>
+            <a:fillRect/>
+          </a:stretch>
+        </p:blipFill>
+        <p:spPr>
+          <a:xfrm>
+            <a:off x="394704" y="1018958"/>
+            <a:ext cx="8354591" cy="3105583"/>
+          </a:xfrm>
+          <a:prstGeom prst="rect">
+            <a:avLst/>
+          </a:prstGeom>
+        </p:spPr>
+      </p:pic>
     </p:spTree>
     <p:extLst>
       <p:ext uri="{BB962C8B-B14F-4D97-AF65-F5344CB8AC3E}">
-        <p14:creationId xmlns:p14="http://schemas.microsoft.com/office/powerpoint/2010/main" val="153810681"/>
+        <p14:creationId xmlns:p14="http://schemas.microsoft.com/office/powerpoint/2010/main" val="3348399140"/>
       </p:ext>
     </p:extLst>
   </p:cSld>
@@ -8096,455 +9124,6 @@
   <p:transition>
     <p:fade/>
   </p:transition>
-</p:sld>
-</file>
-
-<file path=ppt/slides/slide7.xml><?xml version="1.0" encoding="utf-8"?>
-<p:sld xmlns:a="http://schemas.openxmlformats.org/drawingml/2006/main" xmlns:r="http://schemas.openxmlformats.org/officeDocument/2006/relationships" xmlns:p="http://schemas.openxmlformats.org/presentationml/2006/main">
-  <p:cSld>
-    <p:spTree>
-      <p:nvGrpSpPr>
-        <p:cNvPr id="1" name="Shape 1502"/>
-        <p:cNvGrpSpPr/>
-        <p:nvPr/>
-      </p:nvGrpSpPr>
-      <p:grpSpPr>
-        <a:xfrm>
-          <a:off x="0" y="0"/>
-          <a:ext cx="0" cy="0"/>
-          <a:chOff x="0" y="0"/>
-          <a:chExt cx="0" cy="0"/>
-        </a:xfrm>
-      </p:grpSpPr>
-      <p:sp>
-        <p:nvSpPr>
-          <p:cNvPr id="1503" name="Google Shape;1503;p54"/>
-          <p:cNvSpPr txBox="1">
-            <a:spLocks noGrp="1"/>
-          </p:cNvSpPr>
-          <p:nvPr>
-            <p:ph type="subTitle" idx="1"/>
-          </p:nvPr>
-        </p:nvSpPr>
-        <p:spPr>
-          <a:xfrm>
-            <a:off x="720000" y="1824225"/>
-            <a:ext cx="5650200" cy="378300"/>
-          </a:xfrm>
-          <a:prstGeom prst="rect">
-            <a:avLst/>
-          </a:prstGeom>
-        </p:spPr>
-        <p:txBody>
-          <a:bodyPr spcFirstLastPara="1" wrap="square" lIns="91425" tIns="91425" rIns="91425" bIns="91425" anchor="t" anchorCtr="0">
-            <a:noAutofit/>
-          </a:bodyPr>
-          <a:lstStyle/>
-          <a:p>
-            <a:pPr marL="0" lvl="0" indent="0" algn="l" rtl="0">
-              <a:spcBef>
-                <a:spcPts val="0"/>
-              </a:spcBef>
-              <a:spcAft>
-                <a:spcPts val="0"/>
-              </a:spcAft>
-              <a:buNone/>
-            </a:pPr>
-            <a:r>
-              <a:rPr lang="en" dirty="0"/>
-              <a:t>DO YOU HAVE ANY QUESTIONS?</a:t>
-            </a:r>
-            <a:endParaRPr dirty="0"/>
-          </a:p>
-        </p:txBody>
-      </p:sp>
-      <p:sp>
-        <p:nvSpPr>
-          <p:cNvPr id="1504" name="Google Shape;1504;p54"/>
-          <p:cNvSpPr txBox="1">
-            <a:spLocks noGrp="1"/>
-          </p:cNvSpPr>
-          <p:nvPr>
-            <p:ph type="ctrTitle"/>
-          </p:nvPr>
-        </p:nvSpPr>
-        <p:spPr>
-          <a:xfrm>
-            <a:off x="720000" y="1049325"/>
-            <a:ext cx="5650200" cy="774900"/>
-          </a:xfrm>
-          <a:prstGeom prst="rect">
-            <a:avLst/>
-          </a:prstGeom>
-        </p:spPr>
-        <p:txBody>
-          <a:bodyPr spcFirstLastPara="1" wrap="square" lIns="91425" tIns="91425" rIns="91425" bIns="91425" anchor="t" anchorCtr="0">
-            <a:noAutofit/>
-          </a:bodyPr>
-          <a:lstStyle/>
-          <a:p>
-            <a:pPr marL="0" lvl="0" indent="0" algn="l" rtl="0">
-              <a:spcBef>
-                <a:spcPts val="0"/>
-              </a:spcBef>
-              <a:spcAft>
-                <a:spcPts val="0"/>
-              </a:spcAft>
-              <a:buNone/>
-            </a:pPr>
-            <a:r>
-              <a:rPr lang="en"/>
-              <a:t>THANKS!</a:t>
-            </a:r>
-            <a:endParaRPr/>
-          </a:p>
-        </p:txBody>
-      </p:sp>
-      <p:sp>
-        <p:nvSpPr>
-          <p:cNvPr id="1542" name="Google Shape;1542;p54"/>
-          <p:cNvSpPr/>
-          <p:nvPr/>
-        </p:nvSpPr>
-        <p:spPr>
-          <a:xfrm>
-            <a:off x="570050" y="3746300"/>
-            <a:ext cx="939600" cy="939600"/>
-          </a:xfrm>
-          <a:prstGeom prst="snip1Rect">
-            <a:avLst>
-              <a:gd name="adj" fmla="val 11329"/>
-            </a:avLst>
-          </a:prstGeom>
-          <a:solidFill>
-            <a:schemeClr val="lt1"/>
-          </a:solidFill>
-          <a:ln w="28575" cap="flat" cmpd="sng">
-            <a:solidFill>
-              <a:schemeClr val="dk1"/>
-            </a:solidFill>
-            <a:prstDash val="solid"/>
-            <a:round/>
-            <a:headEnd type="none" w="sm" len="sm"/>
-            <a:tailEnd type="none" w="sm" len="sm"/>
-          </a:ln>
-        </p:spPr>
-        <p:txBody>
-          <a:bodyPr spcFirstLastPara="1" wrap="square" lIns="91425" tIns="91425" rIns="91425" bIns="91425" anchor="ctr" anchorCtr="0">
-            <a:noAutofit/>
-          </a:bodyPr>
-          <a:lstStyle/>
-          <a:p>
-            <a:pPr marL="0" lvl="0" indent="0" algn="l" rtl="0">
-              <a:spcBef>
-                <a:spcPts val="0"/>
-              </a:spcBef>
-              <a:spcAft>
-                <a:spcPts val="0"/>
-              </a:spcAft>
-              <a:buNone/>
-            </a:pPr>
-            <a:endParaRPr/>
-          </a:p>
-        </p:txBody>
-      </p:sp>
-      <p:sp>
-        <p:nvSpPr>
-          <p:cNvPr id="1543" name="Google Shape;1543;p54"/>
-          <p:cNvSpPr/>
-          <p:nvPr/>
-        </p:nvSpPr>
-        <p:spPr>
-          <a:xfrm>
-            <a:off x="490150" y="3665400"/>
-            <a:ext cx="939600" cy="939600"/>
-          </a:xfrm>
-          <a:prstGeom prst="snip1Rect">
-            <a:avLst>
-              <a:gd name="adj" fmla="val 11329"/>
-            </a:avLst>
-          </a:prstGeom>
-          <a:solidFill>
-            <a:schemeClr val="accent1"/>
-          </a:solidFill>
-          <a:ln w="28575" cap="flat" cmpd="sng">
-            <a:solidFill>
-              <a:schemeClr val="dk1"/>
-            </a:solidFill>
-            <a:prstDash val="solid"/>
-            <a:round/>
-            <a:headEnd type="none" w="sm" len="sm"/>
-            <a:tailEnd type="none" w="sm" len="sm"/>
-          </a:ln>
-        </p:spPr>
-        <p:txBody>
-          <a:bodyPr spcFirstLastPara="1" wrap="square" lIns="91425" tIns="91425" rIns="91425" bIns="91425" anchor="ctr" anchorCtr="0">
-            <a:noAutofit/>
-          </a:bodyPr>
-          <a:lstStyle/>
-          <a:p>
-            <a:pPr marL="0" lvl="0" indent="0" algn="l" rtl="0">
-              <a:spcBef>
-                <a:spcPts val="0"/>
-              </a:spcBef>
-              <a:spcAft>
-                <a:spcPts val="0"/>
-              </a:spcAft>
-              <a:buNone/>
-            </a:pPr>
-            <a:endParaRPr/>
-          </a:p>
-        </p:txBody>
-      </p:sp>
-      <p:sp>
-        <p:nvSpPr>
-          <p:cNvPr id="1544" name="Google Shape;1544;p54"/>
-          <p:cNvSpPr/>
-          <p:nvPr/>
-        </p:nvSpPr>
-        <p:spPr>
-          <a:xfrm>
-            <a:off x="1708675" y="3746300"/>
-            <a:ext cx="939600" cy="939600"/>
-          </a:xfrm>
-          <a:prstGeom prst="snip1Rect">
-            <a:avLst>
-              <a:gd name="adj" fmla="val 11329"/>
-            </a:avLst>
-          </a:prstGeom>
-          <a:solidFill>
-            <a:schemeClr val="lt1"/>
-          </a:solidFill>
-          <a:ln w="28575" cap="flat" cmpd="sng">
-            <a:solidFill>
-              <a:schemeClr val="dk1"/>
-            </a:solidFill>
-            <a:prstDash val="solid"/>
-            <a:round/>
-            <a:headEnd type="none" w="sm" len="sm"/>
-            <a:tailEnd type="none" w="sm" len="sm"/>
-          </a:ln>
-        </p:spPr>
-        <p:txBody>
-          <a:bodyPr spcFirstLastPara="1" wrap="square" lIns="91425" tIns="91425" rIns="91425" bIns="91425" anchor="ctr" anchorCtr="0">
-            <a:noAutofit/>
-          </a:bodyPr>
-          <a:lstStyle/>
-          <a:p>
-            <a:pPr marL="0" lvl="0" indent="0" algn="l" rtl="0">
-              <a:spcBef>
-                <a:spcPts val="0"/>
-              </a:spcBef>
-              <a:spcAft>
-                <a:spcPts val="0"/>
-              </a:spcAft>
-              <a:buNone/>
-            </a:pPr>
-            <a:endParaRPr/>
-          </a:p>
-        </p:txBody>
-      </p:sp>
-      <p:sp>
-        <p:nvSpPr>
-          <p:cNvPr id="1545" name="Google Shape;1545;p54"/>
-          <p:cNvSpPr/>
-          <p:nvPr/>
-        </p:nvSpPr>
-        <p:spPr>
-          <a:xfrm>
-            <a:off x="1628775" y="3665400"/>
-            <a:ext cx="939600" cy="939600"/>
-          </a:xfrm>
-          <a:prstGeom prst="snip1Rect">
-            <a:avLst>
-              <a:gd name="adj" fmla="val 11329"/>
-            </a:avLst>
-          </a:prstGeom>
-          <a:solidFill>
-            <a:schemeClr val="accent2"/>
-          </a:solidFill>
-          <a:ln w="28575" cap="flat" cmpd="sng">
-            <a:solidFill>
-              <a:schemeClr val="dk1"/>
-            </a:solidFill>
-            <a:prstDash val="solid"/>
-            <a:round/>
-            <a:headEnd type="none" w="sm" len="sm"/>
-            <a:tailEnd type="none" w="sm" len="sm"/>
-          </a:ln>
-        </p:spPr>
-        <p:txBody>
-          <a:bodyPr spcFirstLastPara="1" wrap="square" lIns="91425" tIns="91425" rIns="91425" bIns="91425" anchor="ctr" anchorCtr="0">
-            <a:noAutofit/>
-          </a:bodyPr>
-          <a:lstStyle/>
-          <a:p>
-            <a:pPr marL="0" lvl="0" indent="0" algn="l" rtl="0">
-              <a:spcBef>
-                <a:spcPts val="0"/>
-              </a:spcBef>
-              <a:spcAft>
-                <a:spcPts val="0"/>
-              </a:spcAft>
-              <a:buNone/>
-            </a:pPr>
-            <a:endParaRPr/>
-          </a:p>
-        </p:txBody>
-      </p:sp>
-      <p:sp>
-        <p:nvSpPr>
-          <p:cNvPr id="1546" name="Google Shape;1546;p54"/>
-          <p:cNvSpPr/>
-          <p:nvPr/>
-        </p:nvSpPr>
-        <p:spPr>
-          <a:xfrm>
-            <a:off x="2847300" y="3746300"/>
-            <a:ext cx="939600" cy="939600"/>
-          </a:xfrm>
-          <a:prstGeom prst="snip1Rect">
-            <a:avLst>
-              <a:gd name="adj" fmla="val 11329"/>
-            </a:avLst>
-          </a:prstGeom>
-          <a:solidFill>
-            <a:schemeClr val="lt1"/>
-          </a:solidFill>
-          <a:ln w="28575" cap="flat" cmpd="sng">
-            <a:solidFill>
-              <a:schemeClr val="dk1"/>
-            </a:solidFill>
-            <a:prstDash val="solid"/>
-            <a:round/>
-            <a:headEnd type="none" w="sm" len="sm"/>
-            <a:tailEnd type="none" w="sm" len="sm"/>
-          </a:ln>
-        </p:spPr>
-        <p:txBody>
-          <a:bodyPr spcFirstLastPara="1" wrap="square" lIns="91425" tIns="91425" rIns="91425" bIns="91425" anchor="ctr" anchorCtr="0">
-            <a:noAutofit/>
-          </a:bodyPr>
-          <a:lstStyle/>
-          <a:p>
-            <a:pPr marL="0" lvl="0" indent="0" algn="l" rtl="0">
-              <a:spcBef>
-                <a:spcPts val="0"/>
-              </a:spcBef>
-              <a:spcAft>
-                <a:spcPts val="0"/>
-              </a:spcAft>
-              <a:buNone/>
-            </a:pPr>
-            <a:endParaRPr/>
-          </a:p>
-        </p:txBody>
-      </p:sp>
-      <p:sp>
-        <p:nvSpPr>
-          <p:cNvPr id="1547" name="Google Shape;1547;p54"/>
-          <p:cNvSpPr/>
-          <p:nvPr/>
-        </p:nvSpPr>
-        <p:spPr>
-          <a:xfrm>
-            <a:off x="2767400" y="3665400"/>
-            <a:ext cx="939600" cy="939600"/>
-          </a:xfrm>
-          <a:prstGeom prst="snip1Rect">
-            <a:avLst>
-              <a:gd name="adj" fmla="val 11329"/>
-            </a:avLst>
-          </a:prstGeom>
-          <a:solidFill>
-            <a:schemeClr val="lt2"/>
-          </a:solidFill>
-          <a:ln w="28575" cap="flat" cmpd="sng">
-            <a:solidFill>
-              <a:schemeClr val="dk1"/>
-            </a:solidFill>
-            <a:prstDash val="solid"/>
-            <a:round/>
-            <a:headEnd type="none" w="sm" len="sm"/>
-            <a:tailEnd type="none" w="sm" len="sm"/>
-          </a:ln>
-        </p:spPr>
-        <p:txBody>
-          <a:bodyPr spcFirstLastPara="1" wrap="square" lIns="91425" tIns="91425" rIns="91425" bIns="91425" anchor="ctr" anchorCtr="0">
-            <a:noAutofit/>
-          </a:bodyPr>
-          <a:lstStyle/>
-          <a:p>
-            <a:pPr marL="0" lvl="0" indent="0" algn="l" rtl="0">
-              <a:spcBef>
-                <a:spcPts val="0"/>
-              </a:spcBef>
-              <a:spcAft>
-                <a:spcPts val="0"/>
-              </a:spcAft>
-              <a:buNone/>
-            </a:pPr>
-            <a:endParaRPr/>
-          </a:p>
-        </p:txBody>
-      </p:sp>
-      <p:sp>
-        <p:nvSpPr>
-          <p:cNvPr id="4" name="Rectangle 3">
-            <a:extLst>
-              <a:ext uri="{FF2B5EF4-FFF2-40B4-BE49-F238E27FC236}">
-                <a16:creationId xmlns:a16="http://schemas.microsoft.com/office/drawing/2014/main" id="{9694C185-2733-82A6-CD26-B6BB946D14B6}"/>
-              </a:ext>
-            </a:extLst>
-          </p:cNvPr>
-          <p:cNvSpPr/>
-          <p:nvPr/>
-        </p:nvSpPr>
-        <p:spPr>
-          <a:xfrm>
-            <a:off x="4211782" y="3837709"/>
-            <a:ext cx="4253345" cy="477982"/>
-          </a:xfrm>
-          <a:prstGeom prst="rect">
-            <a:avLst/>
-          </a:prstGeom>
-          <a:solidFill>
-            <a:schemeClr val="bg1"/>
-          </a:solidFill>
-          <a:ln>
-            <a:noFill/>
-          </a:ln>
-        </p:spPr>
-        <p:style>
-          <a:lnRef idx="2">
-            <a:schemeClr val="accent1">
-              <a:shade val="50000"/>
-            </a:schemeClr>
-          </a:lnRef>
-          <a:fillRef idx="1">
-            <a:schemeClr val="accent1"/>
-          </a:fillRef>
-          <a:effectRef idx="0">
-            <a:schemeClr val="accent1"/>
-          </a:effectRef>
-          <a:fontRef idx="minor">
-            <a:schemeClr val="lt1"/>
-          </a:fontRef>
-        </p:style>
-        <p:txBody>
-          <a:bodyPr rtlCol="0" anchor="ctr"/>
-          <a:lstStyle/>
-          <a:p>
-            <a:pPr algn="ctr"/>
-            <a:endParaRPr lang="en-US"/>
-          </a:p>
-        </p:txBody>
-      </p:sp>
-    </p:spTree>
-  </p:cSld>
-  <p:clrMapOvr>
-    <a:masterClrMapping/>
-  </p:clrMapOvr>
 </p:sld>
 </file>
 

</xml_diff>

<commit_message>
Update gitbook 2024-08-20 15:46:13
</commit_message>
<xml_diff>
--- a/Week02/BasicHtmlElements.pptx
+++ b/Week02/BasicHtmlElements.pptx
@@ -5,35 +5,36 @@
     <p:sldMasterId id="2147483676" r:id="rId1"/>
   </p:sldMasterIdLst>
   <p:notesMasterIdLst>
-    <p:notesMasterId r:id="rId9"/>
+    <p:notesMasterId r:id="rId10"/>
   </p:notesMasterIdLst>
   <p:sldIdLst>
     <p:sldId id="256" r:id="rId2"/>
-    <p:sldId id="319" r:id="rId3"/>
-    <p:sldId id="320" r:id="rId4"/>
-    <p:sldId id="305" r:id="rId5"/>
-    <p:sldId id="321" r:id="rId6"/>
-    <p:sldId id="322" r:id="rId7"/>
-    <p:sldId id="279" r:id="rId8"/>
+    <p:sldId id="323" r:id="rId3"/>
+    <p:sldId id="319" r:id="rId4"/>
+    <p:sldId id="320" r:id="rId5"/>
+    <p:sldId id="305" r:id="rId6"/>
+    <p:sldId id="321" r:id="rId7"/>
+    <p:sldId id="322" r:id="rId8"/>
+    <p:sldId id="279" r:id="rId9"/>
   </p:sldIdLst>
   <p:sldSz cx="9144000" cy="5143500" type="screen16x9"/>
   <p:notesSz cx="6858000" cy="9144000"/>
   <p:embeddedFontLst>
     <p:embeddedFont>
       <p:font typeface="Consolas" panose="020B0609020204030204" pitchFamily="49" charset="0"/>
-      <p:regular r:id="rId10"/>
-      <p:bold r:id="rId11"/>
-      <p:italic r:id="rId12"/>
-      <p:boldItalic r:id="rId13"/>
+      <p:regular r:id="rId11"/>
+      <p:bold r:id="rId12"/>
+      <p:italic r:id="rId13"/>
+      <p:boldItalic r:id="rId14"/>
     </p:embeddedFont>
     <p:embeddedFont>
       <p:font typeface="Krona One" panose="020B0604020202020204" charset="0"/>
-      <p:regular r:id="rId14"/>
+      <p:regular r:id="rId15"/>
     </p:embeddedFont>
     <p:embeddedFont>
       <p:font typeface="Miriam Libre" panose="00000500000000000000" pitchFamily="2" charset="-79"/>
-      <p:regular r:id="rId15"/>
-      <p:bold r:id="rId16"/>
+      <p:regular r:id="rId16"/>
+      <p:bold r:id="rId17"/>
     </p:embeddedFont>
   </p:embeddedFontLst>
   <p:defaultTextStyle>
@@ -948,7 +949,7 @@
           <a:p>
             <a:fld id="{DEC8F7F9-57EC-49CF-9FCD-2B781E4B449F}" type="slidenum">
               <a:rPr lang="en-US" smtClean="0"/>
-              <a:t>6</a:t>
+              <a:t>7</a:t>
             </a:fld>
             <a:endParaRPr lang="en-US"/>
           </a:p>
@@ -4581,7 +4582,7 @@
           <a:p>
             <a:fld id="{5958763E-B898-436D-883D-03711491D54A}" type="datetimeFigureOut">
               <a:rPr lang="en-US" smtClean="0"/>
-              <a:t>2/8/2023</a:t>
+              <a:t>8/20/2024</a:t>
             </a:fld>
             <a:endParaRPr lang="en-US"/>
           </a:p>
@@ -6332,6 +6333,824 @@
       </p:grpSpPr>
       <p:sp>
         <p:nvSpPr>
+          <p:cNvPr id="2" name="TextBox 1">
+            <a:extLst>
+              <a:ext uri="{FF2B5EF4-FFF2-40B4-BE49-F238E27FC236}">
+                <a16:creationId xmlns:a16="http://schemas.microsoft.com/office/drawing/2014/main" id="{9624852B-234A-0E2C-D790-30CFBBEE89A1}"/>
+              </a:ext>
+            </a:extLst>
+          </p:cNvPr>
+          <p:cNvSpPr txBox="1"/>
+          <p:nvPr/>
+        </p:nvSpPr>
+        <p:spPr>
+          <a:xfrm>
+            <a:off x="504265" y="457201"/>
+            <a:ext cx="7675499" cy="584775"/>
+          </a:xfrm>
+          <a:prstGeom prst="rect">
+            <a:avLst/>
+          </a:prstGeom>
+          <a:noFill/>
+        </p:spPr>
+        <p:txBody>
+          <a:bodyPr wrap="none" rtlCol="0">
+            <a:spAutoFit/>
+          </a:bodyPr>
+          <a:lstStyle/>
+          <a:p>
+            <a:r>
+              <a:rPr lang="en-US" sz="3200" dirty="0">
+                <a:latin typeface="Krona One" panose="020B0604020202020204" charset="0"/>
+              </a:rPr>
+              <a:t>The Fundamental Elements</a:t>
+            </a:r>
+          </a:p>
+        </p:txBody>
+      </p:sp>
+      <p:sp>
+        <p:nvSpPr>
+          <p:cNvPr id="3" name="TextBox 2">
+            <a:extLst>
+              <a:ext uri="{FF2B5EF4-FFF2-40B4-BE49-F238E27FC236}">
+                <a16:creationId xmlns:a16="http://schemas.microsoft.com/office/drawing/2014/main" id="{91C45632-B413-935D-DC82-85FFFAA660E7}"/>
+              </a:ext>
+            </a:extLst>
+          </p:cNvPr>
+          <p:cNvSpPr txBox="1"/>
+          <p:nvPr/>
+        </p:nvSpPr>
+        <p:spPr>
+          <a:xfrm>
+            <a:off x="625289" y="1405218"/>
+            <a:ext cx="3402106" cy="2862322"/>
+          </a:xfrm>
+          <a:prstGeom prst="rect">
+            <a:avLst/>
+          </a:prstGeom>
+          <a:noFill/>
+        </p:spPr>
+        <p:txBody>
+          <a:bodyPr wrap="square" rtlCol="0">
+            <a:spAutoFit/>
+          </a:bodyPr>
+          <a:lstStyle/>
+          <a:p>
+            <a:r>
+              <a:rPr lang="en-US" sz="3600" dirty="0">
+                <a:latin typeface="Consolas" panose="020B0609020204030204" pitchFamily="49" charset="0"/>
+              </a:rPr>
+              <a:t>&lt;html&gt;</a:t>
+            </a:r>
+          </a:p>
+          <a:p>
+            <a:r>
+              <a:rPr lang="en-US" sz="3600" dirty="0">
+                <a:latin typeface="Consolas" panose="020B0609020204030204" pitchFamily="49" charset="0"/>
+              </a:rPr>
+              <a:t>  &lt;body&gt;</a:t>
+            </a:r>
+          </a:p>
+          <a:p>
+            <a:r>
+              <a:rPr lang="en-US" sz="3600" dirty="0">
+                <a:latin typeface="Consolas" panose="020B0609020204030204" pitchFamily="49" charset="0"/>
+              </a:rPr>
+              <a:t>   </a:t>
+            </a:r>
+            <a:r>
+              <a:rPr lang="en-US" sz="2800" dirty="0">
+                <a:solidFill>
+                  <a:schemeClr val="accent5">
+                    <a:lumMod val="75000"/>
+                  </a:schemeClr>
+                </a:solidFill>
+                <a:latin typeface="Consolas" panose="020B0609020204030204" pitchFamily="49" charset="0"/>
+              </a:rPr>
+              <a:t>&lt;..stuff..&gt; </a:t>
+            </a:r>
+            <a:endParaRPr lang="en-US" sz="3600" dirty="0">
+              <a:solidFill>
+                <a:schemeClr val="accent5">
+                  <a:lumMod val="75000"/>
+                </a:schemeClr>
+              </a:solidFill>
+              <a:latin typeface="Consolas" panose="020B0609020204030204" pitchFamily="49" charset="0"/>
+            </a:endParaRPr>
+          </a:p>
+          <a:p>
+            <a:r>
+              <a:rPr lang="en-US" sz="3600" dirty="0">
+                <a:latin typeface="Consolas" panose="020B0609020204030204" pitchFamily="49" charset="0"/>
+              </a:rPr>
+              <a:t>  &lt;/body&gt;</a:t>
+            </a:r>
+          </a:p>
+          <a:p>
+            <a:r>
+              <a:rPr lang="en-US" sz="3600" dirty="0">
+                <a:latin typeface="Consolas" panose="020B0609020204030204" pitchFamily="49" charset="0"/>
+              </a:rPr>
+              <a:t>&lt;html&gt;</a:t>
+            </a:r>
+          </a:p>
+        </p:txBody>
+      </p:sp>
+      <p:cxnSp>
+        <p:nvCxnSpPr>
+          <p:cNvPr id="5" name="Straight Arrow Connector 4">
+            <a:extLst>
+              <a:ext uri="{FF2B5EF4-FFF2-40B4-BE49-F238E27FC236}">
+                <a16:creationId xmlns:a16="http://schemas.microsoft.com/office/drawing/2014/main" id="{64FECE5D-C54A-0FDB-55E3-5D52355EB517}"/>
+              </a:ext>
+            </a:extLst>
+          </p:cNvPr>
+          <p:cNvCxnSpPr/>
+          <p:nvPr/>
+        </p:nvCxnSpPr>
+        <p:spPr>
+          <a:xfrm>
+            <a:off x="2312894" y="1741394"/>
+            <a:ext cx="1714501" cy="0"/>
+          </a:xfrm>
+          <a:prstGeom prst="straightConnector1">
+            <a:avLst/>
+          </a:prstGeom>
+          <a:ln w="38100">
+            <a:tailEnd type="triangle"/>
+          </a:ln>
+        </p:spPr>
+        <p:style>
+          <a:lnRef idx="1">
+            <a:schemeClr val="accent4"/>
+          </a:lnRef>
+          <a:fillRef idx="0">
+            <a:schemeClr val="accent4"/>
+          </a:fillRef>
+          <a:effectRef idx="0">
+            <a:schemeClr val="accent4"/>
+          </a:effectRef>
+          <a:fontRef idx="minor">
+            <a:schemeClr val="tx1"/>
+          </a:fontRef>
+        </p:style>
+      </p:cxnSp>
+      <p:cxnSp>
+        <p:nvCxnSpPr>
+          <p:cNvPr id="7" name="Straight Arrow Connector 6">
+            <a:extLst>
+              <a:ext uri="{FF2B5EF4-FFF2-40B4-BE49-F238E27FC236}">
+                <a16:creationId xmlns:a16="http://schemas.microsoft.com/office/drawing/2014/main" id="{EA92A3F4-2122-4283-B297-751E925337CB}"/>
+              </a:ext>
+            </a:extLst>
+          </p:cNvPr>
+          <p:cNvCxnSpPr/>
+          <p:nvPr/>
+        </p:nvCxnSpPr>
+        <p:spPr>
+          <a:xfrm>
+            <a:off x="2823882" y="2306171"/>
+            <a:ext cx="2070847" cy="0"/>
+          </a:xfrm>
+          <a:prstGeom prst="straightConnector1">
+            <a:avLst/>
+          </a:prstGeom>
+          <a:ln w="38100">
+            <a:tailEnd type="triangle"/>
+          </a:ln>
+        </p:spPr>
+        <p:style>
+          <a:lnRef idx="1">
+            <a:schemeClr val="accent1"/>
+          </a:lnRef>
+          <a:fillRef idx="0">
+            <a:schemeClr val="accent1"/>
+          </a:fillRef>
+          <a:effectRef idx="0">
+            <a:schemeClr val="accent1"/>
+          </a:effectRef>
+          <a:fontRef idx="minor">
+            <a:schemeClr val="tx1"/>
+          </a:fontRef>
+        </p:style>
+      </p:cxnSp>
+      <p:cxnSp>
+        <p:nvCxnSpPr>
+          <p:cNvPr id="9" name="Straight Arrow Connector 8">
+            <a:extLst>
+              <a:ext uri="{FF2B5EF4-FFF2-40B4-BE49-F238E27FC236}">
+                <a16:creationId xmlns:a16="http://schemas.microsoft.com/office/drawing/2014/main" id="{01293593-F517-EED7-DF13-2BBF8A5D37B6}"/>
+              </a:ext>
+            </a:extLst>
+          </p:cNvPr>
+          <p:cNvCxnSpPr/>
+          <p:nvPr/>
+        </p:nvCxnSpPr>
+        <p:spPr>
+          <a:xfrm>
+            <a:off x="3751729" y="2877671"/>
+            <a:ext cx="1822077" cy="0"/>
+          </a:xfrm>
+          <a:prstGeom prst="straightConnector1">
+            <a:avLst/>
+          </a:prstGeom>
+          <a:ln w="38100">
+            <a:tailEnd type="triangle"/>
+          </a:ln>
+        </p:spPr>
+        <p:style>
+          <a:lnRef idx="1">
+            <a:schemeClr val="dk1"/>
+          </a:lnRef>
+          <a:fillRef idx="0">
+            <a:schemeClr val="dk1"/>
+          </a:fillRef>
+          <a:effectRef idx="0">
+            <a:schemeClr val="dk1"/>
+          </a:effectRef>
+          <a:fontRef idx="minor">
+            <a:schemeClr val="tx1"/>
+          </a:fontRef>
+        </p:style>
+      </p:cxnSp>
+      <p:sp>
+        <p:nvSpPr>
+          <p:cNvPr id="10" name="TextBox 9">
+            <a:extLst>
+              <a:ext uri="{FF2B5EF4-FFF2-40B4-BE49-F238E27FC236}">
+                <a16:creationId xmlns:a16="http://schemas.microsoft.com/office/drawing/2014/main" id="{4F82A284-F739-7AD3-9745-02B4B7099EC4}"/>
+              </a:ext>
+            </a:extLst>
+          </p:cNvPr>
+          <p:cNvSpPr txBox="1"/>
+          <p:nvPr/>
+        </p:nvSpPr>
+        <p:spPr>
+          <a:xfrm>
+            <a:off x="4027395" y="1550006"/>
+            <a:ext cx="4491316" cy="338554"/>
+          </a:xfrm>
+          <a:prstGeom prst="rect">
+            <a:avLst/>
+          </a:prstGeom>
+          <a:noFill/>
+        </p:spPr>
+        <p:txBody>
+          <a:bodyPr wrap="square" rtlCol="0">
+            <a:spAutoFit/>
+          </a:bodyPr>
+          <a:lstStyle/>
+          <a:p>
+            <a:r>
+              <a:rPr lang="en-US" sz="1600" dirty="0">
+                <a:latin typeface="Miriam Libre" panose="00000500000000000000" pitchFamily="2" charset="-79"/>
+                <a:cs typeface="Miriam Libre" panose="00000500000000000000" pitchFamily="2" charset="-79"/>
+              </a:rPr>
+              <a:t>“Root” element - contains entire document</a:t>
+            </a:r>
+          </a:p>
+        </p:txBody>
+      </p:sp>
+      <p:sp>
+        <p:nvSpPr>
+          <p:cNvPr id="11" name="TextBox 10">
+            <a:extLst>
+              <a:ext uri="{FF2B5EF4-FFF2-40B4-BE49-F238E27FC236}">
+                <a16:creationId xmlns:a16="http://schemas.microsoft.com/office/drawing/2014/main" id="{1FEC6EFF-7935-96B9-5B53-3E9365A52294}"/>
+              </a:ext>
+            </a:extLst>
+          </p:cNvPr>
+          <p:cNvSpPr txBox="1"/>
+          <p:nvPr/>
+        </p:nvSpPr>
+        <p:spPr>
+          <a:xfrm>
+            <a:off x="4982135" y="2121505"/>
+            <a:ext cx="2649071" cy="338554"/>
+          </a:xfrm>
+          <a:prstGeom prst="rect">
+            <a:avLst/>
+          </a:prstGeom>
+          <a:noFill/>
+        </p:spPr>
+        <p:txBody>
+          <a:bodyPr wrap="square" rtlCol="0">
+            <a:spAutoFit/>
+          </a:bodyPr>
+          <a:lstStyle/>
+          <a:p>
+            <a:r>
+              <a:rPr lang="en-US" sz="1600" dirty="0">
+                <a:latin typeface="Miriam Libre" panose="00000500000000000000" pitchFamily="2" charset="-79"/>
+                <a:cs typeface="Miriam Libre" panose="00000500000000000000" pitchFamily="2" charset="-79"/>
+              </a:rPr>
+              <a:t>HTML content element</a:t>
+            </a:r>
+          </a:p>
+        </p:txBody>
+      </p:sp>
+      <p:sp>
+        <p:nvSpPr>
+          <p:cNvPr id="12" name="TextBox 11">
+            <a:extLst>
+              <a:ext uri="{FF2B5EF4-FFF2-40B4-BE49-F238E27FC236}">
+                <a16:creationId xmlns:a16="http://schemas.microsoft.com/office/drawing/2014/main" id="{96EA66B9-8B31-F92F-17CF-CACD5739B42F}"/>
+              </a:ext>
+            </a:extLst>
+          </p:cNvPr>
+          <p:cNvSpPr txBox="1"/>
+          <p:nvPr/>
+        </p:nvSpPr>
+        <p:spPr>
+          <a:xfrm>
+            <a:off x="5658971" y="2686280"/>
+            <a:ext cx="2731993" cy="338554"/>
+          </a:xfrm>
+          <a:prstGeom prst="rect">
+            <a:avLst/>
+          </a:prstGeom>
+          <a:noFill/>
+        </p:spPr>
+        <p:txBody>
+          <a:bodyPr wrap="square" rtlCol="0">
+            <a:spAutoFit/>
+          </a:bodyPr>
+          <a:lstStyle/>
+          <a:p>
+            <a:r>
+              <a:rPr lang="en-US" sz="1600" dirty="0">
+                <a:latin typeface="Miriam Libre" panose="00000500000000000000" pitchFamily="2" charset="-79"/>
+                <a:cs typeface="Miriam Libre" panose="00000500000000000000" pitchFamily="2" charset="-79"/>
+              </a:rPr>
+              <a:t>Everything that is visible!</a:t>
+            </a:r>
+          </a:p>
+        </p:txBody>
+      </p:sp>
+      <p:sp>
+        <p:nvSpPr>
+          <p:cNvPr id="13" name="Rectangle 12">
+            <a:extLst>
+              <a:ext uri="{FF2B5EF4-FFF2-40B4-BE49-F238E27FC236}">
+                <a16:creationId xmlns:a16="http://schemas.microsoft.com/office/drawing/2014/main" id="{8BC1921F-6671-3934-3AE0-042EF1986F89}"/>
+              </a:ext>
+            </a:extLst>
+          </p:cNvPr>
+          <p:cNvSpPr/>
+          <p:nvPr/>
+        </p:nvSpPr>
+        <p:spPr>
+          <a:xfrm>
+            <a:off x="4027395" y="3381937"/>
+            <a:ext cx="4202205" cy="885603"/>
+          </a:xfrm>
+          <a:prstGeom prst="rect">
+            <a:avLst/>
+          </a:prstGeom>
+        </p:spPr>
+        <p:style>
+          <a:lnRef idx="2">
+            <a:schemeClr val="accent4">
+              <a:shade val="15000"/>
+            </a:schemeClr>
+          </a:lnRef>
+          <a:fillRef idx="1">
+            <a:schemeClr val="accent4"/>
+          </a:fillRef>
+          <a:effectRef idx="0">
+            <a:schemeClr val="accent4"/>
+          </a:effectRef>
+          <a:fontRef idx="minor">
+            <a:schemeClr val="lt1"/>
+          </a:fontRef>
+        </p:style>
+        <p:txBody>
+          <a:bodyPr rtlCol="0" anchor="ctr"/>
+          <a:lstStyle/>
+          <a:p>
+            <a:pPr algn="ctr"/>
+            <a:r>
+              <a:rPr lang="en-US" sz="1800" dirty="0">
+                <a:latin typeface="Miriam Libre" panose="00000500000000000000" pitchFamily="2" charset="-79"/>
+                <a:cs typeface="Miriam Libre" panose="00000500000000000000" pitchFamily="2" charset="-79"/>
+              </a:rPr>
+              <a:t>The code will work without these… but you should add them anyway!</a:t>
+            </a:r>
+          </a:p>
+        </p:txBody>
+      </p:sp>
+    </p:spTree>
+    <p:extLst>
+      <p:ext uri="{BB962C8B-B14F-4D97-AF65-F5344CB8AC3E}">
+        <p14:creationId xmlns:p14="http://schemas.microsoft.com/office/powerpoint/2010/main" val="4012359058"/>
+      </p:ext>
+    </p:extLst>
+  </p:cSld>
+  <p:clrMapOvr>
+    <a:masterClrMapping/>
+  </p:clrMapOvr>
+  <p:timing>
+    <p:tnLst>
+      <p:par>
+        <p:cTn id="1" dur="indefinite" restart="never" nodeType="tmRoot">
+          <p:childTnLst>
+            <p:seq concurrent="1" nextAc="seek">
+              <p:cTn id="2" dur="indefinite" nodeType="mainSeq">
+                <p:childTnLst>
+                  <p:par>
+                    <p:cTn id="3" fill="hold">
+                      <p:stCondLst>
+                        <p:cond delay="indefinite"/>
+                      </p:stCondLst>
+                      <p:childTnLst>
+                        <p:par>
+                          <p:cTn id="4" fill="hold">
+                            <p:stCondLst>
+                              <p:cond delay="0"/>
+                            </p:stCondLst>
+                            <p:childTnLst>
+                              <p:par>
+                                <p:cTn id="5" presetID="22" presetClass="entr" presetSubtype="8" fill="hold" nodeType="clickEffect">
+                                  <p:stCondLst>
+                                    <p:cond delay="0"/>
+                                  </p:stCondLst>
+                                  <p:childTnLst>
+                                    <p:set>
+                                      <p:cBhvr>
+                                        <p:cTn id="6" dur="1" fill="hold">
+                                          <p:stCondLst>
+                                            <p:cond delay="0"/>
+                                          </p:stCondLst>
+                                        </p:cTn>
+                                        <p:tgtEl>
+                                          <p:spTgt spid="5"/>
+                                        </p:tgtEl>
+                                        <p:attrNameLst>
+                                          <p:attrName>style.visibility</p:attrName>
+                                        </p:attrNameLst>
+                                      </p:cBhvr>
+                                      <p:to>
+                                        <p:strVal val="visible"/>
+                                      </p:to>
+                                    </p:set>
+                                    <p:animEffect transition="in" filter="wipe(left)">
+                                      <p:cBhvr>
+                                        <p:cTn id="7" dur="500"/>
+                                        <p:tgtEl>
+                                          <p:spTgt spid="5"/>
+                                        </p:tgtEl>
+                                      </p:cBhvr>
+                                    </p:animEffect>
+                                  </p:childTnLst>
+                                </p:cTn>
+                              </p:par>
+                            </p:childTnLst>
+                          </p:cTn>
+                        </p:par>
+                        <p:par>
+                          <p:cTn id="8" fill="hold">
+                            <p:stCondLst>
+                              <p:cond delay="500"/>
+                            </p:stCondLst>
+                            <p:childTnLst>
+                              <p:par>
+                                <p:cTn id="9" presetID="22" presetClass="entr" presetSubtype="8" fill="hold" grpId="0" nodeType="afterEffect">
+                                  <p:stCondLst>
+                                    <p:cond delay="0"/>
+                                  </p:stCondLst>
+                                  <p:childTnLst>
+                                    <p:set>
+                                      <p:cBhvr>
+                                        <p:cTn id="10" dur="1" fill="hold">
+                                          <p:stCondLst>
+                                            <p:cond delay="0"/>
+                                          </p:stCondLst>
+                                        </p:cTn>
+                                        <p:tgtEl>
+                                          <p:spTgt spid="10"/>
+                                        </p:tgtEl>
+                                        <p:attrNameLst>
+                                          <p:attrName>style.visibility</p:attrName>
+                                        </p:attrNameLst>
+                                      </p:cBhvr>
+                                      <p:to>
+                                        <p:strVal val="visible"/>
+                                      </p:to>
+                                    </p:set>
+                                    <p:animEffect transition="in" filter="wipe(left)">
+                                      <p:cBhvr>
+                                        <p:cTn id="11" dur="500"/>
+                                        <p:tgtEl>
+                                          <p:spTgt spid="10"/>
+                                        </p:tgtEl>
+                                      </p:cBhvr>
+                                    </p:animEffect>
+                                  </p:childTnLst>
+                                </p:cTn>
+                              </p:par>
+                            </p:childTnLst>
+                          </p:cTn>
+                        </p:par>
+                      </p:childTnLst>
+                    </p:cTn>
+                  </p:par>
+                  <p:par>
+                    <p:cTn id="12" fill="hold">
+                      <p:stCondLst>
+                        <p:cond delay="indefinite"/>
+                      </p:stCondLst>
+                      <p:childTnLst>
+                        <p:par>
+                          <p:cTn id="13" fill="hold">
+                            <p:stCondLst>
+                              <p:cond delay="0"/>
+                            </p:stCondLst>
+                            <p:childTnLst>
+                              <p:par>
+                                <p:cTn id="14" presetID="22" presetClass="entr" presetSubtype="8" fill="hold" nodeType="clickEffect">
+                                  <p:stCondLst>
+                                    <p:cond delay="0"/>
+                                  </p:stCondLst>
+                                  <p:childTnLst>
+                                    <p:set>
+                                      <p:cBhvr>
+                                        <p:cTn id="15" dur="1" fill="hold">
+                                          <p:stCondLst>
+                                            <p:cond delay="0"/>
+                                          </p:stCondLst>
+                                        </p:cTn>
+                                        <p:tgtEl>
+                                          <p:spTgt spid="7"/>
+                                        </p:tgtEl>
+                                        <p:attrNameLst>
+                                          <p:attrName>style.visibility</p:attrName>
+                                        </p:attrNameLst>
+                                      </p:cBhvr>
+                                      <p:to>
+                                        <p:strVal val="visible"/>
+                                      </p:to>
+                                    </p:set>
+                                    <p:animEffect transition="in" filter="wipe(left)">
+                                      <p:cBhvr>
+                                        <p:cTn id="16" dur="500"/>
+                                        <p:tgtEl>
+                                          <p:spTgt spid="7"/>
+                                        </p:tgtEl>
+                                      </p:cBhvr>
+                                    </p:animEffect>
+                                  </p:childTnLst>
+                                </p:cTn>
+                              </p:par>
+                            </p:childTnLst>
+                          </p:cTn>
+                        </p:par>
+                        <p:par>
+                          <p:cTn id="17" fill="hold">
+                            <p:stCondLst>
+                              <p:cond delay="500"/>
+                            </p:stCondLst>
+                            <p:childTnLst>
+                              <p:par>
+                                <p:cTn id="18" presetID="22" presetClass="entr" presetSubtype="8" fill="hold" grpId="0" nodeType="afterEffect">
+                                  <p:stCondLst>
+                                    <p:cond delay="0"/>
+                                  </p:stCondLst>
+                                  <p:childTnLst>
+                                    <p:set>
+                                      <p:cBhvr>
+                                        <p:cTn id="19" dur="1" fill="hold">
+                                          <p:stCondLst>
+                                            <p:cond delay="0"/>
+                                          </p:stCondLst>
+                                        </p:cTn>
+                                        <p:tgtEl>
+                                          <p:spTgt spid="11"/>
+                                        </p:tgtEl>
+                                        <p:attrNameLst>
+                                          <p:attrName>style.visibility</p:attrName>
+                                        </p:attrNameLst>
+                                      </p:cBhvr>
+                                      <p:to>
+                                        <p:strVal val="visible"/>
+                                      </p:to>
+                                    </p:set>
+                                    <p:animEffect transition="in" filter="wipe(left)">
+                                      <p:cBhvr>
+                                        <p:cTn id="20" dur="500"/>
+                                        <p:tgtEl>
+                                          <p:spTgt spid="11"/>
+                                        </p:tgtEl>
+                                      </p:cBhvr>
+                                    </p:animEffect>
+                                  </p:childTnLst>
+                                </p:cTn>
+                              </p:par>
+                            </p:childTnLst>
+                          </p:cTn>
+                        </p:par>
+                      </p:childTnLst>
+                    </p:cTn>
+                  </p:par>
+                  <p:par>
+                    <p:cTn id="21" fill="hold">
+                      <p:stCondLst>
+                        <p:cond delay="indefinite"/>
+                      </p:stCondLst>
+                      <p:childTnLst>
+                        <p:par>
+                          <p:cTn id="22" fill="hold">
+                            <p:stCondLst>
+                              <p:cond delay="0"/>
+                            </p:stCondLst>
+                            <p:childTnLst>
+                              <p:par>
+                                <p:cTn id="23" presetID="22" presetClass="entr" presetSubtype="8" fill="hold" nodeType="clickEffect">
+                                  <p:stCondLst>
+                                    <p:cond delay="0"/>
+                                  </p:stCondLst>
+                                  <p:childTnLst>
+                                    <p:set>
+                                      <p:cBhvr>
+                                        <p:cTn id="24" dur="1" fill="hold">
+                                          <p:stCondLst>
+                                            <p:cond delay="0"/>
+                                          </p:stCondLst>
+                                        </p:cTn>
+                                        <p:tgtEl>
+                                          <p:spTgt spid="9"/>
+                                        </p:tgtEl>
+                                        <p:attrNameLst>
+                                          <p:attrName>style.visibility</p:attrName>
+                                        </p:attrNameLst>
+                                      </p:cBhvr>
+                                      <p:to>
+                                        <p:strVal val="visible"/>
+                                      </p:to>
+                                    </p:set>
+                                    <p:animEffect transition="in" filter="wipe(left)">
+                                      <p:cBhvr>
+                                        <p:cTn id="25" dur="500"/>
+                                        <p:tgtEl>
+                                          <p:spTgt spid="9"/>
+                                        </p:tgtEl>
+                                      </p:cBhvr>
+                                    </p:animEffect>
+                                  </p:childTnLst>
+                                </p:cTn>
+                              </p:par>
+                            </p:childTnLst>
+                          </p:cTn>
+                        </p:par>
+                        <p:par>
+                          <p:cTn id="26" fill="hold">
+                            <p:stCondLst>
+                              <p:cond delay="500"/>
+                            </p:stCondLst>
+                            <p:childTnLst>
+                              <p:par>
+                                <p:cTn id="27" presetID="22" presetClass="entr" presetSubtype="8" fill="hold" grpId="0" nodeType="afterEffect">
+                                  <p:stCondLst>
+                                    <p:cond delay="0"/>
+                                  </p:stCondLst>
+                                  <p:childTnLst>
+                                    <p:set>
+                                      <p:cBhvr>
+                                        <p:cTn id="28" dur="1" fill="hold">
+                                          <p:stCondLst>
+                                            <p:cond delay="0"/>
+                                          </p:stCondLst>
+                                        </p:cTn>
+                                        <p:tgtEl>
+                                          <p:spTgt spid="12"/>
+                                        </p:tgtEl>
+                                        <p:attrNameLst>
+                                          <p:attrName>style.visibility</p:attrName>
+                                        </p:attrNameLst>
+                                      </p:cBhvr>
+                                      <p:to>
+                                        <p:strVal val="visible"/>
+                                      </p:to>
+                                    </p:set>
+                                    <p:animEffect transition="in" filter="wipe(left)">
+                                      <p:cBhvr>
+                                        <p:cTn id="29" dur="500"/>
+                                        <p:tgtEl>
+                                          <p:spTgt spid="12"/>
+                                        </p:tgtEl>
+                                      </p:cBhvr>
+                                    </p:animEffect>
+                                  </p:childTnLst>
+                                </p:cTn>
+                              </p:par>
+                            </p:childTnLst>
+                          </p:cTn>
+                        </p:par>
+                      </p:childTnLst>
+                    </p:cTn>
+                  </p:par>
+                  <p:par>
+                    <p:cTn id="30" fill="hold">
+                      <p:stCondLst>
+                        <p:cond delay="indefinite"/>
+                      </p:stCondLst>
+                      <p:childTnLst>
+                        <p:par>
+                          <p:cTn id="31" fill="hold">
+                            <p:stCondLst>
+                              <p:cond delay="0"/>
+                            </p:stCondLst>
+                            <p:childTnLst>
+                              <p:par>
+                                <p:cTn id="32" presetID="10" presetClass="entr" presetSubtype="0" fill="hold" grpId="0" nodeType="clickEffect">
+                                  <p:stCondLst>
+                                    <p:cond delay="0"/>
+                                  </p:stCondLst>
+                                  <p:childTnLst>
+                                    <p:set>
+                                      <p:cBhvr>
+                                        <p:cTn id="33" dur="1" fill="hold">
+                                          <p:stCondLst>
+                                            <p:cond delay="0"/>
+                                          </p:stCondLst>
+                                        </p:cTn>
+                                        <p:tgtEl>
+                                          <p:spTgt spid="13"/>
+                                        </p:tgtEl>
+                                        <p:attrNameLst>
+                                          <p:attrName>style.visibility</p:attrName>
+                                        </p:attrNameLst>
+                                      </p:cBhvr>
+                                      <p:to>
+                                        <p:strVal val="visible"/>
+                                      </p:to>
+                                    </p:set>
+                                    <p:animEffect transition="in" filter="fade">
+                                      <p:cBhvr>
+                                        <p:cTn id="34" dur="500"/>
+                                        <p:tgtEl>
+                                          <p:spTgt spid="13"/>
+                                        </p:tgtEl>
+                                      </p:cBhvr>
+                                    </p:animEffect>
+                                  </p:childTnLst>
+                                </p:cTn>
+                              </p:par>
+                            </p:childTnLst>
+                          </p:cTn>
+                        </p:par>
+                      </p:childTnLst>
+                    </p:cTn>
+                  </p:par>
+                </p:childTnLst>
+              </p:cTn>
+              <p:prevCondLst>
+                <p:cond evt="onPrev" delay="0">
+                  <p:tgtEl>
+                    <p:sldTgt/>
+                  </p:tgtEl>
+                </p:cond>
+              </p:prevCondLst>
+              <p:nextCondLst>
+                <p:cond evt="onNext" delay="0">
+                  <p:tgtEl>
+                    <p:sldTgt/>
+                  </p:tgtEl>
+                </p:cond>
+              </p:nextCondLst>
+            </p:seq>
+          </p:childTnLst>
+        </p:cTn>
+      </p:par>
+    </p:tnLst>
+    <p:bldLst>
+      <p:bldP spid="10" grpId="0"/>
+      <p:bldP spid="11" grpId="0"/>
+      <p:bldP spid="12" grpId="0"/>
+      <p:bldP spid="13" grpId="0" animBg="1"/>
+    </p:bldLst>
+  </p:timing>
+</p:sld>
+</file>
+
+<file path=ppt/slides/slide3.xml><?xml version="1.0" encoding="utf-8"?>
+<p:sld xmlns:a="http://schemas.openxmlformats.org/drawingml/2006/main" xmlns:r="http://schemas.openxmlformats.org/officeDocument/2006/relationships" xmlns:p="http://schemas.openxmlformats.org/presentationml/2006/main">
+  <p:cSld>
+    <p:spTree>
+      <p:nvGrpSpPr>
+        <p:cNvPr id="1" name=""/>
+        <p:cNvGrpSpPr/>
+        <p:nvPr/>
+      </p:nvGrpSpPr>
+      <p:grpSpPr>
+        <a:xfrm>
+          <a:off x="0" y="0"/>
+          <a:ext cx="0" cy="0"/>
+          <a:chOff x="0" y="0"/>
+          <a:chExt cx="0" cy="0"/>
+        </a:xfrm>
+      </p:grpSpPr>
+      <p:sp>
+        <p:nvSpPr>
           <p:cNvPr id="5" name="Rectangle 4">
             <a:extLst>
               <a:ext uri="{FF2B5EF4-FFF2-40B4-BE49-F238E27FC236}">
@@ -6681,401 +7500,6 @@
     <p:extLst>
       <p:ext uri="{BB962C8B-B14F-4D97-AF65-F5344CB8AC3E}">
         <p14:creationId xmlns:p14="http://schemas.microsoft.com/office/powerpoint/2010/main" val="1589075953"/>
-      </p:ext>
-    </p:extLst>
-  </p:cSld>
-  <p:clrMapOvr>
-    <a:masterClrMapping/>
-  </p:clrMapOvr>
-  <p:transition>
-    <p:fade/>
-  </p:transition>
-  <p:timing>
-    <p:tnLst>
-      <p:par>
-        <p:cTn id="1" dur="indefinite" restart="never" nodeType="tmRoot">
-          <p:childTnLst>
-            <p:seq concurrent="1" nextAc="seek">
-              <p:cTn id="2" dur="indefinite" nodeType="mainSeq">
-                <p:childTnLst>
-                  <p:par>
-                    <p:cTn id="3" fill="hold">
-                      <p:stCondLst>
-                        <p:cond delay="indefinite"/>
-                      </p:stCondLst>
-                      <p:childTnLst>
-                        <p:par>
-                          <p:cTn id="4" fill="hold">
-                            <p:stCondLst>
-                              <p:cond delay="0"/>
-                            </p:stCondLst>
-                            <p:childTnLst>
-                              <p:par>
-                                <p:cTn id="5" presetID="10" presetClass="entr" presetSubtype="0" fill="hold" grpId="0" nodeType="clickEffect">
-                                  <p:stCondLst>
-                                    <p:cond delay="0"/>
-                                  </p:stCondLst>
-                                  <p:childTnLst>
-                                    <p:set>
-                                      <p:cBhvr>
-                                        <p:cTn id="6" dur="1" fill="hold">
-                                          <p:stCondLst>
-                                            <p:cond delay="0"/>
-                                          </p:stCondLst>
-                                        </p:cTn>
-                                        <p:tgtEl>
-                                          <p:spTgt spid="4"/>
-                                        </p:tgtEl>
-                                        <p:attrNameLst>
-                                          <p:attrName>style.visibility</p:attrName>
-                                        </p:attrNameLst>
-                                      </p:cBhvr>
-                                      <p:to>
-                                        <p:strVal val="visible"/>
-                                      </p:to>
-                                    </p:set>
-                                    <p:animEffect transition="in" filter="fade">
-                                      <p:cBhvr>
-                                        <p:cTn id="7" dur="500"/>
-                                        <p:tgtEl>
-                                          <p:spTgt spid="4"/>
-                                        </p:tgtEl>
-                                      </p:cBhvr>
-                                    </p:animEffect>
-                                  </p:childTnLst>
-                                </p:cTn>
-                              </p:par>
-                            </p:childTnLst>
-                          </p:cTn>
-                        </p:par>
-                      </p:childTnLst>
-                    </p:cTn>
-                  </p:par>
-                </p:childTnLst>
-              </p:cTn>
-              <p:prevCondLst>
-                <p:cond evt="onPrev" delay="0">
-                  <p:tgtEl>
-                    <p:sldTgt/>
-                  </p:tgtEl>
-                </p:cond>
-              </p:prevCondLst>
-              <p:nextCondLst>
-                <p:cond evt="onNext" delay="0">
-                  <p:tgtEl>
-                    <p:sldTgt/>
-                  </p:tgtEl>
-                </p:cond>
-              </p:nextCondLst>
-            </p:seq>
-          </p:childTnLst>
-        </p:cTn>
-      </p:par>
-    </p:tnLst>
-    <p:bldLst>
-      <p:bldP spid="4" grpId="0"/>
-    </p:bldLst>
-  </p:timing>
-</p:sld>
-</file>
-
-<file path=ppt/slides/slide3.xml><?xml version="1.0" encoding="utf-8"?>
-<p:sld xmlns:a="http://schemas.openxmlformats.org/drawingml/2006/main" xmlns:r="http://schemas.openxmlformats.org/officeDocument/2006/relationships" xmlns:p="http://schemas.openxmlformats.org/presentationml/2006/main">
-  <p:cSld>
-    <p:spTree>
-      <p:nvGrpSpPr>
-        <p:cNvPr id="1" name=""/>
-        <p:cNvGrpSpPr/>
-        <p:nvPr/>
-      </p:nvGrpSpPr>
-      <p:grpSpPr>
-        <a:xfrm>
-          <a:off x="0" y="0"/>
-          <a:ext cx="0" cy="0"/>
-          <a:chOff x="0" y="0"/>
-          <a:chExt cx="0" cy="0"/>
-        </a:xfrm>
-      </p:grpSpPr>
-      <p:sp>
-        <p:nvSpPr>
-          <p:cNvPr id="5" name="Rectangle 4">
-            <a:extLst>
-              <a:ext uri="{FF2B5EF4-FFF2-40B4-BE49-F238E27FC236}">
-                <a16:creationId xmlns:a16="http://schemas.microsoft.com/office/drawing/2014/main" id="{2CE3FFA3-15BD-3901-E2F8-25B2099C9B53}"/>
-              </a:ext>
-            </a:extLst>
-          </p:cNvPr>
-          <p:cNvSpPr/>
-          <p:nvPr/>
-        </p:nvSpPr>
-        <p:spPr>
-          <a:xfrm>
-            <a:off x="285750" y="822960"/>
-            <a:ext cx="8572500" cy="3839095"/>
-          </a:xfrm>
-          <a:prstGeom prst="rect">
-            <a:avLst/>
-          </a:prstGeom>
-          <a:solidFill>
-            <a:schemeClr val="tx1"/>
-          </a:solidFill>
-          <a:ln>
-            <a:solidFill>
-              <a:schemeClr val="tx2"/>
-            </a:solidFill>
-          </a:ln>
-        </p:spPr>
-        <p:style>
-          <a:lnRef idx="2">
-            <a:schemeClr val="accent1">
-              <a:shade val="50000"/>
-            </a:schemeClr>
-          </a:lnRef>
-          <a:fillRef idx="1">
-            <a:schemeClr val="accent1"/>
-          </a:fillRef>
-          <a:effectRef idx="0">
-            <a:schemeClr val="accent1"/>
-          </a:effectRef>
-          <a:fontRef idx="minor">
-            <a:schemeClr val="lt1"/>
-          </a:fontRef>
-        </p:style>
-        <p:txBody>
-          <a:bodyPr rtlCol="0" anchor="ctr"/>
-          <a:lstStyle/>
-          <a:p>
-            <a:pPr algn="ctr"/>
-            <a:endParaRPr lang="en-US"/>
-          </a:p>
-        </p:txBody>
-      </p:sp>
-      <p:sp>
-        <p:nvSpPr>
-          <p:cNvPr id="2" name="Title 1"/>
-          <p:cNvSpPr>
-            <a:spLocks noGrp="1"/>
-          </p:cNvSpPr>
-          <p:nvPr>
-            <p:ph type="title"/>
-          </p:nvPr>
-        </p:nvSpPr>
-        <p:spPr/>
-        <p:txBody>
-          <a:bodyPr anchor="ctr"/>
-          <a:lstStyle/>
-          <a:p>
-            <a:r>
-              <a:rPr lang="en-US" dirty="0">
-                <a:solidFill>
-                  <a:schemeClr val="tx1"/>
-                </a:solidFill>
-              </a:rPr>
-              <a:t>The Paragraph Element</a:t>
-            </a:r>
-          </a:p>
-        </p:txBody>
-      </p:sp>
-      <p:sp>
-        <p:nvSpPr>
-          <p:cNvPr id="3" name="Content Placeholder 2"/>
-          <p:cNvSpPr>
-            <a:spLocks noGrp="1"/>
-          </p:cNvSpPr>
-          <p:nvPr>
-            <p:ph idx="1"/>
-          </p:nvPr>
-        </p:nvSpPr>
-        <p:spPr>
-          <a:xfrm>
-            <a:off x="719999" y="1136072"/>
-            <a:ext cx="7704000" cy="1269757"/>
-          </a:xfrm>
-        </p:spPr>
-        <p:txBody>
-          <a:bodyPr/>
-          <a:lstStyle/>
-          <a:p>
-            <a:pPr>
-              <a:buClr>
-                <a:schemeClr val="bg1"/>
-              </a:buClr>
-            </a:pPr>
-            <a:r>
-              <a:rPr lang="en-US" sz="2000" dirty="0">
-                <a:solidFill>
-                  <a:schemeClr val="bg1"/>
-                </a:solidFill>
-              </a:rPr>
-              <a:t>Displays common text on the page</a:t>
-            </a:r>
-          </a:p>
-          <a:p>
-            <a:pPr lvl="1">
-              <a:buClr>
-                <a:schemeClr val="bg1"/>
-              </a:buClr>
-            </a:pPr>
-            <a:r>
-              <a:rPr lang="en-US" sz="2000" dirty="0">
-                <a:solidFill>
-                  <a:schemeClr val="bg1"/>
-                </a:solidFill>
-              </a:rPr>
-              <a:t>The content does not have to be multiple sentences</a:t>
-            </a:r>
-          </a:p>
-          <a:p>
-            <a:pPr>
-              <a:buClr>
-                <a:schemeClr val="bg1"/>
-              </a:buClr>
-            </a:pPr>
-            <a:r>
-              <a:rPr lang="en-US" sz="2000" dirty="0">
-                <a:solidFill>
-                  <a:schemeClr val="bg1"/>
-                </a:solidFill>
-              </a:rPr>
-              <a:t>Each </a:t>
-            </a:r>
-            <a:r>
-              <a:rPr lang="en-US" sz="2000" b="1" dirty="0">
-                <a:solidFill>
-                  <a:schemeClr val="accent1">
-                    <a:lumMod val="60000"/>
-                    <a:lumOff val="40000"/>
-                  </a:schemeClr>
-                </a:solidFill>
-                <a:latin typeface="Consolas" panose="020B0609020204030204" pitchFamily="49" charset="0"/>
-              </a:rPr>
-              <a:t>&lt;p&gt;&lt;/p&gt;</a:t>
-            </a:r>
-            <a:r>
-              <a:rPr lang="en-US" sz="2000" dirty="0">
-                <a:solidFill>
-                  <a:schemeClr val="bg1"/>
-                </a:solidFill>
-              </a:rPr>
-              <a:t> creates a new line under it</a:t>
-            </a:r>
-            <a:endParaRPr lang="en-US" sz="2000" b="1" dirty="0">
-              <a:solidFill>
-                <a:schemeClr val="accent1">
-                  <a:lumMod val="60000"/>
-                  <a:lumOff val="40000"/>
-                </a:schemeClr>
-              </a:solidFill>
-              <a:latin typeface="Consolas" panose="020B0609020204030204" pitchFamily="49" charset="0"/>
-            </a:endParaRPr>
-          </a:p>
-        </p:txBody>
-      </p:sp>
-      <p:sp>
-        <p:nvSpPr>
-          <p:cNvPr id="4" name="TextBox 3"/>
-          <p:cNvSpPr txBox="1"/>
-          <p:nvPr/>
-        </p:nvSpPr>
-        <p:spPr>
-          <a:xfrm>
-            <a:off x="634383" y="2975264"/>
-            <a:ext cx="7875233" cy="775597"/>
-          </a:xfrm>
-          <a:prstGeom prst="rect">
-            <a:avLst/>
-          </a:prstGeom>
-          <a:noFill/>
-        </p:spPr>
-        <p:txBody>
-          <a:bodyPr wrap="none" lIns="137160" tIns="109728" rIns="137160" bIns="109728" rtlCol="0">
-            <a:spAutoFit/>
-          </a:bodyPr>
-          <a:lstStyle/>
-          <a:p>
-            <a:r>
-              <a:rPr lang="en-US" sz="3600" b="1" dirty="0">
-                <a:solidFill>
-                  <a:srgbClr val="808080"/>
-                </a:solidFill>
-                <a:latin typeface="Consolas" panose="020B0609020204030204" pitchFamily="49" charset="0"/>
-              </a:rPr>
-              <a:t>&lt;</a:t>
-            </a:r>
-            <a:r>
-              <a:rPr lang="en-US" sz="3600" b="1" dirty="0">
-                <a:solidFill>
-                  <a:srgbClr val="569CD6"/>
-                </a:solidFill>
-                <a:latin typeface="Consolas" panose="020B0609020204030204" pitchFamily="49" charset="0"/>
-              </a:rPr>
-              <a:t>p</a:t>
-            </a:r>
-            <a:r>
-              <a:rPr lang="en-US" sz="3600" b="1" dirty="0">
-                <a:solidFill>
-                  <a:srgbClr val="808080"/>
-                </a:solidFill>
-                <a:latin typeface="Consolas" panose="020B0609020204030204" pitchFamily="49" charset="0"/>
-              </a:rPr>
-              <a:t>&gt;</a:t>
-            </a:r>
-            <a:r>
-              <a:rPr lang="en-US" sz="3600" b="1" dirty="0">
-                <a:solidFill>
-                  <a:schemeClr val="bg1"/>
-                </a:solidFill>
-                <a:latin typeface="Consolas" panose="020B0609020204030204" pitchFamily="49" charset="0"/>
-              </a:rPr>
-              <a:t>This will appear normal</a:t>
-            </a:r>
-            <a:r>
-              <a:rPr lang="en-US" sz="3600" b="1" dirty="0">
-                <a:solidFill>
-                  <a:srgbClr val="808080"/>
-                </a:solidFill>
-                <a:latin typeface="Consolas" panose="020B0609020204030204" pitchFamily="49" charset="0"/>
-              </a:rPr>
-              <a:t>&lt;/</a:t>
-            </a:r>
-            <a:r>
-              <a:rPr lang="en-US" sz="3600" b="1" dirty="0">
-                <a:solidFill>
-                  <a:srgbClr val="569CD6"/>
-                </a:solidFill>
-                <a:latin typeface="Consolas" panose="020B0609020204030204" pitchFamily="49" charset="0"/>
-              </a:rPr>
-              <a:t>p</a:t>
-            </a:r>
-            <a:r>
-              <a:rPr lang="en-US" sz="3600" b="1" dirty="0">
-                <a:solidFill>
-                  <a:srgbClr val="808080"/>
-                </a:solidFill>
-                <a:latin typeface="Consolas" panose="020B0609020204030204" pitchFamily="49" charset="0"/>
-              </a:rPr>
-              <a:t>&gt;</a:t>
-            </a:r>
-            <a:endParaRPr lang="en-US" sz="2000" b="1" dirty="0">
-              <a:gradFill>
-                <a:gsLst>
-                  <a:gs pos="2917">
-                    <a:schemeClr val="tx1"/>
-                  </a:gs>
-                  <a:gs pos="30000">
-                    <a:schemeClr val="tx1"/>
-                  </a:gs>
-                </a:gsLst>
-                <a:lin ang="5400000" scaled="0"/>
-              </a:gradFill>
-            </a:endParaRPr>
-          </a:p>
-        </p:txBody>
-      </p:sp>
-    </p:spTree>
-    <p:extLst>
-      <p:ext uri="{BB962C8B-B14F-4D97-AF65-F5344CB8AC3E}">
-        <p14:creationId xmlns:p14="http://schemas.microsoft.com/office/powerpoint/2010/main" val="3519910749"/>
       </p:ext>
     </p:extLst>
   </p:cSld>
@@ -7196,7 +7620,7 @@
           <p:cNvPr id="5" name="Rectangle 4">
             <a:extLst>
               <a:ext uri="{FF2B5EF4-FFF2-40B4-BE49-F238E27FC236}">
-                <a16:creationId xmlns:a16="http://schemas.microsoft.com/office/drawing/2014/main" id="{FCE8C6AD-BD43-04CA-D8C8-389B386D3285}"/>
+                <a16:creationId xmlns:a16="http://schemas.microsoft.com/office/drawing/2014/main" id="{2CE3FFA3-15BD-3901-E2F8-25B2099C9B53}"/>
               </a:ext>
             </a:extLst>
           </p:cNvPr>
@@ -7266,7 +7690,7 @@
                   <a:schemeClr val="tx1"/>
                 </a:solidFill>
               </a:rPr>
-              <a:t>The Hyperlink Element</a:t>
+              <a:t>The Paragraph Element</a:t>
             </a:r>
           </a:p>
         </p:txBody>
@@ -7283,8 +7707,8 @@
         </p:nvSpPr>
         <p:spPr>
           <a:xfrm>
-            <a:off x="285751" y="1152475"/>
-            <a:ext cx="8572500" cy="1549161"/>
+            <a:off x="719999" y="1136072"/>
+            <a:ext cx="7704000" cy="1269757"/>
           </a:xfrm>
         </p:spPr>
         <p:txBody>
@@ -7302,7 +7726,22 @@
                   <a:schemeClr val="bg1"/>
                 </a:solidFill>
               </a:rPr>
-              <a:t>Used to create a link to another page</a:t>
+              <a:t>Displays common text on the page</a:t>
+            </a:r>
+          </a:p>
+          <a:p>
+            <a:pPr lvl="1">
+              <a:buClr>
+                <a:schemeClr val="bg1"/>
+              </a:buClr>
+            </a:pPr>
+            <a:r>
+              <a:rPr lang="en-US" sz="2000" dirty="0">
+                <a:solidFill>
+                  <a:schemeClr val="bg1"/>
+                </a:solidFill>
+              </a:rPr>
+              <a:t>The content does not have to be multiple sentences</a:t>
             </a:r>
           </a:p>
           <a:p>
@@ -7317,10 +7756,10 @@
                   <a:schemeClr val="bg1"/>
                 </a:solidFill>
               </a:rPr>
-              <a:t>Set the </a:t>
+              <a:t>Each </a:t>
             </a:r>
             <a:r>
-              <a:rPr lang="en-US" sz="2000" b="1" dirty="0" err="1">
+              <a:rPr lang="en-US" sz="2000" b="1" dirty="0">
                 <a:solidFill>
                   <a:schemeClr val="accent1">
                     <a:lumMod val="60000"/>
@@ -7329,7 +7768,7 @@
                 </a:solidFill>
                 <a:latin typeface="Consolas" panose="020B0609020204030204" pitchFamily="49" charset="0"/>
               </a:rPr>
-              <a:t>href</a:t>
+              <a:t>&lt;p&gt;&lt;/p&gt;</a:t>
             </a:r>
             <a:r>
               <a:rPr lang="en-US" sz="2000" dirty="0">
@@ -7337,23 +7776,17 @@
                   <a:schemeClr val="bg1"/>
                 </a:solidFill>
               </a:rPr>
-              <a:t> to a URL</a:t>
+              <a:t> creates a new line under it</a:t>
             </a:r>
-          </a:p>
-          <a:p>
-            <a:pPr>
-              <a:buClr>
-                <a:schemeClr val="bg1"/>
-              </a:buClr>
-            </a:pPr>
-            <a:r>
-              <a:rPr lang="en-US" sz="2000" dirty="0">
-                <a:solidFill>
-                  <a:schemeClr val="bg1"/>
-                </a:solidFill>
-              </a:rPr>
-              <a:t>The text of the link goes in between the opening and closing tag</a:t>
-            </a:r>
+            <a:endParaRPr lang="en-US" sz="2000" b="1" dirty="0">
+              <a:solidFill>
+                <a:schemeClr val="accent1">
+                  <a:lumMod val="60000"/>
+                  <a:lumOff val="40000"/>
+                </a:schemeClr>
+              </a:solidFill>
+              <a:latin typeface="Consolas" panose="020B0609020204030204" pitchFamily="49" charset="0"/>
+            </a:endParaRPr>
           </a:p>
         </p:txBody>
       </p:sp>
@@ -7365,8 +7798,8 @@
         </p:nvSpPr>
         <p:spPr>
           <a:xfrm>
-            <a:off x="279298" y="3257550"/>
-            <a:ext cx="8529258" cy="683264"/>
+            <a:off x="634383" y="2975264"/>
+            <a:ext cx="7875233" cy="775597"/>
           </a:xfrm>
           <a:prstGeom prst="rect">
             <a:avLst/>
@@ -7380,7 +7813,7 @@
           <a:lstStyle/>
           <a:p>
             <a:r>
-              <a:rPr lang="en-US" sz="3000" b="1" dirty="0">
+              <a:rPr lang="en-US" sz="3600" b="1" dirty="0">
                 <a:solidFill>
                   <a:srgbClr val="808080"/>
                 </a:solidFill>
@@ -7389,52 +7822,16 @@
               <a:t>&lt;</a:t>
             </a:r>
             <a:r>
-              <a:rPr lang="en-US" sz="3000" b="1" dirty="0">
+              <a:rPr lang="en-US" sz="3600" b="1" dirty="0">
                 <a:solidFill>
                   <a:srgbClr val="569CD6"/>
                 </a:solidFill>
                 <a:latin typeface="Consolas" panose="020B0609020204030204" pitchFamily="49" charset="0"/>
               </a:rPr>
-              <a:t>a</a:t>
+              <a:t>p</a:t>
             </a:r>
             <a:r>
-              <a:rPr lang="en-US" sz="3000" b="1" dirty="0">
-                <a:solidFill>
-                  <a:srgbClr val="D4D4D4"/>
-                </a:solidFill>
-                <a:latin typeface="Consolas" panose="020B0609020204030204" pitchFamily="49" charset="0"/>
-              </a:rPr>
-              <a:t> </a:t>
-            </a:r>
-            <a:r>
-              <a:rPr lang="en-US" sz="3000" b="1" dirty="0" err="1">
-                <a:solidFill>
-                  <a:srgbClr val="9CDCFE"/>
-                </a:solidFill>
-                <a:latin typeface="Consolas" panose="020B0609020204030204" pitchFamily="49" charset="0"/>
-              </a:rPr>
-              <a:t>href</a:t>
-            </a:r>
-            <a:r>
-              <a:rPr lang="en-US" sz="3000" b="1" dirty="0">
-                <a:solidFill>
-                  <a:srgbClr val="D4D4D4"/>
-                </a:solidFill>
-                <a:latin typeface="Consolas" panose="020B0609020204030204" pitchFamily="49" charset="0"/>
-              </a:rPr>
-              <a:t>=</a:t>
-            </a:r>
-            <a:r>
-              <a:rPr lang="en-US" sz="3000" b="1" dirty="0">
-                <a:solidFill>
-                  <a:srgbClr val="CE9178"/>
-                </a:solidFill>
-                <a:latin typeface="Consolas" panose="020B0609020204030204" pitchFamily="49" charset="0"/>
-              </a:rPr>
-              <a:t>"https://google.com"</a:t>
-            </a:r>
-            <a:r>
-              <a:rPr lang="en-US" sz="3000" b="1" dirty="0">
+              <a:rPr lang="en-US" sz="3600" b="1" dirty="0">
                 <a:solidFill>
                   <a:srgbClr val="808080"/>
                 </a:solidFill>
@@ -7443,16 +7840,16 @@
               <a:t>&gt;</a:t>
             </a:r>
             <a:r>
-              <a:rPr lang="en-US" sz="3000" b="1" dirty="0">
+              <a:rPr lang="en-US" sz="3600" b="1" dirty="0">
                 <a:solidFill>
                   <a:schemeClr val="bg1"/>
                 </a:solidFill>
                 <a:latin typeface="Consolas" panose="020B0609020204030204" pitchFamily="49" charset="0"/>
               </a:rPr>
-              <a:t>Google</a:t>
+              <a:t>This will appear normal</a:t>
             </a:r>
             <a:r>
-              <a:rPr lang="en-US" sz="3000" b="1" dirty="0">
+              <a:rPr lang="en-US" sz="3600" b="1" dirty="0">
                 <a:solidFill>
                   <a:srgbClr val="808080"/>
                 </a:solidFill>
@@ -7461,16 +7858,16 @@
               <a:t>&lt;/</a:t>
             </a:r>
             <a:r>
-              <a:rPr lang="en-US" sz="3000" b="1" dirty="0">
+              <a:rPr lang="en-US" sz="3600" b="1" dirty="0">
                 <a:solidFill>
                   <a:srgbClr val="569CD6"/>
                 </a:solidFill>
                 <a:latin typeface="Consolas" panose="020B0609020204030204" pitchFamily="49" charset="0"/>
               </a:rPr>
-              <a:t>a</a:t>
+              <a:t>p</a:t>
             </a:r>
             <a:r>
-              <a:rPr lang="en-US" sz="3000" b="1" dirty="0">
+              <a:rPr lang="en-US" sz="3600" b="1" dirty="0">
                 <a:solidFill>
                   <a:srgbClr val="808080"/>
                 </a:solidFill>
@@ -7478,11 +7875,18 @@
               </a:rPr>
               <a:t>&gt;</a:t>
             </a:r>
-            <a:endParaRPr lang="en-US" sz="3000" b="1" dirty="0">
-              <a:solidFill>
-                <a:srgbClr val="D4D4D4"/>
-              </a:solidFill>
-              <a:latin typeface="Consolas" panose="020B0609020204030204" pitchFamily="49" charset="0"/>
+            <a:endParaRPr lang="en-US" sz="2000" b="1" dirty="0">
+              <a:gradFill>
+                <a:gsLst>
+                  <a:gs pos="2917">
+                    <a:schemeClr val="tx1"/>
+                  </a:gs>
+                  <a:gs pos="30000">
+                    <a:schemeClr val="tx1"/>
+                  </a:gs>
+                </a:gsLst>
+                <a:lin ang="5400000" scaled="0"/>
+              </a:gradFill>
             </a:endParaRPr>
           </a:p>
         </p:txBody>
@@ -7490,7 +7894,7 @@
     </p:spTree>
     <p:extLst>
       <p:ext uri="{BB962C8B-B14F-4D97-AF65-F5344CB8AC3E}">
-        <p14:creationId xmlns:p14="http://schemas.microsoft.com/office/powerpoint/2010/main" val="1987866754"/>
+        <p14:creationId xmlns:p14="http://schemas.microsoft.com/office/powerpoint/2010/main" val="3519910749"/>
       </p:ext>
     </p:extLst>
   </p:cSld>
@@ -7611,7 +8015,7 @@
           <p:cNvPr id="5" name="Rectangle 4">
             <a:extLst>
               <a:ext uri="{FF2B5EF4-FFF2-40B4-BE49-F238E27FC236}">
-                <a16:creationId xmlns:a16="http://schemas.microsoft.com/office/drawing/2014/main" id="{02DE89CA-A60D-1CBA-419F-E45ECDC38EAE}"/>
+                <a16:creationId xmlns:a16="http://schemas.microsoft.com/office/drawing/2014/main" id="{FCE8C6AD-BD43-04CA-D8C8-389B386D3285}"/>
               </a:ext>
             </a:extLst>
           </p:cNvPr>
@@ -7620,7 +8024,7 @@
         </p:nvSpPr>
         <p:spPr>
           <a:xfrm>
-            <a:off x="303784" y="822960"/>
+            <a:off x="285750" y="822960"/>
             <a:ext cx="8572500" cy="3839095"/>
           </a:xfrm>
           <a:prstGeom prst="rect">
@@ -7681,7 +8085,7 @@
                   <a:schemeClr val="tx1"/>
                 </a:solidFill>
               </a:rPr>
-              <a:t>The Image Element</a:t>
+              <a:t>The Hyperlink Element</a:t>
             </a:r>
           </a:p>
         </p:txBody>
@@ -7698,20 +8102,13 @@
         </p:nvSpPr>
         <p:spPr>
           <a:xfrm>
-            <a:off x="285750" y="857250"/>
-            <a:ext cx="8572500" cy="1800225"/>
+            <a:off x="285751" y="1152475"/>
+            <a:ext cx="8572500" cy="1549161"/>
           </a:xfrm>
         </p:spPr>
         <p:txBody>
           <a:bodyPr/>
           <a:lstStyle/>
-          <a:p>
-            <a:endParaRPr lang="en-US" dirty="0">
-              <a:solidFill>
-                <a:schemeClr val="bg1"/>
-              </a:solidFill>
-            </a:endParaRPr>
-          </a:p>
           <a:p>
             <a:pPr>
               <a:buClr>
@@ -7719,12 +8116,12 @@
               </a:buClr>
             </a:pPr>
             <a:r>
-              <a:rPr lang="en-US" sz="2400" dirty="0">
+              <a:rPr lang="en-US" sz="2000" dirty="0">
                 <a:solidFill>
                   <a:schemeClr val="bg1"/>
                 </a:solidFill>
               </a:rPr>
-              <a:t>Used to display an image</a:t>
+              <a:t>Used to create a link to another page</a:t>
             </a:r>
           </a:p>
           <a:p>
@@ -7734,7 +8131,7 @@
               </a:buClr>
             </a:pPr>
             <a:r>
-              <a:rPr lang="en-US" sz="2400" dirty="0">
+              <a:rPr lang="en-US" sz="2000" dirty="0">
                 <a:solidFill>
                   <a:schemeClr val="bg1"/>
                 </a:solidFill>
@@ -7742,7 +8139,7 @@
               <a:t>Set the </a:t>
             </a:r>
             <a:r>
-              <a:rPr lang="en-US" sz="2400" b="1" dirty="0" err="1">
+              <a:rPr lang="en-US" sz="2000" b="1" dirty="0" err="1">
                 <a:solidFill>
                   <a:schemeClr val="accent1">
                     <a:lumMod val="60000"/>
@@ -7751,10 +8148,10 @@
                 </a:solidFill>
                 <a:latin typeface="Consolas" panose="020B0609020204030204" pitchFamily="49" charset="0"/>
               </a:rPr>
-              <a:t>src</a:t>
+              <a:t>href</a:t>
             </a:r>
             <a:r>
-              <a:rPr lang="en-US" sz="2400" dirty="0">
+              <a:rPr lang="en-US" sz="2000" dirty="0">
                 <a:solidFill>
                   <a:schemeClr val="bg1"/>
                 </a:solidFill>
@@ -7769,20 +8166,12 @@
               </a:buClr>
             </a:pPr>
             <a:r>
-              <a:rPr lang="en-US" sz="2400" dirty="0">
+              <a:rPr lang="en-US" sz="2000" dirty="0">
                 <a:solidFill>
                   <a:schemeClr val="bg1"/>
                 </a:solidFill>
               </a:rPr>
-              <a:t>This element has no closing tag – it is </a:t>
-            </a:r>
-            <a:r>
-              <a:rPr lang="en-US" sz="2400" b="1" i="1" dirty="0">
-                <a:solidFill>
-                  <a:schemeClr val="bg1"/>
-                </a:solidFill>
-              </a:rPr>
-              <a:t>self-closing</a:t>
+              <a:t>The text of the link goes in between the opening and closing tag</a:t>
             </a:r>
           </a:p>
         </p:txBody>
@@ -7795,8 +8184,8 @@
         </p:nvSpPr>
         <p:spPr>
           <a:xfrm>
-            <a:off x="159494" y="3257550"/>
-            <a:ext cx="8861080" cy="637097"/>
+            <a:off x="279298" y="3257550"/>
+            <a:ext cx="8529258" cy="683264"/>
           </a:xfrm>
           <a:prstGeom prst="rect">
             <a:avLst/>
@@ -7810,7 +8199,7 @@
           <a:lstStyle/>
           <a:p>
             <a:r>
-              <a:rPr lang="en-US" sz="2700" b="1" dirty="0">
+              <a:rPr lang="en-US" sz="3000" b="1" dirty="0">
                 <a:solidFill>
                   <a:srgbClr val="808080"/>
                 </a:solidFill>
@@ -7819,16 +8208,16 @@
               <a:t>&lt;</a:t>
             </a:r>
             <a:r>
-              <a:rPr lang="en-US" sz="2700" b="1" dirty="0" err="1">
+              <a:rPr lang="en-US" sz="3000" b="1" dirty="0">
                 <a:solidFill>
                   <a:srgbClr val="569CD6"/>
                 </a:solidFill>
                 <a:latin typeface="Consolas" panose="020B0609020204030204" pitchFamily="49" charset="0"/>
               </a:rPr>
-              <a:t>img</a:t>
+              <a:t>a</a:t>
             </a:r>
             <a:r>
-              <a:rPr lang="en-US" sz="2700" b="1" dirty="0">
+              <a:rPr lang="en-US" sz="3000" b="1" dirty="0">
                 <a:solidFill>
                   <a:srgbClr val="D4D4D4"/>
                 </a:solidFill>
@@ -7837,16 +8226,16 @@
               <a:t> </a:t>
             </a:r>
             <a:r>
-              <a:rPr lang="en-US" sz="2700" b="1" dirty="0" err="1">
+              <a:rPr lang="en-US" sz="3000" b="1" dirty="0" err="1">
                 <a:solidFill>
                   <a:srgbClr val="9CDCFE"/>
                 </a:solidFill>
                 <a:latin typeface="Consolas" panose="020B0609020204030204" pitchFamily="49" charset="0"/>
               </a:rPr>
-              <a:t>src</a:t>
+              <a:t>href</a:t>
             </a:r>
             <a:r>
-              <a:rPr lang="en-US" sz="2700" b="1" dirty="0">
+              <a:rPr lang="en-US" sz="3000" b="1" dirty="0">
                 <a:solidFill>
                   <a:srgbClr val="D4D4D4"/>
                 </a:solidFill>
@@ -7855,33 +8244,60 @@
               <a:t>=</a:t>
             </a:r>
             <a:r>
-              <a:rPr lang="en-US" sz="2700" b="1" dirty="0">
+              <a:rPr lang="en-US" sz="3000" b="1" dirty="0">
                 <a:solidFill>
                   <a:srgbClr val="CE9178"/>
                 </a:solidFill>
                 <a:latin typeface="Consolas" panose="020B0609020204030204" pitchFamily="49" charset="0"/>
               </a:rPr>
-              <a:t>"https://i.imgur.com/GfT5Z9R.png"</a:t>
+              <a:t>"https://google.com"</a:t>
             </a:r>
             <a:r>
-              <a:rPr lang="en-US" sz="2700" b="1" dirty="0">
-                <a:solidFill>
-                  <a:srgbClr val="D4D4D4"/>
-                </a:solidFill>
-                <a:latin typeface="Consolas" panose="020B0609020204030204" pitchFamily="49" charset="0"/>
-              </a:rPr>
-              <a:t> </a:t>
-            </a:r>
-            <a:r>
-              <a:rPr lang="en-US" sz="2700" b="1" dirty="0">
+              <a:rPr lang="en-US" sz="3000" b="1" dirty="0">
                 <a:solidFill>
                   <a:srgbClr val="808080"/>
                 </a:solidFill>
                 <a:latin typeface="Consolas" panose="020B0609020204030204" pitchFamily="49" charset="0"/>
               </a:rPr>
-              <a:t>/&gt;</a:t>
+              <a:t>&gt;</a:t>
             </a:r>
-            <a:endParaRPr lang="en-US" sz="2700" b="1" dirty="0">
+            <a:r>
+              <a:rPr lang="en-US" sz="3000" b="1" dirty="0">
+                <a:solidFill>
+                  <a:schemeClr val="bg1"/>
+                </a:solidFill>
+                <a:latin typeface="Consolas" panose="020B0609020204030204" pitchFamily="49" charset="0"/>
+              </a:rPr>
+              <a:t>Google</a:t>
+            </a:r>
+            <a:r>
+              <a:rPr lang="en-US" sz="3000" b="1" dirty="0">
+                <a:solidFill>
+                  <a:srgbClr val="808080"/>
+                </a:solidFill>
+                <a:latin typeface="Consolas" panose="020B0609020204030204" pitchFamily="49" charset="0"/>
+              </a:rPr>
+              <a:t>&lt;/</a:t>
+            </a:r>
+            <a:r>
+              <a:rPr lang="en-US" sz="3000" b="1" dirty="0">
+                <a:solidFill>
+                  <a:srgbClr val="569CD6"/>
+                </a:solidFill>
+                <a:latin typeface="Consolas" panose="020B0609020204030204" pitchFamily="49" charset="0"/>
+              </a:rPr>
+              <a:t>a</a:t>
+            </a:r>
+            <a:r>
+              <a:rPr lang="en-US" sz="3000" b="1" dirty="0">
+                <a:solidFill>
+                  <a:srgbClr val="808080"/>
+                </a:solidFill>
+                <a:latin typeface="Consolas" panose="020B0609020204030204" pitchFamily="49" charset="0"/>
+              </a:rPr>
+              <a:t>&gt;</a:t>
+            </a:r>
+            <a:endParaRPr lang="en-US" sz="3000" b="1" dirty="0">
               <a:solidFill>
                 <a:srgbClr val="D4D4D4"/>
               </a:solidFill>
@@ -7893,7 +8309,7 @@
     </p:spTree>
     <p:extLst>
       <p:ext uri="{BB962C8B-B14F-4D97-AF65-F5344CB8AC3E}">
-        <p14:creationId xmlns:p14="http://schemas.microsoft.com/office/powerpoint/2010/main" val="1344415121"/>
+        <p14:creationId xmlns:p14="http://schemas.microsoft.com/office/powerpoint/2010/main" val="1987866754"/>
       </p:ext>
     </p:extLst>
   </p:cSld>
@@ -8011,6 +8427,409 @@
       </p:grpSpPr>
       <p:sp>
         <p:nvSpPr>
+          <p:cNvPr id="5" name="Rectangle 4">
+            <a:extLst>
+              <a:ext uri="{FF2B5EF4-FFF2-40B4-BE49-F238E27FC236}">
+                <a16:creationId xmlns:a16="http://schemas.microsoft.com/office/drawing/2014/main" id="{02DE89CA-A60D-1CBA-419F-E45ECDC38EAE}"/>
+              </a:ext>
+            </a:extLst>
+          </p:cNvPr>
+          <p:cNvSpPr/>
+          <p:nvPr/>
+        </p:nvSpPr>
+        <p:spPr>
+          <a:xfrm>
+            <a:off x="303784" y="822960"/>
+            <a:ext cx="8572500" cy="3839095"/>
+          </a:xfrm>
+          <a:prstGeom prst="rect">
+            <a:avLst/>
+          </a:prstGeom>
+          <a:solidFill>
+            <a:schemeClr val="tx1"/>
+          </a:solidFill>
+          <a:ln>
+            <a:solidFill>
+              <a:schemeClr val="tx2"/>
+            </a:solidFill>
+          </a:ln>
+        </p:spPr>
+        <p:style>
+          <a:lnRef idx="2">
+            <a:schemeClr val="accent1">
+              <a:shade val="50000"/>
+            </a:schemeClr>
+          </a:lnRef>
+          <a:fillRef idx="1">
+            <a:schemeClr val="accent1"/>
+          </a:fillRef>
+          <a:effectRef idx="0">
+            <a:schemeClr val="accent1"/>
+          </a:effectRef>
+          <a:fontRef idx="minor">
+            <a:schemeClr val="lt1"/>
+          </a:fontRef>
+        </p:style>
+        <p:txBody>
+          <a:bodyPr rtlCol="0" anchor="ctr"/>
+          <a:lstStyle/>
+          <a:p>
+            <a:pPr algn="ctr"/>
+            <a:endParaRPr lang="en-US"/>
+          </a:p>
+        </p:txBody>
+      </p:sp>
+      <p:sp>
+        <p:nvSpPr>
+          <p:cNvPr id="2" name="Title 1"/>
+          <p:cNvSpPr>
+            <a:spLocks noGrp="1"/>
+          </p:cNvSpPr>
+          <p:nvPr>
+            <p:ph type="title"/>
+          </p:nvPr>
+        </p:nvSpPr>
+        <p:spPr/>
+        <p:txBody>
+          <a:bodyPr anchor="ctr"/>
+          <a:lstStyle/>
+          <a:p>
+            <a:r>
+              <a:rPr lang="en-US" dirty="0">
+                <a:solidFill>
+                  <a:schemeClr val="tx1"/>
+                </a:solidFill>
+              </a:rPr>
+              <a:t>The Image Element</a:t>
+            </a:r>
+          </a:p>
+        </p:txBody>
+      </p:sp>
+      <p:sp>
+        <p:nvSpPr>
+          <p:cNvPr id="3" name="Content Placeholder 2"/>
+          <p:cNvSpPr>
+            <a:spLocks noGrp="1"/>
+          </p:cNvSpPr>
+          <p:nvPr>
+            <p:ph idx="1"/>
+          </p:nvPr>
+        </p:nvSpPr>
+        <p:spPr>
+          <a:xfrm>
+            <a:off x="285750" y="857250"/>
+            <a:ext cx="8572500" cy="1800225"/>
+          </a:xfrm>
+        </p:spPr>
+        <p:txBody>
+          <a:bodyPr/>
+          <a:lstStyle/>
+          <a:p>
+            <a:endParaRPr lang="en-US" dirty="0">
+              <a:solidFill>
+                <a:schemeClr val="bg1"/>
+              </a:solidFill>
+            </a:endParaRPr>
+          </a:p>
+          <a:p>
+            <a:pPr>
+              <a:buClr>
+                <a:schemeClr val="bg1"/>
+              </a:buClr>
+            </a:pPr>
+            <a:r>
+              <a:rPr lang="en-US" sz="2400" dirty="0">
+                <a:solidFill>
+                  <a:schemeClr val="bg1"/>
+                </a:solidFill>
+              </a:rPr>
+              <a:t>Used to display an image</a:t>
+            </a:r>
+          </a:p>
+          <a:p>
+            <a:pPr>
+              <a:buClr>
+                <a:schemeClr val="bg1"/>
+              </a:buClr>
+            </a:pPr>
+            <a:r>
+              <a:rPr lang="en-US" sz="2400" dirty="0">
+                <a:solidFill>
+                  <a:schemeClr val="bg1"/>
+                </a:solidFill>
+              </a:rPr>
+              <a:t>Set the </a:t>
+            </a:r>
+            <a:r>
+              <a:rPr lang="en-US" sz="2400" b="1" dirty="0" err="1">
+                <a:solidFill>
+                  <a:schemeClr val="accent1">
+                    <a:lumMod val="60000"/>
+                    <a:lumOff val="40000"/>
+                  </a:schemeClr>
+                </a:solidFill>
+                <a:latin typeface="Consolas" panose="020B0609020204030204" pitchFamily="49" charset="0"/>
+              </a:rPr>
+              <a:t>src</a:t>
+            </a:r>
+            <a:r>
+              <a:rPr lang="en-US" sz="2400" dirty="0">
+                <a:solidFill>
+                  <a:schemeClr val="bg1"/>
+                </a:solidFill>
+              </a:rPr>
+              <a:t> to a URL</a:t>
+            </a:r>
+          </a:p>
+          <a:p>
+            <a:pPr>
+              <a:buClr>
+                <a:schemeClr val="bg1"/>
+              </a:buClr>
+            </a:pPr>
+            <a:r>
+              <a:rPr lang="en-US" sz="2400" dirty="0">
+                <a:solidFill>
+                  <a:schemeClr val="bg1"/>
+                </a:solidFill>
+              </a:rPr>
+              <a:t>This element has no closing tag – it is </a:t>
+            </a:r>
+            <a:r>
+              <a:rPr lang="en-US" sz="2400" b="1" i="1" dirty="0">
+                <a:solidFill>
+                  <a:schemeClr val="bg1"/>
+                </a:solidFill>
+              </a:rPr>
+              <a:t>self-closing</a:t>
+            </a:r>
+          </a:p>
+        </p:txBody>
+      </p:sp>
+      <p:sp>
+        <p:nvSpPr>
+          <p:cNvPr id="4" name="TextBox 3"/>
+          <p:cNvSpPr txBox="1"/>
+          <p:nvPr/>
+        </p:nvSpPr>
+        <p:spPr>
+          <a:xfrm>
+            <a:off x="159494" y="3257550"/>
+            <a:ext cx="8861080" cy="637097"/>
+          </a:xfrm>
+          <a:prstGeom prst="rect">
+            <a:avLst/>
+          </a:prstGeom>
+          <a:noFill/>
+        </p:spPr>
+        <p:txBody>
+          <a:bodyPr wrap="none" lIns="137160" tIns="109728" rIns="137160" bIns="109728" rtlCol="0">
+            <a:spAutoFit/>
+          </a:bodyPr>
+          <a:lstStyle/>
+          <a:p>
+            <a:r>
+              <a:rPr lang="en-US" sz="2700" b="1" dirty="0">
+                <a:solidFill>
+                  <a:srgbClr val="808080"/>
+                </a:solidFill>
+                <a:latin typeface="Consolas" panose="020B0609020204030204" pitchFamily="49" charset="0"/>
+              </a:rPr>
+              <a:t>&lt;</a:t>
+            </a:r>
+            <a:r>
+              <a:rPr lang="en-US" sz="2700" b="1" dirty="0" err="1">
+                <a:solidFill>
+                  <a:srgbClr val="569CD6"/>
+                </a:solidFill>
+                <a:latin typeface="Consolas" panose="020B0609020204030204" pitchFamily="49" charset="0"/>
+              </a:rPr>
+              <a:t>img</a:t>
+            </a:r>
+            <a:r>
+              <a:rPr lang="en-US" sz="2700" b="1" dirty="0">
+                <a:solidFill>
+                  <a:srgbClr val="D4D4D4"/>
+                </a:solidFill>
+                <a:latin typeface="Consolas" panose="020B0609020204030204" pitchFamily="49" charset="0"/>
+              </a:rPr>
+              <a:t> </a:t>
+            </a:r>
+            <a:r>
+              <a:rPr lang="en-US" sz="2700" b="1" dirty="0" err="1">
+                <a:solidFill>
+                  <a:srgbClr val="9CDCFE"/>
+                </a:solidFill>
+                <a:latin typeface="Consolas" panose="020B0609020204030204" pitchFamily="49" charset="0"/>
+              </a:rPr>
+              <a:t>src</a:t>
+            </a:r>
+            <a:r>
+              <a:rPr lang="en-US" sz="2700" b="1" dirty="0">
+                <a:solidFill>
+                  <a:srgbClr val="D4D4D4"/>
+                </a:solidFill>
+                <a:latin typeface="Consolas" panose="020B0609020204030204" pitchFamily="49" charset="0"/>
+              </a:rPr>
+              <a:t>=</a:t>
+            </a:r>
+            <a:r>
+              <a:rPr lang="en-US" sz="2700" b="1" dirty="0">
+                <a:solidFill>
+                  <a:srgbClr val="CE9178"/>
+                </a:solidFill>
+                <a:latin typeface="Consolas" panose="020B0609020204030204" pitchFamily="49" charset="0"/>
+              </a:rPr>
+              <a:t>"https://i.imgur.com/GfT5Z9R.png"</a:t>
+            </a:r>
+            <a:r>
+              <a:rPr lang="en-US" sz="2700" b="1" dirty="0">
+                <a:solidFill>
+                  <a:srgbClr val="D4D4D4"/>
+                </a:solidFill>
+                <a:latin typeface="Consolas" panose="020B0609020204030204" pitchFamily="49" charset="0"/>
+              </a:rPr>
+              <a:t> </a:t>
+            </a:r>
+            <a:r>
+              <a:rPr lang="en-US" sz="2700" b="1" dirty="0">
+                <a:solidFill>
+                  <a:srgbClr val="808080"/>
+                </a:solidFill>
+                <a:latin typeface="Consolas" panose="020B0609020204030204" pitchFamily="49" charset="0"/>
+              </a:rPr>
+              <a:t>/&gt;</a:t>
+            </a:r>
+            <a:endParaRPr lang="en-US" sz="2700" b="1" dirty="0">
+              <a:solidFill>
+                <a:srgbClr val="D4D4D4"/>
+              </a:solidFill>
+              <a:latin typeface="Consolas" panose="020B0609020204030204" pitchFamily="49" charset="0"/>
+            </a:endParaRPr>
+          </a:p>
+        </p:txBody>
+      </p:sp>
+    </p:spTree>
+    <p:extLst>
+      <p:ext uri="{BB962C8B-B14F-4D97-AF65-F5344CB8AC3E}">
+        <p14:creationId xmlns:p14="http://schemas.microsoft.com/office/powerpoint/2010/main" val="1344415121"/>
+      </p:ext>
+    </p:extLst>
+  </p:cSld>
+  <p:clrMapOvr>
+    <a:masterClrMapping/>
+  </p:clrMapOvr>
+  <p:transition>
+    <p:fade/>
+  </p:transition>
+  <p:timing>
+    <p:tnLst>
+      <p:par>
+        <p:cTn id="1" dur="indefinite" restart="never" nodeType="tmRoot">
+          <p:childTnLst>
+            <p:seq concurrent="1" nextAc="seek">
+              <p:cTn id="2" dur="indefinite" nodeType="mainSeq">
+                <p:childTnLst>
+                  <p:par>
+                    <p:cTn id="3" fill="hold">
+                      <p:stCondLst>
+                        <p:cond delay="indefinite"/>
+                      </p:stCondLst>
+                      <p:childTnLst>
+                        <p:par>
+                          <p:cTn id="4" fill="hold">
+                            <p:stCondLst>
+                              <p:cond delay="0"/>
+                            </p:stCondLst>
+                            <p:childTnLst>
+                              <p:par>
+                                <p:cTn id="5" presetID="10" presetClass="entr" presetSubtype="0" fill="hold" grpId="0" nodeType="clickEffect">
+                                  <p:stCondLst>
+                                    <p:cond delay="0"/>
+                                  </p:stCondLst>
+                                  <p:childTnLst>
+                                    <p:set>
+                                      <p:cBhvr>
+                                        <p:cTn id="6" dur="1" fill="hold">
+                                          <p:stCondLst>
+                                            <p:cond delay="0"/>
+                                          </p:stCondLst>
+                                        </p:cTn>
+                                        <p:tgtEl>
+                                          <p:spTgt spid="4"/>
+                                        </p:tgtEl>
+                                        <p:attrNameLst>
+                                          <p:attrName>style.visibility</p:attrName>
+                                        </p:attrNameLst>
+                                      </p:cBhvr>
+                                      <p:to>
+                                        <p:strVal val="visible"/>
+                                      </p:to>
+                                    </p:set>
+                                    <p:animEffect transition="in" filter="fade">
+                                      <p:cBhvr>
+                                        <p:cTn id="7" dur="500"/>
+                                        <p:tgtEl>
+                                          <p:spTgt spid="4"/>
+                                        </p:tgtEl>
+                                      </p:cBhvr>
+                                    </p:animEffect>
+                                  </p:childTnLst>
+                                </p:cTn>
+                              </p:par>
+                            </p:childTnLst>
+                          </p:cTn>
+                        </p:par>
+                      </p:childTnLst>
+                    </p:cTn>
+                  </p:par>
+                </p:childTnLst>
+              </p:cTn>
+              <p:prevCondLst>
+                <p:cond evt="onPrev" delay="0">
+                  <p:tgtEl>
+                    <p:sldTgt/>
+                  </p:tgtEl>
+                </p:cond>
+              </p:prevCondLst>
+              <p:nextCondLst>
+                <p:cond evt="onNext" delay="0">
+                  <p:tgtEl>
+                    <p:sldTgt/>
+                  </p:tgtEl>
+                </p:cond>
+              </p:nextCondLst>
+            </p:seq>
+          </p:childTnLst>
+        </p:cTn>
+      </p:par>
+    </p:tnLst>
+    <p:bldLst>
+      <p:bldP spid="4" grpId="0"/>
+    </p:bldLst>
+  </p:timing>
+</p:sld>
+</file>
+
+<file path=ppt/slides/slide7.xml><?xml version="1.0" encoding="utf-8"?>
+<p:sld xmlns:a="http://schemas.openxmlformats.org/drawingml/2006/main" xmlns:r="http://schemas.openxmlformats.org/officeDocument/2006/relationships" xmlns:p="http://schemas.openxmlformats.org/presentationml/2006/main">
+  <p:cSld>
+    <p:spTree>
+      <p:nvGrpSpPr>
+        <p:cNvPr id="1" name=""/>
+        <p:cNvGrpSpPr/>
+        <p:nvPr/>
+      </p:nvGrpSpPr>
+      <p:grpSpPr>
+        <a:xfrm>
+          <a:off x="0" y="0"/>
+          <a:ext cx="0" cy="0"/>
+          <a:chOff x="0" y="0"/>
+          <a:chExt cx="0" cy="0"/>
+        </a:xfrm>
+      </p:grpSpPr>
+      <p:sp>
+        <p:nvSpPr>
           <p:cNvPr id="2" name="Title 1"/>
           <p:cNvSpPr>
             <a:spLocks noGrp="1"/>
@@ -8099,7 +8918,7 @@
 </p:sld>
 </file>
 
-<file path=ppt/slides/slide7.xml><?xml version="1.0" encoding="utf-8"?>
+<file path=ppt/slides/slide8.xml><?xml version="1.0" encoding="utf-8"?>
 <p:sld xmlns:a="http://schemas.openxmlformats.org/drawingml/2006/main" xmlns:r="http://schemas.openxmlformats.org/officeDocument/2006/relationships" xmlns:p="http://schemas.openxmlformats.org/presentationml/2006/main">
   <p:cSld>
     <p:spTree>

</xml_diff>

<commit_message>
Update gitbook 2024-08-21 13:31:00
</commit_message>
<xml_diff>
--- a/Week02/BasicHtmlElements.pptx
+++ b/Week02/BasicHtmlElements.pptx
@@ -5,36 +5,40 @@
     <p:sldMasterId id="2147483676" r:id="rId1"/>
   </p:sldMasterIdLst>
   <p:notesMasterIdLst>
-    <p:notesMasterId r:id="rId10"/>
+    <p:notesMasterId r:id="rId14"/>
   </p:notesMasterIdLst>
   <p:sldIdLst>
     <p:sldId id="256" r:id="rId2"/>
     <p:sldId id="323" r:id="rId3"/>
     <p:sldId id="319" r:id="rId4"/>
-    <p:sldId id="320" r:id="rId5"/>
-    <p:sldId id="305" r:id="rId6"/>
-    <p:sldId id="321" r:id="rId7"/>
-    <p:sldId id="322" r:id="rId8"/>
-    <p:sldId id="279" r:id="rId9"/>
+    <p:sldId id="324" r:id="rId5"/>
+    <p:sldId id="320" r:id="rId6"/>
+    <p:sldId id="325" r:id="rId7"/>
+    <p:sldId id="305" r:id="rId8"/>
+    <p:sldId id="326" r:id="rId9"/>
+    <p:sldId id="321" r:id="rId10"/>
+    <p:sldId id="327" r:id="rId11"/>
+    <p:sldId id="322" r:id="rId12"/>
+    <p:sldId id="279" r:id="rId13"/>
   </p:sldIdLst>
   <p:sldSz cx="9144000" cy="5143500" type="screen16x9"/>
   <p:notesSz cx="6858000" cy="9144000"/>
   <p:embeddedFontLst>
     <p:embeddedFont>
       <p:font typeface="Consolas" panose="020B0609020204030204" pitchFamily="49" charset="0"/>
-      <p:regular r:id="rId11"/>
-      <p:bold r:id="rId12"/>
-      <p:italic r:id="rId13"/>
-      <p:boldItalic r:id="rId14"/>
+      <p:regular r:id="rId15"/>
+      <p:bold r:id="rId16"/>
+      <p:italic r:id="rId17"/>
+      <p:boldItalic r:id="rId18"/>
     </p:embeddedFont>
     <p:embeddedFont>
       <p:font typeface="Krona One" panose="020B0604020202020204" charset="0"/>
-      <p:regular r:id="rId15"/>
+      <p:regular r:id="rId19"/>
     </p:embeddedFont>
     <p:embeddedFont>
       <p:font typeface="Miriam Libre" panose="00000500000000000000" pitchFamily="2" charset="-79"/>
-      <p:regular r:id="rId16"/>
-      <p:bold r:id="rId17"/>
+      <p:regular r:id="rId20"/>
+      <p:bold r:id="rId21"/>
     </p:embeddedFont>
   </p:embeddedFontLst>
   <p:defaultTextStyle>
@@ -949,7 +953,7 @@
           <a:p>
             <a:fld id="{DEC8F7F9-57EC-49CF-9FCD-2B781E4B449F}" type="slidenum">
               <a:rPr lang="en-US" smtClean="0"/>
-              <a:t>7</a:t>
+              <a:t>11</a:t>
             </a:fld>
             <a:endParaRPr lang="en-US"/>
           </a:p>
@@ -4582,7 +4586,7 @@
           <a:p>
             <a:fld id="{5958763E-B898-436D-883D-03711491D54A}" type="datetimeFigureOut">
               <a:rPr lang="en-US" smtClean="0"/>
-              <a:t>8/20/2024</a:t>
+              <a:t>8/21/2024</a:t>
             </a:fld>
             <a:endParaRPr lang="en-US"/>
           </a:p>
@@ -6314,6 +6318,683 @@
 </p:sld>
 </file>
 
+<file path=ppt/slides/slide10.xml><?xml version="1.0" encoding="utf-8"?>
+<p:sld xmlns:a="http://schemas.openxmlformats.org/drawingml/2006/main" xmlns:r="http://schemas.openxmlformats.org/officeDocument/2006/relationships" xmlns:p="http://schemas.openxmlformats.org/presentationml/2006/main">
+  <p:cSld>
+    <p:spTree>
+      <p:nvGrpSpPr>
+        <p:cNvPr id="1" name=""/>
+        <p:cNvGrpSpPr/>
+        <p:nvPr/>
+      </p:nvGrpSpPr>
+      <p:grpSpPr>
+        <a:xfrm>
+          <a:off x="0" y="0"/>
+          <a:ext cx="0" cy="0"/>
+          <a:chOff x="0" y="0"/>
+          <a:chExt cx="0" cy="0"/>
+        </a:xfrm>
+      </p:grpSpPr>
+      <p:sp>
+        <p:nvSpPr>
+          <p:cNvPr id="2" name="Title 1">
+            <a:extLst>
+              <a:ext uri="{FF2B5EF4-FFF2-40B4-BE49-F238E27FC236}">
+                <a16:creationId xmlns:a16="http://schemas.microsoft.com/office/drawing/2014/main" id="{084F45A1-788D-79E8-5CFC-B30C74075F16}"/>
+              </a:ext>
+            </a:extLst>
+          </p:cNvPr>
+          <p:cNvSpPr>
+            <a:spLocks noGrp="1"/>
+          </p:cNvSpPr>
+          <p:nvPr>
+            <p:ph type="title"/>
+          </p:nvPr>
+        </p:nvSpPr>
+        <p:spPr/>
+        <p:txBody>
+          <a:bodyPr/>
+          <a:lstStyle/>
+          <a:p>
+            <a:r>
+              <a:rPr lang="en-US" dirty="0">
+                <a:solidFill>
+                  <a:schemeClr val="tx1"/>
+                </a:solidFill>
+              </a:rPr>
+              <a:t>The Image Element</a:t>
+            </a:r>
+            <a:endParaRPr lang="en-US" dirty="0"/>
+          </a:p>
+        </p:txBody>
+      </p:sp>
+      <p:sp>
+        <p:nvSpPr>
+          <p:cNvPr id="3" name="Content Placeholder 2">
+            <a:extLst>
+              <a:ext uri="{FF2B5EF4-FFF2-40B4-BE49-F238E27FC236}">
+                <a16:creationId xmlns:a16="http://schemas.microsoft.com/office/drawing/2014/main" id="{F120EFF6-C771-F22E-7094-EE536E73E827}"/>
+              </a:ext>
+            </a:extLst>
+          </p:cNvPr>
+          <p:cNvSpPr>
+            <a:spLocks noGrp="1"/>
+          </p:cNvSpPr>
+          <p:nvPr>
+            <p:ph idx="1"/>
+          </p:nvPr>
+        </p:nvSpPr>
+        <p:spPr/>
+        <p:txBody>
+          <a:bodyPr/>
+          <a:lstStyle/>
+          <a:p>
+            <a:endParaRPr lang="en-US"/>
+          </a:p>
+        </p:txBody>
+      </p:sp>
+      <p:pic>
+        <p:nvPicPr>
+          <p:cNvPr id="5" name="Picture 4">
+            <a:extLst>
+              <a:ext uri="{FF2B5EF4-FFF2-40B4-BE49-F238E27FC236}">
+                <a16:creationId xmlns:a16="http://schemas.microsoft.com/office/drawing/2014/main" id="{D979CF40-F384-27DD-1F49-CE5A4300E2B7}"/>
+              </a:ext>
+            </a:extLst>
+          </p:cNvPr>
+          <p:cNvPicPr>
+            <a:picLocks noChangeAspect="1"/>
+          </p:cNvPicPr>
+          <p:nvPr/>
+        </p:nvPicPr>
+        <p:blipFill>
+          <a:blip r:embed="rId2"/>
+          <a:stretch>
+            <a:fillRect/>
+          </a:stretch>
+        </p:blipFill>
+        <p:spPr>
+          <a:xfrm>
+            <a:off x="394704" y="1018958"/>
+            <a:ext cx="8354591" cy="3105583"/>
+          </a:xfrm>
+          <a:prstGeom prst="rect">
+            <a:avLst/>
+          </a:prstGeom>
+        </p:spPr>
+      </p:pic>
+    </p:spTree>
+    <p:extLst>
+      <p:ext uri="{BB962C8B-B14F-4D97-AF65-F5344CB8AC3E}">
+        <p14:creationId xmlns:p14="http://schemas.microsoft.com/office/powerpoint/2010/main" val="3348399140"/>
+      </p:ext>
+    </p:extLst>
+  </p:cSld>
+  <p:clrMapOvr>
+    <a:masterClrMapping/>
+  </p:clrMapOvr>
+  <p:transition>
+    <p:fade/>
+  </p:transition>
+</p:sld>
+</file>
+
+<file path=ppt/slides/slide11.xml><?xml version="1.0" encoding="utf-8"?>
+<p:sld xmlns:a="http://schemas.openxmlformats.org/drawingml/2006/main" xmlns:r="http://schemas.openxmlformats.org/officeDocument/2006/relationships" xmlns:p="http://schemas.openxmlformats.org/presentationml/2006/main">
+  <p:cSld>
+    <p:spTree>
+      <p:nvGrpSpPr>
+        <p:cNvPr id="1" name=""/>
+        <p:cNvGrpSpPr/>
+        <p:nvPr/>
+      </p:nvGrpSpPr>
+      <p:grpSpPr>
+        <a:xfrm>
+          <a:off x="0" y="0"/>
+          <a:ext cx="0" cy="0"/>
+          <a:chOff x="0" y="0"/>
+          <a:chExt cx="0" cy="0"/>
+        </a:xfrm>
+      </p:grpSpPr>
+      <p:sp>
+        <p:nvSpPr>
+          <p:cNvPr id="2" name="Title 1"/>
+          <p:cNvSpPr>
+            <a:spLocks noGrp="1"/>
+          </p:cNvSpPr>
+          <p:nvPr>
+            <p:ph type="title"/>
+          </p:nvPr>
+        </p:nvSpPr>
+        <p:spPr/>
+        <p:txBody>
+          <a:bodyPr anchor="ctr"/>
+          <a:lstStyle/>
+          <a:p>
+            <a:r>
+              <a:rPr lang="en-US" dirty="0">
+                <a:solidFill>
+                  <a:schemeClr val="tx1"/>
+                </a:solidFill>
+              </a:rPr>
+              <a:t>Example</a:t>
+            </a:r>
+          </a:p>
+        </p:txBody>
+      </p:sp>
+      <p:sp>
+        <p:nvSpPr>
+          <p:cNvPr id="3" name="Content Placeholder 2"/>
+          <p:cNvSpPr>
+            <a:spLocks noGrp="1"/>
+          </p:cNvSpPr>
+          <p:nvPr>
+            <p:ph idx="1"/>
+          </p:nvPr>
+        </p:nvSpPr>
+        <p:spPr>
+          <a:xfrm>
+            <a:off x="0" y="1152475"/>
+            <a:ext cx="9144000" cy="3416400"/>
+          </a:xfrm>
+        </p:spPr>
+        <p:txBody>
+          <a:bodyPr anchor="ctr">
+            <a:noAutofit/>
+          </a:bodyPr>
+          <a:lstStyle/>
+          <a:p>
+            <a:pPr marL="42863" indent="0" algn="ctr">
+              <a:buNone/>
+            </a:pPr>
+            <a:r>
+              <a:rPr lang="en-US" sz="2000" b="1" dirty="0">
+                <a:solidFill>
+                  <a:schemeClr val="bg1"/>
+                </a:solidFill>
+                <a:hlinkClick r:id="rId3">
+                  <a:extLst>
+                    <a:ext uri="{A12FA001-AC4F-418D-AE19-62706E023703}">
+                      <ahyp:hlinkClr xmlns:ahyp="http://schemas.microsoft.com/office/drawing/2018/hyperlinkcolor" val="tx"/>
+                    </a:ext>
+                  </a:extLst>
+                </a:hlinkClick>
+              </a:rPr>
+              <a:t>https://replit.com/@HylandOutreach/BasicElementsExample</a:t>
+            </a:r>
+            <a:endParaRPr lang="en-US" sz="2000" b="1" dirty="0">
+              <a:solidFill>
+                <a:schemeClr val="bg1"/>
+              </a:solidFill>
+            </a:endParaRPr>
+          </a:p>
+        </p:txBody>
+      </p:sp>
+    </p:spTree>
+    <p:extLst>
+      <p:ext uri="{BB962C8B-B14F-4D97-AF65-F5344CB8AC3E}">
+        <p14:creationId xmlns:p14="http://schemas.microsoft.com/office/powerpoint/2010/main" val="153810681"/>
+      </p:ext>
+    </p:extLst>
+  </p:cSld>
+  <p:clrMapOvr>
+    <a:masterClrMapping/>
+  </p:clrMapOvr>
+  <p:transition>
+    <p:fade/>
+  </p:transition>
+</p:sld>
+</file>
+
+<file path=ppt/slides/slide12.xml><?xml version="1.0" encoding="utf-8"?>
+<p:sld xmlns:a="http://schemas.openxmlformats.org/drawingml/2006/main" xmlns:r="http://schemas.openxmlformats.org/officeDocument/2006/relationships" xmlns:p="http://schemas.openxmlformats.org/presentationml/2006/main">
+  <p:cSld>
+    <p:spTree>
+      <p:nvGrpSpPr>
+        <p:cNvPr id="1" name="Shape 1502"/>
+        <p:cNvGrpSpPr/>
+        <p:nvPr/>
+      </p:nvGrpSpPr>
+      <p:grpSpPr>
+        <a:xfrm>
+          <a:off x="0" y="0"/>
+          <a:ext cx="0" cy="0"/>
+          <a:chOff x="0" y="0"/>
+          <a:chExt cx="0" cy="0"/>
+        </a:xfrm>
+      </p:grpSpPr>
+      <p:sp>
+        <p:nvSpPr>
+          <p:cNvPr id="1503" name="Google Shape;1503;p54"/>
+          <p:cNvSpPr txBox="1">
+            <a:spLocks noGrp="1"/>
+          </p:cNvSpPr>
+          <p:nvPr>
+            <p:ph type="subTitle" idx="1"/>
+          </p:nvPr>
+        </p:nvSpPr>
+        <p:spPr>
+          <a:xfrm>
+            <a:off x="720000" y="1824225"/>
+            <a:ext cx="5650200" cy="378300"/>
+          </a:xfrm>
+          <a:prstGeom prst="rect">
+            <a:avLst/>
+          </a:prstGeom>
+        </p:spPr>
+        <p:txBody>
+          <a:bodyPr spcFirstLastPara="1" wrap="square" lIns="91425" tIns="91425" rIns="91425" bIns="91425" anchor="t" anchorCtr="0">
+            <a:noAutofit/>
+          </a:bodyPr>
+          <a:lstStyle/>
+          <a:p>
+            <a:pPr marL="0" lvl="0" indent="0" algn="l" rtl="0">
+              <a:spcBef>
+                <a:spcPts val="0"/>
+              </a:spcBef>
+              <a:spcAft>
+                <a:spcPts val="0"/>
+              </a:spcAft>
+              <a:buNone/>
+            </a:pPr>
+            <a:r>
+              <a:rPr lang="en" dirty="0"/>
+              <a:t>DO YOU HAVE ANY QUESTIONS?</a:t>
+            </a:r>
+            <a:endParaRPr dirty="0"/>
+          </a:p>
+        </p:txBody>
+      </p:sp>
+      <p:sp>
+        <p:nvSpPr>
+          <p:cNvPr id="1504" name="Google Shape;1504;p54"/>
+          <p:cNvSpPr txBox="1">
+            <a:spLocks noGrp="1"/>
+          </p:cNvSpPr>
+          <p:nvPr>
+            <p:ph type="ctrTitle"/>
+          </p:nvPr>
+        </p:nvSpPr>
+        <p:spPr>
+          <a:xfrm>
+            <a:off x="720000" y="1049325"/>
+            <a:ext cx="5650200" cy="774900"/>
+          </a:xfrm>
+          <a:prstGeom prst="rect">
+            <a:avLst/>
+          </a:prstGeom>
+        </p:spPr>
+        <p:txBody>
+          <a:bodyPr spcFirstLastPara="1" wrap="square" lIns="91425" tIns="91425" rIns="91425" bIns="91425" anchor="t" anchorCtr="0">
+            <a:noAutofit/>
+          </a:bodyPr>
+          <a:lstStyle/>
+          <a:p>
+            <a:pPr marL="0" lvl="0" indent="0" algn="l" rtl="0">
+              <a:spcBef>
+                <a:spcPts val="0"/>
+              </a:spcBef>
+              <a:spcAft>
+                <a:spcPts val="0"/>
+              </a:spcAft>
+              <a:buNone/>
+            </a:pPr>
+            <a:r>
+              <a:rPr lang="en"/>
+              <a:t>THANKS!</a:t>
+            </a:r>
+            <a:endParaRPr/>
+          </a:p>
+        </p:txBody>
+      </p:sp>
+      <p:sp>
+        <p:nvSpPr>
+          <p:cNvPr id="1542" name="Google Shape;1542;p54"/>
+          <p:cNvSpPr/>
+          <p:nvPr/>
+        </p:nvSpPr>
+        <p:spPr>
+          <a:xfrm>
+            <a:off x="570050" y="3746300"/>
+            <a:ext cx="939600" cy="939600"/>
+          </a:xfrm>
+          <a:prstGeom prst="snip1Rect">
+            <a:avLst>
+              <a:gd name="adj" fmla="val 11329"/>
+            </a:avLst>
+          </a:prstGeom>
+          <a:solidFill>
+            <a:schemeClr val="lt1"/>
+          </a:solidFill>
+          <a:ln w="28575" cap="flat" cmpd="sng">
+            <a:solidFill>
+              <a:schemeClr val="dk1"/>
+            </a:solidFill>
+            <a:prstDash val="solid"/>
+            <a:round/>
+            <a:headEnd type="none" w="sm" len="sm"/>
+            <a:tailEnd type="none" w="sm" len="sm"/>
+          </a:ln>
+        </p:spPr>
+        <p:txBody>
+          <a:bodyPr spcFirstLastPara="1" wrap="square" lIns="91425" tIns="91425" rIns="91425" bIns="91425" anchor="ctr" anchorCtr="0">
+            <a:noAutofit/>
+          </a:bodyPr>
+          <a:lstStyle/>
+          <a:p>
+            <a:pPr marL="0" lvl="0" indent="0" algn="l" rtl="0">
+              <a:spcBef>
+                <a:spcPts val="0"/>
+              </a:spcBef>
+              <a:spcAft>
+                <a:spcPts val="0"/>
+              </a:spcAft>
+              <a:buNone/>
+            </a:pPr>
+            <a:endParaRPr/>
+          </a:p>
+        </p:txBody>
+      </p:sp>
+      <p:sp>
+        <p:nvSpPr>
+          <p:cNvPr id="1543" name="Google Shape;1543;p54"/>
+          <p:cNvSpPr/>
+          <p:nvPr/>
+        </p:nvSpPr>
+        <p:spPr>
+          <a:xfrm>
+            <a:off x="490150" y="3665400"/>
+            <a:ext cx="939600" cy="939600"/>
+          </a:xfrm>
+          <a:prstGeom prst="snip1Rect">
+            <a:avLst>
+              <a:gd name="adj" fmla="val 11329"/>
+            </a:avLst>
+          </a:prstGeom>
+          <a:solidFill>
+            <a:schemeClr val="accent1"/>
+          </a:solidFill>
+          <a:ln w="28575" cap="flat" cmpd="sng">
+            <a:solidFill>
+              <a:schemeClr val="dk1"/>
+            </a:solidFill>
+            <a:prstDash val="solid"/>
+            <a:round/>
+            <a:headEnd type="none" w="sm" len="sm"/>
+            <a:tailEnd type="none" w="sm" len="sm"/>
+          </a:ln>
+        </p:spPr>
+        <p:txBody>
+          <a:bodyPr spcFirstLastPara="1" wrap="square" lIns="91425" tIns="91425" rIns="91425" bIns="91425" anchor="ctr" anchorCtr="0">
+            <a:noAutofit/>
+          </a:bodyPr>
+          <a:lstStyle/>
+          <a:p>
+            <a:pPr marL="0" lvl="0" indent="0" algn="l" rtl="0">
+              <a:spcBef>
+                <a:spcPts val="0"/>
+              </a:spcBef>
+              <a:spcAft>
+                <a:spcPts val="0"/>
+              </a:spcAft>
+              <a:buNone/>
+            </a:pPr>
+            <a:endParaRPr/>
+          </a:p>
+        </p:txBody>
+      </p:sp>
+      <p:sp>
+        <p:nvSpPr>
+          <p:cNvPr id="1544" name="Google Shape;1544;p54"/>
+          <p:cNvSpPr/>
+          <p:nvPr/>
+        </p:nvSpPr>
+        <p:spPr>
+          <a:xfrm>
+            <a:off x="1708675" y="3746300"/>
+            <a:ext cx="939600" cy="939600"/>
+          </a:xfrm>
+          <a:prstGeom prst="snip1Rect">
+            <a:avLst>
+              <a:gd name="adj" fmla="val 11329"/>
+            </a:avLst>
+          </a:prstGeom>
+          <a:solidFill>
+            <a:schemeClr val="lt1"/>
+          </a:solidFill>
+          <a:ln w="28575" cap="flat" cmpd="sng">
+            <a:solidFill>
+              <a:schemeClr val="dk1"/>
+            </a:solidFill>
+            <a:prstDash val="solid"/>
+            <a:round/>
+            <a:headEnd type="none" w="sm" len="sm"/>
+            <a:tailEnd type="none" w="sm" len="sm"/>
+          </a:ln>
+        </p:spPr>
+        <p:txBody>
+          <a:bodyPr spcFirstLastPara="1" wrap="square" lIns="91425" tIns="91425" rIns="91425" bIns="91425" anchor="ctr" anchorCtr="0">
+            <a:noAutofit/>
+          </a:bodyPr>
+          <a:lstStyle/>
+          <a:p>
+            <a:pPr marL="0" lvl="0" indent="0" algn="l" rtl="0">
+              <a:spcBef>
+                <a:spcPts val="0"/>
+              </a:spcBef>
+              <a:spcAft>
+                <a:spcPts val="0"/>
+              </a:spcAft>
+              <a:buNone/>
+            </a:pPr>
+            <a:endParaRPr/>
+          </a:p>
+        </p:txBody>
+      </p:sp>
+      <p:sp>
+        <p:nvSpPr>
+          <p:cNvPr id="1545" name="Google Shape;1545;p54"/>
+          <p:cNvSpPr/>
+          <p:nvPr/>
+        </p:nvSpPr>
+        <p:spPr>
+          <a:xfrm>
+            <a:off x="1628775" y="3665400"/>
+            <a:ext cx="939600" cy="939600"/>
+          </a:xfrm>
+          <a:prstGeom prst="snip1Rect">
+            <a:avLst>
+              <a:gd name="adj" fmla="val 11329"/>
+            </a:avLst>
+          </a:prstGeom>
+          <a:solidFill>
+            <a:schemeClr val="accent2"/>
+          </a:solidFill>
+          <a:ln w="28575" cap="flat" cmpd="sng">
+            <a:solidFill>
+              <a:schemeClr val="dk1"/>
+            </a:solidFill>
+            <a:prstDash val="solid"/>
+            <a:round/>
+            <a:headEnd type="none" w="sm" len="sm"/>
+            <a:tailEnd type="none" w="sm" len="sm"/>
+          </a:ln>
+        </p:spPr>
+        <p:txBody>
+          <a:bodyPr spcFirstLastPara="1" wrap="square" lIns="91425" tIns="91425" rIns="91425" bIns="91425" anchor="ctr" anchorCtr="0">
+            <a:noAutofit/>
+          </a:bodyPr>
+          <a:lstStyle/>
+          <a:p>
+            <a:pPr marL="0" lvl="0" indent="0" algn="l" rtl="0">
+              <a:spcBef>
+                <a:spcPts val="0"/>
+              </a:spcBef>
+              <a:spcAft>
+                <a:spcPts val="0"/>
+              </a:spcAft>
+              <a:buNone/>
+            </a:pPr>
+            <a:endParaRPr/>
+          </a:p>
+        </p:txBody>
+      </p:sp>
+      <p:sp>
+        <p:nvSpPr>
+          <p:cNvPr id="1546" name="Google Shape;1546;p54"/>
+          <p:cNvSpPr/>
+          <p:nvPr/>
+        </p:nvSpPr>
+        <p:spPr>
+          <a:xfrm>
+            <a:off x="2847300" y="3746300"/>
+            <a:ext cx="939600" cy="939600"/>
+          </a:xfrm>
+          <a:prstGeom prst="snip1Rect">
+            <a:avLst>
+              <a:gd name="adj" fmla="val 11329"/>
+            </a:avLst>
+          </a:prstGeom>
+          <a:solidFill>
+            <a:schemeClr val="lt1"/>
+          </a:solidFill>
+          <a:ln w="28575" cap="flat" cmpd="sng">
+            <a:solidFill>
+              <a:schemeClr val="dk1"/>
+            </a:solidFill>
+            <a:prstDash val="solid"/>
+            <a:round/>
+            <a:headEnd type="none" w="sm" len="sm"/>
+            <a:tailEnd type="none" w="sm" len="sm"/>
+          </a:ln>
+        </p:spPr>
+        <p:txBody>
+          <a:bodyPr spcFirstLastPara="1" wrap="square" lIns="91425" tIns="91425" rIns="91425" bIns="91425" anchor="ctr" anchorCtr="0">
+            <a:noAutofit/>
+          </a:bodyPr>
+          <a:lstStyle/>
+          <a:p>
+            <a:pPr marL="0" lvl="0" indent="0" algn="l" rtl="0">
+              <a:spcBef>
+                <a:spcPts val="0"/>
+              </a:spcBef>
+              <a:spcAft>
+                <a:spcPts val="0"/>
+              </a:spcAft>
+              <a:buNone/>
+            </a:pPr>
+            <a:endParaRPr/>
+          </a:p>
+        </p:txBody>
+      </p:sp>
+      <p:sp>
+        <p:nvSpPr>
+          <p:cNvPr id="1547" name="Google Shape;1547;p54"/>
+          <p:cNvSpPr/>
+          <p:nvPr/>
+        </p:nvSpPr>
+        <p:spPr>
+          <a:xfrm>
+            <a:off x="2767400" y="3665400"/>
+            <a:ext cx="939600" cy="939600"/>
+          </a:xfrm>
+          <a:prstGeom prst="snip1Rect">
+            <a:avLst>
+              <a:gd name="adj" fmla="val 11329"/>
+            </a:avLst>
+          </a:prstGeom>
+          <a:solidFill>
+            <a:schemeClr val="lt2"/>
+          </a:solidFill>
+          <a:ln w="28575" cap="flat" cmpd="sng">
+            <a:solidFill>
+              <a:schemeClr val="dk1"/>
+            </a:solidFill>
+            <a:prstDash val="solid"/>
+            <a:round/>
+            <a:headEnd type="none" w="sm" len="sm"/>
+            <a:tailEnd type="none" w="sm" len="sm"/>
+          </a:ln>
+        </p:spPr>
+        <p:txBody>
+          <a:bodyPr spcFirstLastPara="1" wrap="square" lIns="91425" tIns="91425" rIns="91425" bIns="91425" anchor="ctr" anchorCtr="0">
+            <a:noAutofit/>
+          </a:bodyPr>
+          <a:lstStyle/>
+          <a:p>
+            <a:pPr marL="0" lvl="0" indent="0" algn="l" rtl="0">
+              <a:spcBef>
+                <a:spcPts val="0"/>
+              </a:spcBef>
+              <a:spcAft>
+                <a:spcPts val="0"/>
+              </a:spcAft>
+              <a:buNone/>
+            </a:pPr>
+            <a:endParaRPr/>
+          </a:p>
+        </p:txBody>
+      </p:sp>
+      <p:sp>
+        <p:nvSpPr>
+          <p:cNvPr id="4" name="Rectangle 3">
+            <a:extLst>
+              <a:ext uri="{FF2B5EF4-FFF2-40B4-BE49-F238E27FC236}">
+                <a16:creationId xmlns:a16="http://schemas.microsoft.com/office/drawing/2014/main" id="{9694C185-2733-82A6-CD26-B6BB946D14B6}"/>
+              </a:ext>
+            </a:extLst>
+          </p:cNvPr>
+          <p:cNvSpPr/>
+          <p:nvPr/>
+        </p:nvSpPr>
+        <p:spPr>
+          <a:xfrm>
+            <a:off x="4211782" y="3837709"/>
+            <a:ext cx="4253345" cy="477982"/>
+          </a:xfrm>
+          <a:prstGeom prst="rect">
+            <a:avLst/>
+          </a:prstGeom>
+          <a:solidFill>
+            <a:schemeClr val="bg1"/>
+          </a:solidFill>
+          <a:ln>
+            <a:noFill/>
+          </a:ln>
+        </p:spPr>
+        <p:style>
+          <a:lnRef idx="2">
+            <a:schemeClr val="accent1">
+              <a:shade val="50000"/>
+            </a:schemeClr>
+          </a:lnRef>
+          <a:fillRef idx="1">
+            <a:schemeClr val="accent1"/>
+          </a:fillRef>
+          <a:effectRef idx="0">
+            <a:schemeClr val="accent1"/>
+          </a:effectRef>
+          <a:fontRef idx="minor">
+            <a:schemeClr val="lt1"/>
+          </a:fontRef>
+        </p:style>
+        <p:txBody>
+          <a:bodyPr rtlCol="0" anchor="ctr"/>
+          <a:lstStyle/>
+          <a:p>
+            <a:pPr algn="ctr"/>
+            <a:endParaRPr lang="en-US"/>
+          </a:p>
+        </p:txBody>
+      </p:sp>
+    </p:spTree>
+  </p:cSld>
+  <p:clrMapOvr>
+    <a:masterClrMapping/>
+  </p:clrMapOvr>
+</p:sld>
+</file>
+
 <file path=ppt/slides/slide2.xml><?xml version="1.0" encoding="utf-8"?>
 <p:sld xmlns:a="http://schemas.openxmlformats.org/drawingml/2006/main" xmlns:r="http://schemas.openxmlformats.org/officeDocument/2006/relationships" xmlns:p="http://schemas.openxmlformats.org/presentationml/2006/main">
   <p:cSld>
@@ -7620,6 +8301,149 @@
           <p:cNvPr id="5" name="Rectangle 4">
             <a:extLst>
               <a:ext uri="{FF2B5EF4-FFF2-40B4-BE49-F238E27FC236}">
+                <a16:creationId xmlns:a16="http://schemas.microsoft.com/office/drawing/2014/main" id="{557E17FD-13CD-DF44-26D9-56818BDD0162}"/>
+              </a:ext>
+            </a:extLst>
+          </p:cNvPr>
+          <p:cNvSpPr/>
+          <p:nvPr/>
+        </p:nvSpPr>
+        <p:spPr>
+          <a:xfrm>
+            <a:off x="285750" y="822960"/>
+            <a:ext cx="8572500" cy="3839095"/>
+          </a:xfrm>
+          <a:prstGeom prst="rect">
+            <a:avLst/>
+          </a:prstGeom>
+          <a:solidFill>
+            <a:schemeClr val="tx1"/>
+          </a:solidFill>
+          <a:ln>
+            <a:solidFill>
+              <a:schemeClr val="tx2"/>
+            </a:solidFill>
+          </a:ln>
+        </p:spPr>
+        <p:style>
+          <a:lnRef idx="2">
+            <a:schemeClr val="accent1">
+              <a:shade val="50000"/>
+            </a:schemeClr>
+          </a:lnRef>
+          <a:fillRef idx="1">
+            <a:schemeClr val="accent1"/>
+          </a:fillRef>
+          <a:effectRef idx="0">
+            <a:schemeClr val="accent1"/>
+          </a:effectRef>
+          <a:fontRef idx="minor">
+            <a:schemeClr val="lt1"/>
+          </a:fontRef>
+        </p:style>
+        <p:txBody>
+          <a:bodyPr rtlCol="0" anchor="ctr"/>
+          <a:lstStyle/>
+          <a:p>
+            <a:pPr algn="ctr"/>
+            <a:endParaRPr lang="en-US"/>
+          </a:p>
+        </p:txBody>
+      </p:sp>
+      <p:sp>
+        <p:nvSpPr>
+          <p:cNvPr id="2" name="Title 1"/>
+          <p:cNvSpPr>
+            <a:spLocks noGrp="1"/>
+          </p:cNvSpPr>
+          <p:nvPr>
+            <p:ph type="title"/>
+          </p:nvPr>
+        </p:nvSpPr>
+        <p:spPr/>
+        <p:txBody>
+          <a:bodyPr anchor="ctr"/>
+          <a:lstStyle/>
+          <a:p>
+            <a:r>
+              <a:rPr lang="en-US" dirty="0">
+                <a:solidFill>
+                  <a:schemeClr val="tx1"/>
+                </a:solidFill>
+              </a:rPr>
+              <a:t>Header Elements</a:t>
+            </a:r>
+          </a:p>
+        </p:txBody>
+      </p:sp>
+      <p:pic>
+        <p:nvPicPr>
+          <p:cNvPr id="9" name="Picture 8">
+            <a:extLst>
+              <a:ext uri="{FF2B5EF4-FFF2-40B4-BE49-F238E27FC236}">
+                <a16:creationId xmlns:a16="http://schemas.microsoft.com/office/drawing/2014/main" id="{D8504C91-F92E-0E55-B0E8-347207752FBC}"/>
+              </a:ext>
+            </a:extLst>
+          </p:cNvPr>
+          <p:cNvPicPr>
+            <a:picLocks noChangeAspect="1"/>
+          </p:cNvPicPr>
+          <p:nvPr/>
+        </p:nvPicPr>
+        <p:blipFill>
+          <a:blip r:embed="rId2"/>
+          <a:stretch>
+            <a:fillRect/>
+          </a:stretch>
+        </p:blipFill>
+        <p:spPr>
+          <a:xfrm>
+            <a:off x="502840" y="1436603"/>
+            <a:ext cx="8138319" cy="2270293"/>
+          </a:xfrm>
+          <a:prstGeom prst="rect">
+            <a:avLst/>
+          </a:prstGeom>
+        </p:spPr>
+      </p:pic>
+    </p:spTree>
+    <p:extLst>
+      <p:ext uri="{BB962C8B-B14F-4D97-AF65-F5344CB8AC3E}">
+        <p14:creationId xmlns:p14="http://schemas.microsoft.com/office/powerpoint/2010/main" val="1182814773"/>
+      </p:ext>
+    </p:extLst>
+  </p:cSld>
+  <p:clrMapOvr>
+    <a:masterClrMapping/>
+  </p:clrMapOvr>
+  <p:transition>
+    <p:fade/>
+  </p:transition>
+</p:sld>
+</file>
+
+<file path=ppt/slides/slide5.xml><?xml version="1.0" encoding="utf-8"?>
+<p:sld xmlns:a="http://schemas.openxmlformats.org/drawingml/2006/main" xmlns:r="http://schemas.openxmlformats.org/officeDocument/2006/relationships" xmlns:p="http://schemas.openxmlformats.org/presentationml/2006/main">
+  <p:cSld>
+    <p:spTree>
+      <p:nvGrpSpPr>
+        <p:cNvPr id="1" name=""/>
+        <p:cNvGrpSpPr/>
+        <p:nvPr/>
+      </p:nvGrpSpPr>
+      <p:grpSpPr>
+        <a:xfrm>
+          <a:off x="0" y="0"/>
+          <a:ext cx="0" cy="0"/>
+          <a:chOff x="0" y="0"/>
+          <a:chExt cx="0" cy="0"/>
+        </a:xfrm>
+      </p:grpSpPr>
+      <p:sp>
+        <p:nvSpPr>
+          <p:cNvPr id="5" name="Rectangle 4">
+            <a:extLst>
+              <a:ext uri="{FF2B5EF4-FFF2-40B4-BE49-F238E27FC236}">
                 <a16:creationId xmlns:a16="http://schemas.microsoft.com/office/drawing/2014/main" id="{2CE3FFA3-15BD-3901-E2F8-25B2099C9B53}"/>
               </a:ext>
             </a:extLst>
@@ -7895,421 +8719,6 @@
     <p:extLst>
       <p:ext uri="{BB962C8B-B14F-4D97-AF65-F5344CB8AC3E}">
         <p14:creationId xmlns:p14="http://schemas.microsoft.com/office/powerpoint/2010/main" val="3519910749"/>
-      </p:ext>
-    </p:extLst>
-  </p:cSld>
-  <p:clrMapOvr>
-    <a:masterClrMapping/>
-  </p:clrMapOvr>
-  <p:transition>
-    <p:fade/>
-  </p:transition>
-  <p:timing>
-    <p:tnLst>
-      <p:par>
-        <p:cTn id="1" dur="indefinite" restart="never" nodeType="tmRoot">
-          <p:childTnLst>
-            <p:seq concurrent="1" nextAc="seek">
-              <p:cTn id="2" dur="indefinite" nodeType="mainSeq">
-                <p:childTnLst>
-                  <p:par>
-                    <p:cTn id="3" fill="hold">
-                      <p:stCondLst>
-                        <p:cond delay="indefinite"/>
-                      </p:stCondLst>
-                      <p:childTnLst>
-                        <p:par>
-                          <p:cTn id="4" fill="hold">
-                            <p:stCondLst>
-                              <p:cond delay="0"/>
-                            </p:stCondLst>
-                            <p:childTnLst>
-                              <p:par>
-                                <p:cTn id="5" presetID="10" presetClass="entr" presetSubtype="0" fill="hold" grpId="0" nodeType="clickEffect">
-                                  <p:stCondLst>
-                                    <p:cond delay="0"/>
-                                  </p:stCondLst>
-                                  <p:childTnLst>
-                                    <p:set>
-                                      <p:cBhvr>
-                                        <p:cTn id="6" dur="1" fill="hold">
-                                          <p:stCondLst>
-                                            <p:cond delay="0"/>
-                                          </p:stCondLst>
-                                        </p:cTn>
-                                        <p:tgtEl>
-                                          <p:spTgt spid="4"/>
-                                        </p:tgtEl>
-                                        <p:attrNameLst>
-                                          <p:attrName>style.visibility</p:attrName>
-                                        </p:attrNameLst>
-                                      </p:cBhvr>
-                                      <p:to>
-                                        <p:strVal val="visible"/>
-                                      </p:to>
-                                    </p:set>
-                                    <p:animEffect transition="in" filter="fade">
-                                      <p:cBhvr>
-                                        <p:cTn id="7" dur="500"/>
-                                        <p:tgtEl>
-                                          <p:spTgt spid="4"/>
-                                        </p:tgtEl>
-                                      </p:cBhvr>
-                                    </p:animEffect>
-                                  </p:childTnLst>
-                                </p:cTn>
-                              </p:par>
-                            </p:childTnLst>
-                          </p:cTn>
-                        </p:par>
-                      </p:childTnLst>
-                    </p:cTn>
-                  </p:par>
-                </p:childTnLst>
-              </p:cTn>
-              <p:prevCondLst>
-                <p:cond evt="onPrev" delay="0">
-                  <p:tgtEl>
-                    <p:sldTgt/>
-                  </p:tgtEl>
-                </p:cond>
-              </p:prevCondLst>
-              <p:nextCondLst>
-                <p:cond evt="onNext" delay="0">
-                  <p:tgtEl>
-                    <p:sldTgt/>
-                  </p:tgtEl>
-                </p:cond>
-              </p:nextCondLst>
-            </p:seq>
-          </p:childTnLst>
-        </p:cTn>
-      </p:par>
-    </p:tnLst>
-    <p:bldLst>
-      <p:bldP spid="4" grpId="0"/>
-    </p:bldLst>
-  </p:timing>
-</p:sld>
-</file>
-
-<file path=ppt/slides/slide5.xml><?xml version="1.0" encoding="utf-8"?>
-<p:sld xmlns:a="http://schemas.openxmlformats.org/drawingml/2006/main" xmlns:r="http://schemas.openxmlformats.org/officeDocument/2006/relationships" xmlns:p="http://schemas.openxmlformats.org/presentationml/2006/main">
-  <p:cSld>
-    <p:spTree>
-      <p:nvGrpSpPr>
-        <p:cNvPr id="1" name=""/>
-        <p:cNvGrpSpPr/>
-        <p:nvPr/>
-      </p:nvGrpSpPr>
-      <p:grpSpPr>
-        <a:xfrm>
-          <a:off x="0" y="0"/>
-          <a:ext cx="0" cy="0"/>
-          <a:chOff x="0" y="0"/>
-          <a:chExt cx="0" cy="0"/>
-        </a:xfrm>
-      </p:grpSpPr>
-      <p:sp>
-        <p:nvSpPr>
-          <p:cNvPr id="5" name="Rectangle 4">
-            <a:extLst>
-              <a:ext uri="{FF2B5EF4-FFF2-40B4-BE49-F238E27FC236}">
-                <a16:creationId xmlns:a16="http://schemas.microsoft.com/office/drawing/2014/main" id="{FCE8C6AD-BD43-04CA-D8C8-389B386D3285}"/>
-              </a:ext>
-            </a:extLst>
-          </p:cNvPr>
-          <p:cNvSpPr/>
-          <p:nvPr/>
-        </p:nvSpPr>
-        <p:spPr>
-          <a:xfrm>
-            <a:off x="285750" y="822960"/>
-            <a:ext cx="8572500" cy="3839095"/>
-          </a:xfrm>
-          <a:prstGeom prst="rect">
-            <a:avLst/>
-          </a:prstGeom>
-          <a:solidFill>
-            <a:schemeClr val="tx1"/>
-          </a:solidFill>
-          <a:ln>
-            <a:solidFill>
-              <a:schemeClr val="tx2"/>
-            </a:solidFill>
-          </a:ln>
-        </p:spPr>
-        <p:style>
-          <a:lnRef idx="2">
-            <a:schemeClr val="accent1">
-              <a:shade val="50000"/>
-            </a:schemeClr>
-          </a:lnRef>
-          <a:fillRef idx="1">
-            <a:schemeClr val="accent1"/>
-          </a:fillRef>
-          <a:effectRef idx="0">
-            <a:schemeClr val="accent1"/>
-          </a:effectRef>
-          <a:fontRef idx="minor">
-            <a:schemeClr val="lt1"/>
-          </a:fontRef>
-        </p:style>
-        <p:txBody>
-          <a:bodyPr rtlCol="0" anchor="ctr"/>
-          <a:lstStyle/>
-          <a:p>
-            <a:pPr algn="ctr"/>
-            <a:endParaRPr lang="en-US"/>
-          </a:p>
-        </p:txBody>
-      </p:sp>
-      <p:sp>
-        <p:nvSpPr>
-          <p:cNvPr id="2" name="Title 1"/>
-          <p:cNvSpPr>
-            <a:spLocks noGrp="1"/>
-          </p:cNvSpPr>
-          <p:nvPr>
-            <p:ph type="title"/>
-          </p:nvPr>
-        </p:nvSpPr>
-        <p:spPr/>
-        <p:txBody>
-          <a:bodyPr anchor="ctr"/>
-          <a:lstStyle/>
-          <a:p>
-            <a:r>
-              <a:rPr lang="en-US" dirty="0">
-                <a:solidFill>
-                  <a:schemeClr val="tx1"/>
-                </a:solidFill>
-              </a:rPr>
-              <a:t>The Hyperlink Element</a:t>
-            </a:r>
-          </a:p>
-        </p:txBody>
-      </p:sp>
-      <p:sp>
-        <p:nvSpPr>
-          <p:cNvPr id="3" name="Content Placeholder 2"/>
-          <p:cNvSpPr>
-            <a:spLocks noGrp="1"/>
-          </p:cNvSpPr>
-          <p:nvPr>
-            <p:ph idx="1"/>
-          </p:nvPr>
-        </p:nvSpPr>
-        <p:spPr>
-          <a:xfrm>
-            <a:off x="285751" y="1152475"/>
-            <a:ext cx="8572500" cy="1549161"/>
-          </a:xfrm>
-        </p:spPr>
-        <p:txBody>
-          <a:bodyPr/>
-          <a:lstStyle/>
-          <a:p>
-            <a:pPr>
-              <a:buClr>
-                <a:schemeClr val="bg1"/>
-              </a:buClr>
-            </a:pPr>
-            <a:r>
-              <a:rPr lang="en-US" sz="2000" dirty="0">
-                <a:solidFill>
-                  <a:schemeClr val="bg1"/>
-                </a:solidFill>
-              </a:rPr>
-              <a:t>Used to create a link to another page</a:t>
-            </a:r>
-          </a:p>
-          <a:p>
-            <a:pPr>
-              <a:buClr>
-                <a:schemeClr val="bg1"/>
-              </a:buClr>
-            </a:pPr>
-            <a:r>
-              <a:rPr lang="en-US" sz="2000" dirty="0">
-                <a:solidFill>
-                  <a:schemeClr val="bg1"/>
-                </a:solidFill>
-              </a:rPr>
-              <a:t>Set the </a:t>
-            </a:r>
-            <a:r>
-              <a:rPr lang="en-US" sz="2000" b="1" dirty="0" err="1">
-                <a:solidFill>
-                  <a:schemeClr val="accent1">
-                    <a:lumMod val="60000"/>
-                    <a:lumOff val="40000"/>
-                  </a:schemeClr>
-                </a:solidFill>
-                <a:latin typeface="Consolas" panose="020B0609020204030204" pitchFamily="49" charset="0"/>
-              </a:rPr>
-              <a:t>href</a:t>
-            </a:r>
-            <a:r>
-              <a:rPr lang="en-US" sz="2000" dirty="0">
-                <a:solidFill>
-                  <a:schemeClr val="bg1"/>
-                </a:solidFill>
-              </a:rPr>
-              <a:t> to a URL</a:t>
-            </a:r>
-          </a:p>
-          <a:p>
-            <a:pPr>
-              <a:buClr>
-                <a:schemeClr val="bg1"/>
-              </a:buClr>
-            </a:pPr>
-            <a:r>
-              <a:rPr lang="en-US" sz="2000" dirty="0">
-                <a:solidFill>
-                  <a:schemeClr val="bg1"/>
-                </a:solidFill>
-              </a:rPr>
-              <a:t>The text of the link goes in between the opening and closing tag</a:t>
-            </a:r>
-          </a:p>
-        </p:txBody>
-      </p:sp>
-      <p:sp>
-        <p:nvSpPr>
-          <p:cNvPr id="4" name="TextBox 3"/>
-          <p:cNvSpPr txBox="1"/>
-          <p:nvPr/>
-        </p:nvSpPr>
-        <p:spPr>
-          <a:xfrm>
-            <a:off x="279298" y="3257550"/>
-            <a:ext cx="8529258" cy="683264"/>
-          </a:xfrm>
-          <a:prstGeom prst="rect">
-            <a:avLst/>
-          </a:prstGeom>
-          <a:noFill/>
-        </p:spPr>
-        <p:txBody>
-          <a:bodyPr wrap="none" lIns="137160" tIns="109728" rIns="137160" bIns="109728" rtlCol="0">
-            <a:spAutoFit/>
-          </a:bodyPr>
-          <a:lstStyle/>
-          <a:p>
-            <a:r>
-              <a:rPr lang="en-US" sz="3000" b="1" dirty="0">
-                <a:solidFill>
-                  <a:srgbClr val="808080"/>
-                </a:solidFill>
-                <a:latin typeface="Consolas" panose="020B0609020204030204" pitchFamily="49" charset="0"/>
-              </a:rPr>
-              <a:t>&lt;</a:t>
-            </a:r>
-            <a:r>
-              <a:rPr lang="en-US" sz="3000" b="1" dirty="0">
-                <a:solidFill>
-                  <a:srgbClr val="569CD6"/>
-                </a:solidFill>
-                <a:latin typeface="Consolas" panose="020B0609020204030204" pitchFamily="49" charset="0"/>
-              </a:rPr>
-              <a:t>a</a:t>
-            </a:r>
-            <a:r>
-              <a:rPr lang="en-US" sz="3000" b="1" dirty="0">
-                <a:solidFill>
-                  <a:srgbClr val="D4D4D4"/>
-                </a:solidFill>
-                <a:latin typeface="Consolas" panose="020B0609020204030204" pitchFamily="49" charset="0"/>
-              </a:rPr>
-              <a:t> </a:t>
-            </a:r>
-            <a:r>
-              <a:rPr lang="en-US" sz="3000" b="1" dirty="0" err="1">
-                <a:solidFill>
-                  <a:srgbClr val="9CDCFE"/>
-                </a:solidFill>
-                <a:latin typeface="Consolas" panose="020B0609020204030204" pitchFamily="49" charset="0"/>
-              </a:rPr>
-              <a:t>href</a:t>
-            </a:r>
-            <a:r>
-              <a:rPr lang="en-US" sz="3000" b="1" dirty="0">
-                <a:solidFill>
-                  <a:srgbClr val="D4D4D4"/>
-                </a:solidFill>
-                <a:latin typeface="Consolas" panose="020B0609020204030204" pitchFamily="49" charset="0"/>
-              </a:rPr>
-              <a:t>=</a:t>
-            </a:r>
-            <a:r>
-              <a:rPr lang="en-US" sz="3000" b="1" dirty="0">
-                <a:solidFill>
-                  <a:srgbClr val="CE9178"/>
-                </a:solidFill>
-                <a:latin typeface="Consolas" panose="020B0609020204030204" pitchFamily="49" charset="0"/>
-              </a:rPr>
-              <a:t>"https://google.com"</a:t>
-            </a:r>
-            <a:r>
-              <a:rPr lang="en-US" sz="3000" b="1" dirty="0">
-                <a:solidFill>
-                  <a:srgbClr val="808080"/>
-                </a:solidFill>
-                <a:latin typeface="Consolas" panose="020B0609020204030204" pitchFamily="49" charset="0"/>
-              </a:rPr>
-              <a:t>&gt;</a:t>
-            </a:r>
-            <a:r>
-              <a:rPr lang="en-US" sz="3000" b="1" dirty="0">
-                <a:solidFill>
-                  <a:schemeClr val="bg1"/>
-                </a:solidFill>
-                <a:latin typeface="Consolas" panose="020B0609020204030204" pitchFamily="49" charset="0"/>
-              </a:rPr>
-              <a:t>Google</a:t>
-            </a:r>
-            <a:r>
-              <a:rPr lang="en-US" sz="3000" b="1" dirty="0">
-                <a:solidFill>
-                  <a:srgbClr val="808080"/>
-                </a:solidFill>
-                <a:latin typeface="Consolas" panose="020B0609020204030204" pitchFamily="49" charset="0"/>
-              </a:rPr>
-              <a:t>&lt;/</a:t>
-            </a:r>
-            <a:r>
-              <a:rPr lang="en-US" sz="3000" b="1" dirty="0">
-                <a:solidFill>
-                  <a:srgbClr val="569CD6"/>
-                </a:solidFill>
-                <a:latin typeface="Consolas" panose="020B0609020204030204" pitchFamily="49" charset="0"/>
-              </a:rPr>
-              <a:t>a</a:t>
-            </a:r>
-            <a:r>
-              <a:rPr lang="en-US" sz="3000" b="1" dirty="0">
-                <a:solidFill>
-                  <a:srgbClr val="808080"/>
-                </a:solidFill>
-                <a:latin typeface="Consolas" panose="020B0609020204030204" pitchFamily="49" charset="0"/>
-              </a:rPr>
-              <a:t>&gt;</a:t>
-            </a:r>
-            <a:endParaRPr lang="en-US" sz="3000" b="1" dirty="0">
-              <a:solidFill>
-                <a:srgbClr val="D4D4D4"/>
-              </a:solidFill>
-              <a:latin typeface="Consolas" panose="020B0609020204030204" pitchFamily="49" charset="0"/>
-            </a:endParaRPr>
-          </a:p>
-        </p:txBody>
-      </p:sp>
-    </p:spTree>
-    <p:extLst>
-      <p:ext uri="{BB962C8B-B14F-4D97-AF65-F5344CB8AC3E}">
-        <p14:creationId xmlns:p14="http://schemas.microsoft.com/office/powerpoint/2010/main" val="1987866754"/>
       </p:ext>
     </p:extLst>
   </p:cSld>
@@ -8430,6 +8839,732 @@
           <p:cNvPr id="5" name="Rectangle 4">
             <a:extLst>
               <a:ext uri="{FF2B5EF4-FFF2-40B4-BE49-F238E27FC236}">
+                <a16:creationId xmlns:a16="http://schemas.microsoft.com/office/drawing/2014/main" id="{2CE3FFA3-15BD-3901-E2F8-25B2099C9B53}"/>
+              </a:ext>
+            </a:extLst>
+          </p:cNvPr>
+          <p:cNvSpPr/>
+          <p:nvPr/>
+        </p:nvSpPr>
+        <p:spPr>
+          <a:xfrm>
+            <a:off x="285749" y="822960"/>
+            <a:ext cx="8572500" cy="3839095"/>
+          </a:xfrm>
+          <a:prstGeom prst="rect">
+            <a:avLst/>
+          </a:prstGeom>
+          <a:solidFill>
+            <a:schemeClr val="tx1"/>
+          </a:solidFill>
+          <a:ln>
+            <a:solidFill>
+              <a:schemeClr val="tx2"/>
+            </a:solidFill>
+          </a:ln>
+        </p:spPr>
+        <p:style>
+          <a:lnRef idx="2">
+            <a:schemeClr val="accent1">
+              <a:shade val="50000"/>
+            </a:schemeClr>
+          </a:lnRef>
+          <a:fillRef idx="1">
+            <a:schemeClr val="accent1"/>
+          </a:fillRef>
+          <a:effectRef idx="0">
+            <a:schemeClr val="accent1"/>
+          </a:effectRef>
+          <a:fontRef idx="minor">
+            <a:schemeClr val="lt1"/>
+          </a:fontRef>
+        </p:style>
+        <p:txBody>
+          <a:bodyPr rtlCol="0" anchor="ctr"/>
+          <a:lstStyle/>
+          <a:p>
+            <a:pPr algn="ctr"/>
+            <a:endParaRPr lang="en-US"/>
+          </a:p>
+        </p:txBody>
+      </p:sp>
+      <p:sp>
+        <p:nvSpPr>
+          <p:cNvPr id="2" name="Title 1"/>
+          <p:cNvSpPr>
+            <a:spLocks noGrp="1"/>
+          </p:cNvSpPr>
+          <p:nvPr>
+            <p:ph type="title"/>
+          </p:nvPr>
+        </p:nvSpPr>
+        <p:spPr/>
+        <p:txBody>
+          <a:bodyPr anchor="ctr"/>
+          <a:lstStyle/>
+          <a:p>
+            <a:r>
+              <a:rPr lang="en-US" dirty="0">
+                <a:solidFill>
+                  <a:schemeClr val="tx1"/>
+                </a:solidFill>
+              </a:rPr>
+              <a:t>The Paragraph Element</a:t>
+            </a:r>
+          </a:p>
+        </p:txBody>
+      </p:sp>
+      <p:pic>
+        <p:nvPicPr>
+          <p:cNvPr id="7" name="Picture 6">
+            <a:extLst>
+              <a:ext uri="{FF2B5EF4-FFF2-40B4-BE49-F238E27FC236}">
+                <a16:creationId xmlns:a16="http://schemas.microsoft.com/office/drawing/2014/main" id="{84530F80-71B3-5938-01B5-81717C8F0BD8}"/>
+              </a:ext>
+            </a:extLst>
+          </p:cNvPr>
+          <p:cNvPicPr>
+            <a:picLocks noChangeAspect="1"/>
+          </p:cNvPicPr>
+          <p:nvPr/>
+        </p:nvPicPr>
+        <p:blipFill>
+          <a:blip r:embed="rId2"/>
+          <a:stretch>
+            <a:fillRect/>
+          </a:stretch>
+        </p:blipFill>
+        <p:spPr>
+          <a:xfrm>
+            <a:off x="393510" y="1699649"/>
+            <a:ext cx="8356978" cy="1486824"/>
+          </a:xfrm>
+          <a:prstGeom prst="rect">
+            <a:avLst/>
+          </a:prstGeom>
+        </p:spPr>
+      </p:pic>
+    </p:spTree>
+    <p:extLst>
+      <p:ext uri="{BB962C8B-B14F-4D97-AF65-F5344CB8AC3E}">
+        <p14:creationId xmlns:p14="http://schemas.microsoft.com/office/powerpoint/2010/main" val="567858339"/>
+      </p:ext>
+    </p:extLst>
+  </p:cSld>
+  <p:clrMapOvr>
+    <a:masterClrMapping/>
+  </p:clrMapOvr>
+  <p:transition>
+    <p:fade/>
+  </p:transition>
+</p:sld>
+</file>
+
+<file path=ppt/slides/slide7.xml><?xml version="1.0" encoding="utf-8"?>
+<p:sld xmlns:a="http://schemas.openxmlformats.org/drawingml/2006/main" xmlns:r="http://schemas.openxmlformats.org/officeDocument/2006/relationships" xmlns:p="http://schemas.openxmlformats.org/presentationml/2006/main">
+  <p:cSld>
+    <p:spTree>
+      <p:nvGrpSpPr>
+        <p:cNvPr id="1" name=""/>
+        <p:cNvGrpSpPr/>
+        <p:nvPr/>
+      </p:nvGrpSpPr>
+      <p:grpSpPr>
+        <a:xfrm>
+          <a:off x="0" y="0"/>
+          <a:ext cx="0" cy="0"/>
+          <a:chOff x="0" y="0"/>
+          <a:chExt cx="0" cy="0"/>
+        </a:xfrm>
+      </p:grpSpPr>
+      <p:sp>
+        <p:nvSpPr>
+          <p:cNvPr id="5" name="Rectangle 4">
+            <a:extLst>
+              <a:ext uri="{FF2B5EF4-FFF2-40B4-BE49-F238E27FC236}">
+                <a16:creationId xmlns:a16="http://schemas.microsoft.com/office/drawing/2014/main" id="{FCE8C6AD-BD43-04CA-D8C8-389B386D3285}"/>
+              </a:ext>
+            </a:extLst>
+          </p:cNvPr>
+          <p:cNvSpPr/>
+          <p:nvPr/>
+        </p:nvSpPr>
+        <p:spPr>
+          <a:xfrm>
+            <a:off x="285750" y="822960"/>
+            <a:ext cx="8572500" cy="3839095"/>
+          </a:xfrm>
+          <a:prstGeom prst="rect">
+            <a:avLst/>
+          </a:prstGeom>
+          <a:solidFill>
+            <a:schemeClr val="tx1"/>
+          </a:solidFill>
+          <a:ln>
+            <a:solidFill>
+              <a:schemeClr val="tx2"/>
+            </a:solidFill>
+          </a:ln>
+        </p:spPr>
+        <p:style>
+          <a:lnRef idx="2">
+            <a:schemeClr val="accent1">
+              <a:shade val="50000"/>
+            </a:schemeClr>
+          </a:lnRef>
+          <a:fillRef idx="1">
+            <a:schemeClr val="accent1"/>
+          </a:fillRef>
+          <a:effectRef idx="0">
+            <a:schemeClr val="accent1"/>
+          </a:effectRef>
+          <a:fontRef idx="minor">
+            <a:schemeClr val="lt1"/>
+          </a:fontRef>
+        </p:style>
+        <p:txBody>
+          <a:bodyPr rtlCol="0" anchor="ctr"/>
+          <a:lstStyle/>
+          <a:p>
+            <a:pPr algn="ctr"/>
+            <a:endParaRPr lang="en-US"/>
+          </a:p>
+        </p:txBody>
+      </p:sp>
+      <p:sp>
+        <p:nvSpPr>
+          <p:cNvPr id="2" name="Title 1"/>
+          <p:cNvSpPr>
+            <a:spLocks noGrp="1"/>
+          </p:cNvSpPr>
+          <p:nvPr>
+            <p:ph type="title"/>
+          </p:nvPr>
+        </p:nvSpPr>
+        <p:spPr/>
+        <p:txBody>
+          <a:bodyPr anchor="ctr"/>
+          <a:lstStyle/>
+          <a:p>
+            <a:r>
+              <a:rPr lang="en-US" dirty="0">
+                <a:solidFill>
+                  <a:schemeClr val="tx1"/>
+                </a:solidFill>
+              </a:rPr>
+              <a:t>The Hyperlink Element</a:t>
+            </a:r>
+          </a:p>
+        </p:txBody>
+      </p:sp>
+      <p:sp>
+        <p:nvSpPr>
+          <p:cNvPr id="3" name="Content Placeholder 2"/>
+          <p:cNvSpPr>
+            <a:spLocks noGrp="1"/>
+          </p:cNvSpPr>
+          <p:nvPr>
+            <p:ph idx="1"/>
+          </p:nvPr>
+        </p:nvSpPr>
+        <p:spPr>
+          <a:xfrm>
+            <a:off x="285751" y="1152475"/>
+            <a:ext cx="8572500" cy="1549161"/>
+          </a:xfrm>
+        </p:spPr>
+        <p:txBody>
+          <a:bodyPr/>
+          <a:lstStyle/>
+          <a:p>
+            <a:pPr>
+              <a:buClr>
+                <a:schemeClr val="bg1"/>
+              </a:buClr>
+            </a:pPr>
+            <a:r>
+              <a:rPr lang="en-US" sz="2000" dirty="0">
+                <a:solidFill>
+                  <a:schemeClr val="bg1"/>
+                </a:solidFill>
+              </a:rPr>
+              <a:t>Used to create a link to another page</a:t>
+            </a:r>
+          </a:p>
+          <a:p>
+            <a:pPr>
+              <a:buClr>
+                <a:schemeClr val="bg1"/>
+              </a:buClr>
+            </a:pPr>
+            <a:r>
+              <a:rPr lang="en-US" sz="2000" dirty="0">
+                <a:solidFill>
+                  <a:schemeClr val="bg1"/>
+                </a:solidFill>
+              </a:rPr>
+              <a:t>Set the </a:t>
+            </a:r>
+            <a:r>
+              <a:rPr lang="en-US" sz="2000" b="1" dirty="0" err="1">
+                <a:solidFill>
+                  <a:schemeClr val="accent1">
+                    <a:lumMod val="60000"/>
+                    <a:lumOff val="40000"/>
+                  </a:schemeClr>
+                </a:solidFill>
+                <a:latin typeface="Consolas" panose="020B0609020204030204" pitchFamily="49" charset="0"/>
+              </a:rPr>
+              <a:t>href</a:t>
+            </a:r>
+            <a:r>
+              <a:rPr lang="en-US" sz="2000" dirty="0">
+                <a:solidFill>
+                  <a:schemeClr val="bg1"/>
+                </a:solidFill>
+              </a:rPr>
+              <a:t> to a URL</a:t>
+            </a:r>
+          </a:p>
+          <a:p>
+            <a:pPr>
+              <a:buClr>
+                <a:schemeClr val="bg1"/>
+              </a:buClr>
+            </a:pPr>
+            <a:r>
+              <a:rPr lang="en-US" sz="2000" dirty="0">
+                <a:solidFill>
+                  <a:schemeClr val="bg1"/>
+                </a:solidFill>
+              </a:rPr>
+              <a:t>The text of the link goes in between the opening and closing tag</a:t>
+            </a:r>
+          </a:p>
+        </p:txBody>
+      </p:sp>
+      <p:sp>
+        <p:nvSpPr>
+          <p:cNvPr id="4" name="TextBox 3"/>
+          <p:cNvSpPr txBox="1"/>
+          <p:nvPr/>
+        </p:nvSpPr>
+        <p:spPr>
+          <a:xfrm>
+            <a:off x="279298" y="3257550"/>
+            <a:ext cx="8529258" cy="683264"/>
+          </a:xfrm>
+          <a:prstGeom prst="rect">
+            <a:avLst/>
+          </a:prstGeom>
+          <a:noFill/>
+        </p:spPr>
+        <p:txBody>
+          <a:bodyPr wrap="none" lIns="137160" tIns="109728" rIns="137160" bIns="109728" rtlCol="0">
+            <a:spAutoFit/>
+          </a:bodyPr>
+          <a:lstStyle/>
+          <a:p>
+            <a:r>
+              <a:rPr lang="en-US" sz="3000" b="1" dirty="0">
+                <a:solidFill>
+                  <a:srgbClr val="808080"/>
+                </a:solidFill>
+                <a:latin typeface="Consolas" panose="020B0609020204030204" pitchFamily="49" charset="0"/>
+              </a:rPr>
+              <a:t>&lt;</a:t>
+            </a:r>
+            <a:r>
+              <a:rPr lang="en-US" sz="3000" b="1" dirty="0">
+                <a:solidFill>
+                  <a:srgbClr val="569CD6"/>
+                </a:solidFill>
+                <a:latin typeface="Consolas" panose="020B0609020204030204" pitchFamily="49" charset="0"/>
+              </a:rPr>
+              <a:t>a</a:t>
+            </a:r>
+            <a:r>
+              <a:rPr lang="en-US" sz="3000" b="1" dirty="0">
+                <a:solidFill>
+                  <a:srgbClr val="D4D4D4"/>
+                </a:solidFill>
+                <a:latin typeface="Consolas" panose="020B0609020204030204" pitchFamily="49" charset="0"/>
+              </a:rPr>
+              <a:t> </a:t>
+            </a:r>
+            <a:r>
+              <a:rPr lang="en-US" sz="3000" b="1" dirty="0" err="1">
+                <a:solidFill>
+                  <a:srgbClr val="9CDCFE"/>
+                </a:solidFill>
+                <a:latin typeface="Consolas" panose="020B0609020204030204" pitchFamily="49" charset="0"/>
+              </a:rPr>
+              <a:t>href</a:t>
+            </a:r>
+            <a:r>
+              <a:rPr lang="en-US" sz="3000" b="1" dirty="0">
+                <a:solidFill>
+                  <a:srgbClr val="D4D4D4"/>
+                </a:solidFill>
+                <a:latin typeface="Consolas" panose="020B0609020204030204" pitchFamily="49" charset="0"/>
+              </a:rPr>
+              <a:t>=</a:t>
+            </a:r>
+            <a:r>
+              <a:rPr lang="en-US" sz="3000" b="1" dirty="0">
+                <a:solidFill>
+                  <a:srgbClr val="CE9178"/>
+                </a:solidFill>
+                <a:latin typeface="Consolas" panose="020B0609020204030204" pitchFamily="49" charset="0"/>
+              </a:rPr>
+              <a:t>"https://google.com"</a:t>
+            </a:r>
+            <a:r>
+              <a:rPr lang="en-US" sz="3000" b="1" dirty="0">
+                <a:solidFill>
+                  <a:srgbClr val="808080"/>
+                </a:solidFill>
+                <a:latin typeface="Consolas" panose="020B0609020204030204" pitchFamily="49" charset="0"/>
+              </a:rPr>
+              <a:t>&gt;</a:t>
+            </a:r>
+            <a:r>
+              <a:rPr lang="en-US" sz="3000" b="1" dirty="0">
+                <a:solidFill>
+                  <a:schemeClr val="bg1"/>
+                </a:solidFill>
+                <a:latin typeface="Consolas" panose="020B0609020204030204" pitchFamily="49" charset="0"/>
+              </a:rPr>
+              <a:t>Google</a:t>
+            </a:r>
+            <a:r>
+              <a:rPr lang="en-US" sz="3000" b="1" dirty="0">
+                <a:solidFill>
+                  <a:srgbClr val="808080"/>
+                </a:solidFill>
+                <a:latin typeface="Consolas" panose="020B0609020204030204" pitchFamily="49" charset="0"/>
+              </a:rPr>
+              <a:t>&lt;/</a:t>
+            </a:r>
+            <a:r>
+              <a:rPr lang="en-US" sz="3000" b="1" dirty="0">
+                <a:solidFill>
+                  <a:srgbClr val="569CD6"/>
+                </a:solidFill>
+                <a:latin typeface="Consolas" panose="020B0609020204030204" pitchFamily="49" charset="0"/>
+              </a:rPr>
+              <a:t>a</a:t>
+            </a:r>
+            <a:r>
+              <a:rPr lang="en-US" sz="3000" b="1" dirty="0">
+                <a:solidFill>
+                  <a:srgbClr val="808080"/>
+                </a:solidFill>
+                <a:latin typeface="Consolas" panose="020B0609020204030204" pitchFamily="49" charset="0"/>
+              </a:rPr>
+              <a:t>&gt;</a:t>
+            </a:r>
+            <a:endParaRPr lang="en-US" sz="3000" b="1" dirty="0">
+              <a:solidFill>
+                <a:srgbClr val="D4D4D4"/>
+              </a:solidFill>
+              <a:latin typeface="Consolas" panose="020B0609020204030204" pitchFamily="49" charset="0"/>
+            </a:endParaRPr>
+          </a:p>
+        </p:txBody>
+      </p:sp>
+    </p:spTree>
+    <p:extLst>
+      <p:ext uri="{BB962C8B-B14F-4D97-AF65-F5344CB8AC3E}">
+        <p14:creationId xmlns:p14="http://schemas.microsoft.com/office/powerpoint/2010/main" val="1987866754"/>
+      </p:ext>
+    </p:extLst>
+  </p:cSld>
+  <p:clrMapOvr>
+    <a:masterClrMapping/>
+  </p:clrMapOvr>
+  <p:transition>
+    <p:fade/>
+  </p:transition>
+  <p:timing>
+    <p:tnLst>
+      <p:par>
+        <p:cTn id="1" dur="indefinite" restart="never" nodeType="tmRoot">
+          <p:childTnLst>
+            <p:seq concurrent="1" nextAc="seek">
+              <p:cTn id="2" dur="indefinite" nodeType="mainSeq">
+                <p:childTnLst>
+                  <p:par>
+                    <p:cTn id="3" fill="hold">
+                      <p:stCondLst>
+                        <p:cond delay="indefinite"/>
+                      </p:stCondLst>
+                      <p:childTnLst>
+                        <p:par>
+                          <p:cTn id="4" fill="hold">
+                            <p:stCondLst>
+                              <p:cond delay="0"/>
+                            </p:stCondLst>
+                            <p:childTnLst>
+                              <p:par>
+                                <p:cTn id="5" presetID="10" presetClass="entr" presetSubtype="0" fill="hold" grpId="0" nodeType="clickEffect">
+                                  <p:stCondLst>
+                                    <p:cond delay="0"/>
+                                  </p:stCondLst>
+                                  <p:childTnLst>
+                                    <p:set>
+                                      <p:cBhvr>
+                                        <p:cTn id="6" dur="1" fill="hold">
+                                          <p:stCondLst>
+                                            <p:cond delay="0"/>
+                                          </p:stCondLst>
+                                        </p:cTn>
+                                        <p:tgtEl>
+                                          <p:spTgt spid="4"/>
+                                        </p:tgtEl>
+                                        <p:attrNameLst>
+                                          <p:attrName>style.visibility</p:attrName>
+                                        </p:attrNameLst>
+                                      </p:cBhvr>
+                                      <p:to>
+                                        <p:strVal val="visible"/>
+                                      </p:to>
+                                    </p:set>
+                                    <p:animEffect transition="in" filter="fade">
+                                      <p:cBhvr>
+                                        <p:cTn id="7" dur="500"/>
+                                        <p:tgtEl>
+                                          <p:spTgt spid="4"/>
+                                        </p:tgtEl>
+                                      </p:cBhvr>
+                                    </p:animEffect>
+                                  </p:childTnLst>
+                                </p:cTn>
+                              </p:par>
+                            </p:childTnLst>
+                          </p:cTn>
+                        </p:par>
+                      </p:childTnLst>
+                    </p:cTn>
+                  </p:par>
+                </p:childTnLst>
+              </p:cTn>
+              <p:prevCondLst>
+                <p:cond evt="onPrev" delay="0">
+                  <p:tgtEl>
+                    <p:sldTgt/>
+                  </p:tgtEl>
+                </p:cond>
+              </p:prevCondLst>
+              <p:nextCondLst>
+                <p:cond evt="onNext" delay="0">
+                  <p:tgtEl>
+                    <p:sldTgt/>
+                  </p:tgtEl>
+                </p:cond>
+              </p:nextCondLst>
+            </p:seq>
+          </p:childTnLst>
+        </p:cTn>
+      </p:par>
+    </p:tnLst>
+    <p:bldLst>
+      <p:bldP spid="4" grpId="0"/>
+    </p:bldLst>
+  </p:timing>
+</p:sld>
+</file>
+
+<file path=ppt/slides/slide8.xml><?xml version="1.0" encoding="utf-8"?>
+<p:sld xmlns:a="http://schemas.openxmlformats.org/drawingml/2006/main" xmlns:r="http://schemas.openxmlformats.org/officeDocument/2006/relationships" xmlns:p="http://schemas.openxmlformats.org/presentationml/2006/main">
+  <p:cSld>
+    <p:spTree>
+      <p:nvGrpSpPr>
+        <p:cNvPr id="1" name=""/>
+        <p:cNvGrpSpPr/>
+        <p:nvPr/>
+      </p:nvGrpSpPr>
+      <p:grpSpPr>
+        <a:xfrm>
+          <a:off x="0" y="0"/>
+          <a:ext cx="0" cy="0"/>
+          <a:chOff x="0" y="0"/>
+          <a:chExt cx="0" cy="0"/>
+        </a:xfrm>
+      </p:grpSpPr>
+      <p:sp>
+        <p:nvSpPr>
+          <p:cNvPr id="5" name="Rectangle 4">
+            <a:extLst>
+              <a:ext uri="{FF2B5EF4-FFF2-40B4-BE49-F238E27FC236}">
+                <a16:creationId xmlns:a16="http://schemas.microsoft.com/office/drawing/2014/main" id="{FCE8C6AD-BD43-04CA-D8C8-389B386D3285}"/>
+              </a:ext>
+            </a:extLst>
+          </p:cNvPr>
+          <p:cNvSpPr/>
+          <p:nvPr/>
+        </p:nvSpPr>
+        <p:spPr>
+          <a:xfrm>
+            <a:off x="292202" y="1014162"/>
+            <a:ext cx="8572500" cy="3839095"/>
+          </a:xfrm>
+          <a:prstGeom prst="rect">
+            <a:avLst/>
+          </a:prstGeom>
+          <a:solidFill>
+            <a:schemeClr val="tx1"/>
+          </a:solidFill>
+          <a:ln>
+            <a:solidFill>
+              <a:schemeClr val="tx2"/>
+            </a:solidFill>
+          </a:ln>
+        </p:spPr>
+        <p:style>
+          <a:lnRef idx="2">
+            <a:schemeClr val="accent1">
+              <a:shade val="50000"/>
+            </a:schemeClr>
+          </a:lnRef>
+          <a:fillRef idx="1">
+            <a:schemeClr val="accent1"/>
+          </a:fillRef>
+          <a:effectRef idx="0">
+            <a:schemeClr val="accent1"/>
+          </a:effectRef>
+          <a:fontRef idx="minor">
+            <a:schemeClr val="lt1"/>
+          </a:fontRef>
+        </p:style>
+        <p:txBody>
+          <a:bodyPr rtlCol="0" anchor="ctr"/>
+          <a:lstStyle/>
+          <a:p>
+            <a:pPr algn="ctr"/>
+            <a:endParaRPr lang="en-US"/>
+          </a:p>
+        </p:txBody>
+      </p:sp>
+      <p:sp>
+        <p:nvSpPr>
+          <p:cNvPr id="2" name="Title 1"/>
+          <p:cNvSpPr>
+            <a:spLocks noGrp="1"/>
+          </p:cNvSpPr>
+          <p:nvPr>
+            <p:ph type="title"/>
+          </p:nvPr>
+        </p:nvSpPr>
+        <p:spPr/>
+        <p:txBody>
+          <a:bodyPr anchor="ctr"/>
+          <a:lstStyle/>
+          <a:p>
+            <a:r>
+              <a:rPr lang="en-US" dirty="0">
+                <a:solidFill>
+                  <a:schemeClr val="tx1"/>
+                </a:solidFill>
+              </a:rPr>
+              <a:t>The Hyperlink Element</a:t>
+            </a:r>
+          </a:p>
+        </p:txBody>
+      </p:sp>
+      <p:sp>
+        <p:nvSpPr>
+          <p:cNvPr id="7" name="Content Placeholder 6">
+            <a:extLst>
+              <a:ext uri="{FF2B5EF4-FFF2-40B4-BE49-F238E27FC236}">
+                <a16:creationId xmlns:a16="http://schemas.microsoft.com/office/drawing/2014/main" id="{8F4C29BE-4D75-9678-9CDA-8B6D23599744}"/>
+              </a:ext>
+            </a:extLst>
+          </p:cNvPr>
+          <p:cNvSpPr>
+            <a:spLocks noGrp="1"/>
+          </p:cNvSpPr>
+          <p:nvPr>
+            <p:ph idx="1"/>
+          </p:nvPr>
+        </p:nvSpPr>
+        <p:spPr/>
+        <p:txBody>
+          <a:bodyPr/>
+          <a:lstStyle/>
+          <a:p>
+            <a:endParaRPr lang="en-US" dirty="0"/>
+          </a:p>
+        </p:txBody>
+      </p:sp>
+      <p:pic>
+        <p:nvPicPr>
+          <p:cNvPr id="9" name="Picture 8">
+            <a:extLst>
+              <a:ext uri="{FF2B5EF4-FFF2-40B4-BE49-F238E27FC236}">
+                <a16:creationId xmlns:a16="http://schemas.microsoft.com/office/drawing/2014/main" id="{258365D0-7274-9339-3C8E-0C360410D160}"/>
+              </a:ext>
+            </a:extLst>
+          </p:cNvPr>
+          <p:cNvPicPr>
+            <a:picLocks noChangeAspect="1"/>
+          </p:cNvPicPr>
+          <p:nvPr/>
+        </p:nvPicPr>
+        <p:blipFill>
+          <a:blip r:embed="rId2"/>
+          <a:stretch>
+            <a:fillRect/>
+          </a:stretch>
+        </p:blipFill>
+        <p:spPr>
+          <a:xfrm>
+            <a:off x="450778" y="2023033"/>
+            <a:ext cx="8062022" cy="1411729"/>
+          </a:xfrm>
+          <a:prstGeom prst="rect">
+            <a:avLst/>
+          </a:prstGeom>
+        </p:spPr>
+      </p:pic>
+    </p:spTree>
+    <p:extLst>
+      <p:ext uri="{BB962C8B-B14F-4D97-AF65-F5344CB8AC3E}">
+        <p14:creationId xmlns:p14="http://schemas.microsoft.com/office/powerpoint/2010/main" val="1712241861"/>
+      </p:ext>
+    </p:extLst>
+  </p:cSld>
+  <p:clrMapOvr>
+    <a:masterClrMapping/>
+  </p:clrMapOvr>
+  <p:transition>
+    <p:fade/>
+  </p:transition>
+</p:sld>
+</file>
+
+<file path=ppt/slides/slide9.xml><?xml version="1.0" encoding="utf-8"?>
+<p:sld xmlns:a="http://schemas.openxmlformats.org/drawingml/2006/main" xmlns:r="http://schemas.openxmlformats.org/officeDocument/2006/relationships" xmlns:p="http://schemas.openxmlformats.org/presentationml/2006/main">
+  <p:cSld>
+    <p:spTree>
+      <p:nvGrpSpPr>
+        <p:cNvPr id="1" name=""/>
+        <p:cNvGrpSpPr/>
+        <p:nvPr/>
+      </p:nvGrpSpPr>
+      <p:grpSpPr>
+        <a:xfrm>
+          <a:off x="0" y="0"/>
+          <a:ext cx="0" cy="0"/>
+          <a:chOff x="0" y="0"/>
+          <a:chExt cx="0" cy="0"/>
+        </a:xfrm>
+      </p:grpSpPr>
+      <p:sp>
+        <p:nvSpPr>
+          <p:cNvPr id="5" name="Rectangle 4">
+            <a:extLst>
+              <a:ext uri="{FF2B5EF4-FFF2-40B4-BE49-F238E27FC236}">
                 <a16:creationId xmlns:a16="http://schemas.microsoft.com/office/drawing/2014/main" id="{02DE89CA-A60D-1CBA-419F-E45ECDC38EAE}"/>
               </a:ext>
             </a:extLst>
@@ -8808,562 +9943,6 @@
       <p:bldP spid="4" grpId="0"/>
     </p:bldLst>
   </p:timing>
-</p:sld>
-</file>
-
-<file path=ppt/slides/slide7.xml><?xml version="1.0" encoding="utf-8"?>
-<p:sld xmlns:a="http://schemas.openxmlformats.org/drawingml/2006/main" xmlns:r="http://schemas.openxmlformats.org/officeDocument/2006/relationships" xmlns:p="http://schemas.openxmlformats.org/presentationml/2006/main">
-  <p:cSld>
-    <p:spTree>
-      <p:nvGrpSpPr>
-        <p:cNvPr id="1" name=""/>
-        <p:cNvGrpSpPr/>
-        <p:nvPr/>
-      </p:nvGrpSpPr>
-      <p:grpSpPr>
-        <a:xfrm>
-          <a:off x="0" y="0"/>
-          <a:ext cx="0" cy="0"/>
-          <a:chOff x="0" y="0"/>
-          <a:chExt cx="0" cy="0"/>
-        </a:xfrm>
-      </p:grpSpPr>
-      <p:sp>
-        <p:nvSpPr>
-          <p:cNvPr id="2" name="Title 1"/>
-          <p:cNvSpPr>
-            <a:spLocks noGrp="1"/>
-          </p:cNvSpPr>
-          <p:nvPr>
-            <p:ph type="title"/>
-          </p:nvPr>
-        </p:nvSpPr>
-        <p:spPr/>
-        <p:txBody>
-          <a:bodyPr anchor="ctr"/>
-          <a:lstStyle/>
-          <a:p>
-            <a:r>
-              <a:rPr lang="en-US" dirty="0">
-                <a:solidFill>
-                  <a:schemeClr val="tx1"/>
-                </a:solidFill>
-              </a:rPr>
-              <a:t>Example</a:t>
-            </a:r>
-          </a:p>
-        </p:txBody>
-      </p:sp>
-      <p:sp>
-        <p:nvSpPr>
-          <p:cNvPr id="3" name="Content Placeholder 2"/>
-          <p:cNvSpPr>
-            <a:spLocks noGrp="1"/>
-          </p:cNvSpPr>
-          <p:nvPr>
-            <p:ph idx="1"/>
-          </p:nvPr>
-        </p:nvSpPr>
-        <p:spPr>
-          <a:xfrm>
-            <a:off x="0" y="1152475"/>
-            <a:ext cx="9144000" cy="3416400"/>
-          </a:xfrm>
-        </p:spPr>
-        <p:txBody>
-          <a:bodyPr anchor="ctr">
-            <a:noAutofit/>
-          </a:bodyPr>
-          <a:lstStyle/>
-          <a:p>
-            <a:pPr marL="42863" indent="0" algn="ctr">
-              <a:buNone/>
-            </a:pPr>
-            <a:r>
-              <a:rPr lang="en-US" sz="2000" b="1" dirty="0">
-                <a:solidFill>
-                  <a:schemeClr val="bg1"/>
-                </a:solidFill>
-                <a:hlinkClick r:id="rId3">
-                  <a:extLst>
-                    <a:ext uri="{A12FA001-AC4F-418D-AE19-62706E023703}">
-                      <ahyp:hlinkClr xmlns:ahyp="http://schemas.microsoft.com/office/drawing/2018/hyperlinkcolor" val="tx"/>
-                    </a:ext>
-                  </a:extLst>
-                </a:hlinkClick>
-              </a:rPr>
-              <a:t>https://replit.com/@HylandOutreach/BasicElementsExample</a:t>
-            </a:r>
-            <a:endParaRPr lang="en-US" sz="2000" b="1" dirty="0">
-              <a:solidFill>
-                <a:schemeClr val="bg1"/>
-              </a:solidFill>
-            </a:endParaRPr>
-          </a:p>
-        </p:txBody>
-      </p:sp>
-    </p:spTree>
-    <p:extLst>
-      <p:ext uri="{BB962C8B-B14F-4D97-AF65-F5344CB8AC3E}">
-        <p14:creationId xmlns:p14="http://schemas.microsoft.com/office/powerpoint/2010/main" val="153810681"/>
-      </p:ext>
-    </p:extLst>
-  </p:cSld>
-  <p:clrMapOvr>
-    <a:masterClrMapping/>
-  </p:clrMapOvr>
-  <p:transition>
-    <p:fade/>
-  </p:transition>
-</p:sld>
-</file>
-
-<file path=ppt/slides/slide8.xml><?xml version="1.0" encoding="utf-8"?>
-<p:sld xmlns:a="http://schemas.openxmlformats.org/drawingml/2006/main" xmlns:r="http://schemas.openxmlformats.org/officeDocument/2006/relationships" xmlns:p="http://schemas.openxmlformats.org/presentationml/2006/main">
-  <p:cSld>
-    <p:spTree>
-      <p:nvGrpSpPr>
-        <p:cNvPr id="1" name="Shape 1502"/>
-        <p:cNvGrpSpPr/>
-        <p:nvPr/>
-      </p:nvGrpSpPr>
-      <p:grpSpPr>
-        <a:xfrm>
-          <a:off x="0" y="0"/>
-          <a:ext cx="0" cy="0"/>
-          <a:chOff x="0" y="0"/>
-          <a:chExt cx="0" cy="0"/>
-        </a:xfrm>
-      </p:grpSpPr>
-      <p:sp>
-        <p:nvSpPr>
-          <p:cNvPr id="1503" name="Google Shape;1503;p54"/>
-          <p:cNvSpPr txBox="1">
-            <a:spLocks noGrp="1"/>
-          </p:cNvSpPr>
-          <p:nvPr>
-            <p:ph type="subTitle" idx="1"/>
-          </p:nvPr>
-        </p:nvSpPr>
-        <p:spPr>
-          <a:xfrm>
-            <a:off x="720000" y="1824225"/>
-            <a:ext cx="5650200" cy="378300"/>
-          </a:xfrm>
-          <a:prstGeom prst="rect">
-            <a:avLst/>
-          </a:prstGeom>
-        </p:spPr>
-        <p:txBody>
-          <a:bodyPr spcFirstLastPara="1" wrap="square" lIns="91425" tIns="91425" rIns="91425" bIns="91425" anchor="t" anchorCtr="0">
-            <a:noAutofit/>
-          </a:bodyPr>
-          <a:lstStyle/>
-          <a:p>
-            <a:pPr marL="0" lvl="0" indent="0" algn="l" rtl="0">
-              <a:spcBef>
-                <a:spcPts val="0"/>
-              </a:spcBef>
-              <a:spcAft>
-                <a:spcPts val="0"/>
-              </a:spcAft>
-              <a:buNone/>
-            </a:pPr>
-            <a:r>
-              <a:rPr lang="en" dirty="0"/>
-              <a:t>DO YOU HAVE ANY QUESTIONS?</a:t>
-            </a:r>
-            <a:endParaRPr dirty="0"/>
-          </a:p>
-        </p:txBody>
-      </p:sp>
-      <p:sp>
-        <p:nvSpPr>
-          <p:cNvPr id="1504" name="Google Shape;1504;p54"/>
-          <p:cNvSpPr txBox="1">
-            <a:spLocks noGrp="1"/>
-          </p:cNvSpPr>
-          <p:nvPr>
-            <p:ph type="ctrTitle"/>
-          </p:nvPr>
-        </p:nvSpPr>
-        <p:spPr>
-          <a:xfrm>
-            <a:off x="720000" y="1049325"/>
-            <a:ext cx="5650200" cy="774900"/>
-          </a:xfrm>
-          <a:prstGeom prst="rect">
-            <a:avLst/>
-          </a:prstGeom>
-        </p:spPr>
-        <p:txBody>
-          <a:bodyPr spcFirstLastPara="1" wrap="square" lIns="91425" tIns="91425" rIns="91425" bIns="91425" anchor="t" anchorCtr="0">
-            <a:noAutofit/>
-          </a:bodyPr>
-          <a:lstStyle/>
-          <a:p>
-            <a:pPr marL="0" lvl="0" indent="0" algn="l" rtl="0">
-              <a:spcBef>
-                <a:spcPts val="0"/>
-              </a:spcBef>
-              <a:spcAft>
-                <a:spcPts val="0"/>
-              </a:spcAft>
-              <a:buNone/>
-            </a:pPr>
-            <a:r>
-              <a:rPr lang="en"/>
-              <a:t>THANKS!</a:t>
-            </a:r>
-            <a:endParaRPr/>
-          </a:p>
-        </p:txBody>
-      </p:sp>
-      <p:sp>
-        <p:nvSpPr>
-          <p:cNvPr id="1542" name="Google Shape;1542;p54"/>
-          <p:cNvSpPr/>
-          <p:nvPr/>
-        </p:nvSpPr>
-        <p:spPr>
-          <a:xfrm>
-            <a:off x="570050" y="3746300"/>
-            <a:ext cx="939600" cy="939600"/>
-          </a:xfrm>
-          <a:prstGeom prst="snip1Rect">
-            <a:avLst>
-              <a:gd name="adj" fmla="val 11329"/>
-            </a:avLst>
-          </a:prstGeom>
-          <a:solidFill>
-            <a:schemeClr val="lt1"/>
-          </a:solidFill>
-          <a:ln w="28575" cap="flat" cmpd="sng">
-            <a:solidFill>
-              <a:schemeClr val="dk1"/>
-            </a:solidFill>
-            <a:prstDash val="solid"/>
-            <a:round/>
-            <a:headEnd type="none" w="sm" len="sm"/>
-            <a:tailEnd type="none" w="sm" len="sm"/>
-          </a:ln>
-        </p:spPr>
-        <p:txBody>
-          <a:bodyPr spcFirstLastPara="1" wrap="square" lIns="91425" tIns="91425" rIns="91425" bIns="91425" anchor="ctr" anchorCtr="0">
-            <a:noAutofit/>
-          </a:bodyPr>
-          <a:lstStyle/>
-          <a:p>
-            <a:pPr marL="0" lvl="0" indent="0" algn="l" rtl="0">
-              <a:spcBef>
-                <a:spcPts val="0"/>
-              </a:spcBef>
-              <a:spcAft>
-                <a:spcPts val="0"/>
-              </a:spcAft>
-              <a:buNone/>
-            </a:pPr>
-            <a:endParaRPr/>
-          </a:p>
-        </p:txBody>
-      </p:sp>
-      <p:sp>
-        <p:nvSpPr>
-          <p:cNvPr id="1543" name="Google Shape;1543;p54"/>
-          <p:cNvSpPr/>
-          <p:nvPr/>
-        </p:nvSpPr>
-        <p:spPr>
-          <a:xfrm>
-            <a:off x="490150" y="3665400"/>
-            <a:ext cx="939600" cy="939600"/>
-          </a:xfrm>
-          <a:prstGeom prst="snip1Rect">
-            <a:avLst>
-              <a:gd name="adj" fmla="val 11329"/>
-            </a:avLst>
-          </a:prstGeom>
-          <a:solidFill>
-            <a:schemeClr val="accent1"/>
-          </a:solidFill>
-          <a:ln w="28575" cap="flat" cmpd="sng">
-            <a:solidFill>
-              <a:schemeClr val="dk1"/>
-            </a:solidFill>
-            <a:prstDash val="solid"/>
-            <a:round/>
-            <a:headEnd type="none" w="sm" len="sm"/>
-            <a:tailEnd type="none" w="sm" len="sm"/>
-          </a:ln>
-        </p:spPr>
-        <p:txBody>
-          <a:bodyPr spcFirstLastPara="1" wrap="square" lIns="91425" tIns="91425" rIns="91425" bIns="91425" anchor="ctr" anchorCtr="0">
-            <a:noAutofit/>
-          </a:bodyPr>
-          <a:lstStyle/>
-          <a:p>
-            <a:pPr marL="0" lvl="0" indent="0" algn="l" rtl="0">
-              <a:spcBef>
-                <a:spcPts val="0"/>
-              </a:spcBef>
-              <a:spcAft>
-                <a:spcPts val="0"/>
-              </a:spcAft>
-              <a:buNone/>
-            </a:pPr>
-            <a:endParaRPr/>
-          </a:p>
-        </p:txBody>
-      </p:sp>
-      <p:sp>
-        <p:nvSpPr>
-          <p:cNvPr id="1544" name="Google Shape;1544;p54"/>
-          <p:cNvSpPr/>
-          <p:nvPr/>
-        </p:nvSpPr>
-        <p:spPr>
-          <a:xfrm>
-            <a:off x="1708675" y="3746300"/>
-            <a:ext cx="939600" cy="939600"/>
-          </a:xfrm>
-          <a:prstGeom prst="snip1Rect">
-            <a:avLst>
-              <a:gd name="adj" fmla="val 11329"/>
-            </a:avLst>
-          </a:prstGeom>
-          <a:solidFill>
-            <a:schemeClr val="lt1"/>
-          </a:solidFill>
-          <a:ln w="28575" cap="flat" cmpd="sng">
-            <a:solidFill>
-              <a:schemeClr val="dk1"/>
-            </a:solidFill>
-            <a:prstDash val="solid"/>
-            <a:round/>
-            <a:headEnd type="none" w="sm" len="sm"/>
-            <a:tailEnd type="none" w="sm" len="sm"/>
-          </a:ln>
-        </p:spPr>
-        <p:txBody>
-          <a:bodyPr spcFirstLastPara="1" wrap="square" lIns="91425" tIns="91425" rIns="91425" bIns="91425" anchor="ctr" anchorCtr="0">
-            <a:noAutofit/>
-          </a:bodyPr>
-          <a:lstStyle/>
-          <a:p>
-            <a:pPr marL="0" lvl="0" indent="0" algn="l" rtl="0">
-              <a:spcBef>
-                <a:spcPts val="0"/>
-              </a:spcBef>
-              <a:spcAft>
-                <a:spcPts val="0"/>
-              </a:spcAft>
-              <a:buNone/>
-            </a:pPr>
-            <a:endParaRPr/>
-          </a:p>
-        </p:txBody>
-      </p:sp>
-      <p:sp>
-        <p:nvSpPr>
-          <p:cNvPr id="1545" name="Google Shape;1545;p54"/>
-          <p:cNvSpPr/>
-          <p:nvPr/>
-        </p:nvSpPr>
-        <p:spPr>
-          <a:xfrm>
-            <a:off x="1628775" y="3665400"/>
-            <a:ext cx="939600" cy="939600"/>
-          </a:xfrm>
-          <a:prstGeom prst="snip1Rect">
-            <a:avLst>
-              <a:gd name="adj" fmla="val 11329"/>
-            </a:avLst>
-          </a:prstGeom>
-          <a:solidFill>
-            <a:schemeClr val="accent2"/>
-          </a:solidFill>
-          <a:ln w="28575" cap="flat" cmpd="sng">
-            <a:solidFill>
-              <a:schemeClr val="dk1"/>
-            </a:solidFill>
-            <a:prstDash val="solid"/>
-            <a:round/>
-            <a:headEnd type="none" w="sm" len="sm"/>
-            <a:tailEnd type="none" w="sm" len="sm"/>
-          </a:ln>
-        </p:spPr>
-        <p:txBody>
-          <a:bodyPr spcFirstLastPara="1" wrap="square" lIns="91425" tIns="91425" rIns="91425" bIns="91425" anchor="ctr" anchorCtr="0">
-            <a:noAutofit/>
-          </a:bodyPr>
-          <a:lstStyle/>
-          <a:p>
-            <a:pPr marL="0" lvl="0" indent="0" algn="l" rtl="0">
-              <a:spcBef>
-                <a:spcPts val="0"/>
-              </a:spcBef>
-              <a:spcAft>
-                <a:spcPts val="0"/>
-              </a:spcAft>
-              <a:buNone/>
-            </a:pPr>
-            <a:endParaRPr/>
-          </a:p>
-        </p:txBody>
-      </p:sp>
-      <p:sp>
-        <p:nvSpPr>
-          <p:cNvPr id="1546" name="Google Shape;1546;p54"/>
-          <p:cNvSpPr/>
-          <p:nvPr/>
-        </p:nvSpPr>
-        <p:spPr>
-          <a:xfrm>
-            <a:off x="2847300" y="3746300"/>
-            <a:ext cx="939600" cy="939600"/>
-          </a:xfrm>
-          <a:prstGeom prst="snip1Rect">
-            <a:avLst>
-              <a:gd name="adj" fmla="val 11329"/>
-            </a:avLst>
-          </a:prstGeom>
-          <a:solidFill>
-            <a:schemeClr val="lt1"/>
-          </a:solidFill>
-          <a:ln w="28575" cap="flat" cmpd="sng">
-            <a:solidFill>
-              <a:schemeClr val="dk1"/>
-            </a:solidFill>
-            <a:prstDash val="solid"/>
-            <a:round/>
-            <a:headEnd type="none" w="sm" len="sm"/>
-            <a:tailEnd type="none" w="sm" len="sm"/>
-          </a:ln>
-        </p:spPr>
-        <p:txBody>
-          <a:bodyPr spcFirstLastPara="1" wrap="square" lIns="91425" tIns="91425" rIns="91425" bIns="91425" anchor="ctr" anchorCtr="0">
-            <a:noAutofit/>
-          </a:bodyPr>
-          <a:lstStyle/>
-          <a:p>
-            <a:pPr marL="0" lvl="0" indent="0" algn="l" rtl="0">
-              <a:spcBef>
-                <a:spcPts val="0"/>
-              </a:spcBef>
-              <a:spcAft>
-                <a:spcPts val="0"/>
-              </a:spcAft>
-              <a:buNone/>
-            </a:pPr>
-            <a:endParaRPr/>
-          </a:p>
-        </p:txBody>
-      </p:sp>
-      <p:sp>
-        <p:nvSpPr>
-          <p:cNvPr id="1547" name="Google Shape;1547;p54"/>
-          <p:cNvSpPr/>
-          <p:nvPr/>
-        </p:nvSpPr>
-        <p:spPr>
-          <a:xfrm>
-            <a:off x="2767400" y="3665400"/>
-            <a:ext cx="939600" cy="939600"/>
-          </a:xfrm>
-          <a:prstGeom prst="snip1Rect">
-            <a:avLst>
-              <a:gd name="adj" fmla="val 11329"/>
-            </a:avLst>
-          </a:prstGeom>
-          <a:solidFill>
-            <a:schemeClr val="lt2"/>
-          </a:solidFill>
-          <a:ln w="28575" cap="flat" cmpd="sng">
-            <a:solidFill>
-              <a:schemeClr val="dk1"/>
-            </a:solidFill>
-            <a:prstDash val="solid"/>
-            <a:round/>
-            <a:headEnd type="none" w="sm" len="sm"/>
-            <a:tailEnd type="none" w="sm" len="sm"/>
-          </a:ln>
-        </p:spPr>
-        <p:txBody>
-          <a:bodyPr spcFirstLastPara="1" wrap="square" lIns="91425" tIns="91425" rIns="91425" bIns="91425" anchor="ctr" anchorCtr="0">
-            <a:noAutofit/>
-          </a:bodyPr>
-          <a:lstStyle/>
-          <a:p>
-            <a:pPr marL="0" lvl="0" indent="0" algn="l" rtl="0">
-              <a:spcBef>
-                <a:spcPts val="0"/>
-              </a:spcBef>
-              <a:spcAft>
-                <a:spcPts val="0"/>
-              </a:spcAft>
-              <a:buNone/>
-            </a:pPr>
-            <a:endParaRPr/>
-          </a:p>
-        </p:txBody>
-      </p:sp>
-      <p:sp>
-        <p:nvSpPr>
-          <p:cNvPr id="4" name="Rectangle 3">
-            <a:extLst>
-              <a:ext uri="{FF2B5EF4-FFF2-40B4-BE49-F238E27FC236}">
-                <a16:creationId xmlns:a16="http://schemas.microsoft.com/office/drawing/2014/main" id="{9694C185-2733-82A6-CD26-B6BB946D14B6}"/>
-              </a:ext>
-            </a:extLst>
-          </p:cNvPr>
-          <p:cNvSpPr/>
-          <p:nvPr/>
-        </p:nvSpPr>
-        <p:spPr>
-          <a:xfrm>
-            <a:off x="4211782" y="3837709"/>
-            <a:ext cx="4253345" cy="477982"/>
-          </a:xfrm>
-          <a:prstGeom prst="rect">
-            <a:avLst/>
-          </a:prstGeom>
-          <a:solidFill>
-            <a:schemeClr val="bg1"/>
-          </a:solidFill>
-          <a:ln>
-            <a:noFill/>
-          </a:ln>
-        </p:spPr>
-        <p:style>
-          <a:lnRef idx="2">
-            <a:schemeClr val="accent1">
-              <a:shade val="50000"/>
-            </a:schemeClr>
-          </a:lnRef>
-          <a:fillRef idx="1">
-            <a:schemeClr val="accent1"/>
-          </a:fillRef>
-          <a:effectRef idx="0">
-            <a:schemeClr val="accent1"/>
-          </a:effectRef>
-          <a:fontRef idx="minor">
-            <a:schemeClr val="lt1"/>
-          </a:fontRef>
-        </p:style>
-        <p:txBody>
-          <a:bodyPr rtlCol="0" anchor="ctr"/>
-          <a:lstStyle/>
-          <a:p>
-            <a:pPr algn="ctr"/>
-            <a:endParaRPr lang="en-US"/>
-          </a:p>
-        </p:txBody>
-      </p:sp>
-    </p:spTree>
-  </p:cSld>
-  <p:clrMapOvr>
-    <a:masterClrMapping/>
-  </p:clrMapOvr>
 </p:sld>
 </file>
 

</xml_diff>

<commit_message>
replit to glitch changes
</commit_message>
<xml_diff>
--- a/Week02/BasicHtmlElements.pptx
+++ b/Week02/BasicHtmlElements.pptx
@@ -4586,7 +4586,7 @@
           <a:p>
             <a:fld id="{5958763E-B898-436D-883D-03711491D54A}" type="datetimeFigureOut">
               <a:rPr lang="en-US" smtClean="0"/>
-              <a:t>8/21/2024</a:t>
+              <a:t>8/30/2024</a:t>
             </a:fld>
             <a:endParaRPr lang="en-US"/>
           </a:p>
@@ -6508,24 +6508,23 @@
               <a:buNone/>
             </a:pPr>
             <a:r>
-              <a:rPr lang="en-US" sz="2000" b="1" dirty="0">
+              <a:rPr lang="en-US" sz="2000" b="1">
                 <a:solidFill>
-                  <a:schemeClr val="bg1"/>
+                  <a:schemeClr val="tx1"/>
                 </a:solidFill>
-                <a:hlinkClick r:id="rId3">
-                  <a:extLst>
-                    <a:ext uri="{A12FA001-AC4F-418D-AE19-62706E023703}">
-                      <ahyp:hlinkClr xmlns:ahyp="http://schemas.microsoft.com/office/drawing/2018/hyperlinkcolor" val="tx"/>
-                    </a:ext>
-                  </a:extLst>
-                </a:hlinkClick>
+                <a:highlight>
+                  <a:srgbClr val="C0C0C0"/>
+                </a:highlight>
               </a:rPr>
-              <a:t>https://replit.com/@HylandOutreach/BasicElementsExample</a:t>
+              <a:t>https://glitch.com/edit/#!/remix/basicelementsexample</a:t>
             </a:r>
             <a:endParaRPr lang="en-US" sz="2000" b="1" dirty="0">
               <a:solidFill>
-                <a:schemeClr val="bg1"/>
+                <a:schemeClr val="tx1"/>
               </a:solidFill>
+              <a:highlight>
+                <a:srgbClr val="C0C0C0"/>
+              </a:highlight>
             </a:endParaRPr>
           </a:p>
         </p:txBody>

</xml_diff>

<commit_message>
Update gitbook 2024-08-30 20:31:56
</commit_message>
<xml_diff>
--- a/Week02/BasicHtmlElements.pptx
+++ b/Week02/BasicHtmlElements.pptx
@@ -4586,7 +4586,7 @@
           <a:p>
             <a:fld id="{5958763E-B898-436D-883D-03711491D54A}" type="datetimeFigureOut">
               <a:rPr lang="en-US" smtClean="0"/>
-              <a:t>8/21/2024</a:t>
+              <a:t>8/30/2024</a:t>
             </a:fld>
             <a:endParaRPr lang="en-US"/>
           </a:p>
@@ -6508,24 +6508,23 @@
               <a:buNone/>
             </a:pPr>
             <a:r>
-              <a:rPr lang="en-US" sz="2000" b="1" dirty="0">
+              <a:rPr lang="en-US" sz="2000" b="1">
                 <a:solidFill>
-                  <a:schemeClr val="bg1"/>
+                  <a:schemeClr val="tx1"/>
                 </a:solidFill>
-                <a:hlinkClick r:id="rId3">
-                  <a:extLst>
-                    <a:ext uri="{A12FA001-AC4F-418D-AE19-62706E023703}">
-                      <ahyp:hlinkClr xmlns:ahyp="http://schemas.microsoft.com/office/drawing/2018/hyperlinkcolor" val="tx"/>
-                    </a:ext>
-                  </a:extLst>
-                </a:hlinkClick>
+                <a:highlight>
+                  <a:srgbClr val="C0C0C0"/>
+                </a:highlight>
               </a:rPr>
-              <a:t>https://replit.com/@HylandOutreach/BasicElementsExample</a:t>
+              <a:t>https://glitch.com/edit/#!/remix/basicelementsexample</a:t>
             </a:r>
             <a:endParaRPr lang="en-US" sz="2000" b="1" dirty="0">
               <a:solidFill>
-                <a:schemeClr val="bg1"/>
+                <a:schemeClr val="tx1"/>
               </a:solidFill>
+              <a:highlight>
+                <a:srgbClr val="C0C0C0"/>
+              </a:highlight>
             </a:endParaRPr>
           </a:p>
         </p:txBody>

</xml_diff>

<commit_message>
powerpoints use jsfiddle instead of others
</commit_message>
<xml_diff>
--- a/Week02/BasicHtmlElements.pptx
+++ b/Week02/BasicHtmlElements.pptx
@@ -4586,7 +4586,7 @@
           <a:p>
             <a:fld id="{5958763E-B898-436D-883D-03711491D54A}" type="datetimeFigureOut">
               <a:rPr lang="en-US" smtClean="0"/>
-              <a:t>8/30/2024</a:t>
+              <a:t>9/4/2024</a:t>
             </a:fld>
             <a:endParaRPr lang="en-US"/>
           </a:p>
@@ -6508,7 +6508,19 @@
               <a:buNone/>
             </a:pPr>
             <a:r>
-              <a:rPr lang="en-US" sz="2000" b="1">
+              <a:rPr lang="en-US" sz="2000" b="1" dirty="0">
+                <a:solidFill>
+                  <a:schemeClr val="tx1"/>
+                </a:solidFill>
+                <a:highlight>
+                  <a:srgbClr val="C0C0C0"/>
+                </a:highlight>
+                <a:hlinkClick r:id="rId3"/>
+              </a:rPr>
+              <a:t>https://jsfiddle.net/mxtdvL10/</a:t>
+            </a:r>
+            <a:r>
+              <a:rPr lang="en-US" sz="2000" b="1" dirty="0">
                 <a:solidFill>
                   <a:schemeClr val="tx1"/>
                 </a:solidFill>
@@ -6516,16 +6528,8 @@
                   <a:srgbClr val="C0C0C0"/>
                 </a:highlight>
               </a:rPr>
-              <a:t>https://glitch.com/edit/#!/remix/basicelementsexample</a:t>
+              <a:t> </a:t>
             </a:r>
-            <a:endParaRPr lang="en-US" sz="2000" b="1" dirty="0">
-              <a:solidFill>
-                <a:schemeClr val="tx1"/>
-              </a:solidFill>
-              <a:highlight>
-                <a:srgbClr val="C0C0C0"/>
-              </a:highlight>
-            </a:endParaRPr>
           </a:p>
         </p:txBody>
       </p:sp>

</xml_diff>

<commit_message>
Update gitbook 2024-09-04 17:35:20
</commit_message>
<xml_diff>
--- a/Week02/BasicHtmlElements.pptx
+++ b/Week02/BasicHtmlElements.pptx
@@ -4586,7 +4586,7 @@
           <a:p>
             <a:fld id="{5958763E-B898-436D-883D-03711491D54A}" type="datetimeFigureOut">
               <a:rPr lang="en-US" smtClean="0"/>
-              <a:t>8/30/2024</a:t>
+              <a:t>9/4/2024</a:t>
             </a:fld>
             <a:endParaRPr lang="en-US"/>
           </a:p>
@@ -6508,7 +6508,19 @@
               <a:buNone/>
             </a:pPr>
             <a:r>
-              <a:rPr lang="en-US" sz="2000" b="1">
+              <a:rPr lang="en-US" sz="2000" b="1" dirty="0">
+                <a:solidFill>
+                  <a:schemeClr val="tx1"/>
+                </a:solidFill>
+                <a:highlight>
+                  <a:srgbClr val="C0C0C0"/>
+                </a:highlight>
+                <a:hlinkClick r:id="rId3"/>
+              </a:rPr>
+              <a:t>https://jsfiddle.net/mxtdvL10/</a:t>
+            </a:r>
+            <a:r>
+              <a:rPr lang="en-US" sz="2000" b="1" dirty="0">
                 <a:solidFill>
                   <a:schemeClr val="tx1"/>
                 </a:solidFill>
@@ -6516,16 +6528,8 @@
                   <a:srgbClr val="C0C0C0"/>
                 </a:highlight>
               </a:rPr>
-              <a:t>https://glitch.com/edit/#!/remix/basicelementsexample</a:t>
+              <a:t> </a:t>
             </a:r>
-            <a:endParaRPr lang="en-US" sz="2000" b="1" dirty="0">
-              <a:solidFill>
-                <a:schemeClr val="tx1"/>
-              </a:solidFill>
-              <a:highlight>
-                <a:srgbClr val="C0C0C0"/>
-              </a:highlight>
-            </a:endParaRPr>
           </a:p>
         </p:txBody>
       </p:sp>

</xml_diff>

<commit_message>
fix week 2 ppt typo
</commit_message>
<xml_diff>
--- a/Week02/BasicHtmlElements.pptx
+++ b/Week02/BasicHtmlElements.pptx
@@ -4586,7 +4586,7 @@
           <a:p>
             <a:fld id="{5958763E-B898-436D-883D-03711491D54A}" type="datetimeFigureOut">
               <a:rPr lang="en-US" smtClean="0"/>
-              <a:t>9/4/2024</a:t>
+              <a:t>9/30/2024</a:t>
             </a:fld>
             <a:endParaRPr lang="en-US"/>
           </a:p>
@@ -7132,10 +7132,16 @@
           </a:p>
           <a:p>
             <a:r>
+              <a:rPr lang="en-US" sz="3600">
+                <a:latin typeface="Consolas" panose="020B0609020204030204" pitchFamily="49" charset="0"/>
+              </a:rPr>
+              <a:t>&lt;/html</a:t>
+            </a:r>
+            <a:r>
               <a:rPr lang="en-US" sz="3600" dirty="0">
                 <a:latin typeface="Consolas" panose="020B0609020204030204" pitchFamily="49" charset="0"/>
               </a:rPr>
-              <a:t>&lt;html&gt;</a:t>
+              <a:t>&gt;</a:t>
             </a:r>
           </a:p>
         </p:txBody>

</xml_diff>

<commit_message>
Update gitbook 2024-09-30 16:59:48
</commit_message>
<xml_diff>
--- a/Week02/BasicHtmlElements.pptx
+++ b/Week02/BasicHtmlElements.pptx
@@ -4586,7 +4586,7 @@
           <a:p>
             <a:fld id="{5958763E-B898-436D-883D-03711491D54A}" type="datetimeFigureOut">
               <a:rPr lang="en-US" smtClean="0"/>
-              <a:t>9/4/2024</a:t>
+              <a:t>9/30/2024</a:t>
             </a:fld>
             <a:endParaRPr lang="en-US"/>
           </a:p>
@@ -7132,10 +7132,16 @@
           </a:p>
           <a:p>
             <a:r>
+              <a:rPr lang="en-US" sz="3600">
+                <a:latin typeface="Consolas" panose="020B0609020204030204" pitchFamily="49" charset="0"/>
+              </a:rPr>
+              <a:t>&lt;/html</a:t>
+            </a:r>
+            <a:r>
               <a:rPr lang="en-US" sz="3600" dirty="0">
                 <a:latin typeface="Consolas" panose="020B0609020204030204" pitchFamily="49" charset="0"/>
               </a:rPr>
-              <a:t>&lt;html&gt;</a:t>
+              <a:t>&gt;</a:t>
             </a:r>
           </a:p>
         </p:txBody>

</xml_diff>